<commit_message>
premier run sous skincheck
</commit_message>
<xml_diff>
--- a/admin/skin_project_archi_0706.pptx
+++ b/admin/skin_project_archi_0706.pptx
@@ -254,6 +254,7 @@
 <p1510:revInfo xmlns:a="http://schemas.openxmlformats.org/drawingml/2006/main" xmlns:r="http://schemas.openxmlformats.org/officeDocument/2006/relationships" xmlns:p1510="http://schemas.microsoft.com/office/powerpoint/2015/10/main">
   <p1510:revLst>
     <p1510:client id="{21B86071-847B-4CE7-ACEB-EC73C17F7BE1}" v="153" dt="2024-06-06T22:12:25.317"/>
+    <p1510:client id="{A89391CB-9751-4520-9ECA-7ECDFA5EA23C}" v="1" dt="2024-06-07T08:50:37.360"/>
   </p1510:revLst>
 </p1510:revInfo>
 </file>
@@ -1353,6 +1354,93 @@
           </pc:sldLayoutMkLst>
         </pc:sldLayoutChg>
       </pc:sldMasterChg>
+    </pc:docChg>
+  </pc:docChgLst>
+  <pc:docChgLst>
+    <pc:chgData name="Philippe Baucour" userId="5102170ae7533958" providerId="LiveId" clId="{A89391CB-9751-4520-9ECA-7ECDFA5EA23C}"/>
+    <pc:docChg chg="custSel modSld">
+      <pc:chgData name="Philippe Baucour" userId="5102170ae7533958" providerId="LiveId" clId="{A89391CB-9751-4520-9ECA-7ECDFA5EA23C}" dt="2024-06-07T15:20:33.537" v="29" actId="20577"/>
+      <pc:docMkLst>
+        <pc:docMk/>
+      </pc:docMkLst>
+      <pc:sldChg chg="modSp mod">
+        <pc:chgData name="Philippe Baucour" userId="5102170ae7533958" providerId="LiveId" clId="{A89391CB-9751-4520-9ECA-7ECDFA5EA23C}" dt="2024-06-07T15:20:33.537" v="29" actId="20577"/>
+        <pc:sldMkLst>
+          <pc:docMk/>
+          <pc:sldMk cId="1234096396" sldId="265"/>
+        </pc:sldMkLst>
+        <pc:spChg chg="mod">
+          <ac:chgData name="Philippe Baucour" userId="5102170ae7533958" providerId="LiveId" clId="{A89391CB-9751-4520-9ECA-7ECDFA5EA23C}" dt="2024-06-07T08:58:59.819" v="19" actId="20577"/>
+          <ac:spMkLst>
+            <pc:docMk/>
+            <pc:sldMk cId="1234096396" sldId="265"/>
+            <ac:spMk id="3" creationId="{3D5747AA-8B62-5C79-BC10-9F4115BE33B3}"/>
+          </ac:spMkLst>
+        </pc:spChg>
+        <pc:spChg chg="mod">
+          <ac:chgData name="Philippe Baucour" userId="5102170ae7533958" providerId="LiveId" clId="{A89391CB-9751-4520-9ECA-7ECDFA5EA23C}" dt="2024-06-07T15:20:21.929" v="26" actId="20577"/>
+          <ac:spMkLst>
+            <pc:docMk/>
+            <pc:sldMk cId="1234096396" sldId="265"/>
+            <ac:spMk id="11" creationId="{79E35FDB-22AC-7F4D-2AE0-1F1272A4399D}"/>
+          </ac:spMkLst>
+        </pc:spChg>
+        <pc:spChg chg="mod">
+          <ac:chgData name="Philippe Baucour" userId="5102170ae7533958" providerId="LiveId" clId="{A89391CB-9751-4520-9ECA-7ECDFA5EA23C}" dt="2024-06-07T15:20:33.537" v="29" actId="20577"/>
+          <ac:spMkLst>
+            <pc:docMk/>
+            <pc:sldMk cId="1234096396" sldId="265"/>
+            <ac:spMk id="12" creationId="{4C36F25D-D0ED-0579-6575-B4BB62B9EE58}"/>
+          </ac:spMkLst>
+        </pc:spChg>
+      </pc:sldChg>
+      <pc:sldChg chg="addSp delSp modSp mod">
+        <pc:chgData name="Philippe Baucour" userId="5102170ae7533958" providerId="LiveId" clId="{A89391CB-9751-4520-9ECA-7ECDFA5EA23C}" dt="2024-06-07T08:59:05.895" v="23" actId="20577"/>
+        <pc:sldMkLst>
+          <pc:docMk/>
+          <pc:sldMk cId="3601296998" sldId="267"/>
+        </pc:sldMkLst>
+        <pc:spChg chg="add mod">
+          <ac:chgData name="Philippe Baucour" userId="5102170ae7533958" providerId="LiveId" clId="{A89391CB-9751-4520-9ECA-7ECDFA5EA23C}" dt="2024-06-07T08:51:00.024" v="15" actId="1076"/>
+          <ac:spMkLst>
+            <pc:docMk/>
+            <pc:sldMk cId="3601296998" sldId="267"/>
+            <ac:spMk id="2" creationId="{7FB152FA-6981-EA90-83A1-41DAFE3270F3}"/>
+          </ac:spMkLst>
+        </pc:spChg>
+        <pc:spChg chg="mod">
+          <ac:chgData name="Philippe Baucour" userId="5102170ae7533958" providerId="LiveId" clId="{A89391CB-9751-4520-9ECA-7ECDFA5EA23C}" dt="2024-06-07T08:59:05.895" v="23" actId="20577"/>
+          <ac:spMkLst>
+            <pc:docMk/>
+            <pc:sldMk cId="3601296998" sldId="267"/>
+            <ac:spMk id="3" creationId="{3D5747AA-8B62-5C79-BC10-9F4115BE33B3}"/>
+          </ac:spMkLst>
+        </pc:spChg>
+        <pc:spChg chg="mod">
+          <ac:chgData name="Philippe Baucour" userId="5102170ae7533958" providerId="LiveId" clId="{A89391CB-9751-4520-9ECA-7ECDFA5EA23C}" dt="2024-06-07T08:50:54.064" v="14" actId="20577"/>
+          <ac:spMkLst>
+            <pc:docMk/>
+            <pc:sldMk cId="3601296998" sldId="267"/>
+            <ac:spMk id="20" creationId="{6ABD733F-89FD-A412-51AF-EFF2B0DBD600}"/>
+          </ac:spMkLst>
+        </pc:spChg>
+        <pc:spChg chg="mod">
+          <ac:chgData name="Philippe Baucour" userId="5102170ae7533958" providerId="LiveId" clId="{A89391CB-9751-4520-9ECA-7ECDFA5EA23C}" dt="2024-06-07T08:48:13.333" v="2" actId="20577"/>
+          <ac:spMkLst>
+            <pc:docMk/>
+            <pc:sldMk cId="3601296998" sldId="267"/>
+            <ac:spMk id="37" creationId="{18882719-D0A3-5B55-C871-F003AC1A6FBE}"/>
+          </ac:spMkLst>
+        </pc:spChg>
+        <pc:spChg chg="del">
+          <ac:chgData name="Philippe Baucour" userId="5102170ae7533958" providerId="LiveId" clId="{A89391CB-9751-4520-9ECA-7ECDFA5EA23C}" dt="2024-06-07T08:48:23.100" v="6" actId="478"/>
+          <ac:spMkLst>
+            <pc:docMk/>
+            <pc:sldMk cId="3601296998" sldId="267"/>
+            <ac:spMk id="51" creationId="{29407C26-8202-740E-0E7C-8E694C61B647}"/>
+          </ac:spMkLst>
+        </pc:spChg>
+      </pc:sldChg>
     </pc:docChg>
   </pc:docChgLst>
 </pc:chgInfo>
@@ -4169,6 +4257,14 @@
           <a:p>
             <a:r>
               <a:rPr lang="fr-FR" dirty="0" err="1"/>
+              <a:t>SkinCheck</a:t>
+            </a:r>
+            <a:r>
+              <a:rPr lang="fr-FR" dirty="0"/>
+              <a:t> - </a:t>
+            </a:r>
+            <a:r>
+              <a:rPr lang="fr-FR" dirty="0" err="1"/>
               <a:t>What</a:t>
             </a:r>
             <a:r>
@@ -4547,8 +4643,19 @@
                 <a:latin typeface="Courier New" panose="02070309020205020404" pitchFamily="49" charset="0"/>
                 <a:cs typeface="Courier New" panose="02070309020205020404" pitchFamily="49" charset="0"/>
               </a:rPr>
-              <a:t>Host artefact</a:t>
-            </a:r>
+              <a:t>Host </a:t>
+            </a:r>
+            <a:r>
+              <a:rPr lang="fr-FR" sz="675" dirty="0" err="1">
+                <a:latin typeface="Courier New" panose="02070309020205020404" pitchFamily="49" charset="0"/>
+                <a:cs typeface="Courier New" panose="02070309020205020404" pitchFamily="49" charset="0"/>
+              </a:rPr>
+              <a:t>artifacts</a:t>
+            </a:r>
+            <a:endParaRPr lang="fr-FR" sz="675" dirty="0">
+              <a:latin typeface="Courier New" panose="02070309020205020404" pitchFamily="49" charset="0"/>
+              <a:cs typeface="Courier New" panose="02070309020205020404" pitchFamily="49" charset="0"/>
+            </a:endParaRPr>
           </a:p>
         </p:txBody>
       </p:sp>
@@ -4600,7 +4707,7 @@
                 <a:latin typeface="Courier New" panose="02070309020205020404" pitchFamily="49" charset="0"/>
                 <a:cs typeface="Courier New" panose="02070309020205020404" pitchFamily="49" charset="0"/>
               </a:rPr>
-              <a:t>projeect</a:t>
+              <a:t>project</a:t>
             </a:r>
             <a:r>
               <a:rPr lang="fr-FR" sz="675" dirty="0">
@@ -4659,8 +4766,19 @@
                 <a:latin typeface="Courier New" panose="02070309020205020404" pitchFamily="49" charset="0"/>
                 <a:cs typeface="Courier New" panose="02070309020205020404" pitchFamily="49" charset="0"/>
               </a:rPr>
-              <a:t>Save Artefact</a:t>
-            </a:r>
+              <a:t>Save </a:t>
+            </a:r>
+            <a:r>
+              <a:rPr lang="fr-FR" sz="675" dirty="0" err="1">
+                <a:latin typeface="Courier New" panose="02070309020205020404" pitchFamily="49" charset="0"/>
+                <a:cs typeface="Courier New" panose="02070309020205020404" pitchFamily="49" charset="0"/>
+              </a:rPr>
+              <a:t>Artifact</a:t>
+            </a:r>
+            <a:endParaRPr lang="fr-FR" sz="675" dirty="0">
+              <a:latin typeface="Courier New" panose="02070309020205020404" pitchFamily="49" charset="0"/>
+              <a:cs typeface="Courier New" panose="02070309020205020404" pitchFamily="49" charset="0"/>
+            </a:endParaRPr>
           </a:p>
           <a:p>
             <a:r>
@@ -5359,6 +5477,14 @@
           <a:bodyPr/>
           <a:lstStyle/>
           <a:p>
+            <a:r>
+              <a:rPr lang="fr-FR" dirty="0" err="1"/>
+              <a:t>SkinCheck</a:t>
+            </a:r>
+            <a:r>
+              <a:rPr lang="fr-FR" dirty="0"/>
+              <a:t> - </a:t>
+            </a:r>
             <a:r>
               <a:rPr lang="fr-FR" dirty="0" err="1"/>
               <a:t>What</a:t>
@@ -6901,49 +7027,6 @@
       </p:sp>
       <p:sp>
         <p:nvSpPr>
-          <p:cNvPr id="51" name="ZoneTexte 50">
-            <a:extLst>
-              <a:ext uri="{FF2B5EF4-FFF2-40B4-BE49-F238E27FC236}">
-                <a16:creationId xmlns:a16="http://schemas.microsoft.com/office/drawing/2014/main" id="{29407C26-8202-740E-0E7C-8E694C61B647}"/>
-              </a:ext>
-            </a:extLst>
-          </p:cNvPr>
-          <p:cNvSpPr txBox="1"/>
-          <p:nvPr/>
-        </p:nvSpPr>
-        <p:spPr>
-          <a:xfrm>
-            <a:off x="3429075" y="3762263"/>
-            <a:ext cx="335348" cy="253916"/>
-          </a:xfrm>
-          <a:prstGeom prst="rect">
-            <a:avLst/>
-          </a:prstGeom>
-          <a:solidFill>
-            <a:srgbClr val="C00000"/>
-          </a:solidFill>
-        </p:spPr>
-        <p:txBody>
-          <a:bodyPr wrap="none" rtlCol="0">
-            <a:spAutoFit/>
-          </a:bodyPr>
-          <a:lstStyle/>
-          <a:p>
-            <a:r>
-              <a:rPr lang="fr-FR" sz="1050" dirty="0">
-                <a:solidFill>
-                  <a:schemeClr val="bg1">
-                    <a:lumMod val="95000"/>
-                  </a:schemeClr>
-                </a:solidFill>
-              </a:rPr>
-              <a:t>03</a:t>
-            </a:r>
-          </a:p>
-        </p:txBody>
-      </p:sp>
-      <p:sp>
-        <p:nvSpPr>
           <p:cNvPr id="52" name="ZoneTexte 51">
             <a:extLst>
               <a:ext uri="{FF2B5EF4-FFF2-40B4-BE49-F238E27FC236}">
@@ -7067,6 +7150,49 @@
                 </a:solidFill>
               </a:rPr>
               <a:t>04</a:t>
+            </a:r>
+          </a:p>
+        </p:txBody>
+      </p:sp>
+      <p:sp>
+        <p:nvSpPr>
+          <p:cNvPr id="2" name="ZoneTexte 1">
+            <a:extLst>
+              <a:ext uri="{FF2B5EF4-FFF2-40B4-BE49-F238E27FC236}">
+                <a16:creationId xmlns:a16="http://schemas.microsoft.com/office/drawing/2014/main" id="{7FB152FA-6981-EA90-83A1-41DAFE3270F3}"/>
+              </a:ext>
+            </a:extLst>
+          </p:cNvPr>
+          <p:cNvSpPr txBox="1"/>
+          <p:nvPr/>
+        </p:nvSpPr>
+        <p:spPr>
+          <a:xfrm>
+            <a:off x="3547684" y="3733444"/>
+            <a:ext cx="335348" cy="253916"/>
+          </a:xfrm>
+          <a:prstGeom prst="rect">
+            <a:avLst/>
+          </a:prstGeom>
+          <a:solidFill>
+            <a:srgbClr val="C00000"/>
+          </a:solidFill>
+        </p:spPr>
+        <p:txBody>
+          <a:bodyPr wrap="none" rtlCol="0">
+            <a:spAutoFit/>
+          </a:bodyPr>
+          <a:lstStyle/>
+          <a:p>
+            <a:r>
+              <a:rPr lang="fr-FR" sz="1050" dirty="0">
+                <a:solidFill>
+                  <a:schemeClr val="bg1">
+                    <a:lumMod val="95000"/>
+                  </a:schemeClr>
+                </a:solidFill>
+              </a:rPr>
+              <a:t>03</a:t>
             </a:r>
           </a:p>
         </p:txBody>

</xml_diff>

<commit_message>
Travail du WE. Templates, debug etc.
</commit_message>
<xml_diff>
--- a/admin/skin_project_archi_0706.pptx
+++ b/admin/skin_project_archi_0706.pptx
@@ -5,11 +5,13 @@
     <p:sldMasterId id="2147483659" r:id="rId1"/>
   </p:sldMasterIdLst>
   <p:notesMasterIdLst>
-    <p:notesMasterId r:id="rId4"/>
+    <p:notesMasterId r:id="rId6"/>
   </p:notesMasterIdLst>
   <p:sldIdLst>
-    <p:sldId id="265" r:id="rId2"/>
-    <p:sldId id="267" r:id="rId3"/>
+    <p:sldId id="268" r:id="rId2"/>
+    <p:sldId id="265" r:id="rId3"/>
+    <p:sldId id="267" r:id="rId4"/>
+    <p:sldId id="269" r:id="rId5"/>
   </p:sldIdLst>
   <p:sldSz cx="9144000" cy="5143500" type="screen16x9"/>
   <p:notesSz cx="6858000" cy="9144000"/>
@@ -253,8 +255,7 @@
 <file path=ppt/revisionInfo.xml><?xml version="1.0" encoding="utf-8"?>
 <p1510:revInfo xmlns:a="http://schemas.openxmlformats.org/drawingml/2006/main" xmlns:r="http://schemas.openxmlformats.org/officeDocument/2006/relationships" xmlns:p1510="http://schemas.microsoft.com/office/powerpoint/2015/10/main">
   <p1510:revLst>
-    <p1510:client id="{21B86071-847B-4CE7-ACEB-EC73C17F7BE1}" v="153" dt="2024-06-06T22:12:25.317"/>
-    <p1510:client id="{A89391CB-9751-4520-9ECA-7ECDFA5EA23C}" v="1" dt="2024-06-07T08:50:37.360"/>
+    <p1510:client id="{A89391CB-9751-4520-9ECA-7ECDFA5EA23C}" v="612" dt="2024-06-09T16:18:49.970"/>
   </p1510:revLst>
 </p1510:revInfo>
 </file>
@@ -1358,19 +1359,19 @@
   </pc:docChgLst>
   <pc:docChgLst>
     <pc:chgData name="Philippe Baucour" userId="5102170ae7533958" providerId="LiveId" clId="{A89391CB-9751-4520-9ECA-7ECDFA5EA23C}"/>
-    <pc:docChg chg="custSel modSld">
-      <pc:chgData name="Philippe Baucour" userId="5102170ae7533958" providerId="LiveId" clId="{A89391CB-9751-4520-9ECA-7ECDFA5EA23C}" dt="2024-06-07T15:20:33.537" v="29" actId="20577"/>
+    <pc:docChg chg="undo custSel addSld modSld sldOrd">
+      <pc:chgData name="Philippe Baucour" userId="5102170ae7533958" providerId="LiveId" clId="{A89391CB-9751-4520-9ECA-7ECDFA5EA23C}" dt="2024-06-09T16:22:07.783" v="2835" actId="20577"/>
       <pc:docMkLst>
         <pc:docMk/>
       </pc:docMkLst>
       <pc:sldChg chg="modSp mod">
-        <pc:chgData name="Philippe Baucour" userId="5102170ae7533958" providerId="LiveId" clId="{A89391CB-9751-4520-9ECA-7ECDFA5EA23C}" dt="2024-06-07T15:20:33.537" v="29" actId="20577"/>
+        <pc:chgData name="Philippe Baucour" userId="5102170ae7533958" providerId="LiveId" clId="{A89391CB-9751-4520-9ECA-7ECDFA5EA23C}" dt="2024-06-08T16:04:04.752" v="582" actId="20577"/>
         <pc:sldMkLst>
           <pc:docMk/>
           <pc:sldMk cId="1234096396" sldId="265"/>
         </pc:sldMkLst>
         <pc:spChg chg="mod">
-          <ac:chgData name="Philippe Baucour" userId="5102170ae7533958" providerId="LiveId" clId="{A89391CB-9751-4520-9ECA-7ECDFA5EA23C}" dt="2024-06-07T08:58:59.819" v="19" actId="20577"/>
+          <ac:chgData name="Philippe Baucour" userId="5102170ae7533958" providerId="LiveId" clId="{A89391CB-9751-4520-9ECA-7ECDFA5EA23C}" dt="2024-06-08T16:04:04.752" v="582" actId="20577"/>
           <ac:spMkLst>
             <pc:docMk/>
             <pc:sldMk cId="1234096396" sldId="265"/>
@@ -1394,8 +1395,8 @@
           </ac:spMkLst>
         </pc:spChg>
       </pc:sldChg>
-      <pc:sldChg chg="addSp delSp modSp mod">
-        <pc:chgData name="Philippe Baucour" userId="5102170ae7533958" providerId="LiveId" clId="{A89391CB-9751-4520-9ECA-7ECDFA5EA23C}" dt="2024-06-07T08:59:05.895" v="23" actId="20577"/>
+      <pc:sldChg chg="addSp delSp modSp mod modNotesTx">
+        <pc:chgData name="Philippe Baucour" userId="5102170ae7533958" providerId="LiveId" clId="{A89391CB-9751-4520-9ECA-7ECDFA5EA23C}" dt="2024-06-08T16:03:34.603" v="573" actId="20577"/>
         <pc:sldMkLst>
           <pc:docMk/>
           <pc:sldMk cId="3601296998" sldId="267"/>
@@ -1417,6 +1418,14 @@
           </ac:spMkLst>
         </pc:spChg>
         <pc:spChg chg="mod">
+          <ac:chgData name="Philippe Baucour" userId="5102170ae7533958" providerId="LiveId" clId="{A89391CB-9751-4520-9ECA-7ECDFA5EA23C}" dt="2024-06-08T16:03:34.603" v="573" actId="20577"/>
+          <ac:spMkLst>
+            <pc:docMk/>
+            <pc:sldMk cId="3601296998" sldId="267"/>
+            <ac:spMk id="12" creationId="{4C36F25D-D0ED-0579-6575-B4BB62B9EE58}"/>
+          </ac:spMkLst>
+        </pc:spChg>
+        <pc:spChg chg="mod">
           <ac:chgData name="Philippe Baucour" userId="5102170ae7533958" providerId="LiveId" clId="{A89391CB-9751-4520-9ECA-7ECDFA5EA23C}" dt="2024-06-07T08:50:54.064" v="14" actId="20577"/>
           <ac:spMkLst>
             <pc:docMk/>
@@ -1440,6 +1449,564 @@
             <ac:spMk id="51" creationId="{29407C26-8202-740E-0E7C-8E694C61B647}"/>
           </ac:spMkLst>
         </pc:spChg>
+      </pc:sldChg>
+      <pc:sldChg chg="addSp delSp modSp add mod ord">
+        <pc:chgData name="Philippe Baucour" userId="5102170ae7533958" providerId="LiveId" clId="{A89391CB-9751-4520-9ECA-7ECDFA5EA23C}" dt="2024-06-08T16:56:30.452" v="2554"/>
+        <pc:sldMkLst>
+          <pc:docMk/>
+          <pc:sldMk cId="1294538149" sldId="268"/>
+        </pc:sldMkLst>
+        <pc:spChg chg="mod">
+          <ac:chgData name="Philippe Baucour" userId="5102170ae7533958" providerId="LiveId" clId="{A89391CB-9751-4520-9ECA-7ECDFA5EA23C}" dt="2024-06-08T16:54:22.334" v="2534" actId="1036"/>
+          <ac:spMkLst>
+            <pc:docMk/>
+            <pc:sldMk cId="1294538149" sldId="268"/>
+            <ac:spMk id="2" creationId="{7FB152FA-6981-EA90-83A1-41DAFE3270F3}"/>
+          </ac:spMkLst>
+        </pc:spChg>
+        <pc:spChg chg="mod">
+          <ac:chgData name="Philippe Baucour" userId="5102170ae7533958" providerId="LiveId" clId="{A89391CB-9751-4520-9ECA-7ECDFA5EA23C}" dt="2024-06-08T16:01:37.460" v="497" actId="6549"/>
+          <ac:spMkLst>
+            <pc:docMk/>
+            <pc:sldMk cId="1294538149" sldId="268"/>
+            <ac:spMk id="3" creationId="{3D5747AA-8B62-5C79-BC10-9F4115BE33B3}"/>
+          </ac:spMkLst>
+        </pc:spChg>
+        <pc:spChg chg="mod">
+          <ac:chgData name="Philippe Baucour" userId="5102170ae7533958" providerId="LiveId" clId="{A89391CB-9751-4520-9ECA-7ECDFA5EA23C}" dt="2024-06-08T16:54:22.334" v="2534" actId="1036"/>
+          <ac:spMkLst>
+            <pc:docMk/>
+            <pc:sldMk cId="1294538149" sldId="268"/>
+            <ac:spMk id="8" creationId="{7BD7D3CD-81D5-4848-C5A0-5012687582FD}"/>
+          </ac:spMkLst>
+        </pc:spChg>
+        <pc:spChg chg="mod">
+          <ac:chgData name="Philippe Baucour" userId="5102170ae7533958" providerId="LiveId" clId="{A89391CB-9751-4520-9ECA-7ECDFA5EA23C}" dt="2024-06-08T16:54:22.334" v="2534" actId="1036"/>
+          <ac:spMkLst>
+            <pc:docMk/>
+            <pc:sldMk cId="1294538149" sldId="268"/>
+            <ac:spMk id="10" creationId="{74915136-7F52-0861-8BFB-648DDFFB0CDE}"/>
+          </ac:spMkLst>
+        </pc:spChg>
+        <pc:spChg chg="mod">
+          <ac:chgData name="Philippe Baucour" userId="5102170ae7533958" providerId="LiveId" clId="{A89391CB-9751-4520-9ECA-7ECDFA5EA23C}" dt="2024-06-08T16:54:22.334" v="2534" actId="1036"/>
+          <ac:spMkLst>
+            <pc:docMk/>
+            <pc:sldMk cId="1294538149" sldId="268"/>
+            <ac:spMk id="11" creationId="{79E35FDB-22AC-7F4D-2AE0-1F1272A4399D}"/>
+          </ac:spMkLst>
+        </pc:spChg>
+        <pc:spChg chg="del mod">
+          <ac:chgData name="Philippe Baucour" userId="5102170ae7533958" providerId="LiveId" clId="{A89391CB-9751-4520-9ECA-7ECDFA5EA23C}" dt="2024-06-08T16:10:06.011" v="611" actId="478"/>
+          <ac:spMkLst>
+            <pc:docMk/>
+            <pc:sldMk cId="1294538149" sldId="268"/>
+            <ac:spMk id="12" creationId="{4C36F25D-D0ED-0579-6575-B4BB62B9EE58}"/>
+          </ac:spMkLst>
+        </pc:spChg>
+        <pc:spChg chg="add mod">
+          <ac:chgData name="Philippe Baucour" userId="5102170ae7533958" providerId="LiveId" clId="{A89391CB-9751-4520-9ECA-7ECDFA5EA23C}" dt="2024-06-08T16:54:22.334" v="2534" actId="1036"/>
+          <ac:spMkLst>
+            <pc:docMk/>
+            <pc:sldMk cId="1294538149" sldId="268"/>
+            <ac:spMk id="15" creationId="{85B6C5E1-6C57-B98B-0DA8-28B9893D188A}"/>
+          </ac:spMkLst>
+        </pc:spChg>
+        <pc:spChg chg="mod">
+          <ac:chgData name="Philippe Baucour" userId="5102170ae7533958" providerId="LiveId" clId="{A89391CB-9751-4520-9ECA-7ECDFA5EA23C}" dt="2024-06-08T16:54:22.334" v="2534" actId="1036"/>
+          <ac:spMkLst>
+            <pc:docMk/>
+            <pc:sldMk cId="1294538149" sldId="268"/>
+            <ac:spMk id="17" creationId="{54722831-7D4F-84F9-2575-CBF76C7F93C3}"/>
+          </ac:spMkLst>
+        </pc:spChg>
+        <pc:spChg chg="del mod">
+          <ac:chgData name="Philippe Baucour" userId="5102170ae7533958" providerId="LiveId" clId="{A89391CB-9751-4520-9ECA-7ECDFA5EA23C}" dt="2024-06-08T16:32:25.207" v="1261" actId="478"/>
+          <ac:spMkLst>
+            <pc:docMk/>
+            <pc:sldMk cId="1294538149" sldId="268"/>
+            <ac:spMk id="18" creationId="{13CB5633-F708-6431-049E-144D0013763C}"/>
+          </ac:spMkLst>
+        </pc:spChg>
+        <pc:spChg chg="del">
+          <ac:chgData name="Philippe Baucour" userId="5102170ae7533958" providerId="LiveId" clId="{A89391CB-9751-4520-9ECA-7ECDFA5EA23C}" dt="2024-06-08T15:46:26.035" v="175" actId="478"/>
+          <ac:spMkLst>
+            <pc:docMk/>
+            <pc:sldMk cId="1294538149" sldId="268"/>
+            <ac:spMk id="19" creationId="{242F4530-DC9C-BEFA-201A-FF3A85454055}"/>
+          </ac:spMkLst>
+        </pc:spChg>
+        <pc:spChg chg="mod">
+          <ac:chgData name="Philippe Baucour" userId="5102170ae7533958" providerId="LiveId" clId="{A89391CB-9751-4520-9ECA-7ECDFA5EA23C}" dt="2024-06-08T16:54:22.334" v="2534" actId="1036"/>
+          <ac:spMkLst>
+            <pc:docMk/>
+            <pc:sldMk cId="1294538149" sldId="268"/>
+            <ac:spMk id="20" creationId="{6ABD733F-89FD-A412-51AF-EFF2B0DBD600}"/>
+          </ac:spMkLst>
+        </pc:spChg>
+        <pc:spChg chg="mod">
+          <ac:chgData name="Philippe Baucour" userId="5102170ae7533958" providerId="LiveId" clId="{A89391CB-9751-4520-9ECA-7ECDFA5EA23C}" dt="2024-06-08T16:54:22.334" v="2534" actId="1036"/>
+          <ac:spMkLst>
+            <pc:docMk/>
+            <pc:sldMk cId="1294538149" sldId="268"/>
+            <ac:spMk id="31" creationId="{411D03E1-FE63-49A3-4D06-E97A1449DFC3}"/>
+          </ac:spMkLst>
+        </pc:spChg>
+        <pc:spChg chg="mod">
+          <ac:chgData name="Philippe Baucour" userId="5102170ae7533958" providerId="LiveId" clId="{A89391CB-9751-4520-9ECA-7ECDFA5EA23C}" dt="2024-06-08T16:54:22.334" v="2534" actId="1036"/>
+          <ac:spMkLst>
+            <pc:docMk/>
+            <pc:sldMk cId="1294538149" sldId="268"/>
+            <ac:spMk id="35" creationId="{D274B890-A8EE-A186-7126-825C2C23FECC}"/>
+          </ac:spMkLst>
+        </pc:spChg>
+        <pc:spChg chg="del">
+          <ac:chgData name="Philippe Baucour" userId="5102170ae7533958" providerId="LiveId" clId="{A89391CB-9751-4520-9ECA-7ECDFA5EA23C}" dt="2024-06-08T15:46:33.945" v="177" actId="478"/>
+          <ac:spMkLst>
+            <pc:docMk/>
+            <pc:sldMk cId="1294538149" sldId="268"/>
+            <ac:spMk id="36" creationId="{EDA91A5C-CDB7-9572-DADA-2C5426DADCF4}"/>
+          </ac:spMkLst>
+        </pc:spChg>
+        <pc:spChg chg="mod ord">
+          <ac:chgData name="Philippe Baucour" userId="5102170ae7533958" providerId="LiveId" clId="{A89391CB-9751-4520-9ECA-7ECDFA5EA23C}" dt="2024-06-08T16:54:22.334" v="2534" actId="1036"/>
+          <ac:spMkLst>
+            <pc:docMk/>
+            <pc:sldMk cId="1294538149" sldId="268"/>
+            <ac:spMk id="37" creationId="{18882719-D0A3-5B55-C871-F003AC1A6FBE}"/>
+          </ac:spMkLst>
+        </pc:spChg>
+        <pc:spChg chg="del">
+          <ac:chgData name="Philippe Baucour" userId="5102170ae7533958" providerId="LiveId" clId="{A89391CB-9751-4520-9ECA-7ECDFA5EA23C}" dt="2024-06-08T15:47:26.836" v="182" actId="478"/>
+          <ac:spMkLst>
+            <pc:docMk/>
+            <pc:sldMk cId="1294538149" sldId="268"/>
+            <ac:spMk id="42" creationId="{FA9F22D2-7FE5-2E67-A3C0-0B4D433F9275}"/>
+          </ac:spMkLst>
+        </pc:spChg>
+        <pc:spChg chg="del">
+          <ac:chgData name="Philippe Baucour" userId="5102170ae7533958" providerId="LiveId" clId="{A89391CB-9751-4520-9ECA-7ECDFA5EA23C}" dt="2024-06-08T15:46:28.205" v="176" actId="478"/>
+          <ac:spMkLst>
+            <pc:docMk/>
+            <pc:sldMk cId="1294538149" sldId="268"/>
+            <ac:spMk id="43" creationId="{0548D451-BBB6-BF20-68F6-B04B6EB15501}"/>
+          </ac:spMkLst>
+        </pc:spChg>
+        <pc:spChg chg="del">
+          <ac:chgData name="Philippe Baucour" userId="5102170ae7533958" providerId="LiveId" clId="{A89391CB-9751-4520-9ECA-7ECDFA5EA23C}" dt="2024-06-08T15:46:58.453" v="179" actId="478"/>
+          <ac:spMkLst>
+            <pc:docMk/>
+            <pc:sldMk cId="1294538149" sldId="268"/>
+            <ac:spMk id="44" creationId="{2702CE60-8860-2696-6F09-3C49BCEF3BCA}"/>
+          </ac:spMkLst>
+        </pc:spChg>
+        <pc:spChg chg="mod">
+          <ac:chgData name="Philippe Baucour" userId="5102170ae7533958" providerId="LiveId" clId="{A89391CB-9751-4520-9ECA-7ECDFA5EA23C}" dt="2024-06-08T16:54:22.334" v="2534" actId="1036"/>
+          <ac:spMkLst>
+            <pc:docMk/>
+            <pc:sldMk cId="1294538149" sldId="268"/>
+            <ac:spMk id="45" creationId="{B7EC46BE-0F3E-CD8B-03B9-18067334CF89}"/>
+          </ac:spMkLst>
+        </pc:spChg>
+        <pc:spChg chg="mod">
+          <ac:chgData name="Philippe Baucour" userId="5102170ae7533958" providerId="LiveId" clId="{A89391CB-9751-4520-9ECA-7ECDFA5EA23C}" dt="2024-06-08T16:54:22.334" v="2534" actId="1036"/>
+          <ac:spMkLst>
+            <pc:docMk/>
+            <pc:sldMk cId="1294538149" sldId="268"/>
+            <ac:spMk id="48" creationId="{AD104111-C094-DC8C-EF93-9A384BCC4DAA}"/>
+          </ac:spMkLst>
+        </pc:spChg>
+        <pc:spChg chg="mod">
+          <ac:chgData name="Philippe Baucour" userId="5102170ae7533958" providerId="LiveId" clId="{A89391CB-9751-4520-9ECA-7ECDFA5EA23C}" dt="2024-06-08T16:54:22.334" v="2534" actId="1036"/>
+          <ac:spMkLst>
+            <pc:docMk/>
+            <pc:sldMk cId="1294538149" sldId="268"/>
+            <ac:spMk id="49" creationId="{E0D268CB-4B06-33FC-48AF-159E508BF0C9}"/>
+          </ac:spMkLst>
+        </pc:spChg>
+        <pc:spChg chg="mod">
+          <ac:chgData name="Philippe Baucour" userId="5102170ae7533958" providerId="LiveId" clId="{A89391CB-9751-4520-9ECA-7ECDFA5EA23C}" dt="2024-06-08T16:54:22.334" v="2534" actId="1036"/>
+          <ac:spMkLst>
+            <pc:docMk/>
+            <pc:sldMk cId="1294538149" sldId="268"/>
+            <ac:spMk id="50" creationId="{A671C5B9-A334-3D52-FB83-E43BEEFB2500}"/>
+          </ac:spMkLst>
+        </pc:spChg>
+        <pc:spChg chg="mod">
+          <ac:chgData name="Philippe Baucour" userId="5102170ae7533958" providerId="LiveId" clId="{A89391CB-9751-4520-9ECA-7ECDFA5EA23C}" dt="2024-06-08T16:54:22.334" v="2534" actId="1036"/>
+          <ac:spMkLst>
+            <pc:docMk/>
+            <pc:sldMk cId="1294538149" sldId="268"/>
+            <ac:spMk id="52" creationId="{399C0156-77B2-724E-58C3-CB80A7A69061}"/>
+          </ac:spMkLst>
+        </pc:spChg>
+        <pc:spChg chg="mod">
+          <ac:chgData name="Philippe Baucour" userId="5102170ae7533958" providerId="LiveId" clId="{A89391CB-9751-4520-9ECA-7ECDFA5EA23C}" dt="2024-06-08T16:54:22.334" v="2534" actId="1036"/>
+          <ac:spMkLst>
+            <pc:docMk/>
+            <pc:sldMk cId="1294538149" sldId="268"/>
+            <ac:spMk id="53" creationId="{F94A7B61-E32A-5176-ACAA-204F079BF9F1}"/>
+          </ac:spMkLst>
+        </pc:spChg>
+        <pc:spChg chg="add mod">
+          <ac:chgData name="Philippe Baucour" userId="5102170ae7533958" providerId="LiveId" clId="{A89391CB-9751-4520-9ECA-7ECDFA5EA23C}" dt="2024-06-08T16:54:22.334" v="2534" actId="1036"/>
+          <ac:spMkLst>
+            <pc:docMk/>
+            <pc:sldMk cId="1294538149" sldId="268"/>
+            <ac:spMk id="57" creationId="{42D4720D-D86B-CDF4-BA54-47094D836E44}"/>
+          </ac:spMkLst>
+        </pc:spChg>
+        <pc:spChg chg="add mod">
+          <ac:chgData name="Philippe Baucour" userId="5102170ae7533958" providerId="LiveId" clId="{A89391CB-9751-4520-9ECA-7ECDFA5EA23C}" dt="2024-06-08T16:54:48.482" v="2552" actId="20577"/>
+          <ac:spMkLst>
+            <pc:docMk/>
+            <pc:sldMk cId="1294538149" sldId="268"/>
+            <ac:spMk id="58" creationId="{B2E8F991-E10B-B949-C93B-A5A143398AB3}"/>
+          </ac:spMkLst>
+        </pc:spChg>
+        <pc:spChg chg="add mod">
+          <ac:chgData name="Philippe Baucour" userId="5102170ae7533958" providerId="LiveId" clId="{A89391CB-9751-4520-9ECA-7ECDFA5EA23C}" dt="2024-06-08T16:54:22.334" v="2534" actId="1036"/>
+          <ac:spMkLst>
+            <pc:docMk/>
+            <pc:sldMk cId="1294538149" sldId="268"/>
+            <ac:spMk id="61" creationId="{0C67B44A-0F47-AFCD-9934-9CBFA7BCD508}"/>
+          </ac:spMkLst>
+        </pc:spChg>
+        <pc:spChg chg="add mod">
+          <ac:chgData name="Philippe Baucour" userId="5102170ae7533958" providerId="LiveId" clId="{A89391CB-9751-4520-9ECA-7ECDFA5EA23C}" dt="2024-06-08T16:54:22.334" v="2534" actId="1036"/>
+          <ac:spMkLst>
+            <pc:docMk/>
+            <pc:sldMk cId="1294538149" sldId="268"/>
+            <ac:spMk id="62" creationId="{F10532C8-67F5-5F96-A53D-F1BD08EFDC8B}"/>
+          </ac:spMkLst>
+        </pc:spChg>
+        <pc:spChg chg="add mod">
+          <ac:chgData name="Philippe Baucour" userId="5102170ae7533958" providerId="LiveId" clId="{A89391CB-9751-4520-9ECA-7ECDFA5EA23C}" dt="2024-06-08T16:54:22.334" v="2534" actId="1036"/>
+          <ac:spMkLst>
+            <pc:docMk/>
+            <pc:sldMk cId="1294538149" sldId="268"/>
+            <ac:spMk id="63" creationId="{39A85152-5F2B-F7A8-9D12-C4A32B754764}"/>
+          </ac:spMkLst>
+        </pc:spChg>
+        <pc:spChg chg="add mod">
+          <ac:chgData name="Philippe Baucour" userId="5102170ae7533958" providerId="LiveId" clId="{A89391CB-9751-4520-9ECA-7ECDFA5EA23C}" dt="2024-06-08T16:54:22.334" v="2534" actId="1036"/>
+          <ac:spMkLst>
+            <pc:docMk/>
+            <pc:sldMk cId="1294538149" sldId="268"/>
+            <ac:spMk id="1029" creationId="{D7A7CEEA-60D3-E981-000D-38CC7FF6265D}"/>
+          </ac:spMkLst>
+        </pc:spChg>
+        <pc:spChg chg="add mod">
+          <ac:chgData name="Philippe Baucour" userId="5102170ae7533958" providerId="LiveId" clId="{A89391CB-9751-4520-9ECA-7ECDFA5EA23C}" dt="2024-06-08T16:50:01.307" v="2211" actId="1076"/>
+          <ac:spMkLst>
+            <pc:docMk/>
+            <pc:sldMk cId="1294538149" sldId="268"/>
+            <ac:spMk id="1049" creationId="{2D1C83D3-7CE7-2AE3-08E6-C759347B25EF}"/>
+          </ac:spMkLst>
+        </pc:spChg>
+        <pc:spChg chg="add">
+          <ac:chgData name="Philippe Baucour" userId="5102170ae7533958" providerId="LiveId" clId="{A89391CB-9751-4520-9ECA-7ECDFA5EA23C}" dt="2024-06-08T16:50:51.988" v="2214"/>
+          <ac:spMkLst>
+            <pc:docMk/>
+            <pc:sldMk cId="1294538149" sldId="268"/>
+            <ac:spMk id="1052" creationId="{E0A406A3-090A-FA14-0E7C-626E57F033FD}"/>
+          </ac:spMkLst>
+        </pc:spChg>
+        <pc:spChg chg="add del mod">
+          <ac:chgData name="Philippe Baucour" userId="5102170ae7533958" providerId="LiveId" clId="{A89391CB-9751-4520-9ECA-7ECDFA5EA23C}" dt="2024-06-08T16:51:37.229" v="2225" actId="478"/>
+          <ac:spMkLst>
+            <pc:docMk/>
+            <pc:sldMk cId="1294538149" sldId="268"/>
+            <ac:spMk id="1055" creationId="{FBE2EA55-5B22-8219-47AE-D7A56B084153}"/>
+          </ac:spMkLst>
+        </pc:spChg>
+        <pc:grpChg chg="mod">
+          <ac:chgData name="Philippe Baucour" userId="5102170ae7533958" providerId="LiveId" clId="{A89391CB-9751-4520-9ECA-7ECDFA5EA23C}" dt="2024-06-08T16:54:22.334" v="2534" actId="1036"/>
+          <ac:grpSpMkLst>
+            <pc:docMk/>
+            <pc:sldMk cId="1294538149" sldId="268"/>
+            <ac:grpSpMk id="24" creationId="{877BD90E-61C7-545A-7D6C-41BFE296E3FA}"/>
+          </ac:grpSpMkLst>
+        </pc:grpChg>
+        <pc:grpChg chg="add mod">
+          <ac:chgData name="Philippe Baucour" userId="5102170ae7533958" providerId="LiveId" clId="{A89391CB-9751-4520-9ECA-7ECDFA5EA23C}" dt="2024-06-08T16:54:22.334" v="2534" actId="1036"/>
+          <ac:grpSpMkLst>
+            <pc:docMk/>
+            <pc:sldMk cId="1294538149" sldId="268"/>
+            <ac:grpSpMk id="56" creationId="{2C2DF18E-AC16-43EF-C64A-8E7B5B3DB147}"/>
+          </ac:grpSpMkLst>
+        </pc:grpChg>
+        <pc:grpChg chg="add mod">
+          <ac:chgData name="Philippe Baucour" userId="5102170ae7533958" providerId="LiveId" clId="{A89391CB-9751-4520-9ECA-7ECDFA5EA23C}" dt="2024-06-08T16:54:22.334" v="2534" actId="1036"/>
+          <ac:grpSpMkLst>
+            <pc:docMk/>
+            <pc:sldMk cId="1294538149" sldId="268"/>
+            <ac:grpSpMk id="1027" creationId="{9C71DFE7-C00D-9221-C068-D6B6C4D74F1C}"/>
+          </ac:grpSpMkLst>
+        </pc:grpChg>
+        <pc:grpChg chg="add mod">
+          <ac:chgData name="Philippe Baucour" userId="5102170ae7533958" providerId="LiveId" clId="{A89391CB-9751-4520-9ECA-7ECDFA5EA23C}" dt="2024-06-08T16:54:22.334" v="2534" actId="1036"/>
+          <ac:grpSpMkLst>
+            <pc:docMk/>
+            <pc:sldMk cId="1294538149" sldId="268"/>
+            <ac:grpSpMk id="1028" creationId="{BAF9EED9-AED1-DC68-2DCE-26FB79C6239A}"/>
+          </ac:grpSpMkLst>
+        </pc:grpChg>
+        <pc:grpChg chg="add mod">
+          <ac:chgData name="Philippe Baucour" userId="5102170ae7533958" providerId="LiveId" clId="{A89391CB-9751-4520-9ECA-7ECDFA5EA23C}" dt="2024-06-08T16:54:22.334" v="2534" actId="1036"/>
+          <ac:grpSpMkLst>
+            <pc:docMk/>
+            <pc:sldMk cId="1294538149" sldId="268"/>
+            <ac:grpSpMk id="1030" creationId="{0283DBA2-E154-B24E-00E4-B2111440E40D}"/>
+          </ac:grpSpMkLst>
+        </pc:grpChg>
+        <pc:grpChg chg="add mod">
+          <ac:chgData name="Philippe Baucour" userId="5102170ae7533958" providerId="LiveId" clId="{A89391CB-9751-4520-9ECA-7ECDFA5EA23C}" dt="2024-06-08T16:54:22.334" v="2534" actId="1036"/>
+          <ac:grpSpMkLst>
+            <pc:docMk/>
+            <pc:sldMk cId="1294538149" sldId="268"/>
+            <ac:grpSpMk id="1031" creationId="{27408B37-7571-659D-5374-18E36A087DF5}"/>
+          </ac:grpSpMkLst>
+        </pc:grpChg>
+        <pc:grpChg chg="add mod">
+          <ac:chgData name="Philippe Baucour" userId="5102170ae7533958" providerId="LiveId" clId="{A89391CB-9751-4520-9ECA-7ECDFA5EA23C}" dt="2024-06-08T16:54:22.334" v="2534" actId="1036"/>
+          <ac:grpSpMkLst>
+            <pc:docMk/>
+            <pc:sldMk cId="1294538149" sldId="268"/>
+            <ac:grpSpMk id="1036" creationId="{4A82B162-DEFD-9CB7-B60A-A8E228E98432}"/>
+          </ac:grpSpMkLst>
+        </pc:grpChg>
+        <pc:grpChg chg="add del mod">
+          <ac:chgData name="Philippe Baucour" userId="5102170ae7533958" providerId="LiveId" clId="{A89391CB-9751-4520-9ECA-7ECDFA5EA23C}" dt="2024-06-08T16:51:12.463" v="2221" actId="478"/>
+          <ac:grpSpMkLst>
+            <pc:docMk/>
+            <pc:sldMk cId="1294538149" sldId="268"/>
+            <ac:grpSpMk id="1050" creationId="{5E6293FA-85D3-89C9-FDBF-3803B5B1D726}"/>
+          </ac:grpSpMkLst>
+        </pc:grpChg>
+        <pc:graphicFrameChg chg="add del modGraphic">
+          <ac:chgData name="Philippe Baucour" userId="5102170ae7533958" providerId="LiveId" clId="{A89391CB-9751-4520-9ECA-7ECDFA5EA23C}" dt="2024-06-08T15:54:30.720" v="367" actId="478"/>
+          <ac:graphicFrameMkLst>
+            <pc:docMk/>
+            <pc:sldMk cId="1294538149" sldId="268"/>
+            <ac:graphicFrameMk id="41" creationId="{92136151-AD24-EC31-1725-7BBB1E9DA834}"/>
+          </ac:graphicFrameMkLst>
+        </pc:graphicFrameChg>
+        <pc:picChg chg="mod">
+          <ac:chgData name="Philippe Baucour" userId="5102170ae7533958" providerId="LiveId" clId="{A89391CB-9751-4520-9ECA-7ECDFA5EA23C}" dt="2024-06-08T16:54:22.334" v="2534" actId="1036"/>
+          <ac:picMkLst>
+            <pc:docMk/>
+            <pc:sldMk cId="1294538149" sldId="268"/>
+            <ac:picMk id="4" creationId="{717F07D8-AB39-1663-2BCF-301A9A73860B}"/>
+          </ac:picMkLst>
+        </pc:picChg>
+        <pc:picChg chg="mod">
+          <ac:chgData name="Philippe Baucour" userId="5102170ae7533958" providerId="LiveId" clId="{A89391CB-9751-4520-9ECA-7ECDFA5EA23C}" dt="2024-06-08T16:54:22.334" v="2534" actId="1036"/>
+          <ac:picMkLst>
+            <pc:docMk/>
+            <pc:sldMk cId="1294538149" sldId="268"/>
+            <ac:picMk id="5" creationId="{171BDF44-7979-BAC1-BA99-65B541D80E7E}"/>
+          </ac:picMkLst>
+        </pc:picChg>
+        <pc:picChg chg="mod">
+          <ac:chgData name="Philippe Baucour" userId="5102170ae7533958" providerId="LiveId" clId="{A89391CB-9751-4520-9ECA-7ECDFA5EA23C}" dt="2024-06-08T16:54:22.334" v="2534" actId="1036"/>
+          <ac:picMkLst>
+            <pc:docMk/>
+            <pc:sldMk cId="1294538149" sldId="268"/>
+            <ac:picMk id="6" creationId="{B7942790-0D7C-2AFF-BB97-F11C27076DF8}"/>
+          </ac:picMkLst>
+        </pc:picChg>
+        <pc:picChg chg="mod">
+          <ac:chgData name="Philippe Baucour" userId="5102170ae7533958" providerId="LiveId" clId="{A89391CB-9751-4520-9ECA-7ECDFA5EA23C}" dt="2024-06-08T16:54:22.334" v="2534" actId="1036"/>
+          <ac:picMkLst>
+            <pc:docMk/>
+            <pc:sldMk cId="1294538149" sldId="268"/>
+            <ac:picMk id="7" creationId="{C912B127-9006-2475-358D-D9BA774A9413}"/>
+          </ac:picMkLst>
+        </pc:picChg>
+        <pc:picChg chg="del mod">
+          <ac:chgData name="Philippe Baucour" userId="5102170ae7533958" providerId="LiveId" clId="{A89391CB-9751-4520-9ECA-7ECDFA5EA23C}" dt="2024-06-08T15:56:48.137" v="371" actId="478"/>
+          <ac:picMkLst>
+            <pc:docMk/>
+            <pc:sldMk cId="1294538149" sldId="268"/>
+            <ac:picMk id="13" creationId="{AC038A3E-0149-49DA-CD8F-3D60A14A34F4}"/>
+          </ac:picMkLst>
+        </pc:picChg>
+        <pc:picChg chg="mod">
+          <ac:chgData name="Philippe Baucour" userId="5102170ae7533958" providerId="LiveId" clId="{A89391CB-9751-4520-9ECA-7ECDFA5EA23C}" dt="2024-06-08T16:54:22.334" v="2534" actId="1036"/>
+          <ac:picMkLst>
+            <pc:docMk/>
+            <pc:sldMk cId="1294538149" sldId="268"/>
+            <ac:picMk id="25" creationId="{58B98C6B-4E84-6906-C69F-F03FE7557709}"/>
+          </ac:picMkLst>
+        </pc:picChg>
+        <pc:picChg chg="mod">
+          <ac:chgData name="Philippe Baucour" userId="5102170ae7533958" providerId="LiveId" clId="{A89391CB-9751-4520-9ECA-7ECDFA5EA23C}" dt="2024-06-08T16:54:22.334" v="2534" actId="1036"/>
+          <ac:picMkLst>
+            <pc:docMk/>
+            <pc:sldMk cId="1294538149" sldId="268"/>
+            <ac:picMk id="26" creationId="{3C959D3F-A7DE-F337-430A-38BE1E9A400C}"/>
+          </ac:picMkLst>
+        </pc:picChg>
+        <pc:picChg chg="mod">
+          <ac:chgData name="Philippe Baucour" userId="5102170ae7533958" providerId="LiveId" clId="{A89391CB-9751-4520-9ECA-7ECDFA5EA23C}" dt="2024-06-08T16:54:22.334" v="2534" actId="1036"/>
+          <ac:picMkLst>
+            <pc:docMk/>
+            <pc:sldMk cId="1294538149" sldId="268"/>
+            <ac:picMk id="33" creationId="{BCAC1AA9-5DC8-F914-5F46-7AB93D73E38B}"/>
+          </ac:picMkLst>
+        </pc:picChg>
+        <pc:picChg chg="del mod">
+          <ac:chgData name="Philippe Baucour" userId="5102170ae7533958" providerId="LiveId" clId="{A89391CB-9751-4520-9ECA-7ECDFA5EA23C}" dt="2024-06-08T16:51:53.623" v="2229" actId="478"/>
+          <ac:picMkLst>
+            <pc:docMk/>
+            <pc:sldMk cId="1294538149" sldId="268"/>
+            <ac:picMk id="40" creationId="{228584AC-4975-7372-8163-FE6445655BB5}"/>
+          </ac:picMkLst>
+        </pc:picChg>
+        <pc:picChg chg="add mod">
+          <ac:chgData name="Philippe Baucour" userId="5102170ae7533958" providerId="LiveId" clId="{A89391CB-9751-4520-9ECA-7ECDFA5EA23C}" dt="2024-06-08T16:54:22.334" v="2534" actId="1036"/>
+          <ac:picMkLst>
+            <pc:docMk/>
+            <pc:sldMk cId="1294538149" sldId="268"/>
+            <ac:picMk id="47" creationId="{EAA36F96-0FAE-1D0A-E12A-AA22913FAB08}"/>
+          </ac:picMkLst>
+        </pc:picChg>
+        <pc:picChg chg="add mod">
+          <ac:chgData name="Philippe Baucour" userId="5102170ae7533958" providerId="LiveId" clId="{A89391CB-9751-4520-9ECA-7ECDFA5EA23C}" dt="2024-06-08T16:54:22.334" v="2534" actId="1036"/>
+          <ac:picMkLst>
+            <pc:docMk/>
+            <pc:sldMk cId="1294538149" sldId="268"/>
+            <ac:picMk id="54" creationId="{9A92D136-E70E-C007-E650-A2D70CD4F353}"/>
+          </ac:picMkLst>
+        </pc:picChg>
+        <pc:picChg chg="add mod">
+          <ac:chgData name="Philippe Baucour" userId="5102170ae7533958" providerId="LiveId" clId="{A89391CB-9751-4520-9ECA-7ECDFA5EA23C}" dt="2024-06-08T16:54:22.334" v="2534" actId="1036"/>
+          <ac:picMkLst>
+            <pc:docMk/>
+            <pc:sldMk cId="1294538149" sldId="268"/>
+            <ac:picMk id="55" creationId="{C063199A-312E-B148-3C65-8FAC334CC405}"/>
+          </ac:picMkLst>
+        </pc:picChg>
+        <pc:picChg chg="add mod modCrop">
+          <ac:chgData name="Philippe Baucour" userId="5102170ae7533958" providerId="LiveId" clId="{A89391CB-9751-4520-9ECA-7ECDFA5EA23C}" dt="2024-06-08T16:54:22.334" v="2534" actId="1036"/>
+          <ac:picMkLst>
+            <pc:docMk/>
+            <pc:sldMk cId="1294538149" sldId="268"/>
+            <ac:picMk id="60" creationId="{7CB98866-60DE-CAB4-E3DA-4474A06D0431}"/>
+          </ac:picMkLst>
+        </pc:picChg>
+        <pc:picChg chg="add mod">
+          <ac:chgData name="Philippe Baucour" userId="5102170ae7533958" providerId="LiveId" clId="{A89391CB-9751-4520-9ECA-7ECDFA5EA23C}" dt="2024-06-08T16:54:22.334" v="2534" actId="1036"/>
+          <ac:picMkLst>
+            <pc:docMk/>
+            <pc:sldMk cId="1294538149" sldId="268"/>
+            <ac:picMk id="1026" creationId="{0728D59F-5B9E-737F-DE8A-6695246453B8}"/>
+          </ac:picMkLst>
+        </pc:picChg>
+        <pc:picChg chg="add mod">
+          <ac:chgData name="Philippe Baucour" userId="5102170ae7533958" providerId="LiveId" clId="{A89391CB-9751-4520-9ECA-7ECDFA5EA23C}" dt="2024-06-08T16:50:01.307" v="2211" actId="1076"/>
+          <ac:picMkLst>
+            <pc:docMk/>
+            <pc:sldMk cId="1294538149" sldId="268"/>
+            <ac:picMk id="1048" creationId="{B083968F-DB8D-206B-4A1E-78931ABD5EA3}"/>
+          </ac:picMkLst>
+        </pc:picChg>
+        <pc:picChg chg="add del">
+          <ac:chgData name="Philippe Baucour" userId="5102170ae7533958" providerId="LiveId" clId="{A89391CB-9751-4520-9ECA-7ECDFA5EA23C}" dt="2024-06-08T16:51:10.968" v="2220" actId="478"/>
+          <ac:picMkLst>
+            <pc:docMk/>
+            <pc:sldMk cId="1294538149" sldId="268"/>
+            <ac:picMk id="1051" creationId="{72CD209B-E5D8-F384-ACBE-3212B8920B17}"/>
+          </ac:picMkLst>
+        </pc:picChg>
+        <pc:picChg chg="add mod">
+          <ac:chgData name="Philippe Baucour" userId="5102170ae7533958" providerId="LiveId" clId="{A89391CB-9751-4520-9ECA-7ECDFA5EA23C}" dt="2024-06-08T16:54:22.334" v="2534" actId="1036"/>
+          <ac:picMkLst>
+            <pc:docMk/>
+            <pc:sldMk cId="1294538149" sldId="268"/>
+            <ac:picMk id="1056" creationId="{FD93E48A-D1E5-FD02-1902-875615C41779}"/>
+          </ac:picMkLst>
+        </pc:picChg>
+        <pc:cxnChg chg="mod">
+          <ac:chgData name="Philippe Baucour" userId="5102170ae7533958" providerId="LiveId" clId="{A89391CB-9751-4520-9ECA-7ECDFA5EA23C}" dt="2024-06-08T16:54:22.334" v="2534" actId="1036"/>
+          <ac:cxnSpMkLst>
+            <pc:docMk/>
+            <pc:sldMk cId="1294538149" sldId="268"/>
+            <ac:cxnSpMk id="21" creationId="{3E5CC60F-E55F-BB01-045D-DB2636F3D02F}"/>
+          </ac:cxnSpMkLst>
+        </pc:cxnChg>
+        <pc:cxnChg chg="mod">
+          <ac:chgData name="Philippe Baucour" userId="5102170ae7533958" providerId="LiveId" clId="{A89391CB-9751-4520-9ECA-7ECDFA5EA23C}" dt="2024-06-08T16:54:22.334" v="2534" actId="1036"/>
+          <ac:cxnSpMkLst>
+            <pc:docMk/>
+            <pc:sldMk cId="1294538149" sldId="268"/>
+            <ac:cxnSpMk id="23" creationId="{DE938E05-1E91-AB1C-333D-CBB158AF050C}"/>
+          </ac:cxnSpMkLst>
+        </pc:cxnChg>
+        <pc:cxnChg chg="mod">
+          <ac:chgData name="Philippe Baucour" userId="5102170ae7533958" providerId="LiveId" clId="{A89391CB-9751-4520-9ECA-7ECDFA5EA23C}" dt="2024-06-08T16:54:22.334" v="2534" actId="1036"/>
+          <ac:cxnSpMkLst>
+            <pc:docMk/>
+            <pc:sldMk cId="1294538149" sldId="268"/>
+            <ac:cxnSpMk id="27" creationId="{064AB111-5E64-B0CE-170E-10ADD415D98D}"/>
+          </ac:cxnSpMkLst>
+        </pc:cxnChg>
+        <pc:cxnChg chg="mod">
+          <ac:chgData name="Philippe Baucour" userId="5102170ae7533958" providerId="LiveId" clId="{A89391CB-9751-4520-9ECA-7ECDFA5EA23C}" dt="2024-06-08T16:54:22.334" v="2534" actId="1036"/>
+          <ac:cxnSpMkLst>
+            <pc:docMk/>
+            <pc:sldMk cId="1294538149" sldId="268"/>
+            <ac:cxnSpMk id="38" creationId="{F912D15A-4AC2-F142-7374-BF328BB1026B}"/>
+          </ac:cxnSpMkLst>
+        </pc:cxnChg>
+        <pc:cxnChg chg="add mod">
+          <ac:chgData name="Philippe Baucour" userId="5102170ae7533958" providerId="LiveId" clId="{A89391CB-9751-4520-9ECA-7ECDFA5EA23C}" dt="2024-06-08T16:54:22.334" v="2534" actId="1036"/>
+          <ac:cxnSpMkLst>
+            <pc:docMk/>
+            <pc:sldMk cId="1294538149" sldId="268"/>
+            <ac:cxnSpMk id="1032" creationId="{6DEDE52E-6D8A-A403-BA05-57BC07F03271}"/>
+          </ac:cxnSpMkLst>
+        </pc:cxnChg>
+      </pc:sldChg>
+      <pc:sldChg chg="addSp delSp modSp new mod modClrScheme chgLayout">
+        <pc:chgData name="Philippe Baucour" userId="5102170ae7533958" providerId="LiveId" clId="{A89391CB-9751-4520-9ECA-7ECDFA5EA23C}" dt="2024-06-09T16:22:07.783" v="2835" actId="20577"/>
+        <pc:sldMkLst>
+          <pc:docMk/>
+          <pc:sldMk cId="983029951" sldId="269"/>
+        </pc:sldMkLst>
+        <pc:spChg chg="del mod ord">
+          <ac:chgData name="Philippe Baucour" userId="5102170ae7533958" providerId="LiveId" clId="{A89391CB-9751-4520-9ECA-7ECDFA5EA23C}" dt="2024-06-09T16:14:38.155" v="2556" actId="700"/>
+          <ac:spMkLst>
+            <pc:docMk/>
+            <pc:sldMk cId="983029951" sldId="269"/>
+            <ac:spMk id="2" creationId="{3AA59F87-AB60-DB3F-47AE-1DFAF0760A06}"/>
+          </ac:spMkLst>
+        </pc:spChg>
+        <pc:spChg chg="add mod ord">
+          <ac:chgData name="Philippe Baucour" userId="5102170ae7533958" providerId="LiveId" clId="{A89391CB-9751-4520-9ECA-7ECDFA5EA23C}" dt="2024-06-09T16:15:13.741" v="2569" actId="20577"/>
+          <ac:spMkLst>
+            <pc:docMk/>
+            <pc:sldMk cId="983029951" sldId="269"/>
+            <ac:spMk id="3" creationId="{DA480834-FB63-3032-ADA6-17D22532B491}"/>
+          </ac:spMkLst>
+        </pc:spChg>
+        <pc:spChg chg="add mod">
+          <ac:chgData name="Philippe Baucour" userId="5102170ae7533958" providerId="LiveId" clId="{A89391CB-9751-4520-9ECA-7ECDFA5EA23C}" dt="2024-06-09T16:22:07.783" v="2835" actId="20577"/>
+          <ac:spMkLst>
+            <pc:docMk/>
+            <pc:sldMk cId="983029951" sldId="269"/>
+            <ac:spMk id="6" creationId="{C08CA92A-C4D0-7534-BB3C-CB39598FD89A}"/>
+          </ac:spMkLst>
+        </pc:spChg>
+        <pc:picChg chg="add mod">
+          <ac:chgData name="Philippe Baucour" userId="5102170ae7533958" providerId="LiveId" clId="{A89391CB-9751-4520-9ECA-7ECDFA5EA23C}" dt="2024-06-09T16:21:21.724" v="2797" actId="1076"/>
+          <ac:picMkLst>
+            <pc:docMk/>
+            <pc:sldMk cId="983029951" sldId="269"/>
+            <ac:picMk id="5" creationId="{43783C54-F88B-5FBB-5A6E-67D18CDBB5E7}"/>
+          </ac:picMkLst>
+        </pc:picChg>
       </pc:sldChg>
     </pc:docChg>
   </pc:docChgLst>
@@ -1940,38 +2507,17 @@
               <a:buNone/>
             </a:pPr>
             <a:r>
-              <a:rPr lang="fr-FR" dirty="0"/>
-              <a:t>1 – </a:t>
-            </a:r>
-            <a:r>
-              <a:rPr lang="fr-FR" dirty="0" err="1"/>
-              <a:t>Heroku</a:t>
-            </a:r>
-            <a:r>
-              <a:rPr lang="fr-FR" dirty="0"/>
-              <a:t> fonctionne et </a:t>
-            </a:r>
-            <a:r>
-              <a:rPr lang="fr-FR" dirty="0" err="1"/>
-              <a:t>heberge</a:t>
-            </a:r>
-            <a:r>
-              <a:rPr lang="fr-FR" dirty="0"/>
-              <a:t> un serveur </a:t>
-            </a:r>
-            <a:r>
-              <a:rPr lang="fr-FR" dirty="0" err="1"/>
-              <a:t>mlflow</a:t>
-            </a:r>
-            <a:r>
-              <a:rPr lang="fr-FR" dirty="0"/>
-              <a:t> </a:t>
-            </a:r>
-            <a:r>
-              <a:rPr lang="fr-FR" dirty="0" err="1"/>
-              <a:t>tracking</a:t>
-            </a:r>
-            <a:endParaRPr lang="fr-FR" dirty="0"/>
+              <a:rPr lang="fr-FR" strike="sngStrike" dirty="0"/>
+              <a:t>0 – Charger des photos et voir si c'est OK. Droits d'</a:t>
+            </a:r>
+            <a:r>
+              <a:rPr lang="fr-FR" strike="sngStrike" dirty="0" err="1"/>
+              <a:t>acces</a:t>
+            </a:r>
+            <a:r>
+              <a:rPr lang="fr-FR" strike="sngStrike" dirty="0"/>
+              <a:t> ?</a:t>
+            </a:r>
           </a:p>
           <a:p>
             <a:pPr marL="158750" indent="0">
@@ -1979,13 +2525,8 @@
             </a:pPr>
             <a:r>
               <a:rPr lang="fr-FR" dirty="0"/>
-              <a:t>2 – On peut suivre les </a:t>
-            </a:r>
-            <a:r>
-              <a:rPr lang="fr-FR" dirty="0" err="1"/>
-              <a:t>modeles</a:t>
-            </a:r>
-            <a:endParaRPr lang="fr-FR" dirty="0"/>
+              <a:t>1 - Donner des accès à Dominique pour charger des images sur S3 – EN COURS Lundi 10 juin</a:t>
+            </a:r>
           </a:p>
           <a:p>
             <a:pPr marL="158750" indent="0">
@@ -1993,7 +2534,23 @@
             </a:pPr>
             <a:r>
               <a:rPr lang="fr-FR" dirty="0"/>
-              <a:t>3- On peut déposer des données sur un disque S3</a:t>
+              <a:t>2 - Voir avec Quentin ce dont il a besoin pour invoquer un </a:t>
+            </a:r>
+            <a:r>
+              <a:rPr lang="fr-FR" dirty="0" err="1"/>
+              <a:t>predict</a:t>
+            </a:r>
+            <a:r>
+              <a:rPr lang="fr-FR" dirty="0"/>
+              <a:t>() sur </a:t>
+            </a:r>
+            <a:r>
+              <a:rPr lang="fr-FR" dirty="0" err="1"/>
+              <a:t>Heroku</a:t>
+            </a:r>
+            <a:r>
+              <a:rPr lang="fr-FR" dirty="0"/>
+              <a:t> (cours?)</a:t>
             </a:r>
           </a:p>
           <a:p>
@@ -2002,31 +2559,33 @@
             </a:pPr>
             <a:r>
               <a:rPr lang="fr-FR" dirty="0"/>
-              <a:t>4- On peut consommer ces données dans un train. Sauver les </a:t>
+              <a:t>3 – Distribuer ce qui est nécessaire pour pouvoir faire tourner un modèle en local sur une machine</a:t>
+            </a:r>
+          </a:p>
+          <a:p>
+            <a:pPr marL="158750" indent="0">
+              <a:buNone/>
+            </a:pPr>
+            <a:r>
+              <a:rPr lang="fr-FR" dirty="0"/>
+              <a:t>4- Trouver une solution ou une alternative à EC2 (ECS, </a:t>
             </a:r>
             <a:r>
               <a:rPr lang="fr-FR" dirty="0" err="1"/>
-              <a:t>artifacts</a:t>
+              <a:t>runpod</a:t>
             </a:r>
             <a:r>
               <a:rPr lang="fr-FR" dirty="0"/>
-              <a:t> sur le S3 et les paramètres sur </a:t>
-            </a:r>
-            <a:r>
-              <a:rPr lang="fr-FR" dirty="0" err="1"/>
-              <a:t>MLFlow</a:t>
-            </a:r>
+              <a:t>, google…) </a:t>
+            </a:r>
+          </a:p>
+          <a:p>
+            <a:pPr marL="158750" indent="0">
+              <a:buNone/>
+            </a:pPr>
             <a:r>
               <a:rPr lang="fr-FR" dirty="0"/>
-              <a:t> </a:t>
-            </a:r>
-            <a:r>
-              <a:rPr lang="fr-FR" dirty="0" err="1"/>
-              <a:t>tracking</a:t>
-            </a:r>
-            <a:r>
-              <a:rPr lang="fr-FR" dirty="0"/>
-              <a:t> (et la base SQL)</a:t>
+              <a:t>5 – Template de code sklearn/TF</a:t>
             </a:r>
           </a:p>
         </p:txBody>
@@ -2034,7 +2593,7 @@
     </p:spTree>
     <p:extLst>
       <p:ext uri="{BB962C8B-B14F-4D97-AF65-F5344CB8AC3E}">
-        <p14:creationId xmlns:p14="http://schemas.microsoft.com/office/powerpoint/2010/main" val="4283366723"/>
+        <p14:creationId xmlns:p14="http://schemas.microsoft.com/office/powerpoint/2010/main" val="3826647592"/>
       </p:ext>
     </p:extLst>
   </p:cSld>
@@ -2098,8 +2657,37 @@
             </a:pPr>
             <a:r>
               <a:rPr lang="fr-FR" dirty="0"/>
-              <a:t>1 - Donner des accès à Dominique pour charger des images sur S3</a:t>
-            </a:r>
+              <a:t>1 – </a:t>
+            </a:r>
+            <a:r>
+              <a:rPr lang="fr-FR" dirty="0" err="1"/>
+              <a:t>Heroku</a:t>
+            </a:r>
+            <a:r>
+              <a:rPr lang="fr-FR" dirty="0"/>
+              <a:t> fonctionne et </a:t>
+            </a:r>
+            <a:r>
+              <a:rPr lang="fr-FR" dirty="0" err="1"/>
+              <a:t>heberge</a:t>
+            </a:r>
+            <a:r>
+              <a:rPr lang="fr-FR" dirty="0"/>
+              <a:t> un serveur </a:t>
+            </a:r>
+            <a:r>
+              <a:rPr lang="fr-FR" dirty="0" err="1"/>
+              <a:t>mlflow</a:t>
+            </a:r>
+            <a:r>
+              <a:rPr lang="fr-FR" dirty="0"/>
+              <a:t> </a:t>
+            </a:r>
+            <a:r>
+              <a:rPr lang="fr-FR" dirty="0" err="1"/>
+              <a:t>tracking</a:t>
+            </a:r>
+            <a:endParaRPr lang="fr-FR" dirty="0"/>
           </a:p>
           <a:p>
             <a:pPr marL="158750" indent="0">
@@ -2107,24 +2695,13 @@
             </a:pPr>
             <a:r>
               <a:rPr lang="fr-FR" dirty="0"/>
-              <a:t>2 - Voir avec Quentin ce dont il a besoin pour invoquer un </a:t>
+              <a:t>2 – On peut suivre les </a:t>
             </a:r>
             <a:r>
               <a:rPr lang="fr-FR" dirty="0" err="1"/>
-              <a:t>predict</a:t>
-            </a:r>
-            <a:r>
-              <a:rPr lang="fr-FR" dirty="0"/>
-              <a:t>() sur </a:t>
-            </a:r>
-            <a:r>
-              <a:rPr lang="fr-FR" dirty="0" err="1"/>
-              <a:t>Heroku</a:t>
-            </a:r>
-            <a:r>
-              <a:rPr lang="fr-FR" dirty="0"/>
-              <a:t> (cours?)</a:t>
-            </a:r>
+              <a:t>modeles</a:t>
+            </a:r>
+            <a:endParaRPr lang="fr-FR" dirty="0"/>
           </a:p>
           <a:p>
             <a:pPr marL="158750" indent="0">
@@ -2132,7 +2709,7 @@
             </a:pPr>
             <a:r>
               <a:rPr lang="fr-FR" dirty="0"/>
-              <a:t>3 – Distribuer ce qui est nécessaire pour pouvoir faire tourner un modèle en local sur une machine</a:t>
+              <a:t>3- On peut déposer des données sur un disque S3</a:t>
             </a:r>
           </a:p>
           <a:p>
@@ -2141,6 +2718,162 @@
             </a:pPr>
             <a:r>
               <a:rPr lang="fr-FR" dirty="0"/>
+              <a:t>4- On peut consommer ces données dans un train. Sauver les </a:t>
+            </a:r>
+            <a:r>
+              <a:rPr lang="fr-FR" dirty="0" err="1"/>
+              <a:t>artifacts</a:t>
+            </a:r>
+            <a:r>
+              <a:rPr lang="fr-FR" dirty="0"/>
+              <a:t> sur le S3 et les paramètres sur </a:t>
+            </a:r>
+            <a:r>
+              <a:rPr lang="fr-FR" dirty="0" err="1"/>
+              <a:t>MLFlow</a:t>
+            </a:r>
+            <a:r>
+              <a:rPr lang="fr-FR" dirty="0"/>
+              <a:t> </a:t>
+            </a:r>
+            <a:r>
+              <a:rPr lang="fr-FR" dirty="0" err="1"/>
+              <a:t>tracking</a:t>
+            </a:r>
+            <a:r>
+              <a:rPr lang="fr-FR" dirty="0"/>
+              <a:t> (et la base SQL)</a:t>
+            </a:r>
+          </a:p>
+        </p:txBody>
+      </p:sp>
+    </p:spTree>
+    <p:extLst>
+      <p:ext uri="{BB962C8B-B14F-4D97-AF65-F5344CB8AC3E}">
+        <p14:creationId xmlns:p14="http://schemas.microsoft.com/office/powerpoint/2010/main" val="4283366723"/>
+      </p:ext>
+    </p:extLst>
+  </p:cSld>
+  <p:clrMapOvr>
+    <a:masterClrMapping/>
+  </p:clrMapOvr>
+</p:notes>
+</file>
+
+<file path=ppt/notesSlides/notesSlide3.xml><?xml version="1.0" encoding="utf-8"?>
+<p:notes xmlns:a="http://schemas.openxmlformats.org/drawingml/2006/main" xmlns:r="http://schemas.openxmlformats.org/officeDocument/2006/relationships" xmlns:p="http://schemas.openxmlformats.org/presentationml/2006/main">
+  <p:cSld>
+    <p:spTree>
+      <p:nvGrpSpPr>
+        <p:cNvPr id="1" name=""/>
+        <p:cNvGrpSpPr/>
+        <p:nvPr/>
+      </p:nvGrpSpPr>
+      <p:grpSpPr>
+        <a:xfrm>
+          <a:off x="0" y="0"/>
+          <a:ext cx="0" cy="0"/>
+          <a:chOff x="0" y="0"/>
+          <a:chExt cx="0" cy="0"/>
+        </a:xfrm>
+      </p:grpSpPr>
+      <p:sp>
+        <p:nvSpPr>
+          <p:cNvPr id="2" name="Espace réservé de l'image des diapositives 1"/>
+          <p:cNvSpPr>
+            <a:spLocks noGrp="1" noRot="1" noChangeAspect="1"/>
+          </p:cNvSpPr>
+          <p:nvPr>
+            <p:ph type="sldImg"/>
+          </p:nvPr>
+        </p:nvSpPr>
+        <p:spPr>
+          <a:xfrm>
+            <a:off x="381000" y="685800"/>
+            <a:ext cx="6096000" cy="3429000"/>
+          </a:xfrm>
+        </p:spPr>
+      </p:sp>
+      <p:sp>
+        <p:nvSpPr>
+          <p:cNvPr id="3" name="Espace réservé des notes 2"/>
+          <p:cNvSpPr>
+            <a:spLocks noGrp="1"/>
+          </p:cNvSpPr>
+          <p:nvPr>
+            <p:ph type="body" idx="1"/>
+          </p:nvPr>
+        </p:nvSpPr>
+        <p:spPr/>
+        <p:txBody>
+          <a:bodyPr/>
+          <a:lstStyle/>
+          <a:p>
+            <a:pPr marL="158750" indent="0">
+              <a:buNone/>
+            </a:pPr>
+            <a:r>
+              <a:rPr lang="fr-FR" strike="sngStrike" dirty="0"/>
+              <a:t>0 – Charger des photos et voir si c'est OK. Droits d'</a:t>
+            </a:r>
+            <a:r>
+              <a:rPr lang="fr-FR" strike="sngStrike" dirty="0" err="1"/>
+              <a:t>acces</a:t>
+            </a:r>
+            <a:r>
+              <a:rPr lang="fr-FR" strike="sngStrike" dirty="0"/>
+              <a:t> ?</a:t>
+            </a:r>
+          </a:p>
+          <a:p>
+            <a:pPr marL="158750" indent="0">
+              <a:buNone/>
+            </a:pPr>
+            <a:r>
+              <a:rPr lang="fr-FR" dirty="0"/>
+              <a:t>1 - Donner des accès à Dominique pour charger des images sur S3 – EN COURS Lundi 10 juin</a:t>
+            </a:r>
+          </a:p>
+          <a:p>
+            <a:pPr marL="158750" indent="0">
+              <a:buNone/>
+            </a:pPr>
+            <a:r>
+              <a:rPr lang="fr-FR" dirty="0"/>
+              <a:t>2 - Voir avec Quentin ce dont il a besoin pour invoquer un </a:t>
+            </a:r>
+            <a:r>
+              <a:rPr lang="fr-FR" dirty="0" err="1"/>
+              <a:t>predict</a:t>
+            </a:r>
+            <a:r>
+              <a:rPr lang="fr-FR" dirty="0"/>
+              <a:t>() sur </a:t>
+            </a:r>
+            <a:r>
+              <a:rPr lang="fr-FR" dirty="0" err="1"/>
+              <a:t>Heroku</a:t>
+            </a:r>
+            <a:r>
+              <a:rPr lang="fr-FR" dirty="0"/>
+              <a:t> (cours?)</a:t>
+            </a:r>
+          </a:p>
+          <a:p>
+            <a:pPr marL="158750" indent="0">
+              <a:buNone/>
+            </a:pPr>
+            <a:r>
+              <a:rPr lang="fr-FR" dirty="0"/>
+              <a:t>3 – Distribuer ce qui est nécessaire pour pouvoir faire tourner un modèle en local sur une machine</a:t>
+            </a:r>
+          </a:p>
+          <a:p>
+            <a:pPr marL="158750" indent="0">
+              <a:buNone/>
+            </a:pPr>
+            <a:r>
+              <a:rPr lang="fr-FR" dirty="0"/>
               <a:t>4- Trouver une solution ou une alternative à EC2 (ECS, </a:t>
             </a:r>
             <a:r>
@@ -2150,6 +2883,15 @@
             <a:r>
               <a:rPr lang="fr-FR" dirty="0"/>
               <a:t>, google…) </a:t>
+            </a:r>
+          </a:p>
+          <a:p>
+            <a:pPr marL="158750" indent="0">
+              <a:buNone/>
+            </a:pPr>
+            <a:r>
+              <a:rPr lang="fr-FR" dirty="0"/>
+              <a:t>5 – Template de code sklearn/TF</a:t>
             </a:r>
           </a:p>
         </p:txBody>
@@ -4236,6 +4978,59 @@
       </p:grpSpPr>
       <p:sp>
         <p:nvSpPr>
+          <p:cNvPr id="37" name="Rectangle 36">
+            <a:extLst>
+              <a:ext uri="{FF2B5EF4-FFF2-40B4-BE49-F238E27FC236}">
+                <a16:creationId xmlns:a16="http://schemas.microsoft.com/office/drawing/2014/main" id="{18882719-D0A3-5B55-C871-F003AC1A6FBE}"/>
+              </a:ext>
+            </a:extLst>
+          </p:cNvPr>
+          <p:cNvSpPr/>
+          <p:nvPr/>
+        </p:nvSpPr>
+        <p:spPr>
+          <a:xfrm>
+            <a:off x="3350799" y="1569428"/>
+            <a:ext cx="1685411" cy="2714596"/>
+          </a:xfrm>
+          <a:prstGeom prst="rect">
+            <a:avLst/>
+          </a:prstGeom>
+          <a:solidFill>
+            <a:schemeClr val="bg1">
+              <a:lumMod val="85000"/>
+              <a:alpha val="60000"/>
+            </a:schemeClr>
+          </a:solidFill>
+          <a:ln w="12700"/>
+        </p:spPr>
+        <p:style>
+          <a:lnRef idx="2">
+            <a:schemeClr val="accent3">
+              <a:shade val="15000"/>
+            </a:schemeClr>
+          </a:lnRef>
+          <a:fillRef idx="1">
+            <a:schemeClr val="accent3"/>
+          </a:fillRef>
+          <a:effectRef idx="0">
+            <a:schemeClr val="accent3"/>
+          </a:effectRef>
+          <a:fontRef idx="minor">
+            <a:schemeClr val="lt1"/>
+          </a:fontRef>
+        </p:style>
+        <p:txBody>
+          <a:bodyPr rtlCol="0" anchor="ctr"/>
+          <a:lstStyle/>
+          <a:p>
+            <a:pPr algn="ctr"/>
+            <a:endParaRPr lang="fr-FR" sz="800" dirty="0"/>
+          </a:p>
+        </p:txBody>
+      </p:sp>
+      <p:sp>
+        <p:nvSpPr>
           <p:cNvPr id="3" name="Titre 2">
             <a:extLst>
               <a:ext uri="{FF2B5EF4-FFF2-40B4-BE49-F238E27FC236}">
@@ -4261,6 +5056,2208 @@
             </a:r>
             <a:r>
               <a:rPr lang="fr-FR" dirty="0"/>
+              <a:t> - Objectives</a:t>
+            </a:r>
+          </a:p>
+        </p:txBody>
+      </p:sp>
+      <p:pic>
+        <p:nvPicPr>
+          <p:cNvPr id="4" name="Picture 2" descr="Serveur de données - Icônes la mise en réseau gratuites">
+            <a:extLst>
+              <a:ext uri="{FF2B5EF4-FFF2-40B4-BE49-F238E27FC236}">
+                <a16:creationId xmlns:a16="http://schemas.microsoft.com/office/drawing/2014/main" id="{717F07D8-AB39-1663-2BCF-301A9A73860B}"/>
+              </a:ext>
+            </a:extLst>
+          </p:cNvPr>
+          <p:cNvPicPr>
+            <a:picLocks noChangeAspect="1" noChangeArrowheads="1"/>
+          </p:cNvPicPr>
+          <p:nvPr/>
+        </p:nvPicPr>
+        <p:blipFill>
+          <a:blip r:embed="rId3">
+            <a:extLst>
+              <a:ext uri="{28A0092B-C50C-407E-A947-70E740481C1C}">
+                <a14:useLocalDpi xmlns:a14="http://schemas.microsoft.com/office/drawing/2010/main" val="0"/>
+              </a:ext>
+            </a:extLst>
+          </a:blip>
+          <a:srcRect/>
+          <a:stretch>
+            <a:fillRect/>
+          </a:stretch>
+        </p:blipFill>
+        <p:spPr bwMode="auto">
+          <a:xfrm>
+            <a:off x="5812528" y="2523515"/>
+            <a:ext cx="867498" cy="867498"/>
+          </a:xfrm>
+          <a:prstGeom prst="rect">
+            <a:avLst/>
+          </a:prstGeom>
+          <a:noFill/>
+          <a:extLst>
+            <a:ext uri="{909E8E84-426E-40DD-AFC4-6F175D3DCCD1}">
+              <a14:hiddenFill xmlns:a14="http://schemas.microsoft.com/office/drawing/2010/main">
+                <a:solidFill>
+                  <a:srgbClr val="FFFFFF"/>
+                </a:solidFill>
+              </a14:hiddenFill>
+            </a:ext>
+          </a:extLst>
+        </p:spPr>
+      </p:pic>
+      <p:pic>
+        <p:nvPicPr>
+          <p:cNvPr id="5" name="Graphique 4" descr="Ordinateur avec un remplissage uni">
+            <a:extLst>
+              <a:ext uri="{FF2B5EF4-FFF2-40B4-BE49-F238E27FC236}">
+                <a16:creationId xmlns:a16="http://schemas.microsoft.com/office/drawing/2014/main" id="{171BDF44-7979-BAC1-BA99-65B541D80E7E}"/>
+              </a:ext>
+            </a:extLst>
+          </p:cNvPr>
+          <p:cNvPicPr>
+            <a:picLocks noChangeAspect="1"/>
+          </p:cNvPicPr>
+          <p:nvPr/>
+        </p:nvPicPr>
+        <p:blipFill>
+          <a:blip r:embed="rId4">
+            <a:extLst>
+              <a:ext uri="{28A0092B-C50C-407E-A947-70E740481C1C}">
+                <a14:useLocalDpi xmlns:a14="http://schemas.microsoft.com/office/drawing/2010/main" val="0"/>
+              </a:ext>
+              <a:ext uri="{96DAC541-7B7A-43D3-8B79-37D633B846F1}">
+                <asvg:svgBlip xmlns:asvg="http://schemas.microsoft.com/office/drawing/2016/SVG/main" r:embed="rId5"/>
+              </a:ext>
+            </a:extLst>
+          </a:blip>
+          <a:stretch>
+            <a:fillRect/>
+          </a:stretch>
+        </p:blipFill>
+        <p:spPr>
+          <a:xfrm>
+            <a:off x="3897019" y="3595380"/>
+            <a:ext cx="685800" cy="685800"/>
+          </a:xfrm>
+          <a:prstGeom prst="rect">
+            <a:avLst/>
+          </a:prstGeom>
+        </p:spPr>
+      </p:pic>
+      <p:pic>
+        <p:nvPicPr>
+          <p:cNvPr id="6" name="Picture 2" descr="Serveur de données - Icônes la mise en réseau gratuites">
+            <a:extLst>
+              <a:ext uri="{FF2B5EF4-FFF2-40B4-BE49-F238E27FC236}">
+                <a16:creationId xmlns:a16="http://schemas.microsoft.com/office/drawing/2014/main" id="{B7942790-0D7C-2AFF-BB97-F11C27076DF8}"/>
+              </a:ext>
+            </a:extLst>
+          </p:cNvPr>
+          <p:cNvPicPr>
+            <a:picLocks noChangeAspect="1" noChangeArrowheads="1"/>
+          </p:cNvPicPr>
+          <p:nvPr/>
+        </p:nvPicPr>
+        <p:blipFill>
+          <a:blip r:embed="rId3">
+            <a:extLst>
+              <a:ext uri="{28A0092B-C50C-407E-A947-70E740481C1C}">
+                <a14:useLocalDpi xmlns:a14="http://schemas.microsoft.com/office/drawing/2010/main" val="0"/>
+              </a:ext>
+            </a:extLst>
+          </a:blip>
+          <a:srcRect/>
+          <a:stretch>
+            <a:fillRect/>
+          </a:stretch>
+        </p:blipFill>
+        <p:spPr bwMode="auto">
+          <a:xfrm>
+            <a:off x="1601721" y="2519162"/>
+            <a:ext cx="867498" cy="867498"/>
+          </a:xfrm>
+          <a:prstGeom prst="rect">
+            <a:avLst/>
+          </a:prstGeom>
+          <a:noFill/>
+          <a:extLst>
+            <a:ext uri="{909E8E84-426E-40DD-AFC4-6F175D3DCCD1}">
+              <a14:hiddenFill xmlns:a14="http://schemas.microsoft.com/office/drawing/2010/main">
+                <a:solidFill>
+                  <a:srgbClr val="FFFFFF"/>
+                </a:solidFill>
+              </a14:hiddenFill>
+            </a:ext>
+          </a:extLst>
+        </p:spPr>
+      </p:pic>
+      <p:pic>
+        <p:nvPicPr>
+          <p:cNvPr id="7" name="Graphique 6" descr="Base de données avec un remplissage uni">
+            <a:extLst>
+              <a:ext uri="{FF2B5EF4-FFF2-40B4-BE49-F238E27FC236}">
+                <a16:creationId xmlns:a16="http://schemas.microsoft.com/office/drawing/2014/main" id="{C912B127-9006-2475-358D-D9BA774A9413}"/>
+              </a:ext>
+            </a:extLst>
+          </p:cNvPr>
+          <p:cNvPicPr>
+            <a:picLocks noChangeAspect="1"/>
+          </p:cNvPicPr>
+          <p:nvPr/>
+        </p:nvPicPr>
+        <p:blipFill>
+          <a:blip r:embed="rId6">
+            <a:extLst>
+              <a:ext uri="{28A0092B-C50C-407E-A947-70E740481C1C}">
+                <a14:useLocalDpi xmlns:a14="http://schemas.microsoft.com/office/drawing/2010/main" val="0"/>
+              </a:ext>
+              <a:ext uri="{96DAC541-7B7A-43D3-8B79-37D633B846F1}">
+                <asvg:svgBlip xmlns:asvg="http://schemas.microsoft.com/office/drawing/2016/SVG/main" r:embed="rId7"/>
+              </a:ext>
+            </a:extLst>
+          </a:blip>
+          <a:stretch>
+            <a:fillRect/>
+          </a:stretch>
+        </p:blipFill>
+        <p:spPr>
+          <a:xfrm>
+            <a:off x="5683522" y="2982700"/>
+            <a:ext cx="382575" cy="382575"/>
+          </a:xfrm>
+          <a:prstGeom prst="rect">
+            <a:avLst/>
+          </a:prstGeom>
+        </p:spPr>
+      </p:pic>
+      <p:sp>
+        <p:nvSpPr>
+          <p:cNvPr id="17" name="ZoneTexte 16">
+            <a:extLst>
+              <a:ext uri="{FF2B5EF4-FFF2-40B4-BE49-F238E27FC236}">
+                <a16:creationId xmlns:a16="http://schemas.microsoft.com/office/drawing/2014/main" id="{54722831-7D4F-84F9-2575-CBF76C7F93C3}"/>
+              </a:ext>
+            </a:extLst>
+          </p:cNvPr>
+          <p:cNvSpPr txBox="1"/>
+          <p:nvPr/>
+        </p:nvSpPr>
+        <p:spPr>
+          <a:xfrm>
+            <a:off x="159604" y="3149831"/>
+            <a:ext cx="598561" cy="215444"/>
+          </a:xfrm>
+          <a:prstGeom prst="rect">
+            <a:avLst/>
+          </a:prstGeom>
+          <a:solidFill>
+            <a:schemeClr val="accent2">
+              <a:lumMod val="20000"/>
+              <a:lumOff val="80000"/>
+            </a:schemeClr>
+          </a:solidFill>
+          <a:ln w="3175">
+            <a:solidFill>
+              <a:schemeClr val="tx1"/>
+            </a:solidFill>
+          </a:ln>
+        </p:spPr>
+        <p:txBody>
+          <a:bodyPr wrap="square" rtlCol="0" anchor="ctr">
+            <a:spAutoFit/>
+          </a:bodyPr>
+          <a:lstStyle>
+            <a:defPPr marR="0" lvl="0" algn="l" rtl="0">
+              <a:lnSpc>
+                <a:spcPct val="100000"/>
+              </a:lnSpc>
+              <a:spcBef>
+                <a:spcPts val="0"/>
+              </a:spcBef>
+              <a:spcAft>
+                <a:spcPts val="0"/>
+              </a:spcAft>
+              <a:defRPr/>
+            </a:defPPr>
+            <a:lvl1pPr algn="ctr">
+              <a:defRPr sz="675">
+                <a:latin typeface="Courier New" panose="02070309020205020404" pitchFamily="49" charset="0"/>
+                <a:cs typeface="Courier New" panose="02070309020205020404" pitchFamily="49" charset="0"/>
+              </a:defRPr>
+            </a:lvl1pPr>
+          </a:lstStyle>
+          <a:p>
+            <a:r>
+              <a:rPr lang="fr-FR" sz="800" dirty="0"/>
+              <a:t>Data</a:t>
+            </a:r>
+          </a:p>
+        </p:txBody>
+      </p:sp>
+      <p:cxnSp>
+        <p:nvCxnSpPr>
+          <p:cNvPr id="21" name="Connecteur droit avec flèche 20">
+            <a:extLst>
+              <a:ext uri="{FF2B5EF4-FFF2-40B4-BE49-F238E27FC236}">
+                <a16:creationId xmlns:a16="http://schemas.microsoft.com/office/drawing/2014/main" id="{3E5CC60F-E55F-BB01-045D-DB2636F3D02F}"/>
+              </a:ext>
+            </a:extLst>
+          </p:cNvPr>
+          <p:cNvCxnSpPr>
+            <a:cxnSpLocks/>
+            <a:stCxn id="6" idx="3"/>
+          </p:cNvCxnSpPr>
+          <p:nvPr/>
+        </p:nvCxnSpPr>
+        <p:spPr>
+          <a:xfrm flipV="1">
+            <a:off x="2469219" y="2948139"/>
+            <a:ext cx="846859" cy="4772"/>
+          </a:xfrm>
+          <a:prstGeom prst="straightConnector1">
+            <a:avLst/>
+          </a:prstGeom>
+          <a:ln w="57150">
+            <a:headEnd type="triangle"/>
+            <a:tailEnd type="triangle"/>
+          </a:ln>
+        </p:spPr>
+        <p:style>
+          <a:lnRef idx="1">
+            <a:schemeClr val="accent1"/>
+          </a:lnRef>
+          <a:fillRef idx="0">
+            <a:schemeClr val="accent1"/>
+          </a:fillRef>
+          <a:effectRef idx="0">
+            <a:schemeClr val="accent1"/>
+          </a:effectRef>
+          <a:fontRef idx="minor">
+            <a:schemeClr val="tx1"/>
+          </a:fontRef>
+        </p:style>
+      </p:cxnSp>
+      <p:cxnSp>
+        <p:nvCxnSpPr>
+          <p:cNvPr id="23" name="Connecteur droit avec flèche 22">
+            <a:extLst>
+              <a:ext uri="{FF2B5EF4-FFF2-40B4-BE49-F238E27FC236}">
+                <a16:creationId xmlns:a16="http://schemas.microsoft.com/office/drawing/2014/main" id="{DE938E05-1E91-AB1C-333D-CBB158AF050C}"/>
+              </a:ext>
+            </a:extLst>
+          </p:cNvPr>
+          <p:cNvCxnSpPr>
+            <a:cxnSpLocks/>
+            <a:endCxn id="4" idx="1"/>
+          </p:cNvCxnSpPr>
+          <p:nvPr/>
+        </p:nvCxnSpPr>
+        <p:spPr>
+          <a:xfrm flipV="1">
+            <a:off x="5036210" y="2957264"/>
+            <a:ext cx="776318" cy="5170"/>
+          </a:xfrm>
+          <a:prstGeom prst="straightConnector1">
+            <a:avLst/>
+          </a:prstGeom>
+          <a:ln w="57150">
+            <a:headEnd type="none"/>
+            <a:tailEnd type="triangle"/>
+          </a:ln>
+        </p:spPr>
+        <p:style>
+          <a:lnRef idx="1">
+            <a:schemeClr val="accent1"/>
+          </a:lnRef>
+          <a:fillRef idx="0">
+            <a:schemeClr val="accent1"/>
+          </a:fillRef>
+          <a:effectRef idx="0">
+            <a:schemeClr val="accent1"/>
+          </a:effectRef>
+          <a:fontRef idx="minor">
+            <a:schemeClr val="tx1"/>
+          </a:fontRef>
+        </p:style>
+      </p:cxnSp>
+      <p:grpSp>
+        <p:nvGrpSpPr>
+          <p:cNvPr id="24" name="Groupe 23">
+            <a:extLst>
+              <a:ext uri="{FF2B5EF4-FFF2-40B4-BE49-F238E27FC236}">
+                <a16:creationId xmlns:a16="http://schemas.microsoft.com/office/drawing/2014/main" id="{877BD90E-61C7-545A-7D6C-41BFE296E3FA}"/>
+              </a:ext>
+            </a:extLst>
+          </p:cNvPr>
+          <p:cNvGrpSpPr/>
+          <p:nvPr/>
+        </p:nvGrpSpPr>
+        <p:grpSpPr>
+          <a:xfrm>
+            <a:off x="6025630" y="3935410"/>
+            <a:ext cx="685800" cy="685800"/>
+            <a:chOff x="3518477" y="2676206"/>
+            <a:chExt cx="685800" cy="685800"/>
+          </a:xfrm>
+        </p:grpSpPr>
+        <p:pic>
+          <p:nvPicPr>
+            <p:cNvPr id="25" name="Graphique 24" descr="Ordinateur avec un remplissage uni">
+              <a:extLst>
+                <a:ext uri="{FF2B5EF4-FFF2-40B4-BE49-F238E27FC236}">
+                  <a16:creationId xmlns:a16="http://schemas.microsoft.com/office/drawing/2014/main" id="{58B98C6B-4E84-6906-C69F-F03FE7557709}"/>
+                </a:ext>
+              </a:extLst>
+            </p:cNvPr>
+            <p:cNvPicPr>
+              <a:picLocks noChangeAspect="1"/>
+            </p:cNvPicPr>
+            <p:nvPr/>
+          </p:nvPicPr>
+          <p:blipFill>
+            <a:blip r:embed="rId4">
+              <a:extLst>
+                <a:ext uri="{28A0092B-C50C-407E-A947-70E740481C1C}">
+                  <a14:useLocalDpi xmlns:a14="http://schemas.microsoft.com/office/drawing/2010/main" val="0"/>
+                </a:ext>
+                <a:ext uri="{96DAC541-7B7A-43D3-8B79-37D633B846F1}">
+                  <asvg:svgBlip xmlns:asvg="http://schemas.microsoft.com/office/drawing/2016/SVG/main" r:embed="rId5"/>
+                </a:ext>
+              </a:extLst>
+            </a:blip>
+            <a:stretch>
+              <a:fillRect/>
+            </a:stretch>
+          </p:blipFill>
+          <p:spPr>
+            <a:xfrm>
+              <a:off x="3518477" y="2676206"/>
+              <a:ext cx="685800" cy="685800"/>
+            </a:xfrm>
+            <a:prstGeom prst="rect">
+              <a:avLst/>
+            </a:prstGeom>
+          </p:spPr>
+        </p:pic>
+        <p:pic>
+          <p:nvPicPr>
+            <p:cNvPr id="26" name="Image 25">
+              <a:extLst>
+                <a:ext uri="{FF2B5EF4-FFF2-40B4-BE49-F238E27FC236}">
+                  <a16:creationId xmlns:a16="http://schemas.microsoft.com/office/drawing/2014/main" id="{3C959D3F-A7DE-F337-430A-38BE1E9A400C}"/>
+                </a:ext>
+              </a:extLst>
+            </p:cNvPr>
+            <p:cNvPicPr>
+              <a:picLocks noChangeAspect="1"/>
+            </p:cNvPicPr>
+            <p:nvPr/>
+          </p:nvPicPr>
+          <p:blipFill>
+            <a:blip r:embed="rId8"/>
+            <a:stretch>
+              <a:fillRect/>
+            </a:stretch>
+          </p:blipFill>
+          <p:spPr>
+            <a:xfrm>
+              <a:off x="3594735" y="2860818"/>
+              <a:ext cx="305329" cy="228556"/>
+            </a:xfrm>
+            <a:prstGeom prst="rect">
+              <a:avLst/>
+            </a:prstGeom>
+          </p:spPr>
+        </p:pic>
+      </p:grpSp>
+      <p:cxnSp>
+        <p:nvCxnSpPr>
+          <p:cNvPr id="27" name="Connecteur droit avec flèche 26">
+            <a:extLst>
+              <a:ext uri="{FF2B5EF4-FFF2-40B4-BE49-F238E27FC236}">
+                <a16:creationId xmlns:a16="http://schemas.microsoft.com/office/drawing/2014/main" id="{064AB111-5E64-B0CE-170E-10ADD415D98D}"/>
+              </a:ext>
+            </a:extLst>
+          </p:cNvPr>
+          <p:cNvCxnSpPr>
+            <a:cxnSpLocks/>
+            <a:stCxn id="4" idx="2"/>
+          </p:cNvCxnSpPr>
+          <p:nvPr/>
+        </p:nvCxnSpPr>
+        <p:spPr>
+          <a:xfrm>
+            <a:off x="6246277" y="3391013"/>
+            <a:ext cx="6635" cy="650582"/>
+          </a:xfrm>
+          <a:prstGeom prst="straightConnector1">
+            <a:avLst/>
+          </a:prstGeom>
+          <a:ln w="57150">
+            <a:headEnd type="none"/>
+            <a:tailEnd type="triangle"/>
+          </a:ln>
+        </p:spPr>
+        <p:style>
+          <a:lnRef idx="1">
+            <a:schemeClr val="accent1"/>
+          </a:lnRef>
+          <a:fillRef idx="0">
+            <a:schemeClr val="accent1"/>
+          </a:fillRef>
+          <a:effectRef idx="0">
+            <a:schemeClr val="accent1"/>
+          </a:effectRef>
+          <a:fontRef idx="minor">
+            <a:schemeClr val="tx1"/>
+          </a:fontRef>
+        </p:style>
+      </p:cxnSp>
+      <p:pic>
+        <p:nvPicPr>
+          <p:cNvPr id="33" name="Graphique 32" descr="Ordinateur avec un remplissage uni">
+            <a:extLst>
+              <a:ext uri="{FF2B5EF4-FFF2-40B4-BE49-F238E27FC236}">
+                <a16:creationId xmlns:a16="http://schemas.microsoft.com/office/drawing/2014/main" id="{BCAC1AA9-5DC8-F914-5F46-7AB93D73E38B}"/>
+              </a:ext>
+            </a:extLst>
+          </p:cNvPr>
+          <p:cNvPicPr>
+            <a:picLocks noChangeAspect="1"/>
+          </p:cNvPicPr>
+          <p:nvPr/>
+        </p:nvPicPr>
+        <p:blipFill>
+          <a:blip r:embed="rId4">
+            <a:extLst>
+              <a:ext uri="{28A0092B-C50C-407E-A947-70E740481C1C}">
+                <a14:useLocalDpi xmlns:a14="http://schemas.microsoft.com/office/drawing/2010/main" val="0"/>
+              </a:ext>
+              <a:ext uri="{96DAC541-7B7A-43D3-8B79-37D633B846F1}">
+                <asvg:svgBlip xmlns:asvg="http://schemas.microsoft.com/office/drawing/2016/SVG/main" r:embed="rId5"/>
+              </a:ext>
+            </a:extLst>
+          </a:blip>
+          <a:stretch>
+            <a:fillRect/>
+          </a:stretch>
+        </p:blipFill>
+        <p:spPr>
+          <a:xfrm>
+            <a:off x="7684140" y="2612419"/>
+            <a:ext cx="685800" cy="685800"/>
+          </a:xfrm>
+          <a:prstGeom prst="rect">
+            <a:avLst/>
+          </a:prstGeom>
+        </p:spPr>
+      </p:pic>
+      <p:cxnSp>
+        <p:nvCxnSpPr>
+          <p:cNvPr id="38" name="Connecteur droit avec flèche 37">
+            <a:extLst>
+              <a:ext uri="{FF2B5EF4-FFF2-40B4-BE49-F238E27FC236}">
+                <a16:creationId xmlns:a16="http://schemas.microsoft.com/office/drawing/2014/main" id="{F912D15A-4AC2-F142-7374-BF328BB1026B}"/>
+              </a:ext>
+            </a:extLst>
+          </p:cNvPr>
+          <p:cNvCxnSpPr>
+            <a:cxnSpLocks/>
+            <a:stCxn id="4" idx="3"/>
+            <a:endCxn id="33" idx="1"/>
+          </p:cNvCxnSpPr>
+          <p:nvPr/>
+        </p:nvCxnSpPr>
+        <p:spPr>
+          <a:xfrm flipV="1">
+            <a:off x="6680026" y="2955319"/>
+            <a:ext cx="1004114" cy="1945"/>
+          </a:xfrm>
+          <a:prstGeom prst="straightConnector1">
+            <a:avLst/>
+          </a:prstGeom>
+          <a:ln w="57150">
+            <a:headEnd type="triangle"/>
+            <a:tailEnd type="triangle"/>
+          </a:ln>
+        </p:spPr>
+        <p:style>
+          <a:lnRef idx="1">
+            <a:schemeClr val="accent1"/>
+          </a:lnRef>
+          <a:fillRef idx="0">
+            <a:schemeClr val="accent1"/>
+          </a:fillRef>
+          <a:effectRef idx="0">
+            <a:schemeClr val="accent1"/>
+          </a:effectRef>
+          <a:fontRef idx="minor">
+            <a:schemeClr val="tx1"/>
+          </a:fontRef>
+        </p:style>
+      </p:cxnSp>
+      <p:sp>
+        <p:nvSpPr>
+          <p:cNvPr id="48" name="ZoneTexte 47">
+            <a:extLst>
+              <a:ext uri="{FF2B5EF4-FFF2-40B4-BE49-F238E27FC236}">
+                <a16:creationId xmlns:a16="http://schemas.microsoft.com/office/drawing/2014/main" id="{AD104111-C094-DC8C-EF93-9A384BCC4DAA}"/>
+              </a:ext>
+            </a:extLst>
+          </p:cNvPr>
+          <p:cNvSpPr txBox="1"/>
+          <p:nvPr/>
+        </p:nvSpPr>
+        <p:spPr>
+          <a:xfrm>
+            <a:off x="6886373" y="3000946"/>
+            <a:ext cx="605389" cy="184666"/>
+          </a:xfrm>
+          <a:prstGeom prst="rect">
+            <a:avLst/>
+          </a:prstGeom>
+          <a:solidFill>
+            <a:schemeClr val="accent6"/>
+          </a:solidFill>
+          <a:ln w="3175">
+            <a:solidFill>
+              <a:schemeClr val="tx1"/>
+            </a:solidFill>
+          </a:ln>
+        </p:spPr>
+        <p:txBody>
+          <a:bodyPr wrap="square" rtlCol="0" anchor="ctr">
+            <a:spAutoFit/>
+          </a:bodyPr>
+          <a:lstStyle>
+            <a:defPPr marR="0" lvl="0" algn="l" rtl="0">
+              <a:lnSpc>
+                <a:spcPct val="100000"/>
+              </a:lnSpc>
+              <a:spcBef>
+                <a:spcPts val="0"/>
+              </a:spcBef>
+              <a:spcAft>
+                <a:spcPts val="0"/>
+              </a:spcAft>
+              <a:defRPr/>
+            </a:defPPr>
+            <a:lvl1pPr algn="ctr">
+              <a:defRPr sz="675">
+                <a:latin typeface="Courier New" panose="02070309020205020404" pitchFamily="49" charset="0"/>
+                <a:cs typeface="Courier New" panose="02070309020205020404" pitchFamily="49" charset="0"/>
+              </a:defRPr>
+            </a:lvl1pPr>
+          </a:lstStyle>
+          <a:p>
+            <a:r>
+              <a:rPr lang="fr-FR" sz="600" dirty="0" err="1"/>
+              <a:t>predict</a:t>
+            </a:r>
+            <a:r>
+              <a:rPr lang="fr-FR" sz="600" dirty="0"/>
+              <a:t>()</a:t>
+            </a:r>
+          </a:p>
+        </p:txBody>
+      </p:sp>
+      <p:grpSp>
+        <p:nvGrpSpPr>
+          <p:cNvPr id="1031" name="Groupe 1030">
+            <a:extLst>
+              <a:ext uri="{FF2B5EF4-FFF2-40B4-BE49-F238E27FC236}">
+                <a16:creationId xmlns:a16="http://schemas.microsoft.com/office/drawing/2014/main" id="{27408B37-7571-659D-5374-18E36A087DF5}"/>
+              </a:ext>
+            </a:extLst>
+          </p:cNvPr>
+          <p:cNvGrpSpPr/>
+          <p:nvPr/>
+        </p:nvGrpSpPr>
+        <p:grpSpPr>
+          <a:xfrm>
+            <a:off x="1523737" y="3421814"/>
+            <a:ext cx="952035" cy="668334"/>
+            <a:chOff x="1918907" y="2319014"/>
+            <a:chExt cx="952035" cy="668334"/>
+          </a:xfrm>
+        </p:grpSpPr>
+        <p:sp>
+          <p:nvSpPr>
+            <p:cNvPr id="10" name="Rectangle 9">
+              <a:extLst>
+                <a:ext uri="{FF2B5EF4-FFF2-40B4-BE49-F238E27FC236}">
+                  <a16:creationId xmlns:a16="http://schemas.microsoft.com/office/drawing/2014/main" id="{74915136-7F52-0861-8BFB-648DDFFB0CDE}"/>
+                </a:ext>
+              </a:extLst>
+            </p:cNvPr>
+            <p:cNvSpPr/>
+            <p:nvPr/>
+          </p:nvSpPr>
+          <p:spPr>
+            <a:xfrm>
+              <a:off x="1918907" y="2533806"/>
+              <a:ext cx="951105" cy="220526"/>
+            </a:xfrm>
+            <a:prstGeom prst="rect">
+              <a:avLst/>
+            </a:prstGeom>
+            <a:solidFill>
+              <a:schemeClr val="accent4">
+                <a:lumMod val="20000"/>
+                <a:lumOff val="80000"/>
+              </a:schemeClr>
+            </a:solidFill>
+            <a:ln w="3175"/>
+          </p:spPr>
+          <p:style>
+            <a:lnRef idx="2">
+              <a:schemeClr val="accent1">
+                <a:shade val="15000"/>
+              </a:schemeClr>
+            </a:lnRef>
+            <a:fillRef idx="1">
+              <a:schemeClr val="accent1"/>
+            </a:fillRef>
+            <a:effectRef idx="0">
+              <a:schemeClr val="accent1"/>
+            </a:effectRef>
+            <a:fontRef idx="minor">
+              <a:schemeClr val="lt1"/>
+            </a:fontRef>
+          </p:style>
+          <p:txBody>
+            <a:bodyPr rtlCol="0" anchor="ctr"/>
+            <a:lstStyle/>
+            <a:p>
+              <a:pPr algn="ctr"/>
+              <a:r>
+                <a:rPr lang="fr-FR" sz="800" dirty="0">
+                  <a:solidFill>
+                    <a:schemeClr val="tx1"/>
+                  </a:solidFill>
+                  <a:latin typeface="Courier New" panose="02070309020205020404" pitchFamily="49" charset="0"/>
+                  <a:cs typeface="Courier New" panose="02070309020205020404" pitchFamily="49" charset="0"/>
+                </a:rPr>
+                <a:t>S3</a:t>
+              </a:r>
+            </a:p>
+          </p:txBody>
+        </p:sp>
+        <p:sp>
+          <p:nvSpPr>
+            <p:cNvPr id="11" name="ZoneTexte 10">
+              <a:extLst>
+                <a:ext uri="{FF2B5EF4-FFF2-40B4-BE49-F238E27FC236}">
+                  <a16:creationId xmlns:a16="http://schemas.microsoft.com/office/drawing/2014/main" id="{79E35FDB-22AC-7F4D-2AE0-1F1272A4399D}"/>
+                </a:ext>
+              </a:extLst>
+            </p:cNvPr>
+            <p:cNvSpPr txBox="1"/>
+            <p:nvPr/>
+          </p:nvSpPr>
+          <p:spPr>
+            <a:xfrm>
+              <a:off x="1918908" y="2319014"/>
+              <a:ext cx="951105" cy="215444"/>
+            </a:xfrm>
+            <a:prstGeom prst="rect">
+              <a:avLst/>
+            </a:prstGeom>
+            <a:solidFill>
+              <a:schemeClr val="accent2">
+                <a:lumMod val="20000"/>
+                <a:lumOff val="80000"/>
+              </a:schemeClr>
+            </a:solidFill>
+            <a:ln w="3175">
+              <a:solidFill>
+                <a:schemeClr val="tx1"/>
+              </a:solidFill>
+            </a:ln>
+          </p:spPr>
+          <p:txBody>
+            <a:bodyPr wrap="square" rtlCol="0" anchor="ctr">
+              <a:spAutoFit/>
+            </a:bodyPr>
+            <a:lstStyle>
+              <a:defPPr marR="0" lvl="0" algn="l" rtl="0">
+                <a:lnSpc>
+                  <a:spcPct val="100000"/>
+                </a:lnSpc>
+                <a:spcBef>
+                  <a:spcPts val="0"/>
+                </a:spcBef>
+                <a:spcAft>
+                  <a:spcPts val="0"/>
+                </a:spcAft>
+                <a:defRPr/>
+              </a:defPPr>
+              <a:lvl1pPr algn="ctr">
+                <a:defRPr sz="675">
+                  <a:latin typeface="Courier New" panose="02070309020205020404" pitchFamily="49" charset="0"/>
+                  <a:cs typeface="Courier New" panose="02070309020205020404" pitchFamily="49" charset="0"/>
+                </a:defRPr>
+              </a:lvl1pPr>
+            </a:lstStyle>
+            <a:p>
+              <a:r>
+                <a:rPr lang="fr-FR" sz="800" dirty="0" err="1"/>
+                <a:t>Storing</a:t>
+              </a:r>
+              <a:endParaRPr lang="fr-FR" sz="800" dirty="0"/>
+            </a:p>
+          </p:txBody>
+        </p:sp>
+        <p:sp>
+          <p:nvSpPr>
+            <p:cNvPr id="52" name="ZoneTexte 51">
+              <a:extLst>
+                <a:ext uri="{FF2B5EF4-FFF2-40B4-BE49-F238E27FC236}">
+                  <a16:creationId xmlns:a16="http://schemas.microsoft.com/office/drawing/2014/main" id="{399C0156-77B2-724E-58C3-CB80A7A69061}"/>
+                </a:ext>
+              </a:extLst>
+            </p:cNvPr>
+            <p:cNvSpPr txBox="1"/>
+            <p:nvPr/>
+          </p:nvSpPr>
+          <p:spPr>
+            <a:xfrm>
+              <a:off x="2570860" y="2771904"/>
+              <a:ext cx="300082" cy="215444"/>
+            </a:xfrm>
+            <a:prstGeom prst="rect">
+              <a:avLst/>
+            </a:prstGeom>
+            <a:solidFill>
+              <a:srgbClr val="C00000"/>
+            </a:solidFill>
+          </p:spPr>
+          <p:txBody>
+            <a:bodyPr wrap="none" rtlCol="0">
+              <a:spAutoFit/>
+            </a:bodyPr>
+            <a:lstStyle/>
+            <a:p>
+              <a:r>
+                <a:rPr lang="fr-FR" sz="800" dirty="0">
+                  <a:solidFill>
+                    <a:schemeClr val="bg1">
+                      <a:lumMod val="95000"/>
+                    </a:schemeClr>
+                  </a:solidFill>
+                </a:rPr>
+                <a:t>01</a:t>
+              </a:r>
+            </a:p>
+          </p:txBody>
+        </p:sp>
+      </p:grpSp>
+      <p:grpSp>
+        <p:nvGrpSpPr>
+          <p:cNvPr id="1036" name="Groupe 1035">
+            <a:extLst>
+              <a:ext uri="{FF2B5EF4-FFF2-40B4-BE49-F238E27FC236}">
+                <a16:creationId xmlns:a16="http://schemas.microsoft.com/office/drawing/2014/main" id="{4A82B162-DEFD-9CB7-B60A-A8E228E98432}"/>
+              </a:ext>
+            </a:extLst>
+          </p:cNvPr>
+          <p:cNvGrpSpPr/>
+          <p:nvPr/>
+        </p:nvGrpSpPr>
+        <p:grpSpPr>
+          <a:xfrm>
+            <a:off x="6375362" y="3826151"/>
+            <a:ext cx="806668" cy="452159"/>
+            <a:chOff x="6098300" y="4266528"/>
+            <a:chExt cx="806668" cy="452159"/>
+          </a:xfrm>
+        </p:grpSpPr>
+        <p:sp>
+          <p:nvSpPr>
+            <p:cNvPr id="31" name="ZoneTexte 30">
+              <a:extLst>
+                <a:ext uri="{FF2B5EF4-FFF2-40B4-BE49-F238E27FC236}">
+                  <a16:creationId xmlns:a16="http://schemas.microsoft.com/office/drawing/2014/main" id="{411D03E1-FE63-49A3-4D06-E97A1449DFC3}"/>
+                </a:ext>
+              </a:extLst>
+            </p:cNvPr>
+            <p:cNvSpPr txBox="1"/>
+            <p:nvPr/>
+          </p:nvSpPr>
+          <p:spPr>
+            <a:xfrm>
+              <a:off x="6098300" y="4266528"/>
+              <a:ext cx="802073" cy="215444"/>
+            </a:xfrm>
+            <a:prstGeom prst="rect">
+              <a:avLst/>
+            </a:prstGeom>
+            <a:solidFill>
+              <a:schemeClr val="accent2">
+                <a:lumMod val="20000"/>
+                <a:lumOff val="80000"/>
+              </a:schemeClr>
+            </a:solidFill>
+            <a:ln w="3175">
+              <a:solidFill>
+                <a:schemeClr val="tx1"/>
+              </a:solidFill>
+            </a:ln>
+          </p:spPr>
+          <p:txBody>
+            <a:bodyPr wrap="square" rtlCol="0" anchor="ctr">
+              <a:spAutoFit/>
+            </a:bodyPr>
+            <a:lstStyle>
+              <a:defPPr marR="0" lvl="0" algn="l" rtl="0">
+                <a:lnSpc>
+                  <a:spcPct val="100000"/>
+                </a:lnSpc>
+                <a:spcBef>
+                  <a:spcPts val="0"/>
+                </a:spcBef>
+                <a:spcAft>
+                  <a:spcPts val="0"/>
+                </a:spcAft>
+              </a:defPPr>
+              <a:lvl1pPr algn="ctr">
+                <a:defRPr sz="675">
+                  <a:latin typeface="Courier New" panose="02070309020205020404" pitchFamily="49" charset="0"/>
+                  <a:cs typeface="Courier New" panose="02070309020205020404" pitchFamily="49" charset="0"/>
+                </a:defRPr>
+              </a:lvl1pPr>
+            </a:lstStyle>
+            <a:p>
+              <a:r>
+                <a:rPr lang="fr-FR" sz="800" dirty="0"/>
+                <a:t>Monitoring</a:t>
+              </a:r>
+            </a:p>
+          </p:txBody>
+        </p:sp>
+        <p:sp>
+          <p:nvSpPr>
+            <p:cNvPr id="2" name="ZoneTexte 1">
+              <a:extLst>
+                <a:ext uri="{FF2B5EF4-FFF2-40B4-BE49-F238E27FC236}">
+                  <a16:creationId xmlns:a16="http://schemas.microsoft.com/office/drawing/2014/main" id="{7FB152FA-6981-EA90-83A1-41DAFE3270F3}"/>
+                </a:ext>
+              </a:extLst>
+            </p:cNvPr>
+            <p:cNvSpPr txBox="1"/>
+            <p:nvPr/>
+          </p:nvSpPr>
+          <p:spPr>
+            <a:xfrm>
+              <a:off x="6604886" y="4503243"/>
+              <a:ext cx="300082" cy="215444"/>
+            </a:xfrm>
+            <a:prstGeom prst="rect">
+              <a:avLst/>
+            </a:prstGeom>
+            <a:solidFill>
+              <a:srgbClr val="C00000"/>
+            </a:solidFill>
+          </p:spPr>
+          <p:txBody>
+            <a:bodyPr wrap="none" rtlCol="0">
+              <a:spAutoFit/>
+            </a:bodyPr>
+            <a:lstStyle/>
+            <a:p>
+              <a:r>
+                <a:rPr lang="fr-FR" sz="800" dirty="0">
+                  <a:solidFill>
+                    <a:schemeClr val="bg1">
+                      <a:lumMod val="95000"/>
+                    </a:schemeClr>
+                  </a:solidFill>
+                </a:rPr>
+                <a:t>04</a:t>
+              </a:r>
+            </a:p>
+          </p:txBody>
+        </p:sp>
+      </p:grpSp>
+      <p:grpSp>
+        <p:nvGrpSpPr>
+          <p:cNvPr id="1027" name="Groupe 1026">
+            <a:extLst>
+              <a:ext uri="{FF2B5EF4-FFF2-40B4-BE49-F238E27FC236}">
+                <a16:creationId xmlns:a16="http://schemas.microsoft.com/office/drawing/2014/main" id="{9C71DFE7-C00D-9221-C068-D6B6C4D74F1C}"/>
+              </a:ext>
+            </a:extLst>
+          </p:cNvPr>
+          <p:cNvGrpSpPr/>
+          <p:nvPr/>
+        </p:nvGrpSpPr>
+        <p:grpSpPr>
+          <a:xfrm>
+            <a:off x="4253107" y="881702"/>
+            <a:ext cx="1124235" cy="884664"/>
+            <a:chOff x="4082059" y="570089"/>
+            <a:chExt cx="1124235" cy="884664"/>
+          </a:xfrm>
+        </p:grpSpPr>
+        <p:sp>
+          <p:nvSpPr>
+            <p:cNvPr id="45" name="Rectangle 44">
+              <a:extLst>
+                <a:ext uri="{FF2B5EF4-FFF2-40B4-BE49-F238E27FC236}">
+                  <a16:creationId xmlns:a16="http://schemas.microsoft.com/office/drawing/2014/main" id="{B7EC46BE-0F3E-CD8B-03B9-18067334CF89}"/>
+                </a:ext>
+              </a:extLst>
+            </p:cNvPr>
+            <p:cNvSpPr/>
+            <p:nvPr/>
+          </p:nvSpPr>
+          <p:spPr>
+            <a:xfrm>
+              <a:off x="4082060" y="785799"/>
+              <a:ext cx="1115164" cy="220526"/>
+            </a:xfrm>
+            <a:prstGeom prst="rect">
+              <a:avLst/>
+            </a:prstGeom>
+            <a:solidFill>
+              <a:schemeClr val="accent4">
+                <a:lumMod val="20000"/>
+                <a:lumOff val="80000"/>
+              </a:schemeClr>
+            </a:solidFill>
+            <a:ln w="3175"/>
+          </p:spPr>
+          <p:style>
+            <a:lnRef idx="2">
+              <a:schemeClr val="accent1">
+                <a:shade val="15000"/>
+              </a:schemeClr>
+            </a:lnRef>
+            <a:fillRef idx="1">
+              <a:schemeClr val="accent1"/>
+            </a:fillRef>
+            <a:effectRef idx="0">
+              <a:schemeClr val="accent1"/>
+            </a:effectRef>
+            <a:fontRef idx="minor">
+              <a:schemeClr val="lt1"/>
+            </a:fontRef>
+          </p:style>
+          <p:txBody>
+            <a:bodyPr rtlCol="0" anchor="ctr"/>
+            <a:lstStyle/>
+            <a:p>
+              <a:pPr algn="ctr"/>
+              <a:r>
+                <a:rPr lang="fr-FR" sz="800" dirty="0">
+                  <a:solidFill>
+                    <a:schemeClr val="tx1"/>
+                  </a:solidFill>
+                  <a:latin typeface="Courier New" panose="02070309020205020404" pitchFamily="49" charset="0"/>
+                  <a:cs typeface="Courier New" panose="02070309020205020404" pitchFamily="49" charset="0"/>
+                </a:rPr>
+                <a:t>EC2 </a:t>
+              </a:r>
+              <a:r>
+                <a:rPr lang="fr-FR" sz="800" dirty="0" err="1">
+                  <a:solidFill>
+                    <a:schemeClr val="tx1"/>
+                  </a:solidFill>
+                  <a:latin typeface="Courier New" panose="02070309020205020404" pitchFamily="49" charset="0"/>
+                  <a:cs typeface="Courier New" panose="02070309020205020404" pitchFamily="49" charset="0"/>
+                </a:rPr>
+                <a:t>others</a:t>
+              </a:r>
+              <a:endParaRPr lang="fr-FR" sz="800" dirty="0">
+                <a:solidFill>
+                  <a:schemeClr val="tx1"/>
+                </a:solidFill>
+                <a:latin typeface="Courier New" panose="02070309020205020404" pitchFamily="49" charset="0"/>
+                <a:cs typeface="Courier New" panose="02070309020205020404" pitchFamily="49" charset="0"/>
+              </a:endParaRPr>
+            </a:p>
+          </p:txBody>
+        </p:sp>
+        <p:sp>
+          <p:nvSpPr>
+            <p:cNvPr id="49" name="ZoneTexte 48">
+              <a:extLst>
+                <a:ext uri="{FF2B5EF4-FFF2-40B4-BE49-F238E27FC236}">
+                  <a16:creationId xmlns:a16="http://schemas.microsoft.com/office/drawing/2014/main" id="{E0D268CB-4B06-33FC-48AF-159E508BF0C9}"/>
+                </a:ext>
+              </a:extLst>
+            </p:cNvPr>
+            <p:cNvSpPr txBox="1"/>
+            <p:nvPr/>
+          </p:nvSpPr>
+          <p:spPr>
+            <a:xfrm>
+              <a:off x="4082059" y="1005412"/>
+              <a:ext cx="1115164" cy="215444"/>
+            </a:xfrm>
+            <a:prstGeom prst="rect">
+              <a:avLst/>
+            </a:prstGeom>
+            <a:solidFill>
+              <a:schemeClr val="accent5">
+                <a:lumMod val="20000"/>
+                <a:lumOff val="80000"/>
+              </a:schemeClr>
+            </a:solidFill>
+            <a:ln w="3175">
+              <a:solidFill>
+                <a:schemeClr val="tx1"/>
+              </a:solidFill>
+            </a:ln>
+          </p:spPr>
+          <p:txBody>
+            <a:bodyPr wrap="square" rtlCol="0">
+              <a:spAutoFit/>
+            </a:bodyPr>
+            <a:lstStyle>
+              <a:defPPr marR="0" lvl="0" algn="l" rtl="0">
+                <a:lnSpc>
+                  <a:spcPct val="100000"/>
+                </a:lnSpc>
+                <a:spcBef>
+                  <a:spcPts val="0"/>
+                </a:spcBef>
+                <a:spcAft>
+                  <a:spcPts val="0"/>
+                </a:spcAft>
+              </a:defPPr>
+              <a:lvl1pPr>
+                <a:defRPr sz="800">
+                  <a:latin typeface="Courier New" panose="02070309020205020404" pitchFamily="49" charset="0"/>
+                  <a:cs typeface="Courier New" panose="02070309020205020404" pitchFamily="49" charset="0"/>
+                </a:defRPr>
+              </a:lvl1pPr>
+            </a:lstStyle>
+            <a:p>
+              <a:r>
+                <a:rPr lang="fr-FR" dirty="0" err="1"/>
+                <a:t>MLFlow</a:t>
+              </a:r>
+              <a:r>
+                <a:rPr lang="fr-FR" dirty="0"/>
+                <a:t> </a:t>
+              </a:r>
+              <a:r>
+                <a:rPr lang="fr-FR" dirty="0" err="1"/>
+                <a:t>projects</a:t>
+              </a:r>
+              <a:endParaRPr lang="fr-FR" dirty="0"/>
+            </a:p>
+          </p:txBody>
+        </p:sp>
+        <p:sp>
+          <p:nvSpPr>
+            <p:cNvPr id="53" name="ZoneTexte 52">
+              <a:extLst>
+                <a:ext uri="{FF2B5EF4-FFF2-40B4-BE49-F238E27FC236}">
+                  <a16:creationId xmlns:a16="http://schemas.microsoft.com/office/drawing/2014/main" id="{F94A7B61-E32A-5176-ACAA-204F079BF9F1}"/>
+                </a:ext>
+              </a:extLst>
+            </p:cNvPr>
+            <p:cNvSpPr txBox="1"/>
+            <p:nvPr/>
+          </p:nvSpPr>
+          <p:spPr>
+            <a:xfrm>
+              <a:off x="4906212" y="1239309"/>
+              <a:ext cx="300082" cy="215444"/>
+            </a:xfrm>
+            <a:prstGeom prst="rect">
+              <a:avLst/>
+            </a:prstGeom>
+            <a:solidFill>
+              <a:srgbClr val="C00000"/>
+            </a:solidFill>
+          </p:spPr>
+          <p:txBody>
+            <a:bodyPr wrap="none" rtlCol="0">
+              <a:spAutoFit/>
+            </a:bodyPr>
+            <a:lstStyle/>
+            <a:p>
+              <a:r>
+                <a:rPr lang="fr-FR" sz="800" dirty="0">
+                  <a:solidFill>
+                    <a:schemeClr val="bg1">
+                      <a:lumMod val="95000"/>
+                    </a:schemeClr>
+                  </a:solidFill>
+                </a:rPr>
+                <a:t>02</a:t>
+              </a:r>
+            </a:p>
+          </p:txBody>
+        </p:sp>
+        <p:sp>
+          <p:nvSpPr>
+            <p:cNvPr id="15" name="ZoneTexte 14">
+              <a:extLst>
+                <a:ext uri="{FF2B5EF4-FFF2-40B4-BE49-F238E27FC236}">
+                  <a16:creationId xmlns:a16="http://schemas.microsoft.com/office/drawing/2014/main" id="{85B6C5E1-6C57-B98B-0DA8-28B9893D188A}"/>
+                </a:ext>
+              </a:extLst>
+            </p:cNvPr>
+            <p:cNvSpPr txBox="1"/>
+            <p:nvPr/>
+          </p:nvSpPr>
+          <p:spPr>
+            <a:xfrm>
+              <a:off x="4082059" y="570089"/>
+              <a:ext cx="1115164" cy="215444"/>
+            </a:xfrm>
+            <a:prstGeom prst="rect">
+              <a:avLst/>
+            </a:prstGeom>
+            <a:solidFill>
+              <a:schemeClr val="accent2">
+                <a:lumMod val="20000"/>
+                <a:lumOff val="80000"/>
+              </a:schemeClr>
+            </a:solidFill>
+            <a:ln w="3175">
+              <a:solidFill>
+                <a:schemeClr val="tx1"/>
+              </a:solidFill>
+            </a:ln>
+          </p:spPr>
+          <p:txBody>
+            <a:bodyPr wrap="square" rtlCol="0" anchor="ctr">
+              <a:spAutoFit/>
+            </a:bodyPr>
+            <a:lstStyle>
+              <a:defPPr marR="0" lvl="0" algn="l" rtl="0">
+                <a:lnSpc>
+                  <a:spcPct val="100000"/>
+                </a:lnSpc>
+                <a:spcBef>
+                  <a:spcPts val="0"/>
+                </a:spcBef>
+                <a:spcAft>
+                  <a:spcPts val="0"/>
+                </a:spcAft>
+                <a:defRPr/>
+              </a:defPPr>
+              <a:lvl1pPr algn="ctr">
+                <a:defRPr sz="675">
+                  <a:latin typeface="Courier New" panose="02070309020205020404" pitchFamily="49" charset="0"/>
+                  <a:cs typeface="Courier New" panose="02070309020205020404" pitchFamily="49" charset="0"/>
+                </a:defRPr>
+              </a:lvl1pPr>
+            </a:lstStyle>
+            <a:p>
+              <a:r>
+                <a:rPr lang="fr-FR" sz="800" dirty="0"/>
+                <a:t>Training</a:t>
+              </a:r>
+            </a:p>
+          </p:txBody>
+        </p:sp>
+      </p:grpSp>
+      <p:pic>
+        <p:nvPicPr>
+          <p:cNvPr id="47" name="Graphique 46" descr="Nuage avec un remplissage uni">
+            <a:extLst>
+              <a:ext uri="{FF2B5EF4-FFF2-40B4-BE49-F238E27FC236}">
+                <a16:creationId xmlns:a16="http://schemas.microsoft.com/office/drawing/2014/main" id="{EAA36F96-0FAE-1D0A-E12A-AA22913FAB08}"/>
+              </a:ext>
+            </a:extLst>
+          </p:cNvPr>
+          <p:cNvPicPr>
+            <a:picLocks noChangeAspect="1"/>
+          </p:cNvPicPr>
+          <p:nvPr/>
+        </p:nvPicPr>
+        <p:blipFill>
+          <a:blip r:embed="rId9">
+            <a:extLst>
+              <a:ext uri="{96DAC541-7B7A-43D3-8B79-37D633B846F1}">
+                <asvg:svgBlip xmlns:asvg="http://schemas.microsoft.com/office/drawing/2016/SVG/main" r:embed="rId10"/>
+              </a:ext>
+            </a:extLst>
+          </a:blip>
+          <a:stretch>
+            <a:fillRect/>
+          </a:stretch>
+        </p:blipFill>
+        <p:spPr>
+          <a:xfrm>
+            <a:off x="149634" y="2615657"/>
+            <a:ext cx="664963" cy="664963"/>
+          </a:xfrm>
+          <a:prstGeom prst="rect">
+            <a:avLst/>
+          </a:prstGeom>
+        </p:spPr>
+      </p:pic>
+      <p:grpSp>
+        <p:nvGrpSpPr>
+          <p:cNvPr id="56" name="Groupe 55">
+            <a:extLst>
+              <a:ext uri="{FF2B5EF4-FFF2-40B4-BE49-F238E27FC236}">
+                <a16:creationId xmlns:a16="http://schemas.microsoft.com/office/drawing/2014/main" id="{2C2DF18E-AC16-43EF-C64A-8E7B5B3DB147}"/>
+              </a:ext>
+            </a:extLst>
+          </p:cNvPr>
+          <p:cNvGrpSpPr/>
+          <p:nvPr/>
+        </p:nvGrpSpPr>
+        <p:grpSpPr>
+          <a:xfrm rot="20850387">
+            <a:off x="4744057" y="3663044"/>
+            <a:ext cx="1037697" cy="1016278"/>
+            <a:chOff x="700951" y="3221919"/>
+            <a:chExt cx="1037697" cy="1016278"/>
+          </a:xfrm>
+          <a:solidFill>
+            <a:srgbClr val="C00000"/>
+          </a:solidFill>
+        </p:grpSpPr>
+        <p:pic>
+          <p:nvPicPr>
+            <p:cNvPr id="54" name="Graphique 53" descr="Ligne fléchée : faire pivoter à droite avec un remplissage uni">
+              <a:extLst>
+                <a:ext uri="{FF2B5EF4-FFF2-40B4-BE49-F238E27FC236}">
+                  <a16:creationId xmlns:a16="http://schemas.microsoft.com/office/drawing/2014/main" id="{9A92D136-E70E-C007-E650-A2D70CD4F353}"/>
+                </a:ext>
+              </a:extLst>
+            </p:cNvPr>
+            <p:cNvPicPr>
+              <a:picLocks noChangeAspect="1"/>
+            </p:cNvPicPr>
+            <p:nvPr/>
+          </p:nvPicPr>
+          <p:blipFill>
+            <a:blip r:embed="rId11">
+              <a:extLst>
+                <a:ext uri="{96DAC541-7B7A-43D3-8B79-37D633B846F1}">
+                  <asvg:svgBlip xmlns:asvg="http://schemas.microsoft.com/office/drawing/2016/SVG/main" r:embed="rId12"/>
+                </a:ext>
+              </a:extLst>
+            </a:blip>
+            <a:stretch>
+              <a:fillRect/>
+            </a:stretch>
+          </p:blipFill>
+          <p:spPr>
+            <a:xfrm>
+              <a:off x="824248" y="3221919"/>
+              <a:ext cx="914400" cy="914400"/>
+            </a:xfrm>
+            <a:prstGeom prst="rect">
+              <a:avLst/>
+            </a:prstGeom>
+          </p:spPr>
+        </p:pic>
+        <p:pic>
+          <p:nvPicPr>
+            <p:cNvPr id="55" name="Graphique 54" descr="Ligne fléchée : faire pivoter à droite avec un remplissage uni">
+              <a:extLst>
+                <a:ext uri="{FF2B5EF4-FFF2-40B4-BE49-F238E27FC236}">
+                  <a16:creationId xmlns:a16="http://schemas.microsoft.com/office/drawing/2014/main" id="{C063199A-312E-B148-3C65-8FAC334CC405}"/>
+                </a:ext>
+              </a:extLst>
+            </p:cNvPr>
+            <p:cNvPicPr>
+              <a:picLocks noChangeAspect="1"/>
+            </p:cNvPicPr>
+            <p:nvPr/>
+          </p:nvPicPr>
+          <p:blipFill>
+            <a:blip r:embed="rId11">
+              <a:extLst>
+                <a:ext uri="{96DAC541-7B7A-43D3-8B79-37D633B846F1}">
+                  <asvg:svgBlip xmlns:asvg="http://schemas.microsoft.com/office/drawing/2016/SVG/main" r:embed="rId12"/>
+                </a:ext>
+              </a:extLst>
+            </a:blip>
+            <a:stretch>
+              <a:fillRect/>
+            </a:stretch>
+          </p:blipFill>
+          <p:spPr>
+            <a:xfrm rot="10331277">
+              <a:off x="700951" y="3323797"/>
+              <a:ext cx="914400" cy="914400"/>
+            </a:xfrm>
+            <a:prstGeom prst="rect">
+              <a:avLst/>
+            </a:prstGeom>
+          </p:spPr>
+        </p:pic>
+      </p:grpSp>
+      <p:sp>
+        <p:nvSpPr>
+          <p:cNvPr id="57" name="ZoneTexte 56">
+            <a:extLst>
+              <a:ext uri="{FF2B5EF4-FFF2-40B4-BE49-F238E27FC236}">
+                <a16:creationId xmlns:a16="http://schemas.microsoft.com/office/drawing/2014/main" id="{42D4720D-D86B-CDF4-BA54-47094D836E44}"/>
+              </a:ext>
+            </a:extLst>
+          </p:cNvPr>
+          <p:cNvSpPr txBox="1"/>
+          <p:nvPr/>
+        </p:nvSpPr>
+        <p:spPr>
+          <a:xfrm>
+            <a:off x="5263911" y="4401866"/>
+            <a:ext cx="528500" cy="184666"/>
+          </a:xfrm>
+          <a:prstGeom prst="rect">
+            <a:avLst/>
+          </a:prstGeom>
+          <a:solidFill>
+            <a:schemeClr val="accent6"/>
+          </a:solidFill>
+          <a:ln w="3175">
+            <a:solidFill>
+              <a:schemeClr val="tx1"/>
+            </a:solidFill>
+          </a:ln>
+        </p:spPr>
+        <p:txBody>
+          <a:bodyPr wrap="square" rtlCol="0" anchor="ctr">
+            <a:spAutoFit/>
+          </a:bodyPr>
+          <a:lstStyle>
+            <a:defPPr marR="0" lvl="0" algn="l" rtl="0">
+              <a:lnSpc>
+                <a:spcPct val="100000"/>
+              </a:lnSpc>
+              <a:spcBef>
+                <a:spcPts val="0"/>
+              </a:spcBef>
+              <a:spcAft>
+                <a:spcPts val="0"/>
+              </a:spcAft>
+              <a:defRPr/>
+            </a:defPPr>
+            <a:lvl1pPr algn="ctr">
+              <a:defRPr sz="600">
+                <a:latin typeface="Courier New" panose="02070309020205020404" pitchFamily="49" charset="0"/>
+                <a:cs typeface="Courier New" panose="02070309020205020404" pitchFamily="49" charset="0"/>
+              </a:defRPr>
+            </a:lvl1pPr>
+          </a:lstStyle>
+          <a:p>
+            <a:r>
+              <a:rPr lang="fr-FR" dirty="0" err="1"/>
+              <a:t>Iterate</a:t>
+            </a:r>
+            <a:endParaRPr lang="fr-FR" dirty="0"/>
+          </a:p>
+        </p:txBody>
+      </p:sp>
+      <p:sp>
+        <p:nvSpPr>
+          <p:cNvPr id="58" name="ZoneTexte 57">
+            <a:extLst>
+              <a:ext uri="{FF2B5EF4-FFF2-40B4-BE49-F238E27FC236}">
+                <a16:creationId xmlns:a16="http://schemas.microsoft.com/office/drawing/2014/main" id="{B2E8F991-E10B-B949-C93B-A5A143398AB3}"/>
+              </a:ext>
+            </a:extLst>
+          </p:cNvPr>
+          <p:cNvSpPr txBox="1"/>
+          <p:nvPr/>
+        </p:nvSpPr>
+        <p:spPr>
+          <a:xfrm>
+            <a:off x="3469206" y="1608940"/>
+            <a:ext cx="1452011" cy="184666"/>
+          </a:xfrm>
+          <a:prstGeom prst="rect">
+            <a:avLst/>
+          </a:prstGeom>
+          <a:solidFill>
+            <a:schemeClr val="accent6"/>
+          </a:solidFill>
+          <a:ln w="3175">
+            <a:solidFill>
+              <a:schemeClr val="tx1"/>
+            </a:solidFill>
+          </a:ln>
+        </p:spPr>
+        <p:txBody>
+          <a:bodyPr wrap="square" rtlCol="0" anchor="ctr">
+            <a:spAutoFit/>
+          </a:bodyPr>
+          <a:lstStyle>
+            <a:defPPr marR="0" lvl="0" algn="l" rtl="0">
+              <a:lnSpc>
+                <a:spcPct val="100000"/>
+              </a:lnSpc>
+              <a:spcBef>
+                <a:spcPts val="0"/>
+              </a:spcBef>
+              <a:spcAft>
+                <a:spcPts val="0"/>
+              </a:spcAft>
+              <a:defRPr/>
+            </a:defPPr>
+            <a:lvl1pPr algn="ctr">
+              <a:defRPr sz="600">
+                <a:latin typeface="Courier New" panose="02070309020205020404" pitchFamily="49" charset="0"/>
+                <a:cs typeface="Courier New" panose="02070309020205020404" pitchFamily="49" charset="0"/>
+              </a:defRPr>
+            </a:lvl1pPr>
+          </a:lstStyle>
+          <a:p>
+            <a:r>
+              <a:rPr lang="fr-FR" dirty="0"/>
+              <a:t>Multiple </a:t>
+            </a:r>
+            <a:r>
+              <a:rPr lang="fr-FR" dirty="0" err="1"/>
+              <a:t>models</a:t>
+            </a:r>
+            <a:r>
+              <a:rPr lang="fr-FR" dirty="0"/>
+              <a:t>, </a:t>
+            </a:r>
+            <a:r>
+              <a:rPr lang="fr-FR" dirty="0" err="1"/>
+              <a:t>various</a:t>
+            </a:r>
+            <a:r>
+              <a:rPr lang="fr-FR" dirty="0"/>
+              <a:t> HW</a:t>
+            </a:r>
+          </a:p>
+        </p:txBody>
+      </p:sp>
+      <p:pic>
+        <p:nvPicPr>
+          <p:cNvPr id="60" name="Image 59">
+            <a:extLst>
+              <a:ext uri="{FF2B5EF4-FFF2-40B4-BE49-F238E27FC236}">
+                <a16:creationId xmlns:a16="http://schemas.microsoft.com/office/drawing/2014/main" id="{7CB98866-60DE-CAB4-E3DA-4474A06D0431}"/>
+              </a:ext>
+            </a:extLst>
+          </p:cNvPr>
+          <p:cNvPicPr>
+            <a:picLocks noChangeAspect="1"/>
+          </p:cNvPicPr>
+          <p:nvPr/>
+        </p:nvPicPr>
+        <p:blipFill rotWithShape="1">
+          <a:blip r:embed="rId13"/>
+          <a:srcRect l="8118" t="7108" r="12015" b="4195"/>
+          <a:stretch/>
+        </p:blipFill>
+        <p:spPr>
+          <a:xfrm>
+            <a:off x="8312689" y="3196437"/>
+            <a:ext cx="273554" cy="285386"/>
+          </a:xfrm>
+          <a:prstGeom prst="rect">
+            <a:avLst/>
+          </a:prstGeom>
+          <a:effectLst>
+            <a:outerShdw blurRad="50800" dist="38100" dir="2700000" algn="tl" rotWithShape="0">
+              <a:prstClr val="black">
+                <a:alpha val="40000"/>
+              </a:prstClr>
+            </a:outerShdw>
+          </a:effectLst>
+        </p:spPr>
+      </p:pic>
+      <p:pic>
+        <p:nvPicPr>
+          <p:cNvPr id="1026" name="Picture 2" descr="Gpu - Icônes ordinateur gratuites">
+            <a:extLst>
+              <a:ext uri="{FF2B5EF4-FFF2-40B4-BE49-F238E27FC236}">
+                <a16:creationId xmlns:a16="http://schemas.microsoft.com/office/drawing/2014/main" id="{0728D59F-5B9E-737F-DE8A-6695246453B8}"/>
+              </a:ext>
+            </a:extLst>
+          </p:cNvPr>
+          <p:cNvPicPr>
+            <a:picLocks noChangeAspect="1" noChangeArrowheads="1"/>
+          </p:cNvPicPr>
+          <p:nvPr/>
+        </p:nvPicPr>
+        <p:blipFill>
+          <a:blip r:embed="rId14">
+            <a:extLst>
+              <a:ext uri="{28A0092B-C50C-407E-A947-70E740481C1C}">
+                <a14:useLocalDpi xmlns:a14="http://schemas.microsoft.com/office/drawing/2010/main" val="0"/>
+              </a:ext>
+            </a:extLst>
+          </a:blip>
+          <a:srcRect/>
+          <a:stretch>
+            <a:fillRect/>
+          </a:stretch>
+        </p:blipFill>
+        <p:spPr bwMode="auto">
+          <a:xfrm>
+            <a:off x="3860031" y="2745511"/>
+            <a:ext cx="737811" cy="737811"/>
+          </a:xfrm>
+          <a:prstGeom prst="rect">
+            <a:avLst/>
+          </a:prstGeom>
+          <a:noFill/>
+          <a:extLst>
+            <a:ext uri="{909E8E84-426E-40DD-AFC4-6F175D3DCCD1}">
+              <a14:hiddenFill xmlns:a14="http://schemas.microsoft.com/office/drawing/2010/main">
+                <a:solidFill>
+                  <a:srgbClr val="FFFFFF"/>
+                </a:solidFill>
+              </a14:hiddenFill>
+            </a:ext>
+          </a:extLst>
+        </p:spPr>
+      </p:pic>
+      <p:grpSp>
+        <p:nvGrpSpPr>
+          <p:cNvPr id="1028" name="Groupe 1027">
+            <a:extLst>
+              <a:ext uri="{FF2B5EF4-FFF2-40B4-BE49-F238E27FC236}">
+                <a16:creationId xmlns:a16="http://schemas.microsoft.com/office/drawing/2014/main" id="{BAF9EED9-AED1-DC68-2DCE-26FB79C6239A}"/>
+              </a:ext>
+            </a:extLst>
+          </p:cNvPr>
+          <p:cNvGrpSpPr/>
+          <p:nvPr/>
+        </p:nvGrpSpPr>
+        <p:grpSpPr>
+          <a:xfrm>
+            <a:off x="7811770" y="2090576"/>
+            <a:ext cx="880426" cy="871858"/>
+            <a:chOff x="7847330" y="2494196"/>
+            <a:chExt cx="880426" cy="871858"/>
+          </a:xfrm>
+        </p:grpSpPr>
+        <p:sp>
+          <p:nvSpPr>
+            <p:cNvPr id="35" name="ZoneTexte 34">
+              <a:extLst>
+                <a:ext uri="{FF2B5EF4-FFF2-40B4-BE49-F238E27FC236}">
+                  <a16:creationId xmlns:a16="http://schemas.microsoft.com/office/drawing/2014/main" id="{D274B890-A8EE-A186-7126-825C2C23FECC}"/>
+                </a:ext>
+              </a:extLst>
+            </p:cNvPr>
+            <p:cNvSpPr txBox="1"/>
+            <p:nvPr/>
+          </p:nvSpPr>
+          <p:spPr>
+            <a:xfrm>
+              <a:off x="7847331" y="2494196"/>
+              <a:ext cx="874208" cy="215444"/>
+            </a:xfrm>
+            <a:prstGeom prst="rect">
+              <a:avLst/>
+            </a:prstGeom>
+            <a:solidFill>
+              <a:schemeClr val="accent2">
+                <a:lumMod val="20000"/>
+                <a:lumOff val="80000"/>
+              </a:schemeClr>
+            </a:solidFill>
+            <a:ln w="3175">
+              <a:solidFill>
+                <a:schemeClr val="tx1"/>
+              </a:solidFill>
+            </a:ln>
+          </p:spPr>
+          <p:txBody>
+            <a:bodyPr wrap="square" rtlCol="0" anchor="ctr">
+              <a:spAutoFit/>
+            </a:bodyPr>
+            <a:lstStyle>
+              <a:defPPr marR="0" lvl="0" algn="l" rtl="0">
+                <a:lnSpc>
+                  <a:spcPct val="100000"/>
+                </a:lnSpc>
+                <a:spcBef>
+                  <a:spcPts val="0"/>
+                </a:spcBef>
+                <a:spcAft>
+                  <a:spcPts val="0"/>
+                </a:spcAft>
+              </a:defPPr>
+              <a:lvl1pPr algn="ctr">
+                <a:defRPr sz="675">
+                  <a:latin typeface="Courier New" panose="02070309020205020404" pitchFamily="49" charset="0"/>
+                  <a:cs typeface="Courier New" panose="02070309020205020404" pitchFamily="49" charset="0"/>
+                </a:defRPr>
+              </a:lvl1pPr>
+            </a:lstStyle>
+            <a:p>
+              <a:r>
+                <a:rPr lang="fr-FR" sz="800" dirty="0" err="1"/>
+                <a:t>Consuming</a:t>
+              </a:r>
+              <a:endParaRPr lang="fr-FR" sz="800" dirty="0"/>
+            </a:p>
+          </p:txBody>
+        </p:sp>
+        <p:sp>
+          <p:nvSpPr>
+            <p:cNvPr id="20" name="ZoneTexte 19">
+              <a:extLst>
+                <a:ext uri="{FF2B5EF4-FFF2-40B4-BE49-F238E27FC236}">
+                  <a16:creationId xmlns:a16="http://schemas.microsoft.com/office/drawing/2014/main" id="{6ABD733F-89FD-A412-51AF-EFF2B0DBD600}"/>
+                </a:ext>
+              </a:extLst>
+            </p:cNvPr>
+            <p:cNvSpPr txBox="1"/>
+            <p:nvPr/>
+          </p:nvSpPr>
+          <p:spPr>
+            <a:xfrm>
+              <a:off x="8427674" y="3150610"/>
+              <a:ext cx="300082" cy="215444"/>
+            </a:xfrm>
+            <a:prstGeom prst="rect">
+              <a:avLst/>
+            </a:prstGeom>
+            <a:solidFill>
+              <a:srgbClr val="C00000"/>
+            </a:solidFill>
+          </p:spPr>
+          <p:txBody>
+            <a:bodyPr wrap="none" rtlCol="0">
+              <a:spAutoFit/>
+            </a:bodyPr>
+            <a:lstStyle/>
+            <a:p>
+              <a:r>
+                <a:rPr lang="fr-FR" sz="800" dirty="0">
+                  <a:solidFill>
+                    <a:schemeClr val="bg1">
+                      <a:lumMod val="95000"/>
+                    </a:schemeClr>
+                  </a:solidFill>
+                </a:rPr>
+                <a:t>05</a:t>
+              </a:r>
+            </a:p>
+          </p:txBody>
+        </p:sp>
+        <p:sp>
+          <p:nvSpPr>
+            <p:cNvPr id="62" name="Rectangle 61">
+              <a:extLst>
+                <a:ext uri="{FF2B5EF4-FFF2-40B4-BE49-F238E27FC236}">
+                  <a16:creationId xmlns:a16="http://schemas.microsoft.com/office/drawing/2014/main" id="{F10532C8-67F5-5F96-A53D-F1BD08EFDC8B}"/>
+                </a:ext>
+              </a:extLst>
+            </p:cNvPr>
+            <p:cNvSpPr/>
+            <p:nvPr/>
+          </p:nvSpPr>
+          <p:spPr>
+            <a:xfrm>
+              <a:off x="7847330" y="2698676"/>
+              <a:ext cx="874208" cy="220526"/>
+            </a:xfrm>
+            <a:prstGeom prst="rect">
+              <a:avLst/>
+            </a:prstGeom>
+            <a:solidFill>
+              <a:schemeClr val="accent4">
+                <a:lumMod val="20000"/>
+                <a:lumOff val="80000"/>
+              </a:schemeClr>
+            </a:solidFill>
+            <a:ln w="3175"/>
+          </p:spPr>
+          <p:style>
+            <a:lnRef idx="2">
+              <a:schemeClr val="accent1">
+                <a:shade val="15000"/>
+              </a:schemeClr>
+            </a:lnRef>
+            <a:fillRef idx="1">
+              <a:schemeClr val="accent1"/>
+            </a:fillRef>
+            <a:effectRef idx="0">
+              <a:schemeClr val="accent1"/>
+            </a:effectRef>
+            <a:fontRef idx="minor">
+              <a:schemeClr val="lt1"/>
+            </a:fontRef>
+          </p:style>
+          <p:txBody>
+            <a:bodyPr rtlCol="0" anchor="ctr"/>
+            <a:lstStyle/>
+            <a:p>
+              <a:pPr algn="ctr"/>
+              <a:r>
+                <a:rPr lang="fr-FR" sz="800" dirty="0" err="1">
+                  <a:solidFill>
+                    <a:schemeClr val="tx1"/>
+                  </a:solidFill>
+                  <a:latin typeface="Courier New" panose="02070309020205020404" pitchFamily="49" charset="0"/>
+                  <a:cs typeface="Courier New" panose="02070309020205020404" pitchFamily="49" charset="0"/>
+                </a:rPr>
+                <a:t>API+Web</a:t>
+              </a:r>
+              <a:r>
+                <a:rPr lang="fr-FR" sz="800" dirty="0">
+                  <a:solidFill>
+                    <a:schemeClr val="tx1"/>
+                  </a:solidFill>
+                  <a:latin typeface="Courier New" panose="02070309020205020404" pitchFamily="49" charset="0"/>
+                  <a:cs typeface="Courier New" panose="02070309020205020404" pitchFamily="49" charset="0"/>
+                </a:rPr>
+                <a:t> App</a:t>
+              </a:r>
+            </a:p>
+          </p:txBody>
+        </p:sp>
+        <p:sp>
+          <p:nvSpPr>
+            <p:cNvPr id="63" name="ZoneTexte 62">
+              <a:extLst>
+                <a:ext uri="{FF2B5EF4-FFF2-40B4-BE49-F238E27FC236}">
+                  <a16:creationId xmlns:a16="http://schemas.microsoft.com/office/drawing/2014/main" id="{39A85152-5F2B-F7A8-9D12-C4A32B754764}"/>
+                </a:ext>
+              </a:extLst>
+            </p:cNvPr>
+            <p:cNvSpPr txBox="1"/>
+            <p:nvPr/>
+          </p:nvSpPr>
+          <p:spPr>
+            <a:xfrm>
+              <a:off x="7847330" y="2908797"/>
+              <a:ext cx="874208" cy="215444"/>
+            </a:xfrm>
+            <a:prstGeom prst="rect">
+              <a:avLst/>
+            </a:prstGeom>
+            <a:solidFill>
+              <a:schemeClr val="accent5">
+                <a:lumMod val="20000"/>
+                <a:lumOff val="80000"/>
+              </a:schemeClr>
+            </a:solidFill>
+            <a:ln w="3175">
+              <a:solidFill>
+                <a:schemeClr val="tx1"/>
+              </a:solidFill>
+            </a:ln>
+          </p:spPr>
+          <p:txBody>
+            <a:bodyPr wrap="square" rtlCol="0" anchor="ctr">
+              <a:spAutoFit/>
+            </a:bodyPr>
+            <a:lstStyle/>
+            <a:p>
+              <a:pPr algn="ctr"/>
+              <a:r>
+                <a:rPr lang="fr-FR" sz="800" dirty="0">
+                  <a:latin typeface="Courier New" panose="02070309020205020404" pitchFamily="49" charset="0"/>
+                  <a:cs typeface="Courier New" panose="02070309020205020404" pitchFamily="49" charset="0"/>
+                </a:rPr>
+                <a:t>Flask</a:t>
+              </a:r>
+            </a:p>
+          </p:txBody>
+        </p:sp>
+      </p:grpSp>
+      <p:grpSp>
+        <p:nvGrpSpPr>
+          <p:cNvPr id="1030" name="Groupe 1029">
+            <a:extLst>
+              <a:ext uri="{FF2B5EF4-FFF2-40B4-BE49-F238E27FC236}">
+                <a16:creationId xmlns:a16="http://schemas.microsoft.com/office/drawing/2014/main" id="{0283DBA2-E154-B24E-00E4-B2111440E40D}"/>
+              </a:ext>
+            </a:extLst>
+          </p:cNvPr>
+          <p:cNvGrpSpPr/>
+          <p:nvPr/>
+        </p:nvGrpSpPr>
+        <p:grpSpPr>
+          <a:xfrm>
+            <a:off x="5674190" y="1904674"/>
+            <a:ext cx="1102014" cy="878854"/>
+            <a:chOff x="5550125" y="861609"/>
+            <a:chExt cx="1102014" cy="878854"/>
+          </a:xfrm>
+        </p:grpSpPr>
+        <p:sp>
+          <p:nvSpPr>
+            <p:cNvPr id="8" name="Rectangle 7">
+              <a:extLst>
+                <a:ext uri="{FF2B5EF4-FFF2-40B4-BE49-F238E27FC236}">
+                  <a16:creationId xmlns:a16="http://schemas.microsoft.com/office/drawing/2014/main" id="{7BD7D3CD-81D5-4848-C5A0-5012687582FD}"/>
+                </a:ext>
+              </a:extLst>
+            </p:cNvPr>
+            <p:cNvSpPr/>
+            <p:nvPr/>
+          </p:nvSpPr>
+          <p:spPr>
+            <a:xfrm>
+              <a:off x="5550125" y="1075311"/>
+              <a:ext cx="1096351" cy="220526"/>
+            </a:xfrm>
+            <a:prstGeom prst="rect">
+              <a:avLst/>
+            </a:prstGeom>
+            <a:solidFill>
+              <a:schemeClr val="accent4">
+                <a:lumMod val="20000"/>
+                <a:lumOff val="80000"/>
+              </a:schemeClr>
+            </a:solidFill>
+            <a:ln w="3175"/>
+          </p:spPr>
+          <p:style>
+            <a:lnRef idx="2">
+              <a:schemeClr val="accent1">
+                <a:shade val="15000"/>
+              </a:schemeClr>
+            </a:lnRef>
+            <a:fillRef idx="1">
+              <a:schemeClr val="accent1"/>
+            </a:fillRef>
+            <a:effectRef idx="0">
+              <a:schemeClr val="accent1"/>
+            </a:effectRef>
+            <a:fontRef idx="minor">
+              <a:schemeClr val="lt1"/>
+            </a:fontRef>
+          </p:style>
+          <p:txBody>
+            <a:bodyPr rtlCol="0" anchor="ctr"/>
+            <a:lstStyle/>
+            <a:p>
+              <a:pPr algn="ctr"/>
+              <a:r>
+                <a:rPr lang="fr-FR" sz="800" dirty="0" err="1">
+                  <a:solidFill>
+                    <a:schemeClr val="tx1"/>
+                  </a:solidFill>
+                  <a:latin typeface="Courier New" panose="02070309020205020404" pitchFamily="49" charset="0"/>
+                  <a:cs typeface="Courier New" panose="02070309020205020404" pitchFamily="49" charset="0"/>
+                </a:rPr>
+                <a:t>Heroku</a:t>
+              </a:r>
+              <a:endParaRPr lang="fr-FR" sz="800" dirty="0">
+                <a:solidFill>
+                  <a:schemeClr val="tx1"/>
+                </a:solidFill>
+                <a:latin typeface="Courier New" panose="02070309020205020404" pitchFamily="49" charset="0"/>
+                <a:cs typeface="Courier New" panose="02070309020205020404" pitchFamily="49" charset="0"/>
+              </a:endParaRPr>
+            </a:p>
+          </p:txBody>
+        </p:sp>
+        <p:sp>
+          <p:nvSpPr>
+            <p:cNvPr id="50" name="ZoneTexte 49">
+              <a:extLst>
+                <a:ext uri="{FF2B5EF4-FFF2-40B4-BE49-F238E27FC236}">
+                  <a16:creationId xmlns:a16="http://schemas.microsoft.com/office/drawing/2014/main" id="{A671C5B9-A334-3D52-FB83-E43BEEFB2500}"/>
+                </a:ext>
+              </a:extLst>
+            </p:cNvPr>
+            <p:cNvSpPr txBox="1"/>
+            <p:nvPr/>
+          </p:nvSpPr>
+          <p:spPr>
+            <a:xfrm>
+              <a:off x="5550125" y="1294701"/>
+              <a:ext cx="1096351" cy="215444"/>
+            </a:xfrm>
+            <a:prstGeom prst="rect">
+              <a:avLst/>
+            </a:prstGeom>
+            <a:solidFill>
+              <a:schemeClr val="accent5">
+                <a:lumMod val="20000"/>
+                <a:lumOff val="80000"/>
+              </a:schemeClr>
+            </a:solidFill>
+            <a:ln w="3175">
+              <a:solidFill>
+                <a:schemeClr val="tx1"/>
+              </a:solidFill>
+            </a:ln>
+          </p:spPr>
+          <p:txBody>
+            <a:bodyPr wrap="square" rtlCol="0">
+              <a:spAutoFit/>
+            </a:bodyPr>
+            <a:lstStyle/>
+            <a:p>
+              <a:r>
+                <a:rPr lang="fr-FR" sz="800" dirty="0" err="1">
+                  <a:latin typeface="Courier New" panose="02070309020205020404" pitchFamily="49" charset="0"/>
+                  <a:cs typeface="Courier New" panose="02070309020205020404" pitchFamily="49" charset="0"/>
+                </a:rPr>
+                <a:t>MLFlow</a:t>
+              </a:r>
+              <a:r>
+                <a:rPr lang="fr-FR" sz="800" dirty="0">
+                  <a:latin typeface="Courier New" panose="02070309020205020404" pitchFamily="49" charset="0"/>
+                  <a:cs typeface="Courier New" panose="02070309020205020404" pitchFamily="49" charset="0"/>
+                </a:rPr>
+                <a:t> </a:t>
+              </a:r>
+              <a:r>
+                <a:rPr lang="fr-FR" sz="800" dirty="0" err="1">
+                  <a:latin typeface="Courier New" panose="02070309020205020404" pitchFamily="49" charset="0"/>
+                  <a:cs typeface="Courier New" panose="02070309020205020404" pitchFamily="49" charset="0"/>
+                </a:rPr>
+                <a:t>tracking</a:t>
+              </a:r>
+              <a:endParaRPr lang="fr-FR" sz="800" dirty="0">
+                <a:latin typeface="Courier New" panose="02070309020205020404" pitchFamily="49" charset="0"/>
+                <a:cs typeface="Courier New" panose="02070309020205020404" pitchFamily="49" charset="0"/>
+              </a:endParaRPr>
+            </a:p>
+          </p:txBody>
+        </p:sp>
+        <p:sp>
+          <p:nvSpPr>
+            <p:cNvPr id="61" name="ZoneTexte 60">
+              <a:extLst>
+                <a:ext uri="{FF2B5EF4-FFF2-40B4-BE49-F238E27FC236}">
+                  <a16:creationId xmlns:a16="http://schemas.microsoft.com/office/drawing/2014/main" id="{0C67B44A-0F47-AFCD-9934-9CBFA7BCD508}"/>
+                </a:ext>
+              </a:extLst>
+            </p:cNvPr>
+            <p:cNvSpPr txBox="1"/>
+            <p:nvPr/>
+          </p:nvSpPr>
+          <p:spPr>
+            <a:xfrm>
+              <a:off x="5550125" y="861609"/>
+              <a:ext cx="1096351" cy="215444"/>
+            </a:xfrm>
+            <a:prstGeom prst="rect">
+              <a:avLst/>
+            </a:prstGeom>
+            <a:solidFill>
+              <a:schemeClr val="accent2">
+                <a:lumMod val="20000"/>
+                <a:lumOff val="80000"/>
+              </a:schemeClr>
+            </a:solidFill>
+            <a:ln w="3175">
+              <a:solidFill>
+                <a:schemeClr val="tx1"/>
+              </a:solidFill>
+            </a:ln>
+          </p:spPr>
+          <p:txBody>
+            <a:bodyPr wrap="square" rtlCol="0" anchor="ctr">
+              <a:spAutoFit/>
+            </a:bodyPr>
+            <a:lstStyle>
+              <a:defPPr marR="0" lvl="0" algn="l" rtl="0">
+                <a:lnSpc>
+                  <a:spcPct val="100000"/>
+                </a:lnSpc>
+                <a:spcBef>
+                  <a:spcPts val="0"/>
+                </a:spcBef>
+                <a:spcAft>
+                  <a:spcPts val="0"/>
+                </a:spcAft>
+                <a:defRPr/>
+              </a:defPPr>
+              <a:lvl1pPr algn="ctr">
+                <a:defRPr sz="675">
+                  <a:latin typeface="Courier New" panose="02070309020205020404" pitchFamily="49" charset="0"/>
+                  <a:cs typeface="Courier New" panose="02070309020205020404" pitchFamily="49" charset="0"/>
+                </a:defRPr>
+              </a:lvl1pPr>
+            </a:lstStyle>
+            <a:p>
+              <a:r>
+                <a:rPr lang="fr-FR" sz="800" dirty="0" err="1"/>
+                <a:t>Tracking</a:t>
+              </a:r>
+              <a:endParaRPr lang="fr-FR" sz="800" dirty="0"/>
+            </a:p>
+          </p:txBody>
+        </p:sp>
+        <p:sp>
+          <p:nvSpPr>
+            <p:cNvPr id="1029" name="ZoneTexte 1028">
+              <a:extLst>
+                <a:ext uri="{FF2B5EF4-FFF2-40B4-BE49-F238E27FC236}">
+                  <a16:creationId xmlns:a16="http://schemas.microsoft.com/office/drawing/2014/main" id="{D7A7CEEA-60D3-E981-000D-38CC7FF6265D}"/>
+                </a:ext>
+              </a:extLst>
+            </p:cNvPr>
+            <p:cNvSpPr txBox="1"/>
+            <p:nvPr/>
+          </p:nvSpPr>
+          <p:spPr>
+            <a:xfrm>
+              <a:off x="6352057" y="1525019"/>
+              <a:ext cx="300082" cy="215444"/>
+            </a:xfrm>
+            <a:prstGeom prst="rect">
+              <a:avLst/>
+            </a:prstGeom>
+            <a:solidFill>
+              <a:srgbClr val="C00000"/>
+            </a:solidFill>
+          </p:spPr>
+          <p:txBody>
+            <a:bodyPr wrap="none" rtlCol="0">
+              <a:spAutoFit/>
+            </a:bodyPr>
+            <a:lstStyle/>
+            <a:p>
+              <a:r>
+                <a:rPr lang="fr-FR" sz="800" dirty="0">
+                  <a:solidFill>
+                    <a:schemeClr val="bg1">
+                      <a:lumMod val="95000"/>
+                    </a:schemeClr>
+                  </a:solidFill>
+                </a:rPr>
+                <a:t>03</a:t>
+              </a:r>
+            </a:p>
+          </p:txBody>
+        </p:sp>
+      </p:grpSp>
+      <p:cxnSp>
+        <p:nvCxnSpPr>
+          <p:cNvPr id="1032" name="Connecteur droit avec flèche 1031">
+            <a:extLst>
+              <a:ext uri="{FF2B5EF4-FFF2-40B4-BE49-F238E27FC236}">
+                <a16:creationId xmlns:a16="http://schemas.microsoft.com/office/drawing/2014/main" id="{6DEDE52E-6D8A-A403-BA05-57BC07F03271}"/>
+              </a:ext>
+            </a:extLst>
+          </p:cNvPr>
+          <p:cNvCxnSpPr>
+            <a:cxnSpLocks/>
+            <a:stCxn id="47" idx="3"/>
+          </p:cNvCxnSpPr>
+          <p:nvPr/>
+        </p:nvCxnSpPr>
+        <p:spPr>
+          <a:xfrm>
+            <a:off x="814597" y="2948139"/>
+            <a:ext cx="846859" cy="4772"/>
+          </a:xfrm>
+          <a:prstGeom prst="straightConnector1">
+            <a:avLst/>
+          </a:prstGeom>
+          <a:ln w="57150">
+            <a:headEnd type="none"/>
+            <a:tailEnd type="triangle"/>
+          </a:ln>
+        </p:spPr>
+        <p:style>
+          <a:lnRef idx="1">
+            <a:schemeClr val="accent1"/>
+          </a:lnRef>
+          <a:fillRef idx="0">
+            <a:schemeClr val="accent1"/>
+          </a:fillRef>
+          <a:effectRef idx="0">
+            <a:schemeClr val="accent1"/>
+          </a:effectRef>
+          <a:fontRef idx="minor">
+            <a:schemeClr val="tx1"/>
+          </a:fontRef>
+        </p:style>
+      </p:cxnSp>
+      <p:pic>
+        <p:nvPicPr>
+          <p:cNvPr id="1056" name="Image 1055">
+            <a:extLst>
+              <a:ext uri="{FF2B5EF4-FFF2-40B4-BE49-F238E27FC236}">
+                <a16:creationId xmlns:a16="http://schemas.microsoft.com/office/drawing/2014/main" id="{FD93E48A-D1E5-FD02-1902-875615C41779}"/>
+              </a:ext>
+            </a:extLst>
+          </p:cNvPr>
+          <p:cNvPicPr>
+            <a:picLocks noChangeAspect="1"/>
+          </p:cNvPicPr>
+          <p:nvPr/>
+        </p:nvPicPr>
+        <p:blipFill>
+          <a:blip r:embed="rId15"/>
+          <a:stretch>
+            <a:fillRect/>
+          </a:stretch>
+        </p:blipFill>
+        <p:spPr>
+          <a:xfrm>
+            <a:off x="3861014" y="1913668"/>
+            <a:ext cx="771946" cy="771946"/>
+          </a:xfrm>
+          <a:prstGeom prst="rect">
+            <a:avLst/>
+          </a:prstGeom>
+        </p:spPr>
+      </p:pic>
+    </p:spTree>
+    <p:extLst>
+      <p:ext uri="{BB962C8B-B14F-4D97-AF65-F5344CB8AC3E}">
+        <p14:creationId xmlns:p14="http://schemas.microsoft.com/office/powerpoint/2010/main" val="1294538149"/>
+      </p:ext>
+    </p:extLst>
+  </p:cSld>
+  <p:clrMapOvr>
+    <a:masterClrMapping/>
+  </p:clrMapOvr>
+</p:sld>
+</file>
+
+<file path=ppt/slides/slide2.xml><?xml version="1.0" encoding="utf-8"?>
+<p:sld xmlns:a="http://schemas.openxmlformats.org/drawingml/2006/main" xmlns:r="http://schemas.openxmlformats.org/officeDocument/2006/relationships" xmlns:p="http://schemas.openxmlformats.org/presentationml/2006/main">
+  <p:cSld>
+    <p:spTree>
+      <p:nvGrpSpPr>
+        <p:cNvPr id="1" name=""/>
+        <p:cNvGrpSpPr/>
+        <p:nvPr/>
+      </p:nvGrpSpPr>
+      <p:grpSpPr>
+        <a:xfrm>
+          <a:off x="0" y="0"/>
+          <a:ext cx="0" cy="0"/>
+          <a:chOff x="0" y="0"/>
+          <a:chExt cx="0" cy="0"/>
+        </a:xfrm>
+      </p:grpSpPr>
+      <p:sp>
+        <p:nvSpPr>
+          <p:cNvPr id="3" name="Titre 2">
+            <a:extLst>
+              <a:ext uri="{FF2B5EF4-FFF2-40B4-BE49-F238E27FC236}">
+                <a16:creationId xmlns:a16="http://schemas.microsoft.com/office/drawing/2014/main" id="{3D5747AA-8B62-5C79-BC10-9F4115BE33B3}"/>
+              </a:ext>
+            </a:extLst>
+          </p:cNvPr>
+          <p:cNvSpPr>
+            <a:spLocks noGrp="1"/>
+          </p:cNvSpPr>
+          <p:nvPr>
+            <p:ph type="title"/>
+          </p:nvPr>
+        </p:nvSpPr>
+        <p:spPr/>
+        <p:txBody>
+          <a:bodyPr/>
+          <a:lstStyle/>
+          <a:p>
+            <a:r>
+              <a:rPr lang="fr-FR" dirty="0" err="1"/>
+              <a:t>SkinCheck</a:t>
+            </a:r>
+            <a:r>
+              <a:rPr lang="fr-FR" dirty="0"/>
               <a:t> - </a:t>
             </a:r>
             <a:r>
@@ -4285,7 +7282,7 @@
             </a:r>
             <a:r>
               <a:rPr lang="fr-FR" dirty="0"/>
-              <a:t>?</a:t>
+              <a:t> (07/06) ?</a:t>
             </a:r>
           </a:p>
         </p:txBody>
@@ -5377,7 +8374,7 @@
 </p:sld>
 </file>
 
-<file path=ppt/slides/slide2.xml><?xml version="1.0" encoding="utf-8"?>
+<file path=ppt/slides/slide3.xml><?xml version="1.0" encoding="utf-8"?>
 <p:sld xmlns:a="http://schemas.openxmlformats.org/drawingml/2006/main" xmlns:r="http://schemas.openxmlformats.org/officeDocument/2006/relationships" xmlns:p="http://schemas.openxmlformats.org/presentationml/2006/main">
   <p:cSld>
     <p:spTree>
@@ -5951,24 +8948,39 @@
                 <a:latin typeface="Courier New" panose="02070309020205020404" pitchFamily="49" charset="0"/>
                 <a:cs typeface="Courier New" panose="02070309020205020404" pitchFamily="49" charset="0"/>
               </a:rPr>
-              <a:t>Save Artefact</a:t>
-            </a:r>
-          </a:p>
-          <a:p>
+              <a:t>Save </a:t>
+            </a:r>
             <a:r>
               <a:rPr lang="fr-FR" sz="675" dirty="0" err="1">
                 <a:latin typeface="Courier New" panose="02070309020205020404" pitchFamily="49" charset="0"/>
                 <a:cs typeface="Courier New" panose="02070309020205020404" pitchFamily="49" charset="0"/>
               </a:rPr>
-              <a:t>Send</a:t>
-            </a:r>
+              <a:t>Artifacts</a:t>
+            </a:r>
+            <a:endParaRPr lang="fr-FR" sz="675" dirty="0">
+              <a:latin typeface="Courier New" panose="02070309020205020404" pitchFamily="49" charset="0"/>
+              <a:cs typeface="Courier New" panose="02070309020205020404" pitchFamily="49" charset="0"/>
+            </a:endParaRPr>
+          </a:p>
+          <a:p>
             <a:r>
               <a:rPr lang="fr-FR" sz="675" dirty="0">
                 <a:latin typeface="Courier New" panose="02070309020205020404" pitchFamily="49" charset="0"/>
                 <a:cs typeface="Courier New" panose="02070309020205020404" pitchFamily="49" charset="0"/>
               </a:rPr>
-              <a:t> data </a:t>
-            </a:r>
+              <a:t>Save </a:t>
+            </a:r>
+            <a:r>
+              <a:rPr lang="fr-FR" sz="675" dirty="0" err="1">
+                <a:latin typeface="Courier New" panose="02070309020205020404" pitchFamily="49" charset="0"/>
+                <a:cs typeface="Courier New" panose="02070309020205020404" pitchFamily="49" charset="0"/>
+              </a:rPr>
+              <a:t>Parameters</a:t>
+            </a:r>
+            <a:endParaRPr lang="fr-FR" sz="675" dirty="0">
+              <a:latin typeface="Courier New" panose="02070309020205020404" pitchFamily="49" charset="0"/>
+              <a:cs typeface="Courier New" panose="02070309020205020404" pitchFamily="49" charset="0"/>
+            </a:endParaRPr>
           </a:p>
           <a:p>
             <a:endParaRPr lang="fr-FR" sz="675" dirty="0">
@@ -7201,6 +10213,483 @@
     <p:extLst>
       <p:ext uri="{BB962C8B-B14F-4D97-AF65-F5344CB8AC3E}">
         <p14:creationId xmlns:p14="http://schemas.microsoft.com/office/powerpoint/2010/main" val="3601296998"/>
+      </p:ext>
+    </p:extLst>
+  </p:cSld>
+  <p:clrMapOvr>
+    <a:masterClrMapping/>
+  </p:clrMapOvr>
+</p:sld>
+</file>
+
+<file path=ppt/slides/slide4.xml><?xml version="1.0" encoding="utf-8"?>
+<p:sld xmlns:a="http://schemas.openxmlformats.org/drawingml/2006/main" xmlns:r="http://schemas.openxmlformats.org/officeDocument/2006/relationships" xmlns:p="http://schemas.openxmlformats.org/presentationml/2006/main">
+  <p:cSld>
+    <p:spTree>
+      <p:nvGrpSpPr>
+        <p:cNvPr id="1" name=""/>
+        <p:cNvGrpSpPr/>
+        <p:nvPr/>
+      </p:nvGrpSpPr>
+      <p:grpSpPr>
+        <a:xfrm>
+          <a:off x="0" y="0"/>
+          <a:ext cx="0" cy="0"/>
+          <a:chOff x="0" y="0"/>
+          <a:chExt cx="0" cy="0"/>
+        </a:xfrm>
+      </p:grpSpPr>
+      <p:sp>
+        <p:nvSpPr>
+          <p:cNvPr id="3" name="Titre 2">
+            <a:extLst>
+              <a:ext uri="{FF2B5EF4-FFF2-40B4-BE49-F238E27FC236}">
+                <a16:creationId xmlns:a16="http://schemas.microsoft.com/office/drawing/2014/main" id="{DA480834-FB63-3032-ADA6-17D22532B491}"/>
+              </a:ext>
+            </a:extLst>
+          </p:cNvPr>
+          <p:cNvSpPr>
+            <a:spLocks noGrp="1"/>
+          </p:cNvSpPr>
+          <p:nvPr>
+            <p:ph type="title"/>
+          </p:nvPr>
+        </p:nvSpPr>
+        <p:spPr/>
+        <p:txBody>
+          <a:bodyPr/>
+          <a:lstStyle/>
+          <a:p>
+            <a:r>
+              <a:rPr lang="fr-FR" dirty="0"/>
+              <a:t>09/06 </a:t>
+            </a:r>
+          </a:p>
+        </p:txBody>
+      </p:sp>
+      <p:pic>
+        <p:nvPicPr>
+          <p:cNvPr id="5" name="Image 4">
+            <a:extLst>
+              <a:ext uri="{FF2B5EF4-FFF2-40B4-BE49-F238E27FC236}">
+                <a16:creationId xmlns:a16="http://schemas.microsoft.com/office/drawing/2014/main" id="{43783C54-F88B-5FBB-5A6E-67D18CDBB5E7}"/>
+              </a:ext>
+            </a:extLst>
+          </p:cNvPr>
+          <p:cNvPicPr>
+            <a:picLocks noChangeAspect="1"/>
+          </p:cNvPicPr>
+          <p:nvPr/>
+        </p:nvPicPr>
+        <p:blipFill>
+          <a:blip r:embed="rId2"/>
+          <a:stretch>
+            <a:fillRect/>
+          </a:stretch>
+        </p:blipFill>
+        <p:spPr>
+          <a:xfrm>
+            <a:off x="984361" y="941659"/>
+            <a:ext cx="7672572" cy="1850615"/>
+          </a:xfrm>
+          <a:prstGeom prst="rect">
+            <a:avLst/>
+          </a:prstGeom>
+        </p:spPr>
+      </p:pic>
+      <p:sp>
+        <p:nvSpPr>
+          <p:cNvPr id="6" name="ZoneTexte 5">
+            <a:extLst>
+              <a:ext uri="{FF2B5EF4-FFF2-40B4-BE49-F238E27FC236}">
+                <a16:creationId xmlns:a16="http://schemas.microsoft.com/office/drawing/2014/main" id="{C08CA92A-C4D0-7534-BB3C-CB39598FD89A}"/>
+              </a:ext>
+            </a:extLst>
+          </p:cNvPr>
+          <p:cNvSpPr txBox="1"/>
+          <p:nvPr/>
+        </p:nvSpPr>
+        <p:spPr>
+          <a:xfrm>
+            <a:off x="984361" y="3050745"/>
+            <a:ext cx="6489277" cy="1815882"/>
+          </a:xfrm>
+          <a:prstGeom prst="rect">
+            <a:avLst/>
+          </a:prstGeom>
+          <a:noFill/>
+        </p:spPr>
+        <p:txBody>
+          <a:bodyPr wrap="none" rtlCol="0">
+            <a:spAutoFit/>
+          </a:bodyPr>
+          <a:lstStyle/>
+          <a:p>
+            <a:r>
+              <a:rPr lang="fr-FR" dirty="0">
+                <a:latin typeface="Courier New" panose="02070309020205020404" pitchFamily="49" charset="0"/>
+                <a:cs typeface="Courier New" panose="02070309020205020404" pitchFamily="49" charset="0"/>
+              </a:rPr>
+              <a:t>sklearn </a:t>
+            </a:r>
+            <a:r>
+              <a:rPr lang="fr-FR" dirty="0" err="1">
+                <a:latin typeface="Courier New" panose="02070309020205020404" pitchFamily="49" charset="0"/>
+                <a:cs typeface="Courier New" panose="02070309020205020404" pitchFamily="49" charset="0"/>
+              </a:rPr>
+              <a:t>models</a:t>
+            </a:r>
+            <a:endParaRPr lang="fr-FR" dirty="0">
+              <a:latin typeface="Courier New" panose="02070309020205020404" pitchFamily="49" charset="0"/>
+              <a:cs typeface="Courier New" panose="02070309020205020404" pitchFamily="49" charset="0"/>
+            </a:endParaRPr>
+          </a:p>
+          <a:p>
+            <a:r>
+              <a:rPr lang="fr-FR" dirty="0" err="1">
+                <a:latin typeface="Courier New" panose="02070309020205020404" pitchFamily="49" charset="0"/>
+                <a:cs typeface="Courier New" panose="02070309020205020404" pitchFamily="49" charset="0"/>
+              </a:rPr>
+              <a:t>Tensorflow</a:t>
+            </a:r>
+            <a:r>
+              <a:rPr lang="fr-FR" dirty="0">
+                <a:latin typeface="Courier New" panose="02070309020205020404" pitchFamily="49" charset="0"/>
+                <a:cs typeface="Courier New" panose="02070309020205020404" pitchFamily="49" charset="0"/>
+              </a:rPr>
+              <a:t>/</a:t>
+            </a:r>
+            <a:r>
+              <a:rPr lang="fr-FR" dirty="0" err="1">
+                <a:latin typeface="Courier New" panose="02070309020205020404" pitchFamily="49" charset="0"/>
+                <a:cs typeface="Courier New" panose="02070309020205020404" pitchFamily="49" charset="0"/>
+              </a:rPr>
+              <a:t>Keras</a:t>
+            </a:r>
+            <a:r>
+              <a:rPr lang="fr-FR" dirty="0">
+                <a:latin typeface="Courier New" panose="02070309020205020404" pitchFamily="49" charset="0"/>
+                <a:cs typeface="Courier New" panose="02070309020205020404" pitchFamily="49" charset="0"/>
+              </a:rPr>
+              <a:t> </a:t>
+            </a:r>
+            <a:r>
+              <a:rPr lang="fr-FR" dirty="0" err="1">
+                <a:latin typeface="Courier New" panose="02070309020205020404" pitchFamily="49" charset="0"/>
+                <a:cs typeface="Courier New" panose="02070309020205020404" pitchFamily="49" charset="0"/>
+              </a:rPr>
+              <a:t>models</a:t>
+            </a:r>
+            <a:endParaRPr lang="fr-FR" dirty="0">
+              <a:latin typeface="Courier New" panose="02070309020205020404" pitchFamily="49" charset="0"/>
+              <a:cs typeface="Courier New" panose="02070309020205020404" pitchFamily="49" charset="0"/>
+            </a:endParaRPr>
+          </a:p>
+          <a:p>
+            <a:r>
+              <a:rPr lang="fr-FR" dirty="0">
+                <a:latin typeface="Courier New" panose="02070309020205020404" pitchFamily="49" charset="0"/>
+                <a:cs typeface="Courier New" panose="02070309020205020404" pitchFamily="49" charset="0"/>
+              </a:rPr>
+              <a:t>get data </a:t>
+            </a:r>
+            <a:r>
+              <a:rPr lang="fr-FR" dirty="0" err="1">
+                <a:latin typeface="Courier New" panose="02070309020205020404" pitchFamily="49" charset="0"/>
+                <a:cs typeface="Courier New" panose="02070309020205020404" pitchFamily="49" charset="0"/>
+              </a:rPr>
+              <a:t>from</a:t>
+            </a:r>
+            <a:r>
+              <a:rPr lang="fr-FR" dirty="0">
+                <a:latin typeface="Courier New" panose="02070309020205020404" pitchFamily="49" charset="0"/>
+                <a:cs typeface="Courier New" panose="02070309020205020404" pitchFamily="49" charset="0"/>
+              </a:rPr>
+              <a:t> S3 (</a:t>
+            </a:r>
+            <a:r>
+              <a:rPr lang="fr-FR" sz="800" dirty="0">
+                <a:latin typeface="Courier New" panose="02070309020205020404" pitchFamily="49" charset="0"/>
+                <a:cs typeface="Courier New" panose="02070309020205020404" pitchFamily="49" charset="0"/>
+                <a:hlinkClick r:id="rId3"/>
+              </a:rPr>
+              <a:t>https://skincheck-bucket.s3.eu-west-3.amazonaws.com/skincheck-dataset/</a:t>
+            </a:r>
+            <a:r>
+              <a:rPr lang="fr-FR" dirty="0">
+                <a:latin typeface="Courier New" panose="02070309020205020404" pitchFamily="49" charset="0"/>
+                <a:cs typeface="Courier New" panose="02070309020205020404" pitchFamily="49" charset="0"/>
+              </a:rPr>
+              <a:t>)</a:t>
+            </a:r>
+          </a:p>
+          <a:p>
+            <a:r>
+              <a:rPr lang="fr-FR" dirty="0">
+                <a:latin typeface="Courier New" panose="02070309020205020404" pitchFamily="49" charset="0"/>
+                <a:cs typeface="Courier New" panose="02070309020205020404" pitchFamily="49" charset="0"/>
+              </a:rPr>
+              <a:t>Run </a:t>
+            </a:r>
+            <a:r>
+              <a:rPr lang="fr-FR" dirty="0" err="1">
+                <a:latin typeface="Courier New" panose="02070309020205020404" pitchFamily="49" charset="0"/>
+                <a:cs typeface="Courier New" panose="02070309020205020404" pitchFamily="49" charset="0"/>
+              </a:rPr>
+              <a:t>locally</a:t>
+            </a:r>
+            <a:endParaRPr lang="fr-FR" dirty="0">
+              <a:latin typeface="Courier New" panose="02070309020205020404" pitchFamily="49" charset="0"/>
+              <a:cs typeface="Courier New" panose="02070309020205020404" pitchFamily="49" charset="0"/>
+            </a:endParaRPr>
+          </a:p>
+          <a:p>
+            <a:pPr algn="l"/>
+            <a:r>
+              <a:rPr lang="fr-FR" dirty="0">
+                <a:latin typeface="Courier New" panose="02070309020205020404" pitchFamily="49" charset="0"/>
+                <a:cs typeface="Courier New" panose="02070309020205020404" pitchFamily="49" charset="0"/>
+              </a:rPr>
+              <a:t>Store </a:t>
+            </a:r>
+            <a:r>
+              <a:rPr lang="fr-FR" dirty="0" err="1">
+                <a:latin typeface="Courier New" panose="02070309020205020404" pitchFamily="49" charset="0"/>
+                <a:cs typeface="Courier New" panose="02070309020205020404" pitchFamily="49" charset="0"/>
+              </a:rPr>
+              <a:t>artifacts</a:t>
+            </a:r>
+            <a:r>
+              <a:rPr lang="fr-FR" dirty="0">
+                <a:latin typeface="Courier New" panose="02070309020205020404" pitchFamily="49" charset="0"/>
+                <a:cs typeface="Courier New" panose="02070309020205020404" pitchFamily="49" charset="0"/>
+              </a:rPr>
+              <a:t> on S3(</a:t>
+            </a:r>
+            <a:r>
+              <a:rPr lang="en-US" sz="800" dirty="0">
+                <a:latin typeface="Courier New" panose="02070309020205020404" pitchFamily="49" charset="0"/>
+                <a:cs typeface="Courier New" panose="02070309020205020404" pitchFamily="49" charset="0"/>
+                <a:hlinkClick r:id="rId4">
+                  <a:extLst>
+                    <a:ext uri="{A12FA001-AC4F-418D-AE19-62706E023703}">
+                      <ahyp:hlinkClr xmlns:ahyp="http://schemas.microsoft.com/office/drawing/2018/hyperlinkcolor" val="tx"/>
+                    </a:ext>
+                  </a:extLst>
+                </a:hlinkClick>
+              </a:rPr>
+              <a:t>Amazon S3</a:t>
+            </a:r>
+            <a:r>
+              <a:rPr lang="en-US" sz="800" dirty="0">
+                <a:latin typeface="Courier New" panose="02070309020205020404" pitchFamily="49" charset="0"/>
+                <a:cs typeface="Courier New" panose="02070309020205020404" pitchFamily="49" charset="0"/>
+              </a:rPr>
+              <a:t>/</a:t>
+            </a:r>
+            <a:r>
+              <a:rPr lang="en-US" sz="800" dirty="0" err="1">
+                <a:latin typeface="Courier New" panose="02070309020205020404" pitchFamily="49" charset="0"/>
+                <a:cs typeface="Courier New" panose="02070309020205020404" pitchFamily="49" charset="0"/>
+                <a:hlinkClick r:id="rId5">
+                  <a:extLst>
+                    <a:ext uri="{A12FA001-AC4F-418D-AE19-62706E023703}">
+                      <ahyp:hlinkClr xmlns:ahyp="http://schemas.microsoft.com/office/drawing/2018/hyperlinkcolor" val="tx"/>
+                    </a:ext>
+                  </a:extLst>
+                </a:hlinkClick>
+              </a:rPr>
+              <a:t>Compartiments</a:t>
+            </a:r>
+            <a:r>
+              <a:rPr lang="en-US" sz="800" dirty="0">
+                <a:latin typeface="Courier New" panose="02070309020205020404" pitchFamily="49" charset="0"/>
+                <a:cs typeface="Courier New" panose="02070309020205020404" pitchFamily="49" charset="0"/>
+              </a:rPr>
+              <a:t>/</a:t>
+            </a:r>
+            <a:r>
+              <a:rPr lang="en-US" sz="800" dirty="0" err="1">
+                <a:latin typeface="Courier New" panose="02070309020205020404" pitchFamily="49" charset="0"/>
+                <a:cs typeface="Courier New" panose="02070309020205020404" pitchFamily="49" charset="0"/>
+                <a:hlinkClick r:id="rId6">
+                  <a:extLst>
+                    <a:ext uri="{A12FA001-AC4F-418D-AE19-62706E023703}">
+                      <ahyp:hlinkClr xmlns:ahyp="http://schemas.microsoft.com/office/drawing/2018/hyperlinkcolor" val="tx"/>
+                    </a:ext>
+                  </a:extLst>
+                </a:hlinkClick>
+              </a:rPr>
+              <a:t>skincheck</a:t>
+            </a:r>
+            <a:r>
+              <a:rPr lang="en-US" sz="800" dirty="0">
+                <a:latin typeface="Courier New" panose="02070309020205020404" pitchFamily="49" charset="0"/>
+                <a:cs typeface="Courier New" panose="02070309020205020404" pitchFamily="49" charset="0"/>
+                <a:hlinkClick r:id="rId6">
+                  <a:extLst>
+                    <a:ext uri="{A12FA001-AC4F-418D-AE19-62706E023703}">
+                      <ahyp:hlinkClr xmlns:ahyp="http://schemas.microsoft.com/office/drawing/2018/hyperlinkcolor" val="tx"/>
+                    </a:ext>
+                  </a:extLst>
+                </a:hlinkClick>
+              </a:rPr>
+              <a:t>-bucket</a:t>
+            </a:r>
+            <a:r>
+              <a:rPr lang="en-US" sz="800" dirty="0">
+                <a:latin typeface="Courier New" panose="02070309020205020404" pitchFamily="49" charset="0"/>
+                <a:cs typeface="Courier New" panose="02070309020205020404" pitchFamily="49" charset="0"/>
+              </a:rPr>
+              <a:t>/</a:t>
+            </a:r>
+            <a:r>
+              <a:rPr lang="en-US" sz="800" dirty="0" err="1">
+                <a:latin typeface="Courier New" panose="02070309020205020404" pitchFamily="49" charset="0"/>
+                <a:cs typeface="Courier New" panose="02070309020205020404" pitchFamily="49" charset="0"/>
+              </a:rPr>
+              <a:t>skincheck</a:t>
+            </a:r>
+            <a:r>
+              <a:rPr lang="en-US" sz="800" dirty="0">
+                <a:latin typeface="Courier New" panose="02070309020205020404" pitchFamily="49" charset="0"/>
+                <a:cs typeface="Courier New" panose="02070309020205020404" pitchFamily="49" charset="0"/>
+              </a:rPr>
+              <a:t>-artifacts/</a:t>
+            </a:r>
+            <a:r>
+              <a:rPr lang="fr-FR" dirty="0">
+                <a:latin typeface="Courier New" panose="02070309020205020404" pitchFamily="49" charset="0"/>
+                <a:cs typeface="Courier New" panose="02070309020205020404" pitchFamily="49" charset="0"/>
+              </a:rPr>
+              <a:t>)</a:t>
+            </a:r>
+          </a:p>
+          <a:p>
+            <a:r>
+              <a:rPr lang="fr-FR" dirty="0">
+                <a:latin typeface="Courier New" panose="02070309020205020404" pitchFamily="49" charset="0"/>
+                <a:cs typeface="Courier New" panose="02070309020205020404" pitchFamily="49" charset="0"/>
+              </a:rPr>
+              <a:t>Store </a:t>
+            </a:r>
+            <a:r>
+              <a:rPr lang="fr-FR" dirty="0" err="1">
+                <a:latin typeface="Courier New" panose="02070309020205020404" pitchFamily="49" charset="0"/>
+                <a:cs typeface="Courier New" panose="02070309020205020404" pitchFamily="49" charset="0"/>
+              </a:rPr>
+              <a:t>parameters</a:t>
+            </a:r>
+            <a:r>
+              <a:rPr lang="fr-FR" dirty="0">
+                <a:latin typeface="Courier New" panose="02070309020205020404" pitchFamily="49" charset="0"/>
+                <a:cs typeface="Courier New" panose="02070309020205020404" pitchFamily="49" charset="0"/>
+              </a:rPr>
+              <a:t> &amp; </a:t>
+            </a:r>
+            <a:r>
+              <a:rPr lang="fr-FR" dirty="0" err="1">
+                <a:latin typeface="Courier New" panose="02070309020205020404" pitchFamily="49" charset="0"/>
+                <a:cs typeface="Courier New" panose="02070309020205020404" pitchFamily="49" charset="0"/>
+              </a:rPr>
+              <a:t>metrics</a:t>
+            </a:r>
+            <a:r>
+              <a:rPr lang="fr-FR" dirty="0">
+                <a:latin typeface="Courier New" panose="02070309020205020404" pitchFamily="49" charset="0"/>
+                <a:cs typeface="Courier New" panose="02070309020205020404" pitchFamily="49" charset="0"/>
+              </a:rPr>
+              <a:t> on </a:t>
+            </a:r>
+            <a:r>
+              <a:rPr lang="fr-FR" dirty="0" err="1">
+                <a:latin typeface="Courier New" panose="02070309020205020404" pitchFamily="49" charset="0"/>
+                <a:cs typeface="Courier New" panose="02070309020205020404" pitchFamily="49" charset="0"/>
+              </a:rPr>
+              <a:t>mlflow</a:t>
+            </a:r>
+            <a:r>
+              <a:rPr lang="fr-FR" dirty="0">
+                <a:latin typeface="Courier New" panose="02070309020205020404" pitchFamily="49" charset="0"/>
+                <a:cs typeface="Courier New" panose="02070309020205020404" pitchFamily="49" charset="0"/>
+              </a:rPr>
+              <a:t> </a:t>
+            </a:r>
+            <a:r>
+              <a:rPr lang="fr-FR" dirty="0" err="1">
+                <a:latin typeface="Courier New" panose="02070309020205020404" pitchFamily="49" charset="0"/>
+                <a:cs typeface="Courier New" panose="02070309020205020404" pitchFamily="49" charset="0"/>
+              </a:rPr>
+              <a:t>tracking</a:t>
+            </a:r>
+            <a:r>
+              <a:rPr lang="fr-FR" dirty="0">
+                <a:latin typeface="Courier New" panose="02070309020205020404" pitchFamily="49" charset="0"/>
+                <a:cs typeface="Courier New" panose="02070309020205020404" pitchFamily="49" charset="0"/>
+              </a:rPr>
+              <a:t> server</a:t>
+            </a:r>
+          </a:p>
+          <a:p>
+            <a:endParaRPr lang="fr-FR" dirty="0">
+              <a:latin typeface="Courier New" panose="02070309020205020404" pitchFamily="49" charset="0"/>
+              <a:cs typeface="Courier New" panose="02070309020205020404" pitchFamily="49" charset="0"/>
+            </a:endParaRPr>
+          </a:p>
+          <a:p>
+            <a:r>
+              <a:rPr lang="fr-FR" dirty="0">
+                <a:latin typeface="Courier New" panose="02070309020205020404" pitchFamily="49" charset="0"/>
+                <a:cs typeface="Courier New" panose="02070309020205020404" pitchFamily="49" charset="0"/>
+              </a:rPr>
+              <a:t>train.py </a:t>
+            </a:r>
+            <a:r>
+              <a:rPr lang="fr-FR" dirty="0" err="1">
+                <a:latin typeface="Courier New" panose="02070309020205020404" pitchFamily="49" charset="0"/>
+                <a:cs typeface="Courier New" panose="02070309020205020404" pitchFamily="49" charset="0"/>
+              </a:rPr>
+              <a:t>is</a:t>
+            </a:r>
+            <a:r>
+              <a:rPr lang="fr-FR" dirty="0">
+                <a:latin typeface="Courier New" panose="02070309020205020404" pitchFamily="49" charset="0"/>
+                <a:cs typeface="Courier New" panose="02070309020205020404" pitchFamily="49" charset="0"/>
+              </a:rPr>
+              <a:t> </a:t>
+            </a:r>
+            <a:r>
+              <a:rPr lang="fr-FR" dirty="0" err="1">
+                <a:latin typeface="Courier New" panose="02070309020205020404" pitchFamily="49" charset="0"/>
+                <a:cs typeface="Courier New" panose="02070309020205020404" pitchFamily="49" charset="0"/>
+              </a:rPr>
+              <a:t>based</a:t>
+            </a:r>
+            <a:r>
+              <a:rPr lang="fr-FR" dirty="0">
+                <a:latin typeface="Courier New" panose="02070309020205020404" pitchFamily="49" charset="0"/>
+                <a:cs typeface="Courier New" panose="02070309020205020404" pitchFamily="49" charset="0"/>
+              </a:rPr>
+              <a:t> </a:t>
+            </a:r>
+            <a:r>
+              <a:rPr lang="fr-FR">
+                <a:latin typeface="Courier New" panose="02070309020205020404" pitchFamily="49" charset="0"/>
+                <a:cs typeface="Courier New" panose="02070309020205020404" pitchFamily="49" charset="0"/>
+              </a:rPr>
+              <a:t>on classes </a:t>
+            </a:r>
+            <a:endParaRPr lang="fr-FR" dirty="0">
+              <a:latin typeface="Courier New" panose="02070309020205020404" pitchFamily="49" charset="0"/>
+              <a:cs typeface="Courier New" panose="02070309020205020404" pitchFamily="49" charset="0"/>
+            </a:endParaRPr>
+          </a:p>
+        </p:txBody>
+      </p:sp>
+    </p:spTree>
+    <p:extLst>
+      <p:ext uri="{BB962C8B-B14F-4D97-AF65-F5344CB8AC3E}">
+        <p14:creationId xmlns:p14="http://schemas.microsoft.com/office/powerpoint/2010/main" val="983029951"/>
       </p:ext>
     </p:extLst>
   </p:cSld>

</xml_diff>

<commit_message>
update suite pb git
</commit_message>
<xml_diff>
--- a/admin/skin_project_archi_0706.pptx
+++ b/admin/skin_project_archi_0706.pptx
@@ -5,11 +5,13 @@
     <p:sldMasterId id="2147483659" r:id="rId1"/>
   </p:sldMasterIdLst>
   <p:notesMasterIdLst>
-    <p:notesMasterId r:id="rId4"/>
+    <p:notesMasterId r:id="rId6"/>
   </p:notesMasterIdLst>
   <p:sldIdLst>
-    <p:sldId id="265" r:id="rId2"/>
-    <p:sldId id="267" r:id="rId3"/>
+    <p:sldId id="268" r:id="rId2"/>
+    <p:sldId id="265" r:id="rId3"/>
+    <p:sldId id="267" r:id="rId4"/>
+    <p:sldId id="269" r:id="rId5"/>
   </p:sldIdLst>
   <p:sldSz cx="9144000" cy="5143500" type="screen16x9"/>
   <p:notesSz cx="6858000" cy="9144000"/>
@@ -253,7 +255,7 @@
 <file path=ppt/revisionInfo.xml><?xml version="1.0" encoding="utf-8"?>
 <p1510:revInfo xmlns:a="http://schemas.openxmlformats.org/drawingml/2006/main" xmlns:r="http://schemas.openxmlformats.org/officeDocument/2006/relationships" xmlns:p1510="http://schemas.microsoft.com/office/powerpoint/2015/10/main">
   <p1510:revLst>
-    <p1510:client id="{21B86071-847B-4CE7-ACEB-EC73C17F7BE1}" v="153" dt="2024-06-06T22:12:25.317"/>
+    <p1510:client id="{A89391CB-9751-4520-9ECA-7ECDFA5EA23C}" v="612" dt="2024-06-09T16:18:49.970"/>
   </p1510:revLst>
 </p1510:revInfo>
 </file>
@@ -1353,6 +1355,659 @@
           </pc:sldLayoutMkLst>
         </pc:sldLayoutChg>
       </pc:sldMasterChg>
+    </pc:docChg>
+  </pc:docChgLst>
+  <pc:docChgLst>
+    <pc:chgData name="Philippe Baucour" userId="5102170ae7533958" providerId="LiveId" clId="{A89391CB-9751-4520-9ECA-7ECDFA5EA23C}"/>
+    <pc:docChg chg="undo custSel addSld modSld sldOrd">
+      <pc:chgData name="Philippe Baucour" userId="5102170ae7533958" providerId="LiveId" clId="{A89391CB-9751-4520-9ECA-7ECDFA5EA23C}" dt="2024-06-09T16:22:07.783" v="2835" actId="20577"/>
+      <pc:docMkLst>
+        <pc:docMk/>
+      </pc:docMkLst>
+      <pc:sldChg chg="modSp mod">
+        <pc:chgData name="Philippe Baucour" userId="5102170ae7533958" providerId="LiveId" clId="{A89391CB-9751-4520-9ECA-7ECDFA5EA23C}" dt="2024-06-08T16:04:04.752" v="582" actId="20577"/>
+        <pc:sldMkLst>
+          <pc:docMk/>
+          <pc:sldMk cId="1234096396" sldId="265"/>
+        </pc:sldMkLst>
+        <pc:spChg chg="mod">
+          <ac:chgData name="Philippe Baucour" userId="5102170ae7533958" providerId="LiveId" clId="{A89391CB-9751-4520-9ECA-7ECDFA5EA23C}" dt="2024-06-08T16:04:04.752" v="582" actId="20577"/>
+          <ac:spMkLst>
+            <pc:docMk/>
+            <pc:sldMk cId="1234096396" sldId="265"/>
+            <ac:spMk id="3" creationId="{3D5747AA-8B62-5C79-BC10-9F4115BE33B3}"/>
+          </ac:spMkLst>
+        </pc:spChg>
+        <pc:spChg chg="mod">
+          <ac:chgData name="Philippe Baucour" userId="5102170ae7533958" providerId="LiveId" clId="{A89391CB-9751-4520-9ECA-7ECDFA5EA23C}" dt="2024-06-07T15:20:21.929" v="26" actId="20577"/>
+          <ac:spMkLst>
+            <pc:docMk/>
+            <pc:sldMk cId="1234096396" sldId="265"/>
+            <ac:spMk id="11" creationId="{79E35FDB-22AC-7F4D-2AE0-1F1272A4399D}"/>
+          </ac:spMkLst>
+        </pc:spChg>
+        <pc:spChg chg="mod">
+          <ac:chgData name="Philippe Baucour" userId="5102170ae7533958" providerId="LiveId" clId="{A89391CB-9751-4520-9ECA-7ECDFA5EA23C}" dt="2024-06-07T15:20:33.537" v="29" actId="20577"/>
+          <ac:spMkLst>
+            <pc:docMk/>
+            <pc:sldMk cId="1234096396" sldId="265"/>
+            <ac:spMk id="12" creationId="{4C36F25D-D0ED-0579-6575-B4BB62B9EE58}"/>
+          </ac:spMkLst>
+        </pc:spChg>
+      </pc:sldChg>
+      <pc:sldChg chg="addSp delSp modSp mod modNotesTx">
+        <pc:chgData name="Philippe Baucour" userId="5102170ae7533958" providerId="LiveId" clId="{A89391CB-9751-4520-9ECA-7ECDFA5EA23C}" dt="2024-06-08T16:03:34.603" v="573" actId="20577"/>
+        <pc:sldMkLst>
+          <pc:docMk/>
+          <pc:sldMk cId="3601296998" sldId="267"/>
+        </pc:sldMkLst>
+        <pc:spChg chg="add mod">
+          <ac:chgData name="Philippe Baucour" userId="5102170ae7533958" providerId="LiveId" clId="{A89391CB-9751-4520-9ECA-7ECDFA5EA23C}" dt="2024-06-07T08:51:00.024" v="15" actId="1076"/>
+          <ac:spMkLst>
+            <pc:docMk/>
+            <pc:sldMk cId="3601296998" sldId="267"/>
+            <ac:spMk id="2" creationId="{7FB152FA-6981-EA90-83A1-41DAFE3270F3}"/>
+          </ac:spMkLst>
+        </pc:spChg>
+        <pc:spChg chg="mod">
+          <ac:chgData name="Philippe Baucour" userId="5102170ae7533958" providerId="LiveId" clId="{A89391CB-9751-4520-9ECA-7ECDFA5EA23C}" dt="2024-06-07T08:59:05.895" v="23" actId="20577"/>
+          <ac:spMkLst>
+            <pc:docMk/>
+            <pc:sldMk cId="3601296998" sldId="267"/>
+            <ac:spMk id="3" creationId="{3D5747AA-8B62-5C79-BC10-9F4115BE33B3}"/>
+          </ac:spMkLst>
+        </pc:spChg>
+        <pc:spChg chg="mod">
+          <ac:chgData name="Philippe Baucour" userId="5102170ae7533958" providerId="LiveId" clId="{A89391CB-9751-4520-9ECA-7ECDFA5EA23C}" dt="2024-06-08T16:03:34.603" v="573" actId="20577"/>
+          <ac:spMkLst>
+            <pc:docMk/>
+            <pc:sldMk cId="3601296998" sldId="267"/>
+            <ac:spMk id="12" creationId="{4C36F25D-D0ED-0579-6575-B4BB62B9EE58}"/>
+          </ac:spMkLst>
+        </pc:spChg>
+        <pc:spChg chg="mod">
+          <ac:chgData name="Philippe Baucour" userId="5102170ae7533958" providerId="LiveId" clId="{A89391CB-9751-4520-9ECA-7ECDFA5EA23C}" dt="2024-06-07T08:50:54.064" v="14" actId="20577"/>
+          <ac:spMkLst>
+            <pc:docMk/>
+            <pc:sldMk cId="3601296998" sldId="267"/>
+            <ac:spMk id="20" creationId="{6ABD733F-89FD-A412-51AF-EFF2B0DBD600}"/>
+          </ac:spMkLst>
+        </pc:spChg>
+        <pc:spChg chg="mod">
+          <ac:chgData name="Philippe Baucour" userId="5102170ae7533958" providerId="LiveId" clId="{A89391CB-9751-4520-9ECA-7ECDFA5EA23C}" dt="2024-06-07T08:48:13.333" v="2" actId="20577"/>
+          <ac:spMkLst>
+            <pc:docMk/>
+            <pc:sldMk cId="3601296998" sldId="267"/>
+            <ac:spMk id="37" creationId="{18882719-D0A3-5B55-C871-F003AC1A6FBE}"/>
+          </ac:spMkLst>
+        </pc:spChg>
+        <pc:spChg chg="del">
+          <ac:chgData name="Philippe Baucour" userId="5102170ae7533958" providerId="LiveId" clId="{A89391CB-9751-4520-9ECA-7ECDFA5EA23C}" dt="2024-06-07T08:48:23.100" v="6" actId="478"/>
+          <ac:spMkLst>
+            <pc:docMk/>
+            <pc:sldMk cId="3601296998" sldId="267"/>
+            <ac:spMk id="51" creationId="{29407C26-8202-740E-0E7C-8E694C61B647}"/>
+          </ac:spMkLst>
+        </pc:spChg>
+      </pc:sldChg>
+      <pc:sldChg chg="addSp delSp modSp add mod ord">
+        <pc:chgData name="Philippe Baucour" userId="5102170ae7533958" providerId="LiveId" clId="{A89391CB-9751-4520-9ECA-7ECDFA5EA23C}" dt="2024-06-08T16:56:30.452" v="2554"/>
+        <pc:sldMkLst>
+          <pc:docMk/>
+          <pc:sldMk cId="1294538149" sldId="268"/>
+        </pc:sldMkLst>
+        <pc:spChg chg="mod">
+          <ac:chgData name="Philippe Baucour" userId="5102170ae7533958" providerId="LiveId" clId="{A89391CB-9751-4520-9ECA-7ECDFA5EA23C}" dt="2024-06-08T16:54:22.334" v="2534" actId="1036"/>
+          <ac:spMkLst>
+            <pc:docMk/>
+            <pc:sldMk cId="1294538149" sldId="268"/>
+            <ac:spMk id="2" creationId="{7FB152FA-6981-EA90-83A1-41DAFE3270F3}"/>
+          </ac:spMkLst>
+        </pc:spChg>
+        <pc:spChg chg="mod">
+          <ac:chgData name="Philippe Baucour" userId="5102170ae7533958" providerId="LiveId" clId="{A89391CB-9751-4520-9ECA-7ECDFA5EA23C}" dt="2024-06-08T16:01:37.460" v="497" actId="6549"/>
+          <ac:spMkLst>
+            <pc:docMk/>
+            <pc:sldMk cId="1294538149" sldId="268"/>
+            <ac:spMk id="3" creationId="{3D5747AA-8B62-5C79-BC10-9F4115BE33B3}"/>
+          </ac:spMkLst>
+        </pc:spChg>
+        <pc:spChg chg="mod">
+          <ac:chgData name="Philippe Baucour" userId="5102170ae7533958" providerId="LiveId" clId="{A89391CB-9751-4520-9ECA-7ECDFA5EA23C}" dt="2024-06-08T16:54:22.334" v="2534" actId="1036"/>
+          <ac:spMkLst>
+            <pc:docMk/>
+            <pc:sldMk cId="1294538149" sldId="268"/>
+            <ac:spMk id="8" creationId="{7BD7D3CD-81D5-4848-C5A0-5012687582FD}"/>
+          </ac:spMkLst>
+        </pc:spChg>
+        <pc:spChg chg="mod">
+          <ac:chgData name="Philippe Baucour" userId="5102170ae7533958" providerId="LiveId" clId="{A89391CB-9751-4520-9ECA-7ECDFA5EA23C}" dt="2024-06-08T16:54:22.334" v="2534" actId="1036"/>
+          <ac:spMkLst>
+            <pc:docMk/>
+            <pc:sldMk cId="1294538149" sldId="268"/>
+            <ac:spMk id="10" creationId="{74915136-7F52-0861-8BFB-648DDFFB0CDE}"/>
+          </ac:spMkLst>
+        </pc:spChg>
+        <pc:spChg chg="mod">
+          <ac:chgData name="Philippe Baucour" userId="5102170ae7533958" providerId="LiveId" clId="{A89391CB-9751-4520-9ECA-7ECDFA5EA23C}" dt="2024-06-08T16:54:22.334" v="2534" actId="1036"/>
+          <ac:spMkLst>
+            <pc:docMk/>
+            <pc:sldMk cId="1294538149" sldId="268"/>
+            <ac:spMk id="11" creationId="{79E35FDB-22AC-7F4D-2AE0-1F1272A4399D}"/>
+          </ac:spMkLst>
+        </pc:spChg>
+        <pc:spChg chg="del mod">
+          <ac:chgData name="Philippe Baucour" userId="5102170ae7533958" providerId="LiveId" clId="{A89391CB-9751-4520-9ECA-7ECDFA5EA23C}" dt="2024-06-08T16:10:06.011" v="611" actId="478"/>
+          <ac:spMkLst>
+            <pc:docMk/>
+            <pc:sldMk cId="1294538149" sldId="268"/>
+            <ac:spMk id="12" creationId="{4C36F25D-D0ED-0579-6575-B4BB62B9EE58}"/>
+          </ac:spMkLst>
+        </pc:spChg>
+        <pc:spChg chg="add mod">
+          <ac:chgData name="Philippe Baucour" userId="5102170ae7533958" providerId="LiveId" clId="{A89391CB-9751-4520-9ECA-7ECDFA5EA23C}" dt="2024-06-08T16:54:22.334" v="2534" actId="1036"/>
+          <ac:spMkLst>
+            <pc:docMk/>
+            <pc:sldMk cId="1294538149" sldId="268"/>
+            <ac:spMk id="15" creationId="{85B6C5E1-6C57-B98B-0DA8-28B9893D188A}"/>
+          </ac:spMkLst>
+        </pc:spChg>
+        <pc:spChg chg="mod">
+          <ac:chgData name="Philippe Baucour" userId="5102170ae7533958" providerId="LiveId" clId="{A89391CB-9751-4520-9ECA-7ECDFA5EA23C}" dt="2024-06-08T16:54:22.334" v="2534" actId="1036"/>
+          <ac:spMkLst>
+            <pc:docMk/>
+            <pc:sldMk cId="1294538149" sldId="268"/>
+            <ac:spMk id="17" creationId="{54722831-7D4F-84F9-2575-CBF76C7F93C3}"/>
+          </ac:spMkLst>
+        </pc:spChg>
+        <pc:spChg chg="del mod">
+          <ac:chgData name="Philippe Baucour" userId="5102170ae7533958" providerId="LiveId" clId="{A89391CB-9751-4520-9ECA-7ECDFA5EA23C}" dt="2024-06-08T16:32:25.207" v="1261" actId="478"/>
+          <ac:spMkLst>
+            <pc:docMk/>
+            <pc:sldMk cId="1294538149" sldId="268"/>
+            <ac:spMk id="18" creationId="{13CB5633-F708-6431-049E-144D0013763C}"/>
+          </ac:spMkLst>
+        </pc:spChg>
+        <pc:spChg chg="del">
+          <ac:chgData name="Philippe Baucour" userId="5102170ae7533958" providerId="LiveId" clId="{A89391CB-9751-4520-9ECA-7ECDFA5EA23C}" dt="2024-06-08T15:46:26.035" v="175" actId="478"/>
+          <ac:spMkLst>
+            <pc:docMk/>
+            <pc:sldMk cId="1294538149" sldId="268"/>
+            <ac:spMk id="19" creationId="{242F4530-DC9C-BEFA-201A-FF3A85454055}"/>
+          </ac:spMkLst>
+        </pc:spChg>
+        <pc:spChg chg="mod">
+          <ac:chgData name="Philippe Baucour" userId="5102170ae7533958" providerId="LiveId" clId="{A89391CB-9751-4520-9ECA-7ECDFA5EA23C}" dt="2024-06-08T16:54:22.334" v="2534" actId="1036"/>
+          <ac:spMkLst>
+            <pc:docMk/>
+            <pc:sldMk cId="1294538149" sldId="268"/>
+            <ac:spMk id="20" creationId="{6ABD733F-89FD-A412-51AF-EFF2B0DBD600}"/>
+          </ac:spMkLst>
+        </pc:spChg>
+        <pc:spChg chg="mod">
+          <ac:chgData name="Philippe Baucour" userId="5102170ae7533958" providerId="LiveId" clId="{A89391CB-9751-4520-9ECA-7ECDFA5EA23C}" dt="2024-06-08T16:54:22.334" v="2534" actId="1036"/>
+          <ac:spMkLst>
+            <pc:docMk/>
+            <pc:sldMk cId="1294538149" sldId="268"/>
+            <ac:spMk id="31" creationId="{411D03E1-FE63-49A3-4D06-E97A1449DFC3}"/>
+          </ac:spMkLst>
+        </pc:spChg>
+        <pc:spChg chg="mod">
+          <ac:chgData name="Philippe Baucour" userId="5102170ae7533958" providerId="LiveId" clId="{A89391CB-9751-4520-9ECA-7ECDFA5EA23C}" dt="2024-06-08T16:54:22.334" v="2534" actId="1036"/>
+          <ac:spMkLst>
+            <pc:docMk/>
+            <pc:sldMk cId="1294538149" sldId="268"/>
+            <ac:spMk id="35" creationId="{D274B890-A8EE-A186-7126-825C2C23FECC}"/>
+          </ac:spMkLst>
+        </pc:spChg>
+        <pc:spChg chg="del">
+          <ac:chgData name="Philippe Baucour" userId="5102170ae7533958" providerId="LiveId" clId="{A89391CB-9751-4520-9ECA-7ECDFA5EA23C}" dt="2024-06-08T15:46:33.945" v="177" actId="478"/>
+          <ac:spMkLst>
+            <pc:docMk/>
+            <pc:sldMk cId="1294538149" sldId="268"/>
+            <ac:spMk id="36" creationId="{EDA91A5C-CDB7-9572-DADA-2C5426DADCF4}"/>
+          </ac:spMkLst>
+        </pc:spChg>
+        <pc:spChg chg="mod ord">
+          <ac:chgData name="Philippe Baucour" userId="5102170ae7533958" providerId="LiveId" clId="{A89391CB-9751-4520-9ECA-7ECDFA5EA23C}" dt="2024-06-08T16:54:22.334" v="2534" actId="1036"/>
+          <ac:spMkLst>
+            <pc:docMk/>
+            <pc:sldMk cId="1294538149" sldId="268"/>
+            <ac:spMk id="37" creationId="{18882719-D0A3-5B55-C871-F003AC1A6FBE}"/>
+          </ac:spMkLst>
+        </pc:spChg>
+        <pc:spChg chg="del">
+          <ac:chgData name="Philippe Baucour" userId="5102170ae7533958" providerId="LiveId" clId="{A89391CB-9751-4520-9ECA-7ECDFA5EA23C}" dt="2024-06-08T15:47:26.836" v="182" actId="478"/>
+          <ac:spMkLst>
+            <pc:docMk/>
+            <pc:sldMk cId="1294538149" sldId="268"/>
+            <ac:spMk id="42" creationId="{FA9F22D2-7FE5-2E67-A3C0-0B4D433F9275}"/>
+          </ac:spMkLst>
+        </pc:spChg>
+        <pc:spChg chg="del">
+          <ac:chgData name="Philippe Baucour" userId="5102170ae7533958" providerId="LiveId" clId="{A89391CB-9751-4520-9ECA-7ECDFA5EA23C}" dt="2024-06-08T15:46:28.205" v="176" actId="478"/>
+          <ac:spMkLst>
+            <pc:docMk/>
+            <pc:sldMk cId="1294538149" sldId="268"/>
+            <ac:spMk id="43" creationId="{0548D451-BBB6-BF20-68F6-B04B6EB15501}"/>
+          </ac:spMkLst>
+        </pc:spChg>
+        <pc:spChg chg="del">
+          <ac:chgData name="Philippe Baucour" userId="5102170ae7533958" providerId="LiveId" clId="{A89391CB-9751-4520-9ECA-7ECDFA5EA23C}" dt="2024-06-08T15:46:58.453" v="179" actId="478"/>
+          <ac:spMkLst>
+            <pc:docMk/>
+            <pc:sldMk cId="1294538149" sldId="268"/>
+            <ac:spMk id="44" creationId="{2702CE60-8860-2696-6F09-3C49BCEF3BCA}"/>
+          </ac:spMkLst>
+        </pc:spChg>
+        <pc:spChg chg="mod">
+          <ac:chgData name="Philippe Baucour" userId="5102170ae7533958" providerId="LiveId" clId="{A89391CB-9751-4520-9ECA-7ECDFA5EA23C}" dt="2024-06-08T16:54:22.334" v="2534" actId="1036"/>
+          <ac:spMkLst>
+            <pc:docMk/>
+            <pc:sldMk cId="1294538149" sldId="268"/>
+            <ac:spMk id="45" creationId="{B7EC46BE-0F3E-CD8B-03B9-18067334CF89}"/>
+          </ac:spMkLst>
+        </pc:spChg>
+        <pc:spChg chg="mod">
+          <ac:chgData name="Philippe Baucour" userId="5102170ae7533958" providerId="LiveId" clId="{A89391CB-9751-4520-9ECA-7ECDFA5EA23C}" dt="2024-06-08T16:54:22.334" v="2534" actId="1036"/>
+          <ac:spMkLst>
+            <pc:docMk/>
+            <pc:sldMk cId="1294538149" sldId="268"/>
+            <ac:spMk id="48" creationId="{AD104111-C094-DC8C-EF93-9A384BCC4DAA}"/>
+          </ac:spMkLst>
+        </pc:spChg>
+        <pc:spChg chg="mod">
+          <ac:chgData name="Philippe Baucour" userId="5102170ae7533958" providerId="LiveId" clId="{A89391CB-9751-4520-9ECA-7ECDFA5EA23C}" dt="2024-06-08T16:54:22.334" v="2534" actId="1036"/>
+          <ac:spMkLst>
+            <pc:docMk/>
+            <pc:sldMk cId="1294538149" sldId="268"/>
+            <ac:spMk id="49" creationId="{E0D268CB-4B06-33FC-48AF-159E508BF0C9}"/>
+          </ac:spMkLst>
+        </pc:spChg>
+        <pc:spChg chg="mod">
+          <ac:chgData name="Philippe Baucour" userId="5102170ae7533958" providerId="LiveId" clId="{A89391CB-9751-4520-9ECA-7ECDFA5EA23C}" dt="2024-06-08T16:54:22.334" v="2534" actId="1036"/>
+          <ac:spMkLst>
+            <pc:docMk/>
+            <pc:sldMk cId="1294538149" sldId="268"/>
+            <ac:spMk id="50" creationId="{A671C5B9-A334-3D52-FB83-E43BEEFB2500}"/>
+          </ac:spMkLst>
+        </pc:spChg>
+        <pc:spChg chg="mod">
+          <ac:chgData name="Philippe Baucour" userId="5102170ae7533958" providerId="LiveId" clId="{A89391CB-9751-4520-9ECA-7ECDFA5EA23C}" dt="2024-06-08T16:54:22.334" v="2534" actId="1036"/>
+          <ac:spMkLst>
+            <pc:docMk/>
+            <pc:sldMk cId="1294538149" sldId="268"/>
+            <ac:spMk id="52" creationId="{399C0156-77B2-724E-58C3-CB80A7A69061}"/>
+          </ac:spMkLst>
+        </pc:spChg>
+        <pc:spChg chg="mod">
+          <ac:chgData name="Philippe Baucour" userId="5102170ae7533958" providerId="LiveId" clId="{A89391CB-9751-4520-9ECA-7ECDFA5EA23C}" dt="2024-06-08T16:54:22.334" v="2534" actId="1036"/>
+          <ac:spMkLst>
+            <pc:docMk/>
+            <pc:sldMk cId="1294538149" sldId="268"/>
+            <ac:spMk id="53" creationId="{F94A7B61-E32A-5176-ACAA-204F079BF9F1}"/>
+          </ac:spMkLst>
+        </pc:spChg>
+        <pc:spChg chg="add mod">
+          <ac:chgData name="Philippe Baucour" userId="5102170ae7533958" providerId="LiveId" clId="{A89391CB-9751-4520-9ECA-7ECDFA5EA23C}" dt="2024-06-08T16:54:22.334" v="2534" actId="1036"/>
+          <ac:spMkLst>
+            <pc:docMk/>
+            <pc:sldMk cId="1294538149" sldId="268"/>
+            <ac:spMk id="57" creationId="{42D4720D-D86B-CDF4-BA54-47094D836E44}"/>
+          </ac:spMkLst>
+        </pc:spChg>
+        <pc:spChg chg="add mod">
+          <ac:chgData name="Philippe Baucour" userId="5102170ae7533958" providerId="LiveId" clId="{A89391CB-9751-4520-9ECA-7ECDFA5EA23C}" dt="2024-06-08T16:54:48.482" v="2552" actId="20577"/>
+          <ac:spMkLst>
+            <pc:docMk/>
+            <pc:sldMk cId="1294538149" sldId="268"/>
+            <ac:spMk id="58" creationId="{B2E8F991-E10B-B949-C93B-A5A143398AB3}"/>
+          </ac:spMkLst>
+        </pc:spChg>
+        <pc:spChg chg="add mod">
+          <ac:chgData name="Philippe Baucour" userId="5102170ae7533958" providerId="LiveId" clId="{A89391CB-9751-4520-9ECA-7ECDFA5EA23C}" dt="2024-06-08T16:54:22.334" v="2534" actId="1036"/>
+          <ac:spMkLst>
+            <pc:docMk/>
+            <pc:sldMk cId="1294538149" sldId="268"/>
+            <ac:spMk id="61" creationId="{0C67B44A-0F47-AFCD-9934-9CBFA7BCD508}"/>
+          </ac:spMkLst>
+        </pc:spChg>
+        <pc:spChg chg="add mod">
+          <ac:chgData name="Philippe Baucour" userId="5102170ae7533958" providerId="LiveId" clId="{A89391CB-9751-4520-9ECA-7ECDFA5EA23C}" dt="2024-06-08T16:54:22.334" v="2534" actId="1036"/>
+          <ac:spMkLst>
+            <pc:docMk/>
+            <pc:sldMk cId="1294538149" sldId="268"/>
+            <ac:spMk id="62" creationId="{F10532C8-67F5-5F96-A53D-F1BD08EFDC8B}"/>
+          </ac:spMkLst>
+        </pc:spChg>
+        <pc:spChg chg="add mod">
+          <ac:chgData name="Philippe Baucour" userId="5102170ae7533958" providerId="LiveId" clId="{A89391CB-9751-4520-9ECA-7ECDFA5EA23C}" dt="2024-06-08T16:54:22.334" v="2534" actId="1036"/>
+          <ac:spMkLst>
+            <pc:docMk/>
+            <pc:sldMk cId="1294538149" sldId="268"/>
+            <ac:spMk id="63" creationId="{39A85152-5F2B-F7A8-9D12-C4A32B754764}"/>
+          </ac:spMkLst>
+        </pc:spChg>
+        <pc:spChg chg="add mod">
+          <ac:chgData name="Philippe Baucour" userId="5102170ae7533958" providerId="LiveId" clId="{A89391CB-9751-4520-9ECA-7ECDFA5EA23C}" dt="2024-06-08T16:54:22.334" v="2534" actId="1036"/>
+          <ac:spMkLst>
+            <pc:docMk/>
+            <pc:sldMk cId="1294538149" sldId="268"/>
+            <ac:spMk id="1029" creationId="{D7A7CEEA-60D3-E981-000D-38CC7FF6265D}"/>
+          </ac:spMkLst>
+        </pc:spChg>
+        <pc:spChg chg="add mod">
+          <ac:chgData name="Philippe Baucour" userId="5102170ae7533958" providerId="LiveId" clId="{A89391CB-9751-4520-9ECA-7ECDFA5EA23C}" dt="2024-06-08T16:50:01.307" v="2211" actId="1076"/>
+          <ac:spMkLst>
+            <pc:docMk/>
+            <pc:sldMk cId="1294538149" sldId="268"/>
+            <ac:spMk id="1049" creationId="{2D1C83D3-7CE7-2AE3-08E6-C759347B25EF}"/>
+          </ac:spMkLst>
+        </pc:spChg>
+        <pc:spChg chg="add">
+          <ac:chgData name="Philippe Baucour" userId="5102170ae7533958" providerId="LiveId" clId="{A89391CB-9751-4520-9ECA-7ECDFA5EA23C}" dt="2024-06-08T16:50:51.988" v="2214"/>
+          <ac:spMkLst>
+            <pc:docMk/>
+            <pc:sldMk cId="1294538149" sldId="268"/>
+            <ac:spMk id="1052" creationId="{E0A406A3-090A-FA14-0E7C-626E57F033FD}"/>
+          </ac:spMkLst>
+        </pc:spChg>
+        <pc:spChg chg="add del mod">
+          <ac:chgData name="Philippe Baucour" userId="5102170ae7533958" providerId="LiveId" clId="{A89391CB-9751-4520-9ECA-7ECDFA5EA23C}" dt="2024-06-08T16:51:37.229" v="2225" actId="478"/>
+          <ac:spMkLst>
+            <pc:docMk/>
+            <pc:sldMk cId="1294538149" sldId="268"/>
+            <ac:spMk id="1055" creationId="{FBE2EA55-5B22-8219-47AE-D7A56B084153}"/>
+          </ac:spMkLst>
+        </pc:spChg>
+        <pc:grpChg chg="mod">
+          <ac:chgData name="Philippe Baucour" userId="5102170ae7533958" providerId="LiveId" clId="{A89391CB-9751-4520-9ECA-7ECDFA5EA23C}" dt="2024-06-08T16:54:22.334" v="2534" actId="1036"/>
+          <ac:grpSpMkLst>
+            <pc:docMk/>
+            <pc:sldMk cId="1294538149" sldId="268"/>
+            <ac:grpSpMk id="24" creationId="{877BD90E-61C7-545A-7D6C-41BFE296E3FA}"/>
+          </ac:grpSpMkLst>
+        </pc:grpChg>
+        <pc:grpChg chg="add mod">
+          <ac:chgData name="Philippe Baucour" userId="5102170ae7533958" providerId="LiveId" clId="{A89391CB-9751-4520-9ECA-7ECDFA5EA23C}" dt="2024-06-08T16:54:22.334" v="2534" actId="1036"/>
+          <ac:grpSpMkLst>
+            <pc:docMk/>
+            <pc:sldMk cId="1294538149" sldId="268"/>
+            <ac:grpSpMk id="56" creationId="{2C2DF18E-AC16-43EF-C64A-8E7B5B3DB147}"/>
+          </ac:grpSpMkLst>
+        </pc:grpChg>
+        <pc:grpChg chg="add mod">
+          <ac:chgData name="Philippe Baucour" userId="5102170ae7533958" providerId="LiveId" clId="{A89391CB-9751-4520-9ECA-7ECDFA5EA23C}" dt="2024-06-08T16:54:22.334" v="2534" actId="1036"/>
+          <ac:grpSpMkLst>
+            <pc:docMk/>
+            <pc:sldMk cId="1294538149" sldId="268"/>
+            <ac:grpSpMk id="1027" creationId="{9C71DFE7-C00D-9221-C068-D6B6C4D74F1C}"/>
+          </ac:grpSpMkLst>
+        </pc:grpChg>
+        <pc:grpChg chg="add mod">
+          <ac:chgData name="Philippe Baucour" userId="5102170ae7533958" providerId="LiveId" clId="{A89391CB-9751-4520-9ECA-7ECDFA5EA23C}" dt="2024-06-08T16:54:22.334" v="2534" actId="1036"/>
+          <ac:grpSpMkLst>
+            <pc:docMk/>
+            <pc:sldMk cId="1294538149" sldId="268"/>
+            <ac:grpSpMk id="1028" creationId="{BAF9EED9-AED1-DC68-2DCE-26FB79C6239A}"/>
+          </ac:grpSpMkLst>
+        </pc:grpChg>
+        <pc:grpChg chg="add mod">
+          <ac:chgData name="Philippe Baucour" userId="5102170ae7533958" providerId="LiveId" clId="{A89391CB-9751-4520-9ECA-7ECDFA5EA23C}" dt="2024-06-08T16:54:22.334" v="2534" actId="1036"/>
+          <ac:grpSpMkLst>
+            <pc:docMk/>
+            <pc:sldMk cId="1294538149" sldId="268"/>
+            <ac:grpSpMk id="1030" creationId="{0283DBA2-E154-B24E-00E4-B2111440E40D}"/>
+          </ac:grpSpMkLst>
+        </pc:grpChg>
+        <pc:grpChg chg="add mod">
+          <ac:chgData name="Philippe Baucour" userId="5102170ae7533958" providerId="LiveId" clId="{A89391CB-9751-4520-9ECA-7ECDFA5EA23C}" dt="2024-06-08T16:54:22.334" v="2534" actId="1036"/>
+          <ac:grpSpMkLst>
+            <pc:docMk/>
+            <pc:sldMk cId="1294538149" sldId="268"/>
+            <ac:grpSpMk id="1031" creationId="{27408B37-7571-659D-5374-18E36A087DF5}"/>
+          </ac:grpSpMkLst>
+        </pc:grpChg>
+        <pc:grpChg chg="add mod">
+          <ac:chgData name="Philippe Baucour" userId="5102170ae7533958" providerId="LiveId" clId="{A89391CB-9751-4520-9ECA-7ECDFA5EA23C}" dt="2024-06-08T16:54:22.334" v="2534" actId="1036"/>
+          <ac:grpSpMkLst>
+            <pc:docMk/>
+            <pc:sldMk cId="1294538149" sldId="268"/>
+            <ac:grpSpMk id="1036" creationId="{4A82B162-DEFD-9CB7-B60A-A8E228E98432}"/>
+          </ac:grpSpMkLst>
+        </pc:grpChg>
+        <pc:grpChg chg="add del mod">
+          <ac:chgData name="Philippe Baucour" userId="5102170ae7533958" providerId="LiveId" clId="{A89391CB-9751-4520-9ECA-7ECDFA5EA23C}" dt="2024-06-08T16:51:12.463" v="2221" actId="478"/>
+          <ac:grpSpMkLst>
+            <pc:docMk/>
+            <pc:sldMk cId="1294538149" sldId="268"/>
+            <ac:grpSpMk id="1050" creationId="{5E6293FA-85D3-89C9-FDBF-3803B5B1D726}"/>
+          </ac:grpSpMkLst>
+        </pc:grpChg>
+        <pc:graphicFrameChg chg="add del modGraphic">
+          <ac:chgData name="Philippe Baucour" userId="5102170ae7533958" providerId="LiveId" clId="{A89391CB-9751-4520-9ECA-7ECDFA5EA23C}" dt="2024-06-08T15:54:30.720" v="367" actId="478"/>
+          <ac:graphicFrameMkLst>
+            <pc:docMk/>
+            <pc:sldMk cId="1294538149" sldId="268"/>
+            <ac:graphicFrameMk id="41" creationId="{92136151-AD24-EC31-1725-7BBB1E9DA834}"/>
+          </ac:graphicFrameMkLst>
+        </pc:graphicFrameChg>
+        <pc:picChg chg="mod">
+          <ac:chgData name="Philippe Baucour" userId="5102170ae7533958" providerId="LiveId" clId="{A89391CB-9751-4520-9ECA-7ECDFA5EA23C}" dt="2024-06-08T16:54:22.334" v="2534" actId="1036"/>
+          <ac:picMkLst>
+            <pc:docMk/>
+            <pc:sldMk cId="1294538149" sldId="268"/>
+            <ac:picMk id="4" creationId="{717F07D8-AB39-1663-2BCF-301A9A73860B}"/>
+          </ac:picMkLst>
+        </pc:picChg>
+        <pc:picChg chg="mod">
+          <ac:chgData name="Philippe Baucour" userId="5102170ae7533958" providerId="LiveId" clId="{A89391CB-9751-4520-9ECA-7ECDFA5EA23C}" dt="2024-06-08T16:54:22.334" v="2534" actId="1036"/>
+          <ac:picMkLst>
+            <pc:docMk/>
+            <pc:sldMk cId="1294538149" sldId="268"/>
+            <ac:picMk id="5" creationId="{171BDF44-7979-BAC1-BA99-65B541D80E7E}"/>
+          </ac:picMkLst>
+        </pc:picChg>
+        <pc:picChg chg="mod">
+          <ac:chgData name="Philippe Baucour" userId="5102170ae7533958" providerId="LiveId" clId="{A89391CB-9751-4520-9ECA-7ECDFA5EA23C}" dt="2024-06-08T16:54:22.334" v="2534" actId="1036"/>
+          <ac:picMkLst>
+            <pc:docMk/>
+            <pc:sldMk cId="1294538149" sldId="268"/>
+            <ac:picMk id="6" creationId="{B7942790-0D7C-2AFF-BB97-F11C27076DF8}"/>
+          </ac:picMkLst>
+        </pc:picChg>
+        <pc:picChg chg="mod">
+          <ac:chgData name="Philippe Baucour" userId="5102170ae7533958" providerId="LiveId" clId="{A89391CB-9751-4520-9ECA-7ECDFA5EA23C}" dt="2024-06-08T16:54:22.334" v="2534" actId="1036"/>
+          <ac:picMkLst>
+            <pc:docMk/>
+            <pc:sldMk cId="1294538149" sldId="268"/>
+            <ac:picMk id="7" creationId="{C912B127-9006-2475-358D-D9BA774A9413}"/>
+          </ac:picMkLst>
+        </pc:picChg>
+        <pc:picChg chg="del mod">
+          <ac:chgData name="Philippe Baucour" userId="5102170ae7533958" providerId="LiveId" clId="{A89391CB-9751-4520-9ECA-7ECDFA5EA23C}" dt="2024-06-08T15:56:48.137" v="371" actId="478"/>
+          <ac:picMkLst>
+            <pc:docMk/>
+            <pc:sldMk cId="1294538149" sldId="268"/>
+            <ac:picMk id="13" creationId="{AC038A3E-0149-49DA-CD8F-3D60A14A34F4}"/>
+          </ac:picMkLst>
+        </pc:picChg>
+        <pc:picChg chg="mod">
+          <ac:chgData name="Philippe Baucour" userId="5102170ae7533958" providerId="LiveId" clId="{A89391CB-9751-4520-9ECA-7ECDFA5EA23C}" dt="2024-06-08T16:54:22.334" v="2534" actId="1036"/>
+          <ac:picMkLst>
+            <pc:docMk/>
+            <pc:sldMk cId="1294538149" sldId="268"/>
+            <ac:picMk id="25" creationId="{58B98C6B-4E84-6906-C69F-F03FE7557709}"/>
+          </ac:picMkLst>
+        </pc:picChg>
+        <pc:picChg chg="mod">
+          <ac:chgData name="Philippe Baucour" userId="5102170ae7533958" providerId="LiveId" clId="{A89391CB-9751-4520-9ECA-7ECDFA5EA23C}" dt="2024-06-08T16:54:22.334" v="2534" actId="1036"/>
+          <ac:picMkLst>
+            <pc:docMk/>
+            <pc:sldMk cId="1294538149" sldId="268"/>
+            <ac:picMk id="26" creationId="{3C959D3F-A7DE-F337-430A-38BE1E9A400C}"/>
+          </ac:picMkLst>
+        </pc:picChg>
+        <pc:picChg chg="mod">
+          <ac:chgData name="Philippe Baucour" userId="5102170ae7533958" providerId="LiveId" clId="{A89391CB-9751-4520-9ECA-7ECDFA5EA23C}" dt="2024-06-08T16:54:22.334" v="2534" actId="1036"/>
+          <ac:picMkLst>
+            <pc:docMk/>
+            <pc:sldMk cId="1294538149" sldId="268"/>
+            <ac:picMk id="33" creationId="{BCAC1AA9-5DC8-F914-5F46-7AB93D73E38B}"/>
+          </ac:picMkLst>
+        </pc:picChg>
+        <pc:picChg chg="del mod">
+          <ac:chgData name="Philippe Baucour" userId="5102170ae7533958" providerId="LiveId" clId="{A89391CB-9751-4520-9ECA-7ECDFA5EA23C}" dt="2024-06-08T16:51:53.623" v="2229" actId="478"/>
+          <ac:picMkLst>
+            <pc:docMk/>
+            <pc:sldMk cId="1294538149" sldId="268"/>
+            <ac:picMk id="40" creationId="{228584AC-4975-7372-8163-FE6445655BB5}"/>
+          </ac:picMkLst>
+        </pc:picChg>
+        <pc:picChg chg="add mod">
+          <ac:chgData name="Philippe Baucour" userId="5102170ae7533958" providerId="LiveId" clId="{A89391CB-9751-4520-9ECA-7ECDFA5EA23C}" dt="2024-06-08T16:54:22.334" v="2534" actId="1036"/>
+          <ac:picMkLst>
+            <pc:docMk/>
+            <pc:sldMk cId="1294538149" sldId="268"/>
+            <ac:picMk id="47" creationId="{EAA36F96-0FAE-1D0A-E12A-AA22913FAB08}"/>
+          </ac:picMkLst>
+        </pc:picChg>
+        <pc:picChg chg="add mod">
+          <ac:chgData name="Philippe Baucour" userId="5102170ae7533958" providerId="LiveId" clId="{A89391CB-9751-4520-9ECA-7ECDFA5EA23C}" dt="2024-06-08T16:54:22.334" v="2534" actId="1036"/>
+          <ac:picMkLst>
+            <pc:docMk/>
+            <pc:sldMk cId="1294538149" sldId="268"/>
+            <ac:picMk id="54" creationId="{9A92D136-E70E-C007-E650-A2D70CD4F353}"/>
+          </ac:picMkLst>
+        </pc:picChg>
+        <pc:picChg chg="add mod">
+          <ac:chgData name="Philippe Baucour" userId="5102170ae7533958" providerId="LiveId" clId="{A89391CB-9751-4520-9ECA-7ECDFA5EA23C}" dt="2024-06-08T16:54:22.334" v="2534" actId="1036"/>
+          <ac:picMkLst>
+            <pc:docMk/>
+            <pc:sldMk cId="1294538149" sldId="268"/>
+            <ac:picMk id="55" creationId="{C063199A-312E-B148-3C65-8FAC334CC405}"/>
+          </ac:picMkLst>
+        </pc:picChg>
+        <pc:picChg chg="add mod modCrop">
+          <ac:chgData name="Philippe Baucour" userId="5102170ae7533958" providerId="LiveId" clId="{A89391CB-9751-4520-9ECA-7ECDFA5EA23C}" dt="2024-06-08T16:54:22.334" v="2534" actId="1036"/>
+          <ac:picMkLst>
+            <pc:docMk/>
+            <pc:sldMk cId="1294538149" sldId="268"/>
+            <ac:picMk id="60" creationId="{7CB98866-60DE-CAB4-E3DA-4474A06D0431}"/>
+          </ac:picMkLst>
+        </pc:picChg>
+        <pc:picChg chg="add mod">
+          <ac:chgData name="Philippe Baucour" userId="5102170ae7533958" providerId="LiveId" clId="{A89391CB-9751-4520-9ECA-7ECDFA5EA23C}" dt="2024-06-08T16:54:22.334" v="2534" actId="1036"/>
+          <ac:picMkLst>
+            <pc:docMk/>
+            <pc:sldMk cId="1294538149" sldId="268"/>
+            <ac:picMk id="1026" creationId="{0728D59F-5B9E-737F-DE8A-6695246453B8}"/>
+          </ac:picMkLst>
+        </pc:picChg>
+        <pc:picChg chg="add mod">
+          <ac:chgData name="Philippe Baucour" userId="5102170ae7533958" providerId="LiveId" clId="{A89391CB-9751-4520-9ECA-7ECDFA5EA23C}" dt="2024-06-08T16:50:01.307" v="2211" actId="1076"/>
+          <ac:picMkLst>
+            <pc:docMk/>
+            <pc:sldMk cId="1294538149" sldId="268"/>
+            <ac:picMk id="1048" creationId="{B083968F-DB8D-206B-4A1E-78931ABD5EA3}"/>
+          </ac:picMkLst>
+        </pc:picChg>
+        <pc:picChg chg="add del">
+          <ac:chgData name="Philippe Baucour" userId="5102170ae7533958" providerId="LiveId" clId="{A89391CB-9751-4520-9ECA-7ECDFA5EA23C}" dt="2024-06-08T16:51:10.968" v="2220" actId="478"/>
+          <ac:picMkLst>
+            <pc:docMk/>
+            <pc:sldMk cId="1294538149" sldId="268"/>
+            <ac:picMk id="1051" creationId="{72CD209B-E5D8-F384-ACBE-3212B8920B17}"/>
+          </ac:picMkLst>
+        </pc:picChg>
+        <pc:picChg chg="add mod">
+          <ac:chgData name="Philippe Baucour" userId="5102170ae7533958" providerId="LiveId" clId="{A89391CB-9751-4520-9ECA-7ECDFA5EA23C}" dt="2024-06-08T16:54:22.334" v="2534" actId="1036"/>
+          <ac:picMkLst>
+            <pc:docMk/>
+            <pc:sldMk cId="1294538149" sldId="268"/>
+            <ac:picMk id="1056" creationId="{FD93E48A-D1E5-FD02-1902-875615C41779}"/>
+          </ac:picMkLst>
+        </pc:picChg>
+        <pc:cxnChg chg="mod">
+          <ac:chgData name="Philippe Baucour" userId="5102170ae7533958" providerId="LiveId" clId="{A89391CB-9751-4520-9ECA-7ECDFA5EA23C}" dt="2024-06-08T16:54:22.334" v="2534" actId="1036"/>
+          <ac:cxnSpMkLst>
+            <pc:docMk/>
+            <pc:sldMk cId="1294538149" sldId="268"/>
+            <ac:cxnSpMk id="21" creationId="{3E5CC60F-E55F-BB01-045D-DB2636F3D02F}"/>
+          </ac:cxnSpMkLst>
+        </pc:cxnChg>
+        <pc:cxnChg chg="mod">
+          <ac:chgData name="Philippe Baucour" userId="5102170ae7533958" providerId="LiveId" clId="{A89391CB-9751-4520-9ECA-7ECDFA5EA23C}" dt="2024-06-08T16:54:22.334" v="2534" actId="1036"/>
+          <ac:cxnSpMkLst>
+            <pc:docMk/>
+            <pc:sldMk cId="1294538149" sldId="268"/>
+            <ac:cxnSpMk id="23" creationId="{DE938E05-1E91-AB1C-333D-CBB158AF050C}"/>
+          </ac:cxnSpMkLst>
+        </pc:cxnChg>
+        <pc:cxnChg chg="mod">
+          <ac:chgData name="Philippe Baucour" userId="5102170ae7533958" providerId="LiveId" clId="{A89391CB-9751-4520-9ECA-7ECDFA5EA23C}" dt="2024-06-08T16:54:22.334" v="2534" actId="1036"/>
+          <ac:cxnSpMkLst>
+            <pc:docMk/>
+            <pc:sldMk cId="1294538149" sldId="268"/>
+            <ac:cxnSpMk id="27" creationId="{064AB111-5E64-B0CE-170E-10ADD415D98D}"/>
+          </ac:cxnSpMkLst>
+        </pc:cxnChg>
+        <pc:cxnChg chg="mod">
+          <ac:chgData name="Philippe Baucour" userId="5102170ae7533958" providerId="LiveId" clId="{A89391CB-9751-4520-9ECA-7ECDFA5EA23C}" dt="2024-06-08T16:54:22.334" v="2534" actId="1036"/>
+          <ac:cxnSpMkLst>
+            <pc:docMk/>
+            <pc:sldMk cId="1294538149" sldId="268"/>
+            <ac:cxnSpMk id="38" creationId="{F912D15A-4AC2-F142-7374-BF328BB1026B}"/>
+          </ac:cxnSpMkLst>
+        </pc:cxnChg>
+        <pc:cxnChg chg="add mod">
+          <ac:chgData name="Philippe Baucour" userId="5102170ae7533958" providerId="LiveId" clId="{A89391CB-9751-4520-9ECA-7ECDFA5EA23C}" dt="2024-06-08T16:54:22.334" v="2534" actId="1036"/>
+          <ac:cxnSpMkLst>
+            <pc:docMk/>
+            <pc:sldMk cId="1294538149" sldId="268"/>
+            <ac:cxnSpMk id="1032" creationId="{6DEDE52E-6D8A-A403-BA05-57BC07F03271}"/>
+          </ac:cxnSpMkLst>
+        </pc:cxnChg>
+      </pc:sldChg>
+      <pc:sldChg chg="addSp delSp modSp new mod modClrScheme chgLayout">
+        <pc:chgData name="Philippe Baucour" userId="5102170ae7533958" providerId="LiveId" clId="{A89391CB-9751-4520-9ECA-7ECDFA5EA23C}" dt="2024-06-09T16:22:07.783" v="2835" actId="20577"/>
+        <pc:sldMkLst>
+          <pc:docMk/>
+          <pc:sldMk cId="983029951" sldId="269"/>
+        </pc:sldMkLst>
+        <pc:spChg chg="del mod ord">
+          <ac:chgData name="Philippe Baucour" userId="5102170ae7533958" providerId="LiveId" clId="{A89391CB-9751-4520-9ECA-7ECDFA5EA23C}" dt="2024-06-09T16:14:38.155" v="2556" actId="700"/>
+          <ac:spMkLst>
+            <pc:docMk/>
+            <pc:sldMk cId="983029951" sldId="269"/>
+            <ac:spMk id="2" creationId="{3AA59F87-AB60-DB3F-47AE-1DFAF0760A06}"/>
+          </ac:spMkLst>
+        </pc:spChg>
+        <pc:spChg chg="add mod ord">
+          <ac:chgData name="Philippe Baucour" userId="5102170ae7533958" providerId="LiveId" clId="{A89391CB-9751-4520-9ECA-7ECDFA5EA23C}" dt="2024-06-09T16:15:13.741" v="2569" actId="20577"/>
+          <ac:spMkLst>
+            <pc:docMk/>
+            <pc:sldMk cId="983029951" sldId="269"/>
+            <ac:spMk id="3" creationId="{DA480834-FB63-3032-ADA6-17D22532B491}"/>
+          </ac:spMkLst>
+        </pc:spChg>
+        <pc:spChg chg="add mod">
+          <ac:chgData name="Philippe Baucour" userId="5102170ae7533958" providerId="LiveId" clId="{A89391CB-9751-4520-9ECA-7ECDFA5EA23C}" dt="2024-06-09T16:22:07.783" v="2835" actId="20577"/>
+          <ac:spMkLst>
+            <pc:docMk/>
+            <pc:sldMk cId="983029951" sldId="269"/>
+            <ac:spMk id="6" creationId="{C08CA92A-C4D0-7534-BB3C-CB39598FD89A}"/>
+          </ac:spMkLst>
+        </pc:spChg>
+        <pc:picChg chg="add mod">
+          <ac:chgData name="Philippe Baucour" userId="5102170ae7533958" providerId="LiveId" clId="{A89391CB-9751-4520-9ECA-7ECDFA5EA23C}" dt="2024-06-09T16:21:21.724" v="2797" actId="1076"/>
+          <ac:picMkLst>
+            <pc:docMk/>
+            <pc:sldMk cId="983029951" sldId="269"/>
+            <ac:picMk id="5" creationId="{43783C54-F88B-5FBB-5A6E-67D18CDBB5E7}"/>
+          </ac:picMkLst>
+        </pc:picChg>
+      </pc:sldChg>
     </pc:docChg>
   </pc:docChgLst>
 </pc:chgInfo>
@@ -1852,38 +2507,17 @@
               <a:buNone/>
             </a:pPr>
             <a:r>
-              <a:rPr lang="fr-FR" dirty="0"/>
-              <a:t>1 – </a:t>
-            </a:r>
-            <a:r>
-              <a:rPr lang="fr-FR" dirty="0" err="1"/>
-              <a:t>Heroku</a:t>
-            </a:r>
-            <a:r>
-              <a:rPr lang="fr-FR" dirty="0"/>
-              <a:t> fonctionne et </a:t>
-            </a:r>
-            <a:r>
-              <a:rPr lang="fr-FR" dirty="0" err="1"/>
-              <a:t>heberge</a:t>
-            </a:r>
-            <a:r>
-              <a:rPr lang="fr-FR" dirty="0"/>
-              <a:t> un serveur </a:t>
-            </a:r>
-            <a:r>
-              <a:rPr lang="fr-FR" dirty="0" err="1"/>
-              <a:t>mlflow</a:t>
-            </a:r>
-            <a:r>
-              <a:rPr lang="fr-FR" dirty="0"/>
-              <a:t> </a:t>
-            </a:r>
-            <a:r>
-              <a:rPr lang="fr-FR" dirty="0" err="1"/>
-              <a:t>tracking</a:t>
-            </a:r>
-            <a:endParaRPr lang="fr-FR" dirty="0"/>
+              <a:rPr lang="fr-FR" strike="sngStrike" dirty="0"/>
+              <a:t>0 – Charger des photos et voir si c'est OK. Droits d'</a:t>
+            </a:r>
+            <a:r>
+              <a:rPr lang="fr-FR" strike="sngStrike" dirty="0" err="1"/>
+              <a:t>acces</a:t>
+            </a:r>
+            <a:r>
+              <a:rPr lang="fr-FR" strike="sngStrike" dirty="0"/>
+              <a:t> ?</a:t>
+            </a:r>
           </a:p>
           <a:p>
             <a:pPr marL="158750" indent="0">
@@ -1891,13 +2525,8 @@
             </a:pPr>
             <a:r>
               <a:rPr lang="fr-FR" dirty="0"/>
-              <a:t>2 – On peut suivre les </a:t>
-            </a:r>
-            <a:r>
-              <a:rPr lang="fr-FR" dirty="0" err="1"/>
-              <a:t>modeles</a:t>
-            </a:r>
-            <a:endParaRPr lang="fr-FR" dirty="0"/>
+              <a:t>1 - Donner des accès à Dominique pour charger des images sur S3 – EN COURS Lundi 10 juin</a:t>
+            </a:r>
           </a:p>
           <a:p>
             <a:pPr marL="158750" indent="0">
@@ -1905,7 +2534,23 @@
             </a:pPr>
             <a:r>
               <a:rPr lang="fr-FR" dirty="0"/>
-              <a:t>3- On peut déposer des données sur un disque S3</a:t>
+              <a:t>2 - Voir avec Quentin ce dont il a besoin pour invoquer un </a:t>
+            </a:r>
+            <a:r>
+              <a:rPr lang="fr-FR" dirty="0" err="1"/>
+              <a:t>predict</a:t>
+            </a:r>
+            <a:r>
+              <a:rPr lang="fr-FR" dirty="0"/>
+              <a:t>() sur </a:t>
+            </a:r>
+            <a:r>
+              <a:rPr lang="fr-FR" dirty="0" err="1"/>
+              <a:t>Heroku</a:t>
+            </a:r>
+            <a:r>
+              <a:rPr lang="fr-FR" dirty="0"/>
+              <a:t> (cours?)</a:t>
             </a:r>
           </a:p>
           <a:p>
@@ -1914,31 +2559,33 @@
             </a:pPr>
             <a:r>
               <a:rPr lang="fr-FR" dirty="0"/>
-              <a:t>4- On peut consommer ces données dans un train. Sauver les </a:t>
+              <a:t>3 – Distribuer ce qui est nécessaire pour pouvoir faire tourner un modèle en local sur une machine</a:t>
+            </a:r>
+          </a:p>
+          <a:p>
+            <a:pPr marL="158750" indent="0">
+              <a:buNone/>
+            </a:pPr>
+            <a:r>
+              <a:rPr lang="fr-FR" dirty="0"/>
+              <a:t>4- Trouver une solution ou une alternative à EC2 (ECS, </a:t>
             </a:r>
             <a:r>
               <a:rPr lang="fr-FR" dirty="0" err="1"/>
-              <a:t>artifacts</a:t>
+              <a:t>runpod</a:t>
             </a:r>
             <a:r>
               <a:rPr lang="fr-FR" dirty="0"/>
-              <a:t> sur le S3 et les paramètres sur </a:t>
-            </a:r>
-            <a:r>
-              <a:rPr lang="fr-FR" dirty="0" err="1"/>
-              <a:t>MLFlow</a:t>
-            </a:r>
+              <a:t>, google…) </a:t>
+            </a:r>
+          </a:p>
+          <a:p>
+            <a:pPr marL="158750" indent="0">
+              <a:buNone/>
+            </a:pPr>
             <a:r>
               <a:rPr lang="fr-FR" dirty="0"/>
-              <a:t> </a:t>
-            </a:r>
-            <a:r>
-              <a:rPr lang="fr-FR" dirty="0" err="1"/>
-              <a:t>tracking</a:t>
-            </a:r>
-            <a:r>
-              <a:rPr lang="fr-FR" dirty="0"/>
-              <a:t> (et la base SQL)</a:t>
+              <a:t>5 – Template de code sklearn/TF</a:t>
             </a:r>
           </a:p>
         </p:txBody>
@@ -1946,7 +2593,7 @@
     </p:spTree>
     <p:extLst>
       <p:ext uri="{BB962C8B-B14F-4D97-AF65-F5344CB8AC3E}">
-        <p14:creationId xmlns:p14="http://schemas.microsoft.com/office/powerpoint/2010/main" val="4283366723"/>
+        <p14:creationId xmlns:p14="http://schemas.microsoft.com/office/powerpoint/2010/main" val="3826647592"/>
       </p:ext>
     </p:extLst>
   </p:cSld>
@@ -2010,8 +2657,37 @@
             </a:pPr>
             <a:r>
               <a:rPr lang="fr-FR" dirty="0"/>
-              <a:t>1 - Donner des accès à Dominique pour charger des images sur S3</a:t>
-            </a:r>
+              <a:t>1 – </a:t>
+            </a:r>
+            <a:r>
+              <a:rPr lang="fr-FR" dirty="0" err="1"/>
+              <a:t>Heroku</a:t>
+            </a:r>
+            <a:r>
+              <a:rPr lang="fr-FR" dirty="0"/>
+              <a:t> fonctionne et </a:t>
+            </a:r>
+            <a:r>
+              <a:rPr lang="fr-FR" dirty="0" err="1"/>
+              <a:t>heberge</a:t>
+            </a:r>
+            <a:r>
+              <a:rPr lang="fr-FR" dirty="0"/>
+              <a:t> un serveur </a:t>
+            </a:r>
+            <a:r>
+              <a:rPr lang="fr-FR" dirty="0" err="1"/>
+              <a:t>mlflow</a:t>
+            </a:r>
+            <a:r>
+              <a:rPr lang="fr-FR" dirty="0"/>
+              <a:t> </a:t>
+            </a:r>
+            <a:r>
+              <a:rPr lang="fr-FR" dirty="0" err="1"/>
+              <a:t>tracking</a:t>
+            </a:r>
+            <a:endParaRPr lang="fr-FR" dirty="0"/>
           </a:p>
           <a:p>
             <a:pPr marL="158750" indent="0">
@@ -2019,24 +2695,13 @@
             </a:pPr>
             <a:r>
               <a:rPr lang="fr-FR" dirty="0"/>
-              <a:t>2 - Voir avec Quentin ce dont il a besoin pour invoquer un </a:t>
+              <a:t>2 – On peut suivre les </a:t>
             </a:r>
             <a:r>
               <a:rPr lang="fr-FR" dirty="0" err="1"/>
-              <a:t>predict</a:t>
-            </a:r>
-            <a:r>
-              <a:rPr lang="fr-FR" dirty="0"/>
-              <a:t>() sur </a:t>
-            </a:r>
-            <a:r>
-              <a:rPr lang="fr-FR" dirty="0" err="1"/>
-              <a:t>Heroku</a:t>
-            </a:r>
-            <a:r>
-              <a:rPr lang="fr-FR" dirty="0"/>
-              <a:t> (cours?)</a:t>
-            </a:r>
+              <a:t>modeles</a:t>
+            </a:r>
+            <a:endParaRPr lang="fr-FR" dirty="0"/>
           </a:p>
           <a:p>
             <a:pPr marL="158750" indent="0">
@@ -2044,7 +2709,7 @@
             </a:pPr>
             <a:r>
               <a:rPr lang="fr-FR" dirty="0"/>
-              <a:t>3 – Distribuer ce qui est nécessaire pour pouvoir faire tourner un modèle en local sur une machine</a:t>
+              <a:t>3- On peut déposer des données sur un disque S3</a:t>
             </a:r>
           </a:p>
           <a:p>
@@ -2053,6 +2718,162 @@
             </a:pPr>
             <a:r>
               <a:rPr lang="fr-FR" dirty="0"/>
+              <a:t>4- On peut consommer ces données dans un train. Sauver les </a:t>
+            </a:r>
+            <a:r>
+              <a:rPr lang="fr-FR" dirty="0" err="1"/>
+              <a:t>artifacts</a:t>
+            </a:r>
+            <a:r>
+              <a:rPr lang="fr-FR" dirty="0"/>
+              <a:t> sur le S3 et les paramètres sur </a:t>
+            </a:r>
+            <a:r>
+              <a:rPr lang="fr-FR" dirty="0" err="1"/>
+              <a:t>MLFlow</a:t>
+            </a:r>
+            <a:r>
+              <a:rPr lang="fr-FR" dirty="0"/>
+              <a:t> </a:t>
+            </a:r>
+            <a:r>
+              <a:rPr lang="fr-FR" dirty="0" err="1"/>
+              <a:t>tracking</a:t>
+            </a:r>
+            <a:r>
+              <a:rPr lang="fr-FR" dirty="0"/>
+              <a:t> (et la base SQL)</a:t>
+            </a:r>
+          </a:p>
+        </p:txBody>
+      </p:sp>
+    </p:spTree>
+    <p:extLst>
+      <p:ext uri="{BB962C8B-B14F-4D97-AF65-F5344CB8AC3E}">
+        <p14:creationId xmlns:p14="http://schemas.microsoft.com/office/powerpoint/2010/main" val="4283366723"/>
+      </p:ext>
+    </p:extLst>
+  </p:cSld>
+  <p:clrMapOvr>
+    <a:masterClrMapping/>
+  </p:clrMapOvr>
+</p:notes>
+</file>
+
+<file path=ppt/notesSlides/notesSlide3.xml><?xml version="1.0" encoding="utf-8"?>
+<p:notes xmlns:a="http://schemas.openxmlformats.org/drawingml/2006/main" xmlns:r="http://schemas.openxmlformats.org/officeDocument/2006/relationships" xmlns:p="http://schemas.openxmlformats.org/presentationml/2006/main">
+  <p:cSld>
+    <p:spTree>
+      <p:nvGrpSpPr>
+        <p:cNvPr id="1" name=""/>
+        <p:cNvGrpSpPr/>
+        <p:nvPr/>
+      </p:nvGrpSpPr>
+      <p:grpSpPr>
+        <a:xfrm>
+          <a:off x="0" y="0"/>
+          <a:ext cx="0" cy="0"/>
+          <a:chOff x="0" y="0"/>
+          <a:chExt cx="0" cy="0"/>
+        </a:xfrm>
+      </p:grpSpPr>
+      <p:sp>
+        <p:nvSpPr>
+          <p:cNvPr id="2" name="Espace réservé de l'image des diapositives 1"/>
+          <p:cNvSpPr>
+            <a:spLocks noGrp="1" noRot="1" noChangeAspect="1"/>
+          </p:cNvSpPr>
+          <p:nvPr>
+            <p:ph type="sldImg"/>
+          </p:nvPr>
+        </p:nvSpPr>
+        <p:spPr>
+          <a:xfrm>
+            <a:off x="381000" y="685800"/>
+            <a:ext cx="6096000" cy="3429000"/>
+          </a:xfrm>
+        </p:spPr>
+      </p:sp>
+      <p:sp>
+        <p:nvSpPr>
+          <p:cNvPr id="3" name="Espace réservé des notes 2"/>
+          <p:cNvSpPr>
+            <a:spLocks noGrp="1"/>
+          </p:cNvSpPr>
+          <p:nvPr>
+            <p:ph type="body" idx="1"/>
+          </p:nvPr>
+        </p:nvSpPr>
+        <p:spPr/>
+        <p:txBody>
+          <a:bodyPr/>
+          <a:lstStyle/>
+          <a:p>
+            <a:pPr marL="158750" indent="0">
+              <a:buNone/>
+            </a:pPr>
+            <a:r>
+              <a:rPr lang="fr-FR" strike="sngStrike" dirty="0"/>
+              <a:t>0 – Charger des photos et voir si c'est OK. Droits d'</a:t>
+            </a:r>
+            <a:r>
+              <a:rPr lang="fr-FR" strike="sngStrike" dirty="0" err="1"/>
+              <a:t>acces</a:t>
+            </a:r>
+            <a:r>
+              <a:rPr lang="fr-FR" strike="sngStrike" dirty="0"/>
+              <a:t> ?</a:t>
+            </a:r>
+          </a:p>
+          <a:p>
+            <a:pPr marL="158750" indent="0">
+              <a:buNone/>
+            </a:pPr>
+            <a:r>
+              <a:rPr lang="fr-FR" dirty="0"/>
+              <a:t>1 - Donner des accès à Dominique pour charger des images sur S3 – EN COURS Lundi 10 juin</a:t>
+            </a:r>
+          </a:p>
+          <a:p>
+            <a:pPr marL="158750" indent="0">
+              <a:buNone/>
+            </a:pPr>
+            <a:r>
+              <a:rPr lang="fr-FR" dirty="0"/>
+              <a:t>2 - Voir avec Quentin ce dont il a besoin pour invoquer un </a:t>
+            </a:r>
+            <a:r>
+              <a:rPr lang="fr-FR" dirty="0" err="1"/>
+              <a:t>predict</a:t>
+            </a:r>
+            <a:r>
+              <a:rPr lang="fr-FR" dirty="0"/>
+              <a:t>() sur </a:t>
+            </a:r>
+            <a:r>
+              <a:rPr lang="fr-FR" dirty="0" err="1"/>
+              <a:t>Heroku</a:t>
+            </a:r>
+            <a:r>
+              <a:rPr lang="fr-FR" dirty="0"/>
+              <a:t> (cours?)</a:t>
+            </a:r>
+          </a:p>
+          <a:p>
+            <a:pPr marL="158750" indent="0">
+              <a:buNone/>
+            </a:pPr>
+            <a:r>
+              <a:rPr lang="fr-FR" dirty="0"/>
+              <a:t>3 – Distribuer ce qui est nécessaire pour pouvoir faire tourner un modèle en local sur une machine</a:t>
+            </a:r>
+          </a:p>
+          <a:p>
+            <a:pPr marL="158750" indent="0">
+              <a:buNone/>
+            </a:pPr>
+            <a:r>
+              <a:rPr lang="fr-FR" dirty="0"/>
               <a:t>4- Trouver une solution ou une alternative à EC2 (ECS, </a:t>
             </a:r>
             <a:r>
@@ -2062,6 +2883,15 @@
             <a:r>
               <a:rPr lang="fr-FR" dirty="0"/>
               <a:t>, google…) </a:t>
+            </a:r>
+          </a:p>
+          <a:p>
+            <a:pPr marL="158750" indent="0">
+              <a:buNone/>
+            </a:pPr>
+            <a:r>
+              <a:rPr lang="fr-FR" dirty="0"/>
+              <a:t>5 – Template de code sklearn/TF</a:t>
             </a:r>
           </a:p>
         </p:txBody>
@@ -4148,6 +4978,59 @@
       </p:grpSpPr>
       <p:sp>
         <p:nvSpPr>
+          <p:cNvPr id="37" name="Rectangle 36">
+            <a:extLst>
+              <a:ext uri="{FF2B5EF4-FFF2-40B4-BE49-F238E27FC236}">
+                <a16:creationId xmlns:a16="http://schemas.microsoft.com/office/drawing/2014/main" id="{18882719-D0A3-5B55-C871-F003AC1A6FBE}"/>
+              </a:ext>
+            </a:extLst>
+          </p:cNvPr>
+          <p:cNvSpPr/>
+          <p:nvPr/>
+        </p:nvSpPr>
+        <p:spPr>
+          <a:xfrm>
+            <a:off x="3350799" y="1569428"/>
+            <a:ext cx="1685411" cy="2714596"/>
+          </a:xfrm>
+          <a:prstGeom prst="rect">
+            <a:avLst/>
+          </a:prstGeom>
+          <a:solidFill>
+            <a:schemeClr val="bg1">
+              <a:lumMod val="85000"/>
+              <a:alpha val="60000"/>
+            </a:schemeClr>
+          </a:solidFill>
+          <a:ln w="12700"/>
+        </p:spPr>
+        <p:style>
+          <a:lnRef idx="2">
+            <a:schemeClr val="accent3">
+              <a:shade val="15000"/>
+            </a:schemeClr>
+          </a:lnRef>
+          <a:fillRef idx="1">
+            <a:schemeClr val="accent3"/>
+          </a:fillRef>
+          <a:effectRef idx="0">
+            <a:schemeClr val="accent3"/>
+          </a:effectRef>
+          <a:fontRef idx="minor">
+            <a:schemeClr val="lt1"/>
+          </a:fontRef>
+        </p:style>
+        <p:txBody>
+          <a:bodyPr rtlCol="0" anchor="ctr"/>
+          <a:lstStyle/>
+          <a:p>
+            <a:pPr algn="ctr"/>
+            <a:endParaRPr lang="fr-FR" sz="800" dirty="0"/>
+          </a:p>
+        </p:txBody>
+      </p:sp>
+      <p:sp>
+        <p:nvSpPr>
           <p:cNvPr id="3" name="Titre 2">
             <a:extLst>
               <a:ext uri="{FF2B5EF4-FFF2-40B4-BE49-F238E27FC236}">
@@ -4169,6 +5052,2216 @@
           <a:p>
             <a:r>
               <a:rPr lang="fr-FR" dirty="0" err="1"/>
+              <a:t>SkinCheck</a:t>
+            </a:r>
+            <a:r>
+              <a:rPr lang="fr-FR" dirty="0"/>
+              <a:t> - Objectives</a:t>
+            </a:r>
+          </a:p>
+        </p:txBody>
+      </p:sp>
+      <p:pic>
+        <p:nvPicPr>
+          <p:cNvPr id="4" name="Picture 2" descr="Serveur de données - Icônes la mise en réseau gratuites">
+            <a:extLst>
+              <a:ext uri="{FF2B5EF4-FFF2-40B4-BE49-F238E27FC236}">
+                <a16:creationId xmlns:a16="http://schemas.microsoft.com/office/drawing/2014/main" id="{717F07D8-AB39-1663-2BCF-301A9A73860B}"/>
+              </a:ext>
+            </a:extLst>
+          </p:cNvPr>
+          <p:cNvPicPr>
+            <a:picLocks noChangeAspect="1" noChangeArrowheads="1"/>
+          </p:cNvPicPr>
+          <p:nvPr/>
+        </p:nvPicPr>
+        <p:blipFill>
+          <a:blip r:embed="rId3">
+            <a:extLst>
+              <a:ext uri="{28A0092B-C50C-407E-A947-70E740481C1C}">
+                <a14:useLocalDpi xmlns:a14="http://schemas.microsoft.com/office/drawing/2010/main" val="0"/>
+              </a:ext>
+            </a:extLst>
+          </a:blip>
+          <a:srcRect/>
+          <a:stretch>
+            <a:fillRect/>
+          </a:stretch>
+        </p:blipFill>
+        <p:spPr bwMode="auto">
+          <a:xfrm>
+            <a:off x="5812528" y="2523515"/>
+            <a:ext cx="867498" cy="867498"/>
+          </a:xfrm>
+          <a:prstGeom prst="rect">
+            <a:avLst/>
+          </a:prstGeom>
+          <a:noFill/>
+          <a:extLst>
+            <a:ext uri="{909E8E84-426E-40DD-AFC4-6F175D3DCCD1}">
+              <a14:hiddenFill xmlns:a14="http://schemas.microsoft.com/office/drawing/2010/main">
+                <a:solidFill>
+                  <a:srgbClr val="FFFFFF"/>
+                </a:solidFill>
+              </a14:hiddenFill>
+            </a:ext>
+          </a:extLst>
+        </p:spPr>
+      </p:pic>
+      <p:pic>
+        <p:nvPicPr>
+          <p:cNvPr id="5" name="Graphique 4" descr="Ordinateur avec un remplissage uni">
+            <a:extLst>
+              <a:ext uri="{FF2B5EF4-FFF2-40B4-BE49-F238E27FC236}">
+                <a16:creationId xmlns:a16="http://schemas.microsoft.com/office/drawing/2014/main" id="{171BDF44-7979-BAC1-BA99-65B541D80E7E}"/>
+              </a:ext>
+            </a:extLst>
+          </p:cNvPr>
+          <p:cNvPicPr>
+            <a:picLocks noChangeAspect="1"/>
+          </p:cNvPicPr>
+          <p:nvPr/>
+        </p:nvPicPr>
+        <p:blipFill>
+          <a:blip r:embed="rId4">
+            <a:extLst>
+              <a:ext uri="{28A0092B-C50C-407E-A947-70E740481C1C}">
+                <a14:useLocalDpi xmlns:a14="http://schemas.microsoft.com/office/drawing/2010/main" val="0"/>
+              </a:ext>
+              <a:ext uri="{96DAC541-7B7A-43D3-8B79-37D633B846F1}">
+                <asvg:svgBlip xmlns:asvg="http://schemas.microsoft.com/office/drawing/2016/SVG/main" r:embed="rId5"/>
+              </a:ext>
+            </a:extLst>
+          </a:blip>
+          <a:stretch>
+            <a:fillRect/>
+          </a:stretch>
+        </p:blipFill>
+        <p:spPr>
+          <a:xfrm>
+            <a:off x="3897019" y="3595380"/>
+            <a:ext cx="685800" cy="685800"/>
+          </a:xfrm>
+          <a:prstGeom prst="rect">
+            <a:avLst/>
+          </a:prstGeom>
+        </p:spPr>
+      </p:pic>
+      <p:pic>
+        <p:nvPicPr>
+          <p:cNvPr id="6" name="Picture 2" descr="Serveur de données - Icônes la mise en réseau gratuites">
+            <a:extLst>
+              <a:ext uri="{FF2B5EF4-FFF2-40B4-BE49-F238E27FC236}">
+                <a16:creationId xmlns:a16="http://schemas.microsoft.com/office/drawing/2014/main" id="{B7942790-0D7C-2AFF-BB97-F11C27076DF8}"/>
+              </a:ext>
+            </a:extLst>
+          </p:cNvPr>
+          <p:cNvPicPr>
+            <a:picLocks noChangeAspect="1" noChangeArrowheads="1"/>
+          </p:cNvPicPr>
+          <p:nvPr/>
+        </p:nvPicPr>
+        <p:blipFill>
+          <a:blip r:embed="rId3">
+            <a:extLst>
+              <a:ext uri="{28A0092B-C50C-407E-A947-70E740481C1C}">
+                <a14:useLocalDpi xmlns:a14="http://schemas.microsoft.com/office/drawing/2010/main" val="0"/>
+              </a:ext>
+            </a:extLst>
+          </a:blip>
+          <a:srcRect/>
+          <a:stretch>
+            <a:fillRect/>
+          </a:stretch>
+        </p:blipFill>
+        <p:spPr bwMode="auto">
+          <a:xfrm>
+            <a:off x="1601721" y="2519162"/>
+            <a:ext cx="867498" cy="867498"/>
+          </a:xfrm>
+          <a:prstGeom prst="rect">
+            <a:avLst/>
+          </a:prstGeom>
+          <a:noFill/>
+          <a:extLst>
+            <a:ext uri="{909E8E84-426E-40DD-AFC4-6F175D3DCCD1}">
+              <a14:hiddenFill xmlns:a14="http://schemas.microsoft.com/office/drawing/2010/main">
+                <a:solidFill>
+                  <a:srgbClr val="FFFFFF"/>
+                </a:solidFill>
+              </a14:hiddenFill>
+            </a:ext>
+          </a:extLst>
+        </p:spPr>
+      </p:pic>
+      <p:pic>
+        <p:nvPicPr>
+          <p:cNvPr id="7" name="Graphique 6" descr="Base de données avec un remplissage uni">
+            <a:extLst>
+              <a:ext uri="{FF2B5EF4-FFF2-40B4-BE49-F238E27FC236}">
+                <a16:creationId xmlns:a16="http://schemas.microsoft.com/office/drawing/2014/main" id="{C912B127-9006-2475-358D-D9BA774A9413}"/>
+              </a:ext>
+            </a:extLst>
+          </p:cNvPr>
+          <p:cNvPicPr>
+            <a:picLocks noChangeAspect="1"/>
+          </p:cNvPicPr>
+          <p:nvPr/>
+        </p:nvPicPr>
+        <p:blipFill>
+          <a:blip r:embed="rId6">
+            <a:extLst>
+              <a:ext uri="{28A0092B-C50C-407E-A947-70E740481C1C}">
+                <a14:useLocalDpi xmlns:a14="http://schemas.microsoft.com/office/drawing/2010/main" val="0"/>
+              </a:ext>
+              <a:ext uri="{96DAC541-7B7A-43D3-8B79-37D633B846F1}">
+                <asvg:svgBlip xmlns:asvg="http://schemas.microsoft.com/office/drawing/2016/SVG/main" r:embed="rId7"/>
+              </a:ext>
+            </a:extLst>
+          </a:blip>
+          <a:stretch>
+            <a:fillRect/>
+          </a:stretch>
+        </p:blipFill>
+        <p:spPr>
+          <a:xfrm>
+            <a:off x="5683522" y="2982700"/>
+            <a:ext cx="382575" cy="382575"/>
+          </a:xfrm>
+          <a:prstGeom prst="rect">
+            <a:avLst/>
+          </a:prstGeom>
+        </p:spPr>
+      </p:pic>
+      <p:sp>
+        <p:nvSpPr>
+          <p:cNvPr id="17" name="ZoneTexte 16">
+            <a:extLst>
+              <a:ext uri="{FF2B5EF4-FFF2-40B4-BE49-F238E27FC236}">
+                <a16:creationId xmlns:a16="http://schemas.microsoft.com/office/drawing/2014/main" id="{54722831-7D4F-84F9-2575-CBF76C7F93C3}"/>
+              </a:ext>
+            </a:extLst>
+          </p:cNvPr>
+          <p:cNvSpPr txBox="1"/>
+          <p:nvPr/>
+        </p:nvSpPr>
+        <p:spPr>
+          <a:xfrm>
+            <a:off x="159604" y="3149831"/>
+            <a:ext cx="598561" cy="215444"/>
+          </a:xfrm>
+          <a:prstGeom prst="rect">
+            <a:avLst/>
+          </a:prstGeom>
+          <a:solidFill>
+            <a:schemeClr val="accent2">
+              <a:lumMod val="20000"/>
+              <a:lumOff val="80000"/>
+            </a:schemeClr>
+          </a:solidFill>
+          <a:ln w="3175">
+            <a:solidFill>
+              <a:schemeClr val="tx1"/>
+            </a:solidFill>
+          </a:ln>
+        </p:spPr>
+        <p:txBody>
+          <a:bodyPr wrap="square" rtlCol="0" anchor="ctr">
+            <a:spAutoFit/>
+          </a:bodyPr>
+          <a:lstStyle>
+            <a:defPPr marR="0" lvl="0" algn="l" rtl="0">
+              <a:lnSpc>
+                <a:spcPct val="100000"/>
+              </a:lnSpc>
+              <a:spcBef>
+                <a:spcPts val="0"/>
+              </a:spcBef>
+              <a:spcAft>
+                <a:spcPts val="0"/>
+              </a:spcAft>
+              <a:defRPr/>
+            </a:defPPr>
+            <a:lvl1pPr algn="ctr">
+              <a:defRPr sz="675">
+                <a:latin typeface="Courier New" panose="02070309020205020404" pitchFamily="49" charset="0"/>
+                <a:cs typeface="Courier New" panose="02070309020205020404" pitchFamily="49" charset="0"/>
+              </a:defRPr>
+            </a:lvl1pPr>
+          </a:lstStyle>
+          <a:p>
+            <a:r>
+              <a:rPr lang="fr-FR" sz="800" dirty="0"/>
+              <a:t>Data</a:t>
+            </a:r>
+          </a:p>
+        </p:txBody>
+      </p:sp>
+      <p:cxnSp>
+        <p:nvCxnSpPr>
+          <p:cNvPr id="21" name="Connecteur droit avec flèche 20">
+            <a:extLst>
+              <a:ext uri="{FF2B5EF4-FFF2-40B4-BE49-F238E27FC236}">
+                <a16:creationId xmlns:a16="http://schemas.microsoft.com/office/drawing/2014/main" id="{3E5CC60F-E55F-BB01-045D-DB2636F3D02F}"/>
+              </a:ext>
+            </a:extLst>
+          </p:cNvPr>
+          <p:cNvCxnSpPr>
+            <a:cxnSpLocks/>
+            <a:stCxn id="6" idx="3"/>
+          </p:cNvCxnSpPr>
+          <p:nvPr/>
+        </p:nvCxnSpPr>
+        <p:spPr>
+          <a:xfrm flipV="1">
+            <a:off x="2469219" y="2948139"/>
+            <a:ext cx="846859" cy="4772"/>
+          </a:xfrm>
+          <a:prstGeom prst="straightConnector1">
+            <a:avLst/>
+          </a:prstGeom>
+          <a:ln w="57150">
+            <a:headEnd type="triangle"/>
+            <a:tailEnd type="triangle"/>
+          </a:ln>
+        </p:spPr>
+        <p:style>
+          <a:lnRef idx="1">
+            <a:schemeClr val="accent1"/>
+          </a:lnRef>
+          <a:fillRef idx="0">
+            <a:schemeClr val="accent1"/>
+          </a:fillRef>
+          <a:effectRef idx="0">
+            <a:schemeClr val="accent1"/>
+          </a:effectRef>
+          <a:fontRef idx="minor">
+            <a:schemeClr val="tx1"/>
+          </a:fontRef>
+        </p:style>
+      </p:cxnSp>
+      <p:cxnSp>
+        <p:nvCxnSpPr>
+          <p:cNvPr id="23" name="Connecteur droit avec flèche 22">
+            <a:extLst>
+              <a:ext uri="{FF2B5EF4-FFF2-40B4-BE49-F238E27FC236}">
+                <a16:creationId xmlns:a16="http://schemas.microsoft.com/office/drawing/2014/main" id="{DE938E05-1E91-AB1C-333D-CBB158AF050C}"/>
+              </a:ext>
+            </a:extLst>
+          </p:cNvPr>
+          <p:cNvCxnSpPr>
+            <a:cxnSpLocks/>
+            <a:endCxn id="4" idx="1"/>
+          </p:cNvCxnSpPr>
+          <p:nvPr/>
+        </p:nvCxnSpPr>
+        <p:spPr>
+          <a:xfrm flipV="1">
+            <a:off x="5036210" y="2957264"/>
+            <a:ext cx="776318" cy="5170"/>
+          </a:xfrm>
+          <a:prstGeom prst="straightConnector1">
+            <a:avLst/>
+          </a:prstGeom>
+          <a:ln w="57150">
+            <a:headEnd type="none"/>
+            <a:tailEnd type="triangle"/>
+          </a:ln>
+        </p:spPr>
+        <p:style>
+          <a:lnRef idx="1">
+            <a:schemeClr val="accent1"/>
+          </a:lnRef>
+          <a:fillRef idx="0">
+            <a:schemeClr val="accent1"/>
+          </a:fillRef>
+          <a:effectRef idx="0">
+            <a:schemeClr val="accent1"/>
+          </a:effectRef>
+          <a:fontRef idx="minor">
+            <a:schemeClr val="tx1"/>
+          </a:fontRef>
+        </p:style>
+      </p:cxnSp>
+      <p:grpSp>
+        <p:nvGrpSpPr>
+          <p:cNvPr id="24" name="Groupe 23">
+            <a:extLst>
+              <a:ext uri="{FF2B5EF4-FFF2-40B4-BE49-F238E27FC236}">
+                <a16:creationId xmlns:a16="http://schemas.microsoft.com/office/drawing/2014/main" id="{877BD90E-61C7-545A-7D6C-41BFE296E3FA}"/>
+              </a:ext>
+            </a:extLst>
+          </p:cNvPr>
+          <p:cNvGrpSpPr/>
+          <p:nvPr/>
+        </p:nvGrpSpPr>
+        <p:grpSpPr>
+          <a:xfrm>
+            <a:off x="6025630" y="3935410"/>
+            <a:ext cx="685800" cy="685800"/>
+            <a:chOff x="3518477" y="2676206"/>
+            <a:chExt cx="685800" cy="685800"/>
+          </a:xfrm>
+        </p:grpSpPr>
+        <p:pic>
+          <p:nvPicPr>
+            <p:cNvPr id="25" name="Graphique 24" descr="Ordinateur avec un remplissage uni">
+              <a:extLst>
+                <a:ext uri="{FF2B5EF4-FFF2-40B4-BE49-F238E27FC236}">
+                  <a16:creationId xmlns:a16="http://schemas.microsoft.com/office/drawing/2014/main" id="{58B98C6B-4E84-6906-C69F-F03FE7557709}"/>
+                </a:ext>
+              </a:extLst>
+            </p:cNvPr>
+            <p:cNvPicPr>
+              <a:picLocks noChangeAspect="1"/>
+            </p:cNvPicPr>
+            <p:nvPr/>
+          </p:nvPicPr>
+          <p:blipFill>
+            <a:blip r:embed="rId4">
+              <a:extLst>
+                <a:ext uri="{28A0092B-C50C-407E-A947-70E740481C1C}">
+                  <a14:useLocalDpi xmlns:a14="http://schemas.microsoft.com/office/drawing/2010/main" val="0"/>
+                </a:ext>
+                <a:ext uri="{96DAC541-7B7A-43D3-8B79-37D633B846F1}">
+                  <asvg:svgBlip xmlns:asvg="http://schemas.microsoft.com/office/drawing/2016/SVG/main" r:embed="rId5"/>
+                </a:ext>
+              </a:extLst>
+            </a:blip>
+            <a:stretch>
+              <a:fillRect/>
+            </a:stretch>
+          </p:blipFill>
+          <p:spPr>
+            <a:xfrm>
+              <a:off x="3518477" y="2676206"/>
+              <a:ext cx="685800" cy="685800"/>
+            </a:xfrm>
+            <a:prstGeom prst="rect">
+              <a:avLst/>
+            </a:prstGeom>
+          </p:spPr>
+        </p:pic>
+        <p:pic>
+          <p:nvPicPr>
+            <p:cNvPr id="26" name="Image 25">
+              <a:extLst>
+                <a:ext uri="{FF2B5EF4-FFF2-40B4-BE49-F238E27FC236}">
+                  <a16:creationId xmlns:a16="http://schemas.microsoft.com/office/drawing/2014/main" id="{3C959D3F-A7DE-F337-430A-38BE1E9A400C}"/>
+                </a:ext>
+              </a:extLst>
+            </p:cNvPr>
+            <p:cNvPicPr>
+              <a:picLocks noChangeAspect="1"/>
+            </p:cNvPicPr>
+            <p:nvPr/>
+          </p:nvPicPr>
+          <p:blipFill>
+            <a:blip r:embed="rId8"/>
+            <a:stretch>
+              <a:fillRect/>
+            </a:stretch>
+          </p:blipFill>
+          <p:spPr>
+            <a:xfrm>
+              <a:off x="3594735" y="2860818"/>
+              <a:ext cx="305329" cy="228556"/>
+            </a:xfrm>
+            <a:prstGeom prst="rect">
+              <a:avLst/>
+            </a:prstGeom>
+          </p:spPr>
+        </p:pic>
+      </p:grpSp>
+      <p:cxnSp>
+        <p:nvCxnSpPr>
+          <p:cNvPr id="27" name="Connecteur droit avec flèche 26">
+            <a:extLst>
+              <a:ext uri="{FF2B5EF4-FFF2-40B4-BE49-F238E27FC236}">
+                <a16:creationId xmlns:a16="http://schemas.microsoft.com/office/drawing/2014/main" id="{064AB111-5E64-B0CE-170E-10ADD415D98D}"/>
+              </a:ext>
+            </a:extLst>
+          </p:cNvPr>
+          <p:cNvCxnSpPr>
+            <a:cxnSpLocks/>
+            <a:stCxn id="4" idx="2"/>
+          </p:cNvCxnSpPr>
+          <p:nvPr/>
+        </p:nvCxnSpPr>
+        <p:spPr>
+          <a:xfrm>
+            <a:off x="6246277" y="3391013"/>
+            <a:ext cx="6635" cy="650582"/>
+          </a:xfrm>
+          <a:prstGeom prst="straightConnector1">
+            <a:avLst/>
+          </a:prstGeom>
+          <a:ln w="57150">
+            <a:headEnd type="none"/>
+            <a:tailEnd type="triangle"/>
+          </a:ln>
+        </p:spPr>
+        <p:style>
+          <a:lnRef idx="1">
+            <a:schemeClr val="accent1"/>
+          </a:lnRef>
+          <a:fillRef idx="0">
+            <a:schemeClr val="accent1"/>
+          </a:fillRef>
+          <a:effectRef idx="0">
+            <a:schemeClr val="accent1"/>
+          </a:effectRef>
+          <a:fontRef idx="minor">
+            <a:schemeClr val="tx1"/>
+          </a:fontRef>
+        </p:style>
+      </p:cxnSp>
+      <p:pic>
+        <p:nvPicPr>
+          <p:cNvPr id="33" name="Graphique 32" descr="Ordinateur avec un remplissage uni">
+            <a:extLst>
+              <a:ext uri="{FF2B5EF4-FFF2-40B4-BE49-F238E27FC236}">
+                <a16:creationId xmlns:a16="http://schemas.microsoft.com/office/drawing/2014/main" id="{BCAC1AA9-5DC8-F914-5F46-7AB93D73E38B}"/>
+              </a:ext>
+            </a:extLst>
+          </p:cNvPr>
+          <p:cNvPicPr>
+            <a:picLocks noChangeAspect="1"/>
+          </p:cNvPicPr>
+          <p:nvPr/>
+        </p:nvPicPr>
+        <p:blipFill>
+          <a:blip r:embed="rId4">
+            <a:extLst>
+              <a:ext uri="{28A0092B-C50C-407E-A947-70E740481C1C}">
+                <a14:useLocalDpi xmlns:a14="http://schemas.microsoft.com/office/drawing/2010/main" val="0"/>
+              </a:ext>
+              <a:ext uri="{96DAC541-7B7A-43D3-8B79-37D633B846F1}">
+                <asvg:svgBlip xmlns:asvg="http://schemas.microsoft.com/office/drawing/2016/SVG/main" r:embed="rId5"/>
+              </a:ext>
+            </a:extLst>
+          </a:blip>
+          <a:stretch>
+            <a:fillRect/>
+          </a:stretch>
+        </p:blipFill>
+        <p:spPr>
+          <a:xfrm>
+            <a:off x="7684140" y="2612419"/>
+            <a:ext cx="685800" cy="685800"/>
+          </a:xfrm>
+          <a:prstGeom prst="rect">
+            <a:avLst/>
+          </a:prstGeom>
+        </p:spPr>
+      </p:pic>
+      <p:cxnSp>
+        <p:nvCxnSpPr>
+          <p:cNvPr id="38" name="Connecteur droit avec flèche 37">
+            <a:extLst>
+              <a:ext uri="{FF2B5EF4-FFF2-40B4-BE49-F238E27FC236}">
+                <a16:creationId xmlns:a16="http://schemas.microsoft.com/office/drawing/2014/main" id="{F912D15A-4AC2-F142-7374-BF328BB1026B}"/>
+              </a:ext>
+            </a:extLst>
+          </p:cNvPr>
+          <p:cNvCxnSpPr>
+            <a:cxnSpLocks/>
+            <a:stCxn id="4" idx="3"/>
+            <a:endCxn id="33" idx="1"/>
+          </p:cNvCxnSpPr>
+          <p:nvPr/>
+        </p:nvCxnSpPr>
+        <p:spPr>
+          <a:xfrm flipV="1">
+            <a:off x="6680026" y="2955319"/>
+            <a:ext cx="1004114" cy="1945"/>
+          </a:xfrm>
+          <a:prstGeom prst="straightConnector1">
+            <a:avLst/>
+          </a:prstGeom>
+          <a:ln w="57150">
+            <a:headEnd type="triangle"/>
+            <a:tailEnd type="triangle"/>
+          </a:ln>
+        </p:spPr>
+        <p:style>
+          <a:lnRef idx="1">
+            <a:schemeClr val="accent1"/>
+          </a:lnRef>
+          <a:fillRef idx="0">
+            <a:schemeClr val="accent1"/>
+          </a:fillRef>
+          <a:effectRef idx="0">
+            <a:schemeClr val="accent1"/>
+          </a:effectRef>
+          <a:fontRef idx="minor">
+            <a:schemeClr val="tx1"/>
+          </a:fontRef>
+        </p:style>
+      </p:cxnSp>
+      <p:sp>
+        <p:nvSpPr>
+          <p:cNvPr id="48" name="ZoneTexte 47">
+            <a:extLst>
+              <a:ext uri="{FF2B5EF4-FFF2-40B4-BE49-F238E27FC236}">
+                <a16:creationId xmlns:a16="http://schemas.microsoft.com/office/drawing/2014/main" id="{AD104111-C094-DC8C-EF93-9A384BCC4DAA}"/>
+              </a:ext>
+            </a:extLst>
+          </p:cNvPr>
+          <p:cNvSpPr txBox="1"/>
+          <p:nvPr/>
+        </p:nvSpPr>
+        <p:spPr>
+          <a:xfrm>
+            <a:off x="6886373" y="3000946"/>
+            <a:ext cx="605389" cy="184666"/>
+          </a:xfrm>
+          <a:prstGeom prst="rect">
+            <a:avLst/>
+          </a:prstGeom>
+          <a:solidFill>
+            <a:schemeClr val="accent6"/>
+          </a:solidFill>
+          <a:ln w="3175">
+            <a:solidFill>
+              <a:schemeClr val="tx1"/>
+            </a:solidFill>
+          </a:ln>
+        </p:spPr>
+        <p:txBody>
+          <a:bodyPr wrap="square" rtlCol="0" anchor="ctr">
+            <a:spAutoFit/>
+          </a:bodyPr>
+          <a:lstStyle>
+            <a:defPPr marR="0" lvl="0" algn="l" rtl="0">
+              <a:lnSpc>
+                <a:spcPct val="100000"/>
+              </a:lnSpc>
+              <a:spcBef>
+                <a:spcPts val="0"/>
+              </a:spcBef>
+              <a:spcAft>
+                <a:spcPts val="0"/>
+              </a:spcAft>
+              <a:defRPr/>
+            </a:defPPr>
+            <a:lvl1pPr algn="ctr">
+              <a:defRPr sz="675">
+                <a:latin typeface="Courier New" panose="02070309020205020404" pitchFamily="49" charset="0"/>
+                <a:cs typeface="Courier New" panose="02070309020205020404" pitchFamily="49" charset="0"/>
+              </a:defRPr>
+            </a:lvl1pPr>
+          </a:lstStyle>
+          <a:p>
+            <a:r>
+              <a:rPr lang="fr-FR" sz="600" dirty="0" err="1"/>
+              <a:t>predict</a:t>
+            </a:r>
+            <a:r>
+              <a:rPr lang="fr-FR" sz="600" dirty="0"/>
+              <a:t>()</a:t>
+            </a:r>
+          </a:p>
+        </p:txBody>
+      </p:sp>
+      <p:grpSp>
+        <p:nvGrpSpPr>
+          <p:cNvPr id="1031" name="Groupe 1030">
+            <a:extLst>
+              <a:ext uri="{FF2B5EF4-FFF2-40B4-BE49-F238E27FC236}">
+                <a16:creationId xmlns:a16="http://schemas.microsoft.com/office/drawing/2014/main" id="{27408B37-7571-659D-5374-18E36A087DF5}"/>
+              </a:ext>
+            </a:extLst>
+          </p:cNvPr>
+          <p:cNvGrpSpPr/>
+          <p:nvPr/>
+        </p:nvGrpSpPr>
+        <p:grpSpPr>
+          <a:xfrm>
+            <a:off x="1523737" y="3421814"/>
+            <a:ext cx="952035" cy="668334"/>
+            <a:chOff x="1918907" y="2319014"/>
+            <a:chExt cx="952035" cy="668334"/>
+          </a:xfrm>
+        </p:grpSpPr>
+        <p:sp>
+          <p:nvSpPr>
+            <p:cNvPr id="10" name="Rectangle 9">
+              <a:extLst>
+                <a:ext uri="{FF2B5EF4-FFF2-40B4-BE49-F238E27FC236}">
+                  <a16:creationId xmlns:a16="http://schemas.microsoft.com/office/drawing/2014/main" id="{74915136-7F52-0861-8BFB-648DDFFB0CDE}"/>
+                </a:ext>
+              </a:extLst>
+            </p:cNvPr>
+            <p:cNvSpPr/>
+            <p:nvPr/>
+          </p:nvSpPr>
+          <p:spPr>
+            <a:xfrm>
+              <a:off x="1918907" y="2533806"/>
+              <a:ext cx="951105" cy="220526"/>
+            </a:xfrm>
+            <a:prstGeom prst="rect">
+              <a:avLst/>
+            </a:prstGeom>
+            <a:solidFill>
+              <a:schemeClr val="accent4">
+                <a:lumMod val="20000"/>
+                <a:lumOff val="80000"/>
+              </a:schemeClr>
+            </a:solidFill>
+            <a:ln w="3175"/>
+          </p:spPr>
+          <p:style>
+            <a:lnRef idx="2">
+              <a:schemeClr val="accent1">
+                <a:shade val="15000"/>
+              </a:schemeClr>
+            </a:lnRef>
+            <a:fillRef idx="1">
+              <a:schemeClr val="accent1"/>
+            </a:fillRef>
+            <a:effectRef idx="0">
+              <a:schemeClr val="accent1"/>
+            </a:effectRef>
+            <a:fontRef idx="minor">
+              <a:schemeClr val="lt1"/>
+            </a:fontRef>
+          </p:style>
+          <p:txBody>
+            <a:bodyPr rtlCol="0" anchor="ctr"/>
+            <a:lstStyle/>
+            <a:p>
+              <a:pPr algn="ctr"/>
+              <a:r>
+                <a:rPr lang="fr-FR" sz="800" dirty="0">
+                  <a:solidFill>
+                    <a:schemeClr val="tx1"/>
+                  </a:solidFill>
+                  <a:latin typeface="Courier New" panose="02070309020205020404" pitchFamily="49" charset="0"/>
+                  <a:cs typeface="Courier New" panose="02070309020205020404" pitchFamily="49" charset="0"/>
+                </a:rPr>
+                <a:t>S3</a:t>
+              </a:r>
+            </a:p>
+          </p:txBody>
+        </p:sp>
+        <p:sp>
+          <p:nvSpPr>
+            <p:cNvPr id="11" name="ZoneTexte 10">
+              <a:extLst>
+                <a:ext uri="{FF2B5EF4-FFF2-40B4-BE49-F238E27FC236}">
+                  <a16:creationId xmlns:a16="http://schemas.microsoft.com/office/drawing/2014/main" id="{79E35FDB-22AC-7F4D-2AE0-1F1272A4399D}"/>
+                </a:ext>
+              </a:extLst>
+            </p:cNvPr>
+            <p:cNvSpPr txBox="1"/>
+            <p:nvPr/>
+          </p:nvSpPr>
+          <p:spPr>
+            <a:xfrm>
+              <a:off x="1918908" y="2319014"/>
+              <a:ext cx="951105" cy="215444"/>
+            </a:xfrm>
+            <a:prstGeom prst="rect">
+              <a:avLst/>
+            </a:prstGeom>
+            <a:solidFill>
+              <a:schemeClr val="accent2">
+                <a:lumMod val="20000"/>
+                <a:lumOff val="80000"/>
+              </a:schemeClr>
+            </a:solidFill>
+            <a:ln w="3175">
+              <a:solidFill>
+                <a:schemeClr val="tx1"/>
+              </a:solidFill>
+            </a:ln>
+          </p:spPr>
+          <p:txBody>
+            <a:bodyPr wrap="square" rtlCol="0" anchor="ctr">
+              <a:spAutoFit/>
+            </a:bodyPr>
+            <a:lstStyle>
+              <a:defPPr marR="0" lvl="0" algn="l" rtl="0">
+                <a:lnSpc>
+                  <a:spcPct val="100000"/>
+                </a:lnSpc>
+                <a:spcBef>
+                  <a:spcPts val="0"/>
+                </a:spcBef>
+                <a:spcAft>
+                  <a:spcPts val="0"/>
+                </a:spcAft>
+                <a:defRPr/>
+              </a:defPPr>
+              <a:lvl1pPr algn="ctr">
+                <a:defRPr sz="675">
+                  <a:latin typeface="Courier New" panose="02070309020205020404" pitchFamily="49" charset="0"/>
+                  <a:cs typeface="Courier New" panose="02070309020205020404" pitchFamily="49" charset="0"/>
+                </a:defRPr>
+              </a:lvl1pPr>
+            </a:lstStyle>
+            <a:p>
+              <a:r>
+                <a:rPr lang="fr-FR" sz="800" dirty="0" err="1"/>
+                <a:t>Storing</a:t>
+              </a:r>
+              <a:endParaRPr lang="fr-FR" sz="800" dirty="0"/>
+            </a:p>
+          </p:txBody>
+        </p:sp>
+        <p:sp>
+          <p:nvSpPr>
+            <p:cNvPr id="52" name="ZoneTexte 51">
+              <a:extLst>
+                <a:ext uri="{FF2B5EF4-FFF2-40B4-BE49-F238E27FC236}">
+                  <a16:creationId xmlns:a16="http://schemas.microsoft.com/office/drawing/2014/main" id="{399C0156-77B2-724E-58C3-CB80A7A69061}"/>
+                </a:ext>
+              </a:extLst>
+            </p:cNvPr>
+            <p:cNvSpPr txBox="1"/>
+            <p:nvPr/>
+          </p:nvSpPr>
+          <p:spPr>
+            <a:xfrm>
+              <a:off x="2570860" y="2771904"/>
+              <a:ext cx="300082" cy="215444"/>
+            </a:xfrm>
+            <a:prstGeom prst="rect">
+              <a:avLst/>
+            </a:prstGeom>
+            <a:solidFill>
+              <a:srgbClr val="C00000"/>
+            </a:solidFill>
+          </p:spPr>
+          <p:txBody>
+            <a:bodyPr wrap="none" rtlCol="0">
+              <a:spAutoFit/>
+            </a:bodyPr>
+            <a:lstStyle/>
+            <a:p>
+              <a:r>
+                <a:rPr lang="fr-FR" sz="800" dirty="0">
+                  <a:solidFill>
+                    <a:schemeClr val="bg1">
+                      <a:lumMod val="95000"/>
+                    </a:schemeClr>
+                  </a:solidFill>
+                </a:rPr>
+                <a:t>01</a:t>
+              </a:r>
+            </a:p>
+          </p:txBody>
+        </p:sp>
+      </p:grpSp>
+      <p:grpSp>
+        <p:nvGrpSpPr>
+          <p:cNvPr id="1036" name="Groupe 1035">
+            <a:extLst>
+              <a:ext uri="{FF2B5EF4-FFF2-40B4-BE49-F238E27FC236}">
+                <a16:creationId xmlns:a16="http://schemas.microsoft.com/office/drawing/2014/main" id="{4A82B162-DEFD-9CB7-B60A-A8E228E98432}"/>
+              </a:ext>
+            </a:extLst>
+          </p:cNvPr>
+          <p:cNvGrpSpPr/>
+          <p:nvPr/>
+        </p:nvGrpSpPr>
+        <p:grpSpPr>
+          <a:xfrm>
+            <a:off x="6375362" y="3826151"/>
+            <a:ext cx="806668" cy="452159"/>
+            <a:chOff x="6098300" y="4266528"/>
+            <a:chExt cx="806668" cy="452159"/>
+          </a:xfrm>
+        </p:grpSpPr>
+        <p:sp>
+          <p:nvSpPr>
+            <p:cNvPr id="31" name="ZoneTexte 30">
+              <a:extLst>
+                <a:ext uri="{FF2B5EF4-FFF2-40B4-BE49-F238E27FC236}">
+                  <a16:creationId xmlns:a16="http://schemas.microsoft.com/office/drawing/2014/main" id="{411D03E1-FE63-49A3-4D06-E97A1449DFC3}"/>
+                </a:ext>
+              </a:extLst>
+            </p:cNvPr>
+            <p:cNvSpPr txBox="1"/>
+            <p:nvPr/>
+          </p:nvSpPr>
+          <p:spPr>
+            <a:xfrm>
+              <a:off x="6098300" y="4266528"/>
+              <a:ext cx="802073" cy="215444"/>
+            </a:xfrm>
+            <a:prstGeom prst="rect">
+              <a:avLst/>
+            </a:prstGeom>
+            <a:solidFill>
+              <a:schemeClr val="accent2">
+                <a:lumMod val="20000"/>
+                <a:lumOff val="80000"/>
+              </a:schemeClr>
+            </a:solidFill>
+            <a:ln w="3175">
+              <a:solidFill>
+                <a:schemeClr val="tx1"/>
+              </a:solidFill>
+            </a:ln>
+          </p:spPr>
+          <p:txBody>
+            <a:bodyPr wrap="square" rtlCol="0" anchor="ctr">
+              <a:spAutoFit/>
+            </a:bodyPr>
+            <a:lstStyle>
+              <a:defPPr marR="0" lvl="0" algn="l" rtl="0">
+                <a:lnSpc>
+                  <a:spcPct val="100000"/>
+                </a:lnSpc>
+                <a:spcBef>
+                  <a:spcPts val="0"/>
+                </a:spcBef>
+                <a:spcAft>
+                  <a:spcPts val="0"/>
+                </a:spcAft>
+              </a:defPPr>
+              <a:lvl1pPr algn="ctr">
+                <a:defRPr sz="675">
+                  <a:latin typeface="Courier New" panose="02070309020205020404" pitchFamily="49" charset="0"/>
+                  <a:cs typeface="Courier New" panose="02070309020205020404" pitchFamily="49" charset="0"/>
+                </a:defRPr>
+              </a:lvl1pPr>
+            </a:lstStyle>
+            <a:p>
+              <a:r>
+                <a:rPr lang="fr-FR" sz="800" dirty="0"/>
+                <a:t>Monitoring</a:t>
+              </a:r>
+            </a:p>
+          </p:txBody>
+        </p:sp>
+        <p:sp>
+          <p:nvSpPr>
+            <p:cNvPr id="2" name="ZoneTexte 1">
+              <a:extLst>
+                <a:ext uri="{FF2B5EF4-FFF2-40B4-BE49-F238E27FC236}">
+                  <a16:creationId xmlns:a16="http://schemas.microsoft.com/office/drawing/2014/main" id="{7FB152FA-6981-EA90-83A1-41DAFE3270F3}"/>
+                </a:ext>
+              </a:extLst>
+            </p:cNvPr>
+            <p:cNvSpPr txBox="1"/>
+            <p:nvPr/>
+          </p:nvSpPr>
+          <p:spPr>
+            <a:xfrm>
+              <a:off x="6604886" y="4503243"/>
+              <a:ext cx="300082" cy="215444"/>
+            </a:xfrm>
+            <a:prstGeom prst="rect">
+              <a:avLst/>
+            </a:prstGeom>
+            <a:solidFill>
+              <a:srgbClr val="C00000"/>
+            </a:solidFill>
+          </p:spPr>
+          <p:txBody>
+            <a:bodyPr wrap="none" rtlCol="0">
+              <a:spAutoFit/>
+            </a:bodyPr>
+            <a:lstStyle/>
+            <a:p>
+              <a:r>
+                <a:rPr lang="fr-FR" sz="800" dirty="0">
+                  <a:solidFill>
+                    <a:schemeClr val="bg1">
+                      <a:lumMod val="95000"/>
+                    </a:schemeClr>
+                  </a:solidFill>
+                </a:rPr>
+                <a:t>04</a:t>
+              </a:r>
+            </a:p>
+          </p:txBody>
+        </p:sp>
+      </p:grpSp>
+      <p:grpSp>
+        <p:nvGrpSpPr>
+          <p:cNvPr id="1027" name="Groupe 1026">
+            <a:extLst>
+              <a:ext uri="{FF2B5EF4-FFF2-40B4-BE49-F238E27FC236}">
+                <a16:creationId xmlns:a16="http://schemas.microsoft.com/office/drawing/2014/main" id="{9C71DFE7-C00D-9221-C068-D6B6C4D74F1C}"/>
+              </a:ext>
+            </a:extLst>
+          </p:cNvPr>
+          <p:cNvGrpSpPr/>
+          <p:nvPr/>
+        </p:nvGrpSpPr>
+        <p:grpSpPr>
+          <a:xfrm>
+            <a:off x="4253107" y="881702"/>
+            <a:ext cx="1124235" cy="884664"/>
+            <a:chOff x="4082059" y="570089"/>
+            <a:chExt cx="1124235" cy="884664"/>
+          </a:xfrm>
+        </p:grpSpPr>
+        <p:sp>
+          <p:nvSpPr>
+            <p:cNvPr id="45" name="Rectangle 44">
+              <a:extLst>
+                <a:ext uri="{FF2B5EF4-FFF2-40B4-BE49-F238E27FC236}">
+                  <a16:creationId xmlns:a16="http://schemas.microsoft.com/office/drawing/2014/main" id="{B7EC46BE-0F3E-CD8B-03B9-18067334CF89}"/>
+                </a:ext>
+              </a:extLst>
+            </p:cNvPr>
+            <p:cNvSpPr/>
+            <p:nvPr/>
+          </p:nvSpPr>
+          <p:spPr>
+            <a:xfrm>
+              <a:off x="4082060" y="785799"/>
+              <a:ext cx="1115164" cy="220526"/>
+            </a:xfrm>
+            <a:prstGeom prst="rect">
+              <a:avLst/>
+            </a:prstGeom>
+            <a:solidFill>
+              <a:schemeClr val="accent4">
+                <a:lumMod val="20000"/>
+                <a:lumOff val="80000"/>
+              </a:schemeClr>
+            </a:solidFill>
+            <a:ln w="3175"/>
+          </p:spPr>
+          <p:style>
+            <a:lnRef idx="2">
+              <a:schemeClr val="accent1">
+                <a:shade val="15000"/>
+              </a:schemeClr>
+            </a:lnRef>
+            <a:fillRef idx="1">
+              <a:schemeClr val="accent1"/>
+            </a:fillRef>
+            <a:effectRef idx="0">
+              <a:schemeClr val="accent1"/>
+            </a:effectRef>
+            <a:fontRef idx="minor">
+              <a:schemeClr val="lt1"/>
+            </a:fontRef>
+          </p:style>
+          <p:txBody>
+            <a:bodyPr rtlCol="0" anchor="ctr"/>
+            <a:lstStyle/>
+            <a:p>
+              <a:pPr algn="ctr"/>
+              <a:r>
+                <a:rPr lang="fr-FR" sz="800" dirty="0">
+                  <a:solidFill>
+                    <a:schemeClr val="tx1"/>
+                  </a:solidFill>
+                  <a:latin typeface="Courier New" panose="02070309020205020404" pitchFamily="49" charset="0"/>
+                  <a:cs typeface="Courier New" panose="02070309020205020404" pitchFamily="49" charset="0"/>
+                </a:rPr>
+                <a:t>EC2 </a:t>
+              </a:r>
+              <a:r>
+                <a:rPr lang="fr-FR" sz="800" dirty="0" err="1">
+                  <a:solidFill>
+                    <a:schemeClr val="tx1"/>
+                  </a:solidFill>
+                  <a:latin typeface="Courier New" panose="02070309020205020404" pitchFamily="49" charset="0"/>
+                  <a:cs typeface="Courier New" panose="02070309020205020404" pitchFamily="49" charset="0"/>
+                </a:rPr>
+                <a:t>others</a:t>
+              </a:r>
+              <a:endParaRPr lang="fr-FR" sz="800" dirty="0">
+                <a:solidFill>
+                  <a:schemeClr val="tx1"/>
+                </a:solidFill>
+                <a:latin typeface="Courier New" panose="02070309020205020404" pitchFamily="49" charset="0"/>
+                <a:cs typeface="Courier New" panose="02070309020205020404" pitchFamily="49" charset="0"/>
+              </a:endParaRPr>
+            </a:p>
+          </p:txBody>
+        </p:sp>
+        <p:sp>
+          <p:nvSpPr>
+            <p:cNvPr id="49" name="ZoneTexte 48">
+              <a:extLst>
+                <a:ext uri="{FF2B5EF4-FFF2-40B4-BE49-F238E27FC236}">
+                  <a16:creationId xmlns:a16="http://schemas.microsoft.com/office/drawing/2014/main" id="{E0D268CB-4B06-33FC-48AF-159E508BF0C9}"/>
+                </a:ext>
+              </a:extLst>
+            </p:cNvPr>
+            <p:cNvSpPr txBox="1"/>
+            <p:nvPr/>
+          </p:nvSpPr>
+          <p:spPr>
+            <a:xfrm>
+              <a:off x="4082059" y="1005412"/>
+              <a:ext cx="1115164" cy="215444"/>
+            </a:xfrm>
+            <a:prstGeom prst="rect">
+              <a:avLst/>
+            </a:prstGeom>
+            <a:solidFill>
+              <a:schemeClr val="accent5">
+                <a:lumMod val="20000"/>
+                <a:lumOff val="80000"/>
+              </a:schemeClr>
+            </a:solidFill>
+            <a:ln w="3175">
+              <a:solidFill>
+                <a:schemeClr val="tx1"/>
+              </a:solidFill>
+            </a:ln>
+          </p:spPr>
+          <p:txBody>
+            <a:bodyPr wrap="square" rtlCol="0">
+              <a:spAutoFit/>
+            </a:bodyPr>
+            <a:lstStyle>
+              <a:defPPr marR="0" lvl="0" algn="l" rtl="0">
+                <a:lnSpc>
+                  <a:spcPct val="100000"/>
+                </a:lnSpc>
+                <a:spcBef>
+                  <a:spcPts val="0"/>
+                </a:spcBef>
+                <a:spcAft>
+                  <a:spcPts val="0"/>
+                </a:spcAft>
+              </a:defPPr>
+              <a:lvl1pPr>
+                <a:defRPr sz="800">
+                  <a:latin typeface="Courier New" panose="02070309020205020404" pitchFamily="49" charset="0"/>
+                  <a:cs typeface="Courier New" panose="02070309020205020404" pitchFamily="49" charset="0"/>
+                </a:defRPr>
+              </a:lvl1pPr>
+            </a:lstStyle>
+            <a:p>
+              <a:r>
+                <a:rPr lang="fr-FR" dirty="0" err="1"/>
+                <a:t>MLFlow</a:t>
+              </a:r>
+              <a:r>
+                <a:rPr lang="fr-FR" dirty="0"/>
+                <a:t> </a:t>
+              </a:r>
+              <a:r>
+                <a:rPr lang="fr-FR" dirty="0" err="1"/>
+                <a:t>projects</a:t>
+              </a:r>
+              <a:endParaRPr lang="fr-FR" dirty="0"/>
+            </a:p>
+          </p:txBody>
+        </p:sp>
+        <p:sp>
+          <p:nvSpPr>
+            <p:cNvPr id="53" name="ZoneTexte 52">
+              <a:extLst>
+                <a:ext uri="{FF2B5EF4-FFF2-40B4-BE49-F238E27FC236}">
+                  <a16:creationId xmlns:a16="http://schemas.microsoft.com/office/drawing/2014/main" id="{F94A7B61-E32A-5176-ACAA-204F079BF9F1}"/>
+                </a:ext>
+              </a:extLst>
+            </p:cNvPr>
+            <p:cNvSpPr txBox="1"/>
+            <p:nvPr/>
+          </p:nvSpPr>
+          <p:spPr>
+            <a:xfrm>
+              <a:off x="4906212" y="1239309"/>
+              <a:ext cx="300082" cy="215444"/>
+            </a:xfrm>
+            <a:prstGeom prst="rect">
+              <a:avLst/>
+            </a:prstGeom>
+            <a:solidFill>
+              <a:srgbClr val="C00000"/>
+            </a:solidFill>
+          </p:spPr>
+          <p:txBody>
+            <a:bodyPr wrap="none" rtlCol="0">
+              <a:spAutoFit/>
+            </a:bodyPr>
+            <a:lstStyle/>
+            <a:p>
+              <a:r>
+                <a:rPr lang="fr-FR" sz="800" dirty="0">
+                  <a:solidFill>
+                    <a:schemeClr val="bg1">
+                      <a:lumMod val="95000"/>
+                    </a:schemeClr>
+                  </a:solidFill>
+                </a:rPr>
+                <a:t>02</a:t>
+              </a:r>
+            </a:p>
+          </p:txBody>
+        </p:sp>
+        <p:sp>
+          <p:nvSpPr>
+            <p:cNvPr id="15" name="ZoneTexte 14">
+              <a:extLst>
+                <a:ext uri="{FF2B5EF4-FFF2-40B4-BE49-F238E27FC236}">
+                  <a16:creationId xmlns:a16="http://schemas.microsoft.com/office/drawing/2014/main" id="{85B6C5E1-6C57-B98B-0DA8-28B9893D188A}"/>
+                </a:ext>
+              </a:extLst>
+            </p:cNvPr>
+            <p:cNvSpPr txBox="1"/>
+            <p:nvPr/>
+          </p:nvSpPr>
+          <p:spPr>
+            <a:xfrm>
+              <a:off x="4082059" y="570089"/>
+              <a:ext cx="1115164" cy="215444"/>
+            </a:xfrm>
+            <a:prstGeom prst="rect">
+              <a:avLst/>
+            </a:prstGeom>
+            <a:solidFill>
+              <a:schemeClr val="accent2">
+                <a:lumMod val="20000"/>
+                <a:lumOff val="80000"/>
+              </a:schemeClr>
+            </a:solidFill>
+            <a:ln w="3175">
+              <a:solidFill>
+                <a:schemeClr val="tx1"/>
+              </a:solidFill>
+            </a:ln>
+          </p:spPr>
+          <p:txBody>
+            <a:bodyPr wrap="square" rtlCol="0" anchor="ctr">
+              <a:spAutoFit/>
+            </a:bodyPr>
+            <a:lstStyle>
+              <a:defPPr marR="0" lvl="0" algn="l" rtl="0">
+                <a:lnSpc>
+                  <a:spcPct val="100000"/>
+                </a:lnSpc>
+                <a:spcBef>
+                  <a:spcPts val="0"/>
+                </a:spcBef>
+                <a:spcAft>
+                  <a:spcPts val="0"/>
+                </a:spcAft>
+                <a:defRPr/>
+              </a:defPPr>
+              <a:lvl1pPr algn="ctr">
+                <a:defRPr sz="675">
+                  <a:latin typeface="Courier New" panose="02070309020205020404" pitchFamily="49" charset="0"/>
+                  <a:cs typeface="Courier New" panose="02070309020205020404" pitchFamily="49" charset="0"/>
+                </a:defRPr>
+              </a:lvl1pPr>
+            </a:lstStyle>
+            <a:p>
+              <a:r>
+                <a:rPr lang="fr-FR" sz="800" dirty="0"/>
+                <a:t>Training</a:t>
+              </a:r>
+            </a:p>
+          </p:txBody>
+        </p:sp>
+      </p:grpSp>
+      <p:pic>
+        <p:nvPicPr>
+          <p:cNvPr id="47" name="Graphique 46" descr="Nuage avec un remplissage uni">
+            <a:extLst>
+              <a:ext uri="{FF2B5EF4-FFF2-40B4-BE49-F238E27FC236}">
+                <a16:creationId xmlns:a16="http://schemas.microsoft.com/office/drawing/2014/main" id="{EAA36F96-0FAE-1D0A-E12A-AA22913FAB08}"/>
+              </a:ext>
+            </a:extLst>
+          </p:cNvPr>
+          <p:cNvPicPr>
+            <a:picLocks noChangeAspect="1"/>
+          </p:cNvPicPr>
+          <p:nvPr/>
+        </p:nvPicPr>
+        <p:blipFill>
+          <a:blip r:embed="rId9">
+            <a:extLst>
+              <a:ext uri="{96DAC541-7B7A-43D3-8B79-37D633B846F1}">
+                <asvg:svgBlip xmlns:asvg="http://schemas.microsoft.com/office/drawing/2016/SVG/main" r:embed="rId10"/>
+              </a:ext>
+            </a:extLst>
+          </a:blip>
+          <a:stretch>
+            <a:fillRect/>
+          </a:stretch>
+        </p:blipFill>
+        <p:spPr>
+          <a:xfrm>
+            <a:off x="149634" y="2615657"/>
+            <a:ext cx="664963" cy="664963"/>
+          </a:xfrm>
+          <a:prstGeom prst="rect">
+            <a:avLst/>
+          </a:prstGeom>
+        </p:spPr>
+      </p:pic>
+      <p:grpSp>
+        <p:nvGrpSpPr>
+          <p:cNvPr id="56" name="Groupe 55">
+            <a:extLst>
+              <a:ext uri="{FF2B5EF4-FFF2-40B4-BE49-F238E27FC236}">
+                <a16:creationId xmlns:a16="http://schemas.microsoft.com/office/drawing/2014/main" id="{2C2DF18E-AC16-43EF-C64A-8E7B5B3DB147}"/>
+              </a:ext>
+            </a:extLst>
+          </p:cNvPr>
+          <p:cNvGrpSpPr/>
+          <p:nvPr/>
+        </p:nvGrpSpPr>
+        <p:grpSpPr>
+          <a:xfrm rot="20850387">
+            <a:off x="4744057" y="3663044"/>
+            <a:ext cx="1037697" cy="1016278"/>
+            <a:chOff x="700951" y="3221919"/>
+            <a:chExt cx="1037697" cy="1016278"/>
+          </a:xfrm>
+          <a:solidFill>
+            <a:srgbClr val="C00000"/>
+          </a:solidFill>
+        </p:grpSpPr>
+        <p:pic>
+          <p:nvPicPr>
+            <p:cNvPr id="54" name="Graphique 53" descr="Ligne fléchée : faire pivoter à droite avec un remplissage uni">
+              <a:extLst>
+                <a:ext uri="{FF2B5EF4-FFF2-40B4-BE49-F238E27FC236}">
+                  <a16:creationId xmlns:a16="http://schemas.microsoft.com/office/drawing/2014/main" id="{9A92D136-E70E-C007-E650-A2D70CD4F353}"/>
+                </a:ext>
+              </a:extLst>
+            </p:cNvPr>
+            <p:cNvPicPr>
+              <a:picLocks noChangeAspect="1"/>
+            </p:cNvPicPr>
+            <p:nvPr/>
+          </p:nvPicPr>
+          <p:blipFill>
+            <a:blip r:embed="rId11">
+              <a:extLst>
+                <a:ext uri="{96DAC541-7B7A-43D3-8B79-37D633B846F1}">
+                  <asvg:svgBlip xmlns:asvg="http://schemas.microsoft.com/office/drawing/2016/SVG/main" r:embed="rId12"/>
+                </a:ext>
+              </a:extLst>
+            </a:blip>
+            <a:stretch>
+              <a:fillRect/>
+            </a:stretch>
+          </p:blipFill>
+          <p:spPr>
+            <a:xfrm>
+              <a:off x="824248" y="3221919"/>
+              <a:ext cx="914400" cy="914400"/>
+            </a:xfrm>
+            <a:prstGeom prst="rect">
+              <a:avLst/>
+            </a:prstGeom>
+          </p:spPr>
+        </p:pic>
+        <p:pic>
+          <p:nvPicPr>
+            <p:cNvPr id="55" name="Graphique 54" descr="Ligne fléchée : faire pivoter à droite avec un remplissage uni">
+              <a:extLst>
+                <a:ext uri="{FF2B5EF4-FFF2-40B4-BE49-F238E27FC236}">
+                  <a16:creationId xmlns:a16="http://schemas.microsoft.com/office/drawing/2014/main" id="{C063199A-312E-B148-3C65-8FAC334CC405}"/>
+                </a:ext>
+              </a:extLst>
+            </p:cNvPr>
+            <p:cNvPicPr>
+              <a:picLocks noChangeAspect="1"/>
+            </p:cNvPicPr>
+            <p:nvPr/>
+          </p:nvPicPr>
+          <p:blipFill>
+            <a:blip r:embed="rId11">
+              <a:extLst>
+                <a:ext uri="{96DAC541-7B7A-43D3-8B79-37D633B846F1}">
+                  <asvg:svgBlip xmlns:asvg="http://schemas.microsoft.com/office/drawing/2016/SVG/main" r:embed="rId12"/>
+                </a:ext>
+              </a:extLst>
+            </a:blip>
+            <a:stretch>
+              <a:fillRect/>
+            </a:stretch>
+          </p:blipFill>
+          <p:spPr>
+            <a:xfrm rot="10331277">
+              <a:off x="700951" y="3323797"/>
+              <a:ext cx="914400" cy="914400"/>
+            </a:xfrm>
+            <a:prstGeom prst="rect">
+              <a:avLst/>
+            </a:prstGeom>
+          </p:spPr>
+        </p:pic>
+      </p:grpSp>
+      <p:sp>
+        <p:nvSpPr>
+          <p:cNvPr id="57" name="ZoneTexte 56">
+            <a:extLst>
+              <a:ext uri="{FF2B5EF4-FFF2-40B4-BE49-F238E27FC236}">
+                <a16:creationId xmlns:a16="http://schemas.microsoft.com/office/drawing/2014/main" id="{42D4720D-D86B-CDF4-BA54-47094D836E44}"/>
+              </a:ext>
+            </a:extLst>
+          </p:cNvPr>
+          <p:cNvSpPr txBox="1"/>
+          <p:nvPr/>
+        </p:nvSpPr>
+        <p:spPr>
+          <a:xfrm>
+            <a:off x="5263911" y="4401866"/>
+            <a:ext cx="528500" cy="184666"/>
+          </a:xfrm>
+          <a:prstGeom prst="rect">
+            <a:avLst/>
+          </a:prstGeom>
+          <a:solidFill>
+            <a:schemeClr val="accent6"/>
+          </a:solidFill>
+          <a:ln w="3175">
+            <a:solidFill>
+              <a:schemeClr val="tx1"/>
+            </a:solidFill>
+          </a:ln>
+        </p:spPr>
+        <p:txBody>
+          <a:bodyPr wrap="square" rtlCol="0" anchor="ctr">
+            <a:spAutoFit/>
+          </a:bodyPr>
+          <a:lstStyle>
+            <a:defPPr marR="0" lvl="0" algn="l" rtl="0">
+              <a:lnSpc>
+                <a:spcPct val="100000"/>
+              </a:lnSpc>
+              <a:spcBef>
+                <a:spcPts val="0"/>
+              </a:spcBef>
+              <a:spcAft>
+                <a:spcPts val="0"/>
+              </a:spcAft>
+              <a:defRPr/>
+            </a:defPPr>
+            <a:lvl1pPr algn="ctr">
+              <a:defRPr sz="600">
+                <a:latin typeface="Courier New" panose="02070309020205020404" pitchFamily="49" charset="0"/>
+                <a:cs typeface="Courier New" panose="02070309020205020404" pitchFamily="49" charset="0"/>
+              </a:defRPr>
+            </a:lvl1pPr>
+          </a:lstStyle>
+          <a:p>
+            <a:r>
+              <a:rPr lang="fr-FR" dirty="0" err="1"/>
+              <a:t>Iterate</a:t>
+            </a:r>
+            <a:endParaRPr lang="fr-FR" dirty="0"/>
+          </a:p>
+        </p:txBody>
+      </p:sp>
+      <p:sp>
+        <p:nvSpPr>
+          <p:cNvPr id="58" name="ZoneTexte 57">
+            <a:extLst>
+              <a:ext uri="{FF2B5EF4-FFF2-40B4-BE49-F238E27FC236}">
+                <a16:creationId xmlns:a16="http://schemas.microsoft.com/office/drawing/2014/main" id="{B2E8F991-E10B-B949-C93B-A5A143398AB3}"/>
+              </a:ext>
+            </a:extLst>
+          </p:cNvPr>
+          <p:cNvSpPr txBox="1"/>
+          <p:nvPr/>
+        </p:nvSpPr>
+        <p:spPr>
+          <a:xfrm>
+            <a:off x="3469206" y="1608940"/>
+            <a:ext cx="1452011" cy="184666"/>
+          </a:xfrm>
+          <a:prstGeom prst="rect">
+            <a:avLst/>
+          </a:prstGeom>
+          <a:solidFill>
+            <a:schemeClr val="accent6"/>
+          </a:solidFill>
+          <a:ln w="3175">
+            <a:solidFill>
+              <a:schemeClr val="tx1"/>
+            </a:solidFill>
+          </a:ln>
+        </p:spPr>
+        <p:txBody>
+          <a:bodyPr wrap="square" rtlCol="0" anchor="ctr">
+            <a:spAutoFit/>
+          </a:bodyPr>
+          <a:lstStyle>
+            <a:defPPr marR="0" lvl="0" algn="l" rtl="0">
+              <a:lnSpc>
+                <a:spcPct val="100000"/>
+              </a:lnSpc>
+              <a:spcBef>
+                <a:spcPts val="0"/>
+              </a:spcBef>
+              <a:spcAft>
+                <a:spcPts val="0"/>
+              </a:spcAft>
+              <a:defRPr/>
+            </a:defPPr>
+            <a:lvl1pPr algn="ctr">
+              <a:defRPr sz="600">
+                <a:latin typeface="Courier New" panose="02070309020205020404" pitchFamily="49" charset="0"/>
+                <a:cs typeface="Courier New" panose="02070309020205020404" pitchFamily="49" charset="0"/>
+              </a:defRPr>
+            </a:lvl1pPr>
+          </a:lstStyle>
+          <a:p>
+            <a:r>
+              <a:rPr lang="fr-FR" dirty="0"/>
+              <a:t>Multiple </a:t>
+            </a:r>
+            <a:r>
+              <a:rPr lang="fr-FR" dirty="0" err="1"/>
+              <a:t>models</a:t>
+            </a:r>
+            <a:r>
+              <a:rPr lang="fr-FR" dirty="0"/>
+              <a:t>, </a:t>
+            </a:r>
+            <a:r>
+              <a:rPr lang="fr-FR" dirty="0" err="1"/>
+              <a:t>various</a:t>
+            </a:r>
+            <a:r>
+              <a:rPr lang="fr-FR" dirty="0"/>
+              <a:t> HW</a:t>
+            </a:r>
+          </a:p>
+        </p:txBody>
+      </p:sp>
+      <p:pic>
+        <p:nvPicPr>
+          <p:cNvPr id="60" name="Image 59">
+            <a:extLst>
+              <a:ext uri="{FF2B5EF4-FFF2-40B4-BE49-F238E27FC236}">
+                <a16:creationId xmlns:a16="http://schemas.microsoft.com/office/drawing/2014/main" id="{7CB98866-60DE-CAB4-E3DA-4474A06D0431}"/>
+              </a:ext>
+            </a:extLst>
+          </p:cNvPr>
+          <p:cNvPicPr>
+            <a:picLocks noChangeAspect="1"/>
+          </p:cNvPicPr>
+          <p:nvPr/>
+        </p:nvPicPr>
+        <p:blipFill rotWithShape="1">
+          <a:blip r:embed="rId13"/>
+          <a:srcRect l="8118" t="7108" r="12015" b="4195"/>
+          <a:stretch/>
+        </p:blipFill>
+        <p:spPr>
+          <a:xfrm>
+            <a:off x="8312689" y="3196437"/>
+            <a:ext cx="273554" cy="285386"/>
+          </a:xfrm>
+          <a:prstGeom prst="rect">
+            <a:avLst/>
+          </a:prstGeom>
+          <a:effectLst>
+            <a:outerShdw blurRad="50800" dist="38100" dir="2700000" algn="tl" rotWithShape="0">
+              <a:prstClr val="black">
+                <a:alpha val="40000"/>
+              </a:prstClr>
+            </a:outerShdw>
+          </a:effectLst>
+        </p:spPr>
+      </p:pic>
+      <p:pic>
+        <p:nvPicPr>
+          <p:cNvPr id="1026" name="Picture 2" descr="Gpu - Icônes ordinateur gratuites">
+            <a:extLst>
+              <a:ext uri="{FF2B5EF4-FFF2-40B4-BE49-F238E27FC236}">
+                <a16:creationId xmlns:a16="http://schemas.microsoft.com/office/drawing/2014/main" id="{0728D59F-5B9E-737F-DE8A-6695246453B8}"/>
+              </a:ext>
+            </a:extLst>
+          </p:cNvPr>
+          <p:cNvPicPr>
+            <a:picLocks noChangeAspect="1" noChangeArrowheads="1"/>
+          </p:cNvPicPr>
+          <p:nvPr/>
+        </p:nvPicPr>
+        <p:blipFill>
+          <a:blip r:embed="rId14">
+            <a:extLst>
+              <a:ext uri="{28A0092B-C50C-407E-A947-70E740481C1C}">
+                <a14:useLocalDpi xmlns:a14="http://schemas.microsoft.com/office/drawing/2010/main" val="0"/>
+              </a:ext>
+            </a:extLst>
+          </a:blip>
+          <a:srcRect/>
+          <a:stretch>
+            <a:fillRect/>
+          </a:stretch>
+        </p:blipFill>
+        <p:spPr bwMode="auto">
+          <a:xfrm>
+            <a:off x="3860031" y="2745511"/>
+            <a:ext cx="737811" cy="737811"/>
+          </a:xfrm>
+          <a:prstGeom prst="rect">
+            <a:avLst/>
+          </a:prstGeom>
+          <a:noFill/>
+          <a:extLst>
+            <a:ext uri="{909E8E84-426E-40DD-AFC4-6F175D3DCCD1}">
+              <a14:hiddenFill xmlns:a14="http://schemas.microsoft.com/office/drawing/2010/main">
+                <a:solidFill>
+                  <a:srgbClr val="FFFFFF"/>
+                </a:solidFill>
+              </a14:hiddenFill>
+            </a:ext>
+          </a:extLst>
+        </p:spPr>
+      </p:pic>
+      <p:grpSp>
+        <p:nvGrpSpPr>
+          <p:cNvPr id="1028" name="Groupe 1027">
+            <a:extLst>
+              <a:ext uri="{FF2B5EF4-FFF2-40B4-BE49-F238E27FC236}">
+                <a16:creationId xmlns:a16="http://schemas.microsoft.com/office/drawing/2014/main" id="{BAF9EED9-AED1-DC68-2DCE-26FB79C6239A}"/>
+              </a:ext>
+            </a:extLst>
+          </p:cNvPr>
+          <p:cNvGrpSpPr/>
+          <p:nvPr/>
+        </p:nvGrpSpPr>
+        <p:grpSpPr>
+          <a:xfrm>
+            <a:off x="7811770" y="2090576"/>
+            <a:ext cx="880426" cy="871858"/>
+            <a:chOff x="7847330" y="2494196"/>
+            <a:chExt cx="880426" cy="871858"/>
+          </a:xfrm>
+        </p:grpSpPr>
+        <p:sp>
+          <p:nvSpPr>
+            <p:cNvPr id="35" name="ZoneTexte 34">
+              <a:extLst>
+                <a:ext uri="{FF2B5EF4-FFF2-40B4-BE49-F238E27FC236}">
+                  <a16:creationId xmlns:a16="http://schemas.microsoft.com/office/drawing/2014/main" id="{D274B890-A8EE-A186-7126-825C2C23FECC}"/>
+                </a:ext>
+              </a:extLst>
+            </p:cNvPr>
+            <p:cNvSpPr txBox="1"/>
+            <p:nvPr/>
+          </p:nvSpPr>
+          <p:spPr>
+            <a:xfrm>
+              <a:off x="7847331" y="2494196"/>
+              <a:ext cx="874208" cy="215444"/>
+            </a:xfrm>
+            <a:prstGeom prst="rect">
+              <a:avLst/>
+            </a:prstGeom>
+            <a:solidFill>
+              <a:schemeClr val="accent2">
+                <a:lumMod val="20000"/>
+                <a:lumOff val="80000"/>
+              </a:schemeClr>
+            </a:solidFill>
+            <a:ln w="3175">
+              <a:solidFill>
+                <a:schemeClr val="tx1"/>
+              </a:solidFill>
+            </a:ln>
+          </p:spPr>
+          <p:txBody>
+            <a:bodyPr wrap="square" rtlCol="0" anchor="ctr">
+              <a:spAutoFit/>
+            </a:bodyPr>
+            <a:lstStyle>
+              <a:defPPr marR="0" lvl="0" algn="l" rtl="0">
+                <a:lnSpc>
+                  <a:spcPct val="100000"/>
+                </a:lnSpc>
+                <a:spcBef>
+                  <a:spcPts val="0"/>
+                </a:spcBef>
+                <a:spcAft>
+                  <a:spcPts val="0"/>
+                </a:spcAft>
+              </a:defPPr>
+              <a:lvl1pPr algn="ctr">
+                <a:defRPr sz="675">
+                  <a:latin typeface="Courier New" panose="02070309020205020404" pitchFamily="49" charset="0"/>
+                  <a:cs typeface="Courier New" panose="02070309020205020404" pitchFamily="49" charset="0"/>
+                </a:defRPr>
+              </a:lvl1pPr>
+            </a:lstStyle>
+            <a:p>
+              <a:r>
+                <a:rPr lang="fr-FR" sz="800" dirty="0" err="1"/>
+                <a:t>Consuming</a:t>
+              </a:r>
+              <a:endParaRPr lang="fr-FR" sz="800" dirty="0"/>
+            </a:p>
+          </p:txBody>
+        </p:sp>
+        <p:sp>
+          <p:nvSpPr>
+            <p:cNvPr id="20" name="ZoneTexte 19">
+              <a:extLst>
+                <a:ext uri="{FF2B5EF4-FFF2-40B4-BE49-F238E27FC236}">
+                  <a16:creationId xmlns:a16="http://schemas.microsoft.com/office/drawing/2014/main" id="{6ABD733F-89FD-A412-51AF-EFF2B0DBD600}"/>
+                </a:ext>
+              </a:extLst>
+            </p:cNvPr>
+            <p:cNvSpPr txBox="1"/>
+            <p:nvPr/>
+          </p:nvSpPr>
+          <p:spPr>
+            <a:xfrm>
+              <a:off x="8427674" y="3150610"/>
+              <a:ext cx="300082" cy="215444"/>
+            </a:xfrm>
+            <a:prstGeom prst="rect">
+              <a:avLst/>
+            </a:prstGeom>
+            <a:solidFill>
+              <a:srgbClr val="C00000"/>
+            </a:solidFill>
+          </p:spPr>
+          <p:txBody>
+            <a:bodyPr wrap="none" rtlCol="0">
+              <a:spAutoFit/>
+            </a:bodyPr>
+            <a:lstStyle/>
+            <a:p>
+              <a:r>
+                <a:rPr lang="fr-FR" sz="800" dirty="0">
+                  <a:solidFill>
+                    <a:schemeClr val="bg1">
+                      <a:lumMod val="95000"/>
+                    </a:schemeClr>
+                  </a:solidFill>
+                </a:rPr>
+                <a:t>05</a:t>
+              </a:r>
+            </a:p>
+          </p:txBody>
+        </p:sp>
+        <p:sp>
+          <p:nvSpPr>
+            <p:cNvPr id="62" name="Rectangle 61">
+              <a:extLst>
+                <a:ext uri="{FF2B5EF4-FFF2-40B4-BE49-F238E27FC236}">
+                  <a16:creationId xmlns:a16="http://schemas.microsoft.com/office/drawing/2014/main" id="{F10532C8-67F5-5F96-A53D-F1BD08EFDC8B}"/>
+                </a:ext>
+              </a:extLst>
+            </p:cNvPr>
+            <p:cNvSpPr/>
+            <p:nvPr/>
+          </p:nvSpPr>
+          <p:spPr>
+            <a:xfrm>
+              <a:off x="7847330" y="2698676"/>
+              <a:ext cx="874208" cy="220526"/>
+            </a:xfrm>
+            <a:prstGeom prst="rect">
+              <a:avLst/>
+            </a:prstGeom>
+            <a:solidFill>
+              <a:schemeClr val="accent4">
+                <a:lumMod val="20000"/>
+                <a:lumOff val="80000"/>
+              </a:schemeClr>
+            </a:solidFill>
+            <a:ln w="3175"/>
+          </p:spPr>
+          <p:style>
+            <a:lnRef idx="2">
+              <a:schemeClr val="accent1">
+                <a:shade val="15000"/>
+              </a:schemeClr>
+            </a:lnRef>
+            <a:fillRef idx="1">
+              <a:schemeClr val="accent1"/>
+            </a:fillRef>
+            <a:effectRef idx="0">
+              <a:schemeClr val="accent1"/>
+            </a:effectRef>
+            <a:fontRef idx="minor">
+              <a:schemeClr val="lt1"/>
+            </a:fontRef>
+          </p:style>
+          <p:txBody>
+            <a:bodyPr rtlCol="0" anchor="ctr"/>
+            <a:lstStyle/>
+            <a:p>
+              <a:pPr algn="ctr"/>
+              <a:r>
+                <a:rPr lang="fr-FR" sz="800" dirty="0" err="1">
+                  <a:solidFill>
+                    <a:schemeClr val="tx1"/>
+                  </a:solidFill>
+                  <a:latin typeface="Courier New" panose="02070309020205020404" pitchFamily="49" charset="0"/>
+                  <a:cs typeface="Courier New" panose="02070309020205020404" pitchFamily="49" charset="0"/>
+                </a:rPr>
+                <a:t>API+Web</a:t>
+              </a:r>
+              <a:r>
+                <a:rPr lang="fr-FR" sz="800" dirty="0">
+                  <a:solidFill>
+                    <a:schemeClr val="tx1"/>
+                  </a:solidFill>
+                  <a:latin typeface="Courier New" panose="02070309020205020404" pitchFamily="49" charset="0"/>
+                  <a:cs typeface="Courier New" panose="02070309020205020404" pitchFamily="49" charset="0"/>
+                </a:rPr>
+                <a:t> App</a:t>
+              </a:r>
+            </a:p>
+          </p:txBody>
+        </p:sp>
+        <p:sp>
+          <p:nvSpPr>
+            <p:cNvPr id="63" name="ZoneTexte 62">
+              <a:extLst>
+                <a:ext uri="{FF2B5EF4-FFF2-40B4-BE49-F238E27FC236}">
+                  <a16:creationId xmlns:a16="http://schemas.microsoft.com/office/drawing/2014/main" id="{39A85152-5F2B-F7A8-9D12-C4A32B754764}"/>
+                </a:ext>
+              </a:extLst>
+            </p:cNvPr>
+            <p:cNvSpPr txBox="1"/>
+            <p:nvPr/>
+          </p:nvSpPr>
+          <p:spPr>
+            <a:xfrm>
+              <a:off x="7847330" y="2908797"/>
+              <a:ext cx="874208" cy="215444"/>
+            </a:xfrm>
+            <a:prstGeom prst="rect">
+              <a:avLst/>
+            </a:prstGeom>
+            <a:solidFill>
+              <a:schemeClr val="accent5">
+                <a:lumMod val="20000"/>
+                <a:lumOff val="80000"/>
+              </a:schemeClr>
+            </a:solidFill>
+            <a:ln w="3175">
+              <a:solidFill>
+                <a:schemeClr val="tx1"/>
+              </a:solidFill>
+            </a:ln>
+          </p:spPr>
+          <p:txBody>
+            <a:bodyPr wrap="square" rtlCol="0" anchor="ctr">
+              <a:spAutoFit/>
+            </a:bodyPr>
+            <a:lstStyle/>
+            <a:p>
+              <a:pPr algn="ctr"/>
+              <a:r>
+                <a:rPr lang="fr-FR" sz="800" dirty="0">
+                  <a:latin typeface="Courier New" panose="02070309020205020404" pitchFamily="49" charset="0"/>
+                  <a:cs typeface="Courier New" panose="02070309020205020404" pitchFamily="49" charset="0"/>
+                </a:rPr>
+                <a:t>Flask</a:t>
+              </a:r>
+            </a:p>
+          </p:txBody>
+        </p:sp>
+      </p:grpSp>
+      <p:grpSp>
+        <p:nvGrpSpPr>
+          <p:cNvPr id="1030" name="Groupe 1029">
+            <a:extLst>
+              <a:ext uri="{FF2B5EF4-FFF2-40B4-BE49-F238E27FC236}">
+                <a16:creationId xmlns:a16="http://schemas.microsoft.com/office/drawing/2014/main" id="{0283DBA2-E154-B24E-00E4-B2111440E40D}"/>
+              </a:ext>
+            </a:extLst>
+          </p:cNvPr>
+          <p:cNvGrpSpPr/>
+          <p:nvPr/>
+        </p:nvGrpSpPr>
+        <p:grpSpPr>
+          <a:xfrm>
+            <a:off x="5674190" y="1904674"/>
+            <a:ext cx="1102014" cy="878854"/>
+            <a:chOff x="5550125" y="861609"/>
+            <a:chExt cx="1102014" cy="878854"/>
+          </a:xfrm>
+        </p:grpSpPr>
+        <p:sp>
+          <p:nvSpPr>
+            <p:cNvPr id="8" name="Rectangle 7">
+              <a:extLst>
+                <a:ext uri="{FF2B5EF4-FFF2-40B4-BE49-F238E27FC236}">
+                  <a16:creationId xmlns:a16="http://schemas.microsoft.com/office/drawing/2014/main" id="{7BD7D3CD-81D5-4848-C5A0-5012687582FD}"/>
+                </a:ext>
+              </a:extLst>
+            </p:cNvPr>
+            <p:cNvSpPr/>
+            <p:nvPr/>
+          </p:nvSpPr>
+          <p:spPr>
+            <a:xfrm>
+              <a:off x="5550125" y="1075311"/>
+              <a:ext cx="1096351" cy="220526"/>
+            </a:xfrm>
+            <a:prstGeom prst="rect">
+              <a:avLst/>
+            </a:prstGeom>
+            <a:solidFill>
+              <a:schemeClr val="accent4">
+                <a:lumMod val="20000"/>
+                <a:lumOff val="80000"/>
+              </a:schemeClr>
+            </a:solidFill>
+            <a:ln w="3175"/>
+          </p:spPr>
+          <p:style>
+            <a:lnRef idx="2">
+              <a:schemeClr val="accent1">
+                <a:shade val="15000"/>
+              </a:schemeClr>
+            </a:lnRef>
+            <a:fillRef idx="1">
+              <a:schemeClr val="accent1"/>
+            </a:fillRef>
+            <a:effectRef idx="0">
+              <a:schemeClr val="accent1"/>
+            </a:effectRef>
+            <a:fontRef idx="minor">
+              <a:schemeClr val="lt1"/>
+            </a:fontRef>
+          </p:style>
+          <p:txBody>
+            <a:bodyPr rtlCol="0" anchor="ctr"/>
+            <a:lstStyle/>
+            <a:p>
+              <a:pPr algn="ctr"/>
+              <a:r>
+                <a:rPr lang="fr-FR" sz="800" dirty="0" err="1">
+                  <a:solidFill>
+                    <a:schemeClr val="tx1"/>
+                  </a:solidFill>
+                  <a:latin typeface="Courier New" panose="02070309020205020404" pitchFamily="49" charset="0"/>
+                  <a:cs typeface="Courier New" panose="02070309020205020404" pitchFamily="49" charset="0"/>
+                </a:rPr>
+                <a:t>Heroku</a:t>
+              </a:r>
+              <a:endParaRPr lang="fr-FR" sz="800" dirty="0">
+                <a:solidFill>
+                  <a:schemeClr val="tx1"/>
+                </a:solidFill>
+                <a:latin typeface="Courier New" panose="02070309020205020404" pitchFamily="49" charset="0"/>
+                <a:cs typeface="Courier New" panose="02070309020205020404" pitchFamily="49" charset="0"/>
+              </a:endParaRPr>
+            </a:p>
+          </p:txBody>
+        </p:sp>
+        <p:sp>
+          <p:nvSpPr>
+            <p:cNvPr id="50" name="ZoneTexte 49">
+              <a:extLst>
+                <a:ext uri="{FF2B5EF4-FFF2-40B4-BE49-F238E27FC236}">
+                  <a16:creationId xmlns:a16="http://schemas.microsoft.com/office/drawing/2014/main" id="{A671C5B9-A334-3D52-FB83-E43BEEFB2500}"/>
+                </a:ext>
+              </a:extLst>
+            </p:cNvPr>
+            <p:cNvSpPr txBox="1"/>
+            <p:nvPr/>
+          </p:nvSpPr>
+          <p:spPr>
+            <a:xfrm>
+              <a:off x="5550125" y="1294701"/>
+              <a:ext cx="1096351" cy="215444"/>
+            </a:xfrm>
+            <a:prstGeom prst="rect">
+              <a:avLst/>
+            </a:prstGeom>
+            <a:solidFill>
+              <a:schemeClr val="accent5">
+                <a:lumMod val="20000"/>
+                <a:lumOff val="80000"/>
+              </a:schemeClr>
+            </a:solidFill>
+            <a:ln w="3175">
+              <a:solidFill>
+                <a:schemeClr val="tx1"/>
+              </a:solidFill>
+            </a:ln>
+          </p:spPr>
+          <p:txBody>
+            <a:bodyPr wrap="square" rtlCol="0">
+              <a:spAutoFit/>
+            </a:bodyPr>
+            <a:lstStyle/>
+            <a:p>
+              <a:r>
+                <a:rPr lang="fr-FR" sz="800" dirty="0" err="1">
+                  <a:latin typeface="Courier New" panose="02070309020205020404" pitchFamily="49" charset="0"/>
+                  <a:cs typeface="Courier New" panose="02070309020205020404" pitchFamily="49" charset="0"/>
+                </a:rPr>
+                <a:t>MLFlow</a:t>
+              </a:r>
+              <a:r>
+                <a:rPr lang="fr-FR" sz="800" dirty="0">
+                  <a:latin typeface="Courier New" panose="02070309020205020404" pitchFamily="49" charset="0"/>
+                  <a:cs typeface="Courier New" panose="02070309020205020404" pitchFamily="49" charset="0"/>
+                </a:rPr>
+                <a:t> </a:t>
+              </a:r>
+              <a:r>
+                <a:rPr lang="fr-FR" sz="800" dirty="0" err="1">
+                  <a:latin typeface="Courier New" panose="02070309020205020404" pitchFamily="49" charset="0"/>
+                  <a:cs typeface="Courier New" panose="02070309020205020404" pitchFamily="49" charset="0"/>
+                </a:rPr>
+                <a:t>tracking</a:t>
+              </a:r>
+              <a:endParaRPr lang="fr-FR" sz="800" dirty="0">
+                <a:latin typeface="Courier New" panose="02070309020205020404" pitchFamily="49" charset="0"/>
+                <a:cs typeface="Courier New" panose="02070309020205020404" pitchFamily="49" charset="0"/>
+              </a:endParaRPr>
+            </a:p>
+          </p:txBody>
+        </p:sp>
+        <p:sp>
+          <p:nvSpPr>
+            <p:cNvPr id="61" name="ZoneTexte 60">
+              <a:extLst>
+                <a:ext uri="{FF2B5EF4-FFF2-40B4-BE49-F238E27FC236}">
+                  <a16:creationId xmlns:a16="http://schemas.microsoft.com/office/drawing/2014/main" id="{0C67B44A-0F47-AFCD-9934-9CBFA7BCD508}"/>
+                </a:ext>
+              </a:extLst>
+            </p:cNvPr>
+            <p:cNvSpPr txBox="1"/>
+            <p:nvPr/>
+          </p:nvSpPr>
+          <p:spPr>
+            <a:xfrm>
+              <a:off x="5550125" y="861609"/>
+              <a:ext cx="1096351" cy="215444"/>
+            </a:xfrm>
+            <a:prstGeom prst="rect">
+              <a:avLst/>
+            </a:prstGeom>
+            <a:solidFill>
+              <a:schemeClr val="accent2">
+                <a:lumMod val="20000"/>
+                <a:lumOff val="80000"/>
+              </a:schemeClr>
+            </a:solidFill>
+            <a:ln w="3175">
+              <a:solidFill>
+                <a:schemeClr val="tx1"/>
+              </a:solidFill>
+            </a:ln>
+          </p:spPr>
+          <p:txBody>
+            <a:bodyPr wrap="square" rtlCol="0" anchor="ctr">
+              <a:spAutoFit/>
+            </a:bodyPr>
+            <a:lstStyle>
+              <a:defPPr marR="0" lvl="0" algn="l" rtl="0">
+                <a:lnSpc>
+                  <a:spcPct val="100000"/>
+                </a:lnSpc>
+                <a:spcBef>
+                  <a:spcPts val="0"/>
+                </a:spcBef>
+                <a:spcAft>
+                  <a:spcPts val="0"/>
+                </a:spcAft>
+                <a:defRPr/>
+              </a:defPPr>
+              <a:lvl1pPr algn="ctr">
+                <a:defRPr sz="675">
+                  <a:latin typeface="Courier New" panose="02070309020205020404" pitchFamily="49" charset="0"/>
+                  <a:cs typeface="Courier New" panose="02070309020205020404" pitchFamily="49" charset="0"/>
+                </a:defRPr>
+              </a:lvl1pPr>
+            </a:lstStyle>
+            <a:p>
+              <a:r>
+                <a:rPr lang="fr-FR" sz="800" dirty="0" err="1"/>
+                <a:t>Tracking</a:t>
+              </a:r>
+              <a:endParaRPr lang="fr-FR" sz="800" dirty="0"/>
+            </a:p>
+          </p:txBody>
+        </p:sp>
+        <p:sp>
+          <p:nvSpPr>
+            <p:cNvPr id="1029" name="ZoneTexte 1028">
+              <a:extLst>
+                <a:ext uri="{FF2B5EF4-FFF2-40B4-BE49-F238E27FC236}">
+                  <a16:creationId xmlns:a16="http://schemas.microsoft.com/office/drawing/2014/main" id="{D7A7CEEA-60D3-E981-000D-38CC7FF6265D}"/>
+                </a:ext>
+              </a:extLst>
+            </p:cNvPr>
+            <p:cNvSpPr txBox="1"/>
+            <p:nvPr/>
+          </p:nvSpPr>
+          <p:spPr>
+            <a:xfrm>
+              <a:off x="6352057" y="1525019"/>
+              <a:ext cx="300082" cy="215444"/>
+            </a:xfrm>
+            <a:prstGeom prst="rect">
+              <a:avLst/>
+            </a:prstGeom>
+            <a:solidFill>
+              <a:srgbClr val="C00000"/>
+            </a:solidFill>
+          </p:spPr>
+          <p:txBody>
+            <a:bodyPr wrap="none" rtlCol="0">
+              <a:spAutoFit/>
+            </a:bodyPr>
+            <a:lstStyle/>
+            <a:p>
+              <a:r>
+                <a:rPr lang="fr-FR" sz="800" dirty="0">
+                  <a:solidFill>
+                    <a:schemeClr val="bg1">
+                      <a:lumMod val="95000"/>
+                    </a:schemeClr>
+                  </a:solidFill>
+                </a:rPr>
+                <a:t>03</a:t>
+              </a:r>
+            </a:p>
+          </p:txBody>
+        </p:sp>
+      </p:grpSp>
+      <p:cxnSp>
+        <p:nvCxnSpPr>
+          <p:cNvPr id="1032" name="Connecteur droit avec flèche 1031">
+            <a:extLst>
+              <a:ext uri="{FF2B5EF4-FFF2-40B4-BE49-F238E27FC236}">
+                <a16:creationId xmlns:a16="http://schemas.microsoft.com/office/drawing/2014/main" id="{6DEDE52E-6D8A-A403-BA05-57BC07F03271}"/>
+              </a:ext>
+            </a:extLst>
+          </p:cNvPr>
+          <p:cNvCxnSpPr>
+            <a:cxnSpLocks/>
+            <a:stCxn id="47" idx="3"/>
+          </p:cNvCxnSpPr>
+          <p:nvPr/>
+        </p:nvCxnSpPr>
+        <p:spPr>
+          <a:xfrm>
+            <a:off x="814597" y="2948139"/>
+            <a:ext cx="846859" cy="4772"/>
+          </a:xfrm>
+          <a:prstGeom prst="straightConnector1">
+            <a:avLst/>
+          </a:prstGeom>
+          <a:ln w="57150">
+            <a:headEnd type="none"/>
+            <a:tailEnd type="triangle"/>
+          </a:ln>
+        </p:spPr>
+        <p:style>
+          <a:lnRef idx="1">
+            <a:schemeClr val="accent1"/>
+          </a:lnRef>
+          <a:fillRef idx="0">
+            <a:schemeClr val="accent1"/>
+          </a:fillRef>
+          <a:effectRef idx="0">
+            <a:schemeClr val="accent1"/>
+          </a:effectRef>
+          <a:fontRef idx="minor">
+            <a:schemeClr val="tx1"/>
+          </a:fontRef>
+        </p:style>
+      </p:cxnSp>
+      <p:pic>
+        <p:nvPicPr>
+          <p:cNvPr id="1056" name="Image 1055">
+            <a:extLst>
+              <a:ext uri="{FF2B5EF4-FFF2-40B4-BE49-F238E27FC236}">
+                <a16:creationId xmlns:a16="http://schemas.microsoft.com/office/drawing/2014/main" id="{FD93E48A-D1E5-FD02-1902-875615C41779}"/>
+              </a:ext>
+            </a:extLst>
+          </p:cNvPr>
+          <p:cNvPicPr>
+            <a:picLocks noChangeAspect="1"/>
+          </p:cNvPicPr>
+          <p:nvPr/>
+        </p:nvPicPr>
+        <p:blipFill>
+          <a:blip r:embed="rId15"/>
+          <a:stretch>
+            <a:fillRect/>
+          </a:stretch>
+        </p:blipFill>
+        <p:spPr>
+          <a:xfrm>
+            <a:off x="3861014" y="1913668"/>
+            <a:ext cx="771946" cy="771946"/>
+          </a:xfrm>
+          <a:prstGeom prst="rect">
+            <a:avLst/>
+          </a:prstGeom>
+        </p:spPr>
+      </p:pic>
+    </p:spTree>
+    <p:extLst>
+      <p:ext uri="{BB962C8B-B14F-4D97-AF65-F5344CB8AC3E}">
+        <p14:creationId xmlns:p14="http://schemas.microsoft.com/office/powerpoint/2010/main" val="1294538149"/>
+      </p:ext>
+    </p:extLst>
+  </p:cSld>
+  <p:clrMapOvr>
+    <a:masterClrMapping/>
+  </p:clrMapOvr>
+</p:sld>
+</file>
+
+<file path=ppt/slides/slide2.xml><?xml version="1.0" encoding="utf-8"?>
+<p:sld xmlns:a="http://schemas.openxmlformats.org/drawingml/2006/main" xmlns:r="http://schemas.openxmlformats.org/officeDocument/2006/relationships" xmlns:p="http://schemas.openxmlformats.org/presentationml/2006/main">
+  <p:cSld>
+    <p:spTree>
+      <p:nvGrpSpPr>
+        <p:cNvPr id="1" name=""/>
+        <p:cNvGrpSpPr/>
+        <p:nvPr/>
+      </p:nvGrpSpPr>
+      <p:grpSpPr>
+        <a:xfrm>
+          <a:off x="0" y="0"/>
+          <a:ext cx="0" cy="0"/>
+          <a:chOff x="0" y="0"/>
+          <a:chExt cx="0" cy="0"/>
+        </a:xfrm>
+      </p:grpSpPr>
+      <p:sp>
+        <p:nvSpPr>
+          <p:cNvPr id="3" name="Titre 2">
+            <a:extLst>
+              <a:ext uri="{FF2B5EF4-FFF2-40B4-BE49-F238E27FC236}">
+                <a16:creationId xmlns:a16="http://schemas.microsoft.com/office/drawing/2014/main" id="{3D5747AA-8B62-5C79-BC10-9F4115BE33B3}"/>
+              </a:ext>
+            </a:extLst>
+          </p:cNvPr>
+          <p:cNvSpPr>
+            <a:spLocks noGrp="1"/>
+          </p:cNvSpPr>
+          <p:nvPr>
+            <p:ph type="title"/>
+          </p:nvPr>
+        </p:nvSpPr>
+        <p:spPr/>
+        <p:txBody>
+          <a:bodyPr/>
+          <a:lstStyle/>
+          <a:p>
+            <a:r>
+              <a:rPr lang="fr-FR" dirty="0" err="1"/>
+              <a:t>SkinCheck</a:t>
+            </a:r>
+            <a:r>
+              <a:rPr lang="fr-FR" dirty="0"/>
+              <a:t> - </a:t>
+            </a:r>
+            <a:r>
+              <a:rPr lang="fr-FR" dirty="0" err="1"/>
               <a:t>What</a:t>
             </a:r>
             <a:r>
@@ -4189,7 +7282,7 @@
             </a:r>
             <a:r>
               <a:rPr lang="fr-FR" dirty="0"/>
-              <a:t>?</a:t>
+              <a:t> (07/06) ?</a:t>
             </a:r>
           </a:p>
         </p:txBody>
@@ -4547,8 +7640,19 @@
                 <a:latin typeface="Courier New" panose="02070309020205020404" pitchFamily="49" charset="0"/>
                 <a:cs typeface="Courier New" panose="02070309020205020404" pitchFamily="49" charset="0"/>
               </a:rPr>
-              <a:t>Host artefact</a:t>
-            </a:r>
+              <a:t>Host </a:t>
+            </a:r>
+            <a:r>
+              <a:rPr lang="fr-FR" sz="675" dirty="0" err="1">
+                <a:latin typeface="Courier New" panose="02070309020205020404" pitchFamily="49" charset="0"/>
+                <a:cs typeface="Courier New" panose="02070309020205020404" pitchFamily="49" charset="0"/>
+              </a:rPr>
+              <a:t>artifacts</a:t>
+            </a:r>
+            <a:endParaRPr lang="fr-FR" sz="675" dirty="0">
+              <a:latin typeface="Courier New" panose="02070309020205020404" pitchFamily="49" charset="0"/>
+              <a:cs typeface="Courier New" panose="02070309020205020404" pitchFamily="49" charset="0"/>
+            </a:endParaRPr>
           </a:p>
         </p:txBody>
       </p:sp>
@@ -4600,7 +7704,7 @@
                 <a:latin typeface="Courier New" panose="02070309020205020404" pitchFamily="49" charset="0"/>
                 <a:cs typeface="Courier New" panose="02070309020205020404" pitchFamily="49" charset="0"/>
               </a:rPr>
-              <a:t>projeect</a:t>
+              <a:t>project</a:t>
             </a:r>
             <a:r>
               <a:rPr lang="fr-FR" sz="675" dirty="0">
@@ -4659,8 +7763,19 @@
                 <a:latin typeface="Courier New" panose="02070309020205020404" pitchFamily="49" charset="0"/>
                 <a:cs typeface="Courier New" panose="02070309020205020404" pitchFamily="49" charset="0"/>
               </a:rPr>
-              <a:t>Save Artefact</a:t>
-            </a:r>
+              <a:t>Save </a:t>
+            </a:r>
+            <a:r>
+              <a:rPr lang="fr-FR" sz="675" dirty="0" err="1">
+                <a:latin typeface="Courier New" panose="02070309020205020404" pitchFamily="49" charset="0"/>
+                <a:cs typeface="Courier New" panose="02070309020205020404" pitchFamily="49" charset="0"/>
+              </a:rPr>
+              <a:t>Artifact</a:t>
+            </a:r>
+            <a:endParaRPr lang="fr-FR" sz="675" dirty="0">
+              <a:latin typeface="Courier New" panose="02070309020205020404" pitchFamily="49" charset="0"/>
+              <a:cs typeface="Courier New" panose="02070309020205020404" pitchFamily="49" charset="0"/>
+            </a:endParaRPr>
           </a:p>
           <a:p>
             <a:r>
@@ -5259,7 +8374,7 @@
 </p:sld>
 </file>
 
-<file path=ppt/slides/slide2.xml><?xml version="1.0" encoding="utf-8"?>
+<file path=ppt/slides/slide3.xml><?xml version="1.0" encoding="utf-8"?>
 <p:sld xmlns:a="http://schemas.openxmlformats.org/drawingml/2006/main" xmlns:r="http://schemas.openxmlformats.org/officeDocument/2006/relationships" xmlns:p="http://schemas.openxmlformats.org/presentationml/2006/main">
   <p:cSld>
     <p:spTree>
@@ -5359,6 +8474,14 @@
           <a:bodyPr/>
           <a:lstStyle/>
           <a:p>
+            <a:r>
+              <a:rPr lang="fr-FR" dirty="0" err="1"/>
+              <a:t>SkinCheck</a:t>
+            </a:r>
+            <a:r>
+              <a:rPr lang="fr-FR" dirty="0"/>
+              <a:t> - </a:t>
+            </a:r>
             <a:r>
               <a:rPr lang="fr-FR" dirty="0" err="1"/>
               <a:t>What</a:t>
@@ -5825,24 +8948,39 @@
                 <a:latin typeface="Courier New" panose="02070309020205020404" pitchFamily="49" charset="0"/>
                 <a:cs typeface="Courier New" panose="02070309020205020404" pitchFamily="49" charset="0"/>
               </a:rPr>
-              <a:t>Save Artefact</a:t>
-            </a:r>
-          </a:p>
-          <a:p>
+              <a:t>Save </a:t>
+            </a:r>
             <a:r>
               <a:rPr lang="fr-FR" sz="675" dirty="0" err="1">
                 <a:latin typeface="Courier New" panose="02070309020205020404" pitchFamily="49" charset="0"/>
                 <a:cs typeface="Courier New" panose="02070309020205020404" pitchFamily="49" charset="0"/>
               </a:rPr>
-              <a:t>Send</a:t>
-            </a:r>
+              <a:t>Artifacts</a:t>
+            </a:r>
+            <a:endParaRPr lang="fr-FR" sz="675" dirty="0">
+              <a:latin typeface="Courier New" panose="02070309020205020404" pitchFamily="49" charset="0"/>
+              <a:cs typeface="Courier New" panose="02070309020205020404" pitchFamily="49" charset="0"/>
+            </a:endParaRPr>
+          </a:p>
+          <a:p>
             <a:r>
               <a:rPr lang="fr-FR" sz="675" dirty="0">
                 <a:latin typeface="Courier New" panose="02070309020205020404" pitchFamily="49" charset="0"/>
                 <a:cs typeface="Courier New" panose="02070309020205020404" pitchFamily="49" charset="0"/>
               </a:rPr>
-              <a:t> data </a:t>
-            </a:r>
+              <a:t>Save </a:t>
+            </a:r>
+            <a:r>
+              <a:rPr lang="fr-FR" sz="675" dirty="0" err="1">
+                <a:latin typeface="Courier New" panose="02070309020205020404" pitchFamily="49" charset="0"/>
+                <a:cs typeface="Courier New" panose="02070309020205020404" pitchFamily="49" charset="0"/>
+              </a:rPr>
+              <a:t>Parameters</a:t>
+            </a:r>
+            <a:endParaRPr lang="fr-FR" sz="675" dirty="0">
+              <a:latin typeface="Courier New" panose="02070309020205020404" pitchFamily="49" charset="0"/>
+              <a:cs typeface="Courier New" panose="02070309020205020404" pitchFamily="49" charset="0"/>
+            </a:endParaRPr>
           </a:p>
           <a:p>
             <a:endParaRPr lang="fr-FR" sz="675" dirty="0">
@@ -6901,49 +10039,6 @@
       </p:sp>
       <p:sp>
         <p:nvSpPr>
-          <p:cNvPr id="51" name="ZoneTexte 50">
-            <a:extLst>
-              <a:ext uri="{FF2B5EF4-FFF2-40B4-BE49-F238E27FC236}">
-                <a16:creationId xmlns:a16="http://schemas.microsoft.com/office/drawing/2014/main" id="{29407C26-8202-740E-0E7C-8E694C61B647}"/>
-              </a:ext>
-            </a:extLst>
-          </p:cNvPr>
-          <p:cNvSpPr txBox="1"/>
-          <p:nvPr/>
-        </p:nvSpPr>
-        <p:spPr>
-          <a:xfrm>
-            <a:off x="3429075" y="3762263"/>
-            <a:ext cx="335348" cy="253916"/>
-          </a:xfrm>
-          <a:prstGeom prst="rect">
-            <a:avLst/>
-          </a:prstGeom>
-          <a:solidFill>
-            <a:srgbClr val="C00000"/>
-          </a:solidFill>
-        </p:spPr>
-        <p:txBody>
-          <a:bodyPr wrap="none" rtlCol="0">
-            <a:spAutoFit/>
-          </a:bodyPr>
-          <a:lstStyle/>
-          <a:p>
-            <a:r>
-              <a:rPr lang="fr-FR" sz="1050" dirty="0">
-                <a:solidFill>
-                  <a:schemeClr val="bg1">
-                    <a:lumMod val="95000"/>
-                  </a:schemeClr>
-                </a:solidFill>
-              </a:rPr>
-              <a:t>03</a:t>
-            </a:r>
-          </a:p>
-        </p:txBody>
-      </p:sp>
-      <p:sp>
-        <p:nvSpPr>
           <p:cNvPr id="52" name="ZoneTexte 51">
             <a:extLst>
               <a:ext uri="{FF2B5EF4-FFF2-40B4-BE49-F238E27FC236}">
@@ -7071,10 +10166,530 @@
           </a:p>
         </p:txBody>
       </p:sp>
+      <p:sp>
+        <p:nvSpPr>
+          <p:cNvPr id="2" name="ZoneTexte 1">
+            <a:extLst>
+              <a:ext uri="{FF2B5EF4-FFF2-40B4-BE49-F238E27FC236}">
+                <a16:creationId xmlns:a16="http://schemas.microsoft.com/office/drawing/2014/main" id="{7FB152FA-6981-EA90-83A1-41DAFE3270F3}"/>
+              </a:ext>
+            </a:extLst>
+          </p:cNvPr>
+          <p:cNvSpPr txBox="1"/>
+          <p:nvPr/>
+        </p:nvSpPr>
+        <p:spPr>
+          <a:xfrm>
+            <a:off x="3547684" y="3733444"/>
+            <a:ext cx="335348" cy="253916"/>
+          </a:xfrm>
+          <a:prstGeom prst="rect">
+            <a:avLst/>
+          </a:prstGeom>
+          <a:solidFill>
+            <a:srgbClr val="C00000"/>
+          </a:solidFill>
+        </p:spPr>
+        <p:txBody>
+          <a:bodyPr wrap="none" rtlCol="0">
+            <a:spAutoFit/>
+          </a:bodyPr>
+          <a:lstStyle/>
+          <a:p>
+            <a:r>
+              <a:rPr lang="fr-FR" sz="1050" dirty="0">
+                <a:solidFill>
+                  <a:schemeClr val="bg1">
+                    <a:lumMod val="95000"/>
+                  </a:schemeClr>
+                </a:solidFill>
+              </a:rPr>
+              <a:t>03</a:t>
+            </a:r>
+          </a:p>
+        </p:txBody>
+      </p:sp>
     </p:spTree>
     <p:extLst>
       <p:ext uri="{BB962C8B-B14F-4D97-AF65-F5344CB8AC3E}">
         <p14:creationId xmlns:p14="http://schemas.microsoft.com/office/powerpoint/2010/main" val="3601296998"/>
+      </p:ext>
+    </p:extLst>
+  </p:cSld>
+  <p:clrMapOvr>
+    <a:masterClrMapping/>
+  </p:clrMapOvr>
+</p:sld>
+</file>
+
+<file path=ppt/slides/slide4.xml><?xml version="1.0" encoding="utf-8"?>
+<p:sld xmlns:a="http://schemas.openxmlformats.org/drawingml/2006/main" xmlns:r="http://schemas.openxmlformats.org/officeDocument/2006/relationships" xmlns:p="http://schemas.openxmlformats.org/presentationml/2006/main">
+  <p:cSld>
+    <p:spTree>
+      <p:nvGrpSpPr>
+        <p:cNvPr id="1" name=""/>
+        <p:cNvGrpSpPr/>
+        <p:nvPr/>
+      </p:nvGrpSpPr>
+      <p:grpSpPr>
+        <a:xfrm>
+          <a:off x="0" y="0"/>
+          <a:ext cx="0" cy="0"/>
+          <a:chOff x="0" y="0"/>
+          <a:chExt cx="0" cy="0"/>
+        </a:xfrm>
+      </p:grpSpPr>
+      <p:sp>
+        <p:nvSpPr>
+          <p:cNvPr id="3" name="Titre 2">
+            <a:extLst>
+              <a:ext uri="{FF2B5EF4-FFF2-40B4-BE49-F238E27FC236}">
+                <a16:creationId xmlns:a16="http://schemas.microsoft.com/office/drawing/2014/main" id="{DA480834-FB63-3032-ADA6-17D22532B491}"/>
+              </a:ext>
+            </a:extLst>
+          </p:cNvPr>
+          <p:cNvSpPr>
+            <a:spLocks noGrp="1"/>
+          </p:cNvSpPr>
+          <p:nvPr>
+            <p:ph type="title"/>
+          </p:nvPr>
+        </p:nvSpPr>
+        <p:spPr/>
+        <p:txBody>
+          <a:bodyPr/>
+          <a:lstStyle/>
+          <a:p>
+            <a:r>
+              <a:rPr lang="fr-FR" dirty="0"/>
+              <a:t>09/06 </a:t>
+            </a:r>
+          </a:p>
+        </p:txBody>
+      </p:sp>
+      <p:pic>
+        <p:nvPicPr>
+          <p:cNvPr id="5" name="Image 4">
+            <a:extLst>
+              <a:ext uri="{FF2B5EF4-FFF2-40B4-BE49-F238E27FC236}">
+                <a16:creationId xmlns:a16="http://schemas.microsoft.com/office/drawing/2014/main" id="{43783C54-F88B-5FBB-5A6E-67D18CDBB5E7}"/>
+              </a:ext>
+            </a:extLst>
+          </p:cNvPr>
+          <p:cNvPicPr>
+            <a:picLocks noChangeAspect="1"/>
+          </p:cNvPicPr>
+          <p:nvPr/>
+        </p:nvPicPr>
+        <p:blipFill>
+          <a:blip r:embed="rId2"/>
+          <a:stretch>
+            <a:fillRect/>
+          </a:stretch>
+        </p:blipFill>
+        <p:spPr>
+          <a:xfrm>
+            <a:off x="984361" y="941659"/>
+            <a:ext cx="7672572" cy="1850615"/>
+          </a:xfrm>
+          <a:prstGeom prst="rect">
+            <a:avLst/>
+          </a:prstGeom>
+        </p:spPr>
+      </p:pic>
+      <p:sp>
+        <p:nvSpPr>
+          <p:cNvPr id="6" name="ZoneTexte 5">
+            <a:extLst>
+              <a:ext uri="{FF2B5EF4-FFF2-40B4-BE49-F238E27FC236}">
+                <a16:creationId xmlns:a16="http://schemas.microsoft.com/office/drawing/2014/main" id="{C08CA92A-C4D0-7534-BB3C-CB39598FD89A}"/>
+              </a:ext>
+            </a:extLst>
+          </p:cNvPr>
+          <p:cNvSpPr txBox="1"/>
+          <p:nvPr/>
+        </p:nvSpPr>
+        <p:spPr>
+          <a:xfrm>
+            <a:off x="984361" y="3050745"/>
+            <a:ext cx="6489277" cy="1815882"/>
+          </a:xfrm>
+          <a:prstGeom prst="rect">
+            <a:avLst/>
+          </a:prstGeom>
+          <a:noFill/>
+        </p:spPr>
+        <p:txBody>
+          <a:bodyPr wrap="none" rtlCol="0">
+            <a:spAutoFit/>
+          </a:bodyPr>
+          <a:lstStyle/>
+          <a:p>
+            <a:r>
+              <a:rPr lang="fr-FR" dirty="0">
+                <a:latin typeface="Courier New" panose="02070309020205020404" pitchFamily="49" charset="0"/>
+                <a:cs typeface="Courier New" panose="02070309020205020404" pitchFamily="49" charset="0"/>
+              </a:rPr>
+              <a:t>sklearn </a:t>
+            </a:r>
+            <a:r>
+              <a:rPr lang="fr-FR" dirty="0" err="1">
+                <a:latin typeface="Courier New" panose="02070309020205020404" pitchFamily="49" charset="0"/>
+                <a:cs typeface="Courier New" panose="02070309020205020404" pitchFamily="49" charset="0"/>
+              </a:rPr>
+              <a:t>models</a:t>
+            </a:r>
+            <a:endParaRPr lang="fr-FR" dirty="0">
+              <a:latin typeface="Courier New" panose="02070309020205020404" pitchFamily="49" charset="0"/>
+              <a:cs typeface="Courier New" panose="02070309020205020404" pitchFamily="49" charset="0"/>
+            </a:endParaRPr>
+          </a:p>
+          <a:p>
+            <a:r>
+              <a:rPr lang="fr-FR" dirty="0" err="1">
+                <a:latin typeface="Courier New" panose="02070309020205020404" pitchFamily="49" charset="0"/>
+                <a:cs typeface="Courier New" panose="02070309020205020404" pitchFamily="49" charset="0"/>
+              </a:rPr>
+              <a:t>Tensorflow</a:t>
+            </a:r>
+            <a:r>
+              <a:rPr lang="fr-FR" dirty="0">
+                <a:latin typeface="Courier New" panose="02070309020205020404" pitchFamily="49" charset="0"/>
+                <a:cs typeface="Courier New" panose="02070309020205020404" pitchFamily="49" charset="0"/>
+              </a:rPr>
+              <a:t>/</a:t>
+            </a:r>
+            <a:r>
+              <a:rPr lang="fr-FR" dirty="0" err="1">
+                <a:latin typeface="Courier New" panose="02070309020205020404" pitchFamily="49" charset="0"/>
+                <a:cs typeface="Courier New" panose="02070309020205020404" pitchFamily="49" charset="0"/>
+              </a:rPr>
+              <a:t>Keras</a:t>
+            </a:r>
+            <a:r>
+              <a:rPr lang="fr-FR" dirty="0">
+                <a:latin typeface="Courier New" panose="02070309020205020404" pitchFamily="49" charset="0"/>
+                <a:cs typeface="Courier New" panose="02070309020205020404" pitchFamily="49" charset="0"/>
+              </a:rPr>
+              <a:t> </a:t>
+            </a:r>
+            <a:r>
+              <a:rPr lang="fr-FR" dirty="0" err="1">
+                <a:latin typeface="Courier New" panose="02070309020205020404" pitchFamily="49" charset="0"/>
+                <a:cs typeface="Courier New" panose="02070309020205020404" pitchFamily="49" charset="0"/>
+              </a:rPr>
+              <a:t>models</a:t>
+            </a:r>
+            <a:endParaRPr lang="fr-FR" dirty="0">
+              <a:latin typeface="Courier New" panose="02070309020205020404" pitchFamily="49" charset="0"/>
+              <a:cs typeface="Courier New" panose="02070309020205020404" pitchFamily="49" charset="0"/>
+            </a:endParaRPr>
+          </a:p>
+          <a:p>
+            <a:r>
+              <a:rPr lang="fr-FR" dirty="0">
+                <a:latin typeface="Courier New" panose="02070309020205020404" pitchFamily="49" charset="0"/>
+                <a:cs typeface="Courier New" panose="02070309020205020404" pitchFamily="49" charset="0"/>
+              </a:rPr>
+              <a:t>get data </a:t>
+            </a:r>
+            <a:r>
+              <a:rPr lang="fr-FR" dirty="0" err="1">
+                <a:latin typeface="Courier New" panose="02070309020205020404" pitchFamily="49" charset="0"/>
+                <a:cs typeface="Courier New" panose="02070309020205020404" pitchFamily="49" charset="0"/>
+              </a:rPr>
+              <a:t>from</a:t>
+            </a:r>
+            <a:r>
+              <a:rPr lang="fr-FR" dirty="0">
+                <a:latin typeface="Courier New" panose="02070309020205020404" pitchFamily="49" charset="0"/>
+                <a:cs typeface="Courier New" panose="02070309020205020404" pitchFamily="49" charset="0"/>
+              </a:rPr>
+              <a:t> S3 (</a:t>
+            </a:r>
+            <a:r>
+              <a:rPr lang="fr-FR" sz="800" dirty="0">
+                <a:latin typeface="Courier New" panose="02070309020205020404" pitchFamily="49" charset="0"/>
+                <a:cs typeface="Courier New" panose="02070309020205020404" pitchFamily="49" charset="0"/>
+                <a:hlinkClick r:id="rId3"/>
+              </a:rPr>
+              <a:t>https://skincheck-bucket.s3.eu-west-3.amazonaws.com/skincheck-dataset/</a:t>
+            </a:r>
+            <a:r>
+              <a:rPr lang="fr-FR" dirty="0">
+                <a:latin typeface="Courier New" panose="02070309020205020404" pitchFamily="49" charset="0"/>
+                <a:cs typeface="Courier New" panose="02070309020205020404" pitchFamily="49" charset="0"/>
+              </a:rPr>
+              <a:t>)</a:t>
+            </a:r>
+          </a:p>
+          <a:p>
+            <a:r>
+              <a:rPr lang="fr-FR" dirty="0">
+                <a:latin typeface="Courier New" panose="02070309020205020404" pitchFamily="49" charset="0"/>
+                <a:cs typeface="Courier New" panose="02070309020205020404" pitchFamily="49" charset="0"/>
+              </a:rPr>
+              <a:t>Run </a:t>
+            </a:r>
+            <a:r>
+              <a:rPr lang="fr-FR" dirty="0" err="1">
+                <a:latin typeface="Courier New" panose="02070309020205020404" pitchFamily="49" charset="0"/>
+                <a:cs typeface="Courier New" panose="02070309020205020404" pitchFamily="49" charset="0"/>
+              </a:rPr>
+              <a:t>locally</a:t>
+            </a:r>
+            <a:endParaRPr lang="fr-FR" dirty="0">
+              <a:latin typeface="Courier New" panose="02070309020205020404" pitchFamily="49" charset="0"/>
+              <a:cs typeface="Courier New" panose="02070309020205020404" pitchFamily="49" charset="0"/>
+            </a:endParaRPr>
+          </a:p>
+          <a:p>
+            <a:pPr algn="l"/>
+            <a:r>
+              <a:rPr lang="fr-FR" dirty="0">
+                <a:latin typeface="Courier New" panose="02070309020205020404" pitchFamily="49" charset="0"/>
+                <a:cs typeface="Courier New" panose="02070309020205020404" pitchFamily="49" charset="0"/>
+              </a:rPr>
+              <a:t>Store </a:t>
+            </a:r>
+            <a:r>
+              <a:rPr lang="fr-FR" dirty="0" err="1">
+                <a:latin typeface="Courier New" panose="02070309020205020404" pitchFamily="49" charset="0"/>
+                <a:cs typeface="Courier New" panose="02070309020205020404" pitchFamily="49" charset="0"/>
+              </a:rPr>
+              <a:t>artifacts</a:t>
+            </a:r>
+            <a:r>
+              <a:rPr lang="fr-FR" dirty="0">
+                <a:latin typeface="Courier New" panose="02070309020205020404" pitchFamily="49" charset="0"/>
+                <a:cs typeface="Courier New" panose="02070309020205020404" pitchFamily="49" charset="0"/>
+              </a:rPr>
+              <a:t> on S3(</a:t>
+            </a:r>
+            <a:r>
+              <a:rPr lang="en-US" sz="800" dirty="0">
+                <a:latin typeface="Courier New" panose="02070309020205020404" pitchFamily="49" charset="0"/>
+                <a:cs typeface="Courier New" panose="02070309020205020404" pitchFamily="49" charset="0"/>
+                <a:hlinkClick r:id="rId4">
+                  <a:extLst>
+                    <a:ext uri="{A12FA001-AC4F-418D-AE19-62706E023703}">
+                      <ahyp:hlinkClr xmlns:ahyp="http://schemas.microsoft.com/office/drawing/2018/hyperlinkcolor" val="tx"/>
+                    </a:ext>
+                  </a:extLst>
+                </a:hlinkClick>
+              </a:rPr>
+              <a:t>Amazon S3</a:t>
+            </a:r>
+            <a:r>
+              <a:rPr lang="en-US" sz="800" dirty="0">
+                <a:latin typeface="Courier New" panose="02070309020205020404" pitchFamily="49" charset="0"/>
+                <a:cs typeface="Courier New" panose="02070309020205020404" pitchFamily="49" charset="0"/>
+              </a:rPr>
+              <a:t>/</a:t>
+            </a:r>
+            <a:r>
+              <a:rPr lang="en-US" sz="800" dirty="0" err="1">
+                <a:latin typeface="Courier New" panose="02070309020205020404" pitchFamily="49" charset="0"/>
+                <a:cs typeface="Courier New" panose="02070309020205020404" pitchFamily="49" charset="0"/>
+                <a:hlinkClick r:id="rId5">
+                  <a:extLst>
+                    <a:ext uri="{A12FA001-AC4F-418D-AE19-62706E023703}">
+                      <ahyp:hlinkClr xmlns:ahyp="http://schemas.microsoft.com/office/drawing/2018/hyperlinkcolor" val="tx"/>
+                    </a:ext>
+                  </a:extLst>
+                </a:hlinkClick>
+              </a:rPr>
+              <a:t>Compartiments</a:t>
+            </a:r>
+            <a:r>
+              <a:rPr lang="en-US" sz="800" dirty="0">
+                <a:latin typeface="Courier New" panose="02070309020205020404" pitchFamily="49" charset="0"/>
+                <a:cs typeface="Courier New" panose="02070309020205020404" pitchFamily="49" charset="0"/>
+              </a:rPr>
+              <a:t>/</a:t>
+            </a:r>
+            <a:r>
+              <a:rPr lang="en-US" sz="800" dirty="0" err="1">
+                <a:latin typeface="Courier New" panose="02070309020205020404" pitchFamily="49" charset="0"/>
+                <a:cs typeface="Courier New" panose="02070309020205020404" pitchFamily="49" charset="0"/>
+                <a:hlinkClick r:id="rId6">
+                  <a:extLst>
+                    <a:ext uri="{A12FA001-AC4F-418D-AE19-62706E023703}">
+                      <ahyp:hlinkClr xmlns:ahyp="http://schemas.microsoft.com/office/drawing/2018/hyperlinkcolor" val="tx"/>
+                    </a:ext>
+                  </a:extLst>
+                </a:hlinkClick>
+              </a:rPr>
+              <a:t>skincheck</a:t>
+            </a:r>
+            <a:r>
+              <a:rPr lang="en-US" sz="800" dirty="0">
+                <a:latin typeface="Courier New" panose="02070309020205020404" pitchFamily="49" charset="0"/>
+                <a:cs typeface="Courier New" panose="02070309020205020404" pitchFamily="49" charset="0"/>
+                <a:hlinkClick r:id="rId6">
+                  <a:extLst>
+                    <a:ext uri="{A12FA001-AC4F-418D-AE19-62706E023703}">
+                      <ahyp:hlinkClr xmlns:ahyp="http://schemas.microsoft.com/office/drawing/2018/hyperlinkcolor" val="tx"/>
+                    </a:ext>
+                  </a:extLst>
+                </a:hlinkClick>
+              </a:rPr>
+              <a:t>-bucket</a:t>
+            </a:r>
+            <a:r>
+              <a:rPr lang="en-US" sz="800" dirty="0">
+                <a:latin typeface="Courier New" panose="02070309020205020404" pitchFamily="49" charset="0"/>
+                <a:cs typeface="Courier New" panose="02070309020205020404" pitchFamily="49" charset="0"/>
+              </a:rPr>
+              <a:t>/</a:t>
+            </a:r>
+            <a:r>
+              <a:rPr lang="en-US" sz="800" dirty="0" err="1">
+                <a:latin typeface="Courier New" panose="02070309020205020404" pitchFamily="49" charset="0"/>
+                <a:cs typeface="Courier New" panose="02070309020205020404" pitchFamily="49" charset="0"/>
+              </a:rPr>
+              <a:t>skincheck</a:t>
+            </a:r>
+            <a:r>
+              <a:rPr lang="en-US" sz="800" dirty="0">
+                <a:latin typeface="Courier New" panose="02070309020205020404" pitchFamily="49" charset="0"/>
+                <a:cs typeface="Courier New" panose="02070309020205020404" pitchFamily="49" charset="0"/>
+              </a:rPr>
+              <a:t>-artifacts/</a:t>
+            </a:r>
+            <a:r>
+              <a:rPr lang="fr-FR" dirty="0">
+                <a:latin typeface="Courier New" panose="02070309020205020404" pitchFamily="49" charset="0"/>
+                <a:cs typeface="Courier New" panose="02070309020205020404" pitchFamily="49" charset="0"/>
+              </a:rPr>
+              <a:t>)</a:t>
+            </a:r>
+          </a:p>
+          <a:p>
+            <a:r>
+              <a:rPr lang="fr-FR" dirty="0">
+                <a:latin typeface="Courier New" panose="02070309020205020404" pitchFamily="49" charset="0"/>
+                <a:cs typeface="Courier New" panose="02070309020205020404" pitchFamily="49" charset="0"/>
+              </a:rPr>
+              <a:t>Store </a:t>
+            </a:r>
+            <a:r>
+              <a:rPr lang="fr-FR" dirty="0" err="1">
+                <a:latin typeface="Courier New" panose="02070309020205020404" pitchFamily="49" charset="0"/>
+                <a:cs typeface="Courier New" panose="02070309020205020404" pitchFamily="49" charset="0"/>
+              </a:rPr>
+              <a:t>parameters</a:t>
+            </a:r>
+            <a:r>
+              <a:rPr lang="fr-FR" dirty="0">
+                <a:latin typeface="Courier New" panose="02070309020205020404" pitchFamily="49" charset="0"/>
+                <a:cs typeface="Courier New" panose="02070309020205020404" pitchFamily="49" charset="0"/>
+              </a:rPr>
+              <a:t> &amp; </a:t>
+            </a:r>
+            <a:r>
+              <a:rPr lang="fr-FR" dirty="0" err="1">
+                <a:latin typeface="Courier New" panose="02070309020205020404" pitchFamily="49" charset="0"/>
+                <a:cs typeface="Courier New" panose="02070309020205020404" pitchFamily="49" charset="0"/>
+              </a:rPr>
+              <a:t>metrics</a:t>
+            </a:r>
+            <a:r>
+              <a:rPr lang="fr-FR" dirty="0">
+                <a:latin typeface="Courier New" panose="02070309020205020404" pitchFamily="49" charset="0"/>
+                <a:cs typeface="Courier New" panose="02070309020205020404" pitchFamily="49" charset="0"/>
+              </a:rPr>
+              <a:t> on </a:t>
+            </a:r>
+            <a:r>
+              <a:rPr lang="fr-FR" dirty="0" err="1">
+                <a:latin typeface="Courier New" panose="02070309020205020404" pitchFamily="49" charset="0"/>
+                <a:cs typeface="Courier New" panose="02070309020205020404" pitchFamily="49" charset="0"/>
+              </a:rPr>
+              <a:t>mlflow</a:t>
+            </a:r>
+            <a:r>
+              <a:rPr lang="fr-FR" dirty="0">
+                <a:latin typeface="Courier New" panose="02070309020205020404" pitchFamily="49" charset="0"/>
+                <a:cs typeface="Courier New" panose="02070309020205020404" pitchFamily="49" charset="0"/>
+              </a:rPr>
+              <a:t> </a:t>
+            </a:r>
+            <a:r>
+              <a:rPr lang="fr-FR" dirty="0" err="1">
+                <a:latin typeface="Courier New" panose="02070309020205020404" pitchFamily="49" charset="0"/>
+                <a:cs typeface="Courier New" panose="02070309020205020404" pitchFamily="49" charset="0"/>
+              </a:rPr>
+              <a:t>tracking</a:t>
+            </a:r>
+            <a:r>
+              <a:rPr lang="fr-FR" dirty="0">
+                <a:latin typeface="Courier New" panose="02070309020205020404" pitchFamily="49" charset="0"/>
+                <a:cs typeface="Courier New" panose="02070309020205020404" pitchFamily="49" charset="0"/>
+              </a:rPr>
+              <a:t> server</a:t>
+            </a:r>
+          </a:p>
+          <a:p>
+            <a:endParaRPr lang="fr-FR" dirty="0">
+              <a:latin typeface="Courier New" panose="02070309020205020404" pitchFamily="49" charset="0"/>
+              <a:cs typeface="Courier New" panose="02070309020205020404" pitchFamily="49" charset="0"/>
+            </a:endParaRPr>
+          </a:p>
+          <a:p>
+            <a:r>
+              <a:rPr lang="fr-FR" dirty="0">
+                <a:latin typeface="Courier New" panose="02070309020205020404" pitchFamily="49" charset="0"/>
+                <a:cs typeface="Courier New" panose="02070309020205020404" pitchFamily="49" charset="0"/>
+              </a:rPr>
+              <a:t>train.py </a:t>
+            </a:r>
+            <a:r>
+              <a:rPr lang="fr-FR" dirty="0" err="1">
+                <a:latin typeface="Courier New" panose="02070309020205020404" pitchFamily="49" charset="0"/>
+                <a:cs typeface="Courier New" panose="02070309020205020404" pitchFamily="49" charset="0"/>
+              </a:rPr>
+              <a:t>is</a:t>
+            </a:r>
+            <a:r>
+              <a:rPr lang="fr-FR" dirty="0">
+                <a:latin typeface="Courier New" panose="02070309020205020404" pitchFamily="49" charset="0"/>
+                <a:cs typeface="Courier New" panose="02070309020205020404" pitchFamily="49" charset="0"/>
+              </a:rPr>
+              <a:t> </a:t>
+            </a:r>
+            <a:r>
+              <a:rPr lang="fr-FR" dirty="0" err="1">
+                <a:latin typeface="Courier New" panose="02070309020205020404" pitchFamily="49" charset="0"/>
+                <a:cs typeface="Courier New" panose="02070309020205020404" pitchFamily="49" charset="0"/>
+              </a:rPr>
+              <a:t>based</a:t>
+            </a:r>
+            <a:r>
+              <a:rPr lang="fr-FR" dirty="0">
+                <a:latin typeface="Courier New" panose="02070309020205020404" pitchFamily="49" charset="0"/>
+                <a:cs typeface="Courier New" panose="02070309020205020404" pitchFamily="49" charset="0"/>
+              </a:rPr>
+              <a:t> </a:t>
+            </a:r>
+            <a:r>
+              <a:rPr lang="fr-FR">
+                <a:latin typeface="Courier New" panose="02070309020205020404" pitchFamily="49" charset="0"/>
+                <a:cs typeface="Courier New" panose="02070309020205020404" pitchFamily="49" charset="0"/>
+              </a:rPr>
+              <a:t>on classes </a:t>
+            </a:r>
+            <a:endParaRPr lang="fr-FR" dirty="0">
+              <a:latin typeface="Courier New" panose="02070309020205020404" pitchFamily="49" charset="0"/>
+              <a:cs typeface="Courier New" panose="02070309020205020404" pitchFamily="49" charset="0"/>
+            </a:endParaRPr>
+          </a:p>
+        </p:txBody>
+      </p:sp>
+    </p:spTree>
+    <p:extLst>
+      <p:ext uri="{BB962C8B-B14F-4D97-AF65-F5344CB8AC3E}">
+        <p14:creationId xmlns:p14="http://schemas.microsoft.com/office/powerpoint/2010/main" val="983029951"/>
       </p:ext>
     </p:extLst>
   </p:cSld>

</xml_diff>

<commit_message>
Test TF avec image TF GPU
</commit_message>
<xml_diff>
--- a/admin/skin_project_archi_0706.pptx
+++ b/admin/skin_project_archi_0706.pptx
@@ -5,13 +5,14 @@
     <p:sldMasterId id="2147483659" r:id="rId1"/>
   </p:sldMasterIdLst>
   <p:notesMasterIdLst>
-    <p:notesMasterId r:id="rId6"/>
+    <p:notesMasterId r:id="rId7"/>
   </p:notesMasterIdLst>
   <p:sldIdLst>
     <p:sldId id="268" r:id="rId2"/>
-    <p:sldId id="265" r:id="rId3"/>
-    <p:sldId id="267" r:id="rId4"/>
-    <p:sldId id="269" r:id="rId5"/>
+    <p:sldId id="270" r:id="rId3"/>
+    <p:sldId id="265" r:id="rId4"/>
+    <p:sldId id="267" r:id="rId5"/>
+    <p:sldId id="269" r:id="rId6"/>
   </p:sldIdLst>
   <p:sldSz cx="9144000" cy="5143500" type="screen16x9"/>
   <p:notesSz cx="6858000" cy="9144000"/>
@@ -255,6 +256,7 @@
 <file path=ppt/revisionInfo.xml><?xml version="1.0" encoding="utf-8"?>
 <p1510:revInfo xmlns:a="http://schemas.openxmlformats.org/drawingml/2006/main" xmlns:r="http://schemas.openxmlformats.org/officeDocument/2006/relationships" xmlns:p1510="http://schemas.microsoft.com/office/powerpoint/2015/10/main">
   <p1510:revLst>
+    <p1510:client id="{9546EC74-A814-454F-9464-CDAF6A2DE971}" v="169" dt="2024-06-10T15:08:38.136"/>
     <p1510:client id="{A89391CB-9751-4520-9ECA-7ECDFA5EA23C}" v="612" dt="2024-06-09T16:18:49.970"/>
   </p1510:revLst>
 </p1510:revInfo>
@@ -1355,6 +1357,198 @@
           </pc:sldLayoutMkLst>
         </pc:sldLayoutChg>
       </pc:sldMasterChg>
+    </pc:docChg>
+  </pc:docChgLst>
+  <pc:docChgLst>
+    <pc:chgData name="Philippe Baucour" userId="5102170ae7533958" providerId="LiveId" clId="{9546EC74-A814-454F-9464-CDAF6A2DE971}"/>
+    <pc:docChg chg="custSel addSld modSld">
+      <pc:chgData name="Philippe Baucour" userId="5102170ae7533958" providerId="LiveId" clId="{9546EC74-A814-454F-9464-CDAF6A2DE971}" dt="2024-06-10T15:09:45.365" v="179" actId="6549"/>
+      <pc:docMkLst>
+        <pc:docMk/>
+      </pc:docMkLst>
+      <pc:sldChg chg="addSp delSp modSp add mod modAnim modNotesTx">
+        <pc:chgData name="Philippe Baucour" userId="5102170ae7533958" providerId="LiveId" clId="{9546EC74-A814-454F-9464-CDAF6A2DE971}" dt="2024-06-10T15:09:45.365" v="179" actId="6549"/>
+        <pc:sldMkLst>
+          <pc:docMk/>
+          <pc:sldMk cId="1373769093" sldId="270"/>
+        </pc:sldMkLst>
+        <pc:spChg chg="del topLvl">
+          <ac:chgData name="Philippe Baucour" userId="5102170ae7533958" providerId="LiveId" clId="{9546EC74-A814-454F-9464-CDAF6A2DE971}" dt="2024-06-10T14:45:22.720" v="25" actId="478"/>
+          <ac:spMkLst>
+            <pc:docMk/>
+            <pc:sldMk cId="1373769093" sldId="270"/>
+            <ac:spMk id="2" creationId="{7FB152FA-6981-EA90-83A1-41DAFE3270F3}"/>
+          </ac:spMkLst>
+        </pc:spChg>
+        <pc:spChg chg="add mod">
+          <ac:chgData name="Philippe Baucour" userId="5102170ae7533958" providerId="LiveId" clId="{9546EC74-A814-454F-9464-CDAF6A2DE971}" dt="2024-06-10T14:48:35.012" v="37" actId="1076"/>
+          <ac:spMkLst>
+            <pc:docMk/>
+            <pc:sldMk cId="1373769093" sldId="270"/>
+            <ac:spMk id="14" creationId="{EC3BE5EB-C72D-BB87-03A1-27B48EEC3965}"/>
+          </ac:spMkLst>
+        </pc:spChg>
+        <pc:spChg chg="del">
+          <ac:chgData name="Philippe Baucour" userId="5102170ae7533958" providerId="LiveId" clId="{9546EC74-A814-454F-9464-CDAF6A2DE971}" dt="2024-06-10T14:41:05.185" v="1" actId="478"/>
+          <ac:spMkLst>
+            <pc:docMk/>
+            <pc:sldMk cId="1373769093" sldId="270"/>
+            <ac:spMk id="20" creationId="{6ABD733F-89FD-A412-51AF-EFF2B0DBD600}"/>
+          </ac:spMkLst>
+        </pc:spChg>
+        <pc:spChg chg="mod topLvl">
+          <ac:chgData name="Philippe Baucour" userId="5102170ae7533958" providerId="LiveId" clId="{9546EC74-A814-454F-9464-CDAF6A2DE971}" dt="2024-06-10T14:45:39.440" v="26" actId="164"/>
+          <ac:spMkLst>
+            <pc:docMk/>
+            <pc:sldMk cId="1373769093" sldId="270"/>
+            <ac:spMk id="31" creationId="{411D03E1-FE63-49A3-4D06-E97A1449DFC3}"/>
+          </ac:spMkLst>
+        </pc:spChg>
+        <pc:spChg chg="del">
+          <ac:chgData name="Philippe Baucour" userId="5102170ae7533958" providerId="LiveId" clId="{9546EC74-A814-454F-9464-CDAF6A2DE971}" dt="2024-06-10T14:50:56.076" v="42" actId="478"/>
+          <ac:spMkLst>
+            <pc:docMk/>
+            <pc:sldMk cId="1373769093" sldId="270"/>
+            <ac:spMk id="48" creationId="{AD104111-C094-DC8C-EF93-9A384BCC4DAA}"/>
+          </ac:spMkLst>
+        </pc:spChg>
+        <pc:spChg chg="del">
+          <ac:chgData name="Philippe Baucour" userId="5102170ae7533958" providerId="LiveId" clId="{9546EC74-A814-454F-9464-CDAF6A2DE971}" dt="2024-06-10T14:47:17.136" v="31" actId="478"/>
+          <ac:spMkLst>
+            <pc:docMk/>
+            <pc:sldMk cId="1373769093" sldId="270"/>
+            <ac:spMk id="52" creationId="{399C0156-77B2-724E-58C3-CB80A7A69061}"/>
+          </ac:spMkLst>
+        </pc:spChg>
+        <pc:spChg chg="del">
+          <ac:chgData name="Philippe Baucour" userId="5102170ae7533958" providerId="LiveId" clId="{9546EC74-A814-454F-9464-CDAF6A2DE971}" dt="2024-06-10T14:47:33.321" v="33" actId="478"/>
+          <ac:spMkLst>
+            <pc:docMk/>
+            <pc:sldMk cId="1373769093" sldId="270"/>
+            <ac:spMk id="53" creationId="{F94A7B61-E32A-5176-ACAA-204F079BF9F1}"/>
+          </ac:spMkLst>
+        </pc:spChg>
+        <pc:spChg chg="mod">
+          <ac:chgData name="Philippe Baucour" userId="5102170ae7533958" providerId="LiveId" clId="{9546EC74-A814-454F-9464-CDAF6A2DE971}" dt="2024-06-10T14:46:02.429" v="28" actId="164"/>
+          <ac:spMkLst>
+            <pc:docMk/>
+            <pc:sldMk cId="1373769093" sldId="270"/>
+            <ac:spMk id="57" creationId="{42D4720D-D86B-CDF4-BA54-47094D836E44}"/>
+          </ac:spMkLst>
+        </pc:spChg>
+        <pc:spChg chg="del">
+          <ac:chgData name="Philippe Baucour" userId="5102170ae7533958" providerId="LiveId" clId="{9546EC74-A814-454F-9464-CDAF6A2DE971}" dt="2024-06-10T14:50:53.397" v="41" actId="478"/>
+          <ac:spMkLst>
+            <pc:docMk/>
+            <pc:sldMk cId="1373769093" sldId="270"/>
+            <ac:spMk id="58" creationId="{B2E8F991-E10B-B949-C93B-A5A143398AB3}"/>
+          </ac:spMkLst>
+        </pc:spChg>
+        <pc:spChg chg="del mod">
+          <ac:chgData name="Philippe Baucour" userId="5102170ae7533958" providerId="LiveId" clId="{9546EC74-A814-454F-9464-CDAF6A2DE971}" dt="2024-06-10T14:42:54.825" v="12" actId="478"/>
+          <ac:spMkLst>
+            <pc:docMk/>
+            <pc:sldMk cId="1373769093" sldId="270"/>
+            <ac:spMk id="1029" creationId="{D7A7CEEA-60D3-E981-000D-38CC7FF6265D}"/>
+          </ac:spMkLst>
+        </pc:spChg>
+        <pc:grpChg chg="add mod">
+          <ac:chgData name="Philippe Baucour" userId="5102170ae7533958" providerId="LiveId" clId="{9546EC74-A814-454F-9464-CDAF6A2DE971}" dt="2024-06-10T14:42:44.172" v="10" actId="164"/>
+          <ac:grpSpMkLst>
+            <pc:docMk/>
+            <pc:sldMk cId="1373769093" sldId="270"/>
+            <ac:grpSpMk id="9" creationId="{1D7ABDEC-5A23-ECDF-0311-34001DB556DB}"/>
+          </ac:grpSpMkLst>
+        </pc:grpChg>
+        <pc:grpChg chg="add mod">
+          <ac:chgData name="Philippe Baucour" userId="5102170ae7533958" providerId="LiveId" clId="{9546EC74-A814-454F-9464-CDAF6A2DE971}" dt="2024-06-10T14:45:39.440" v="26" actId="164"/>
+          <ac:grpSpMkLst>
+            <pc:docMk/>
+            <pc:sldMk cId="1373769093" sldId="270"/>
+            <ac:grpSpMk id="12" creationId="{9ED725BF-90E5-1579-3A48-8DC4BFCF831D}"/>
+          </ac:grpSpMkLst>
+        </pc:grpChg>
+        <pc:grpChg chg="add mod">
+          <ac:chgData name="Philippe Baucour" userId="5102170ae7533958" providerId="LiveId" clId="{9546EC74-A814-454F-9464-CDAF6A2DE971}" dt="2024-06-10T14:46:02.429" v="28" actId="164"/>
+          <ac:grpSpMkLst>
+            <pc:docMk/>
+            <pc:sldMk cId="1373769093" sldId="270"/>
+            <ac:grpSpMk id="13" creationId="{DE30BA35-B98E-D8A5-C9E9-90092CB10684}"/>
+          </ac:grpSpMkLst>
+        </pc:grpChg>
+        <pc:grpChg chg="mod">
+          <ac:chgData name="Philippe Baucour" userId="5102170ae7533958" providerId="LiveId" clId="{9546EC74-A814-454F-9464-CDAF6A2DE971}" dt="2024-06-10T14:45:39.440" v="26" actId="164"/>
+          <ac:grpSpMkLst>
+            <pc:docMk/>
+            <pc:sldMk cId="1373769093" sldId="270"/>
+            <ac:grpSpMk id="24" creationId="{877BD90E-61C7-545A-7D6C-41BFE296E3FA}"/>
+          </ac:grpSpMkLst>
+        </pc:grpChg>
+        <pc:grpChg chg="mod">
+          <ac:chgData name="Philippe Baucour" userId="5102170ae7533958" providerId="LiveId" clId="{9546EC74-A814-454F-9464-CDAF6A2DE971}" dt="2024-06-10T14:46:02.429" v="28" actId="164"/>
+          <ac:grpSpMkLst>
+            <pc:docMk/>
+            <pc:sldMk cId="1373769093" sldId="270"/>
+            <ac:grpSpMk id="56" creationId="{2C2DF18E-AC16-43EF-C64A-8E7B5B3DB147}"/>
+          </ac:grpSpMkLst>
+        </pc:grpChg>
+        <pc:grpChg chg="del">
+          <ac:chgData name="Philippe Baucour" userId="5102170ae7533958" providerId="LiveId" clId="{9546EC74-A814-454F-9464-CDAF6A2DE971}" dt="2024-06-10T14:45:22.720" v="25" actId="478"/>
+          <ac:grpSpMkLst>
+            <pc:docMk/>
+            <pc:sldMk cId="1373769093" sldId="270"/>
+            <ac:grpSpMk id="1036" creationId="{4A82B162-DEFD-9CB7-B60A-A8E228E98432}"/>
+          </ac:grpSpMkLst>
+        </pc:grpChg>
+        <pc:picChg chg="mod">
+          <ac:chgData name="Philippe Baucour" userId="5102170ae7533958" providerId="LiveId" clId="{9546EC74-A814-454F-9464-CDAF6A2DE971}" dt="2024-06-10T14:42:44.172" v="10" actId="164"/>
+          <ac:picMkLst>
+            <pc:docMk/>
+            <pc:sldMk cId="1373769093" sldId="270"/>
+            <ac:picMk id="4" creationId="{717F07D8-AB39-1663-2BCF-301A9A73860B}"/>
+          </ac:picMkLst>
+        </pc:picChg>
+        <pc:picChg chg="mod">
+          <ac:chgData name="Philippe Baucour" userId="5102170ae7533958" providerId="LiveId" clId="{9546EC74-A814-454F-9464-CDAF6A2DE971}" dt="2024-06-10T14:42:44.172" v="10" actId="164"/>
+          <ac:picMkLst>
+            <pc:docMk/>
+            <pc:sldMk cId="1373769093" sldId="270"/>
+            <ac:picMk id="7" creationId="{C912B127-9006-2475-358D-D9BA774A9413}"/>
+          </ac:picMkLst>
+        </pc:picChg>
+        <pc:picChg chg="add mod">
+          <ac:chgData name="Philippe Baucour" userId="5102170ae7533958" providerId="LiveId" clId="{9546EC74-A814-454F-9464-CDAF6A2DE971}" dt="2024-06-10T15:06:05.390" v="166" actId="1076"/>
+          <ac:picMkLst>
+            <pc:docMk/>
+            <pc:sldMk cId="1373769093" sldId="270"/>
+            <ac:picMk id="16" creationId="{62ED3F04-1018-2948-F086-DDBA0B2AB2A7}"/>
+          </ac:picMkLst>
+        </pc:picChg>
+        <pc:cxnChg chg="mod">
+          <ac:chgData name="Philippe Baucour" userId="5102170ae7533958" providerId="LiveId" clId="{9546EC74-A814-454F-9464-CDAF6A2DE971}" dt="2024-06-10T14:42:34.353" v="9" actId="1036"/>
+          <ac:cxnSpMkLst>
+            <pc:docMk/>
+            <pc:sldMk cId="1373769093" sldId="270"/>
+            <ac:cxnSpMk id="23" creationId="{DE938E05-1E91-AB1C-333D-CBB158AF050C}"/>
+          </ac:cxnSpMkLst>
+        </pc:cxnChg>
+        <pc:cxnChg chg="mod">
+          <ac:chgData name="Philippe Baucour" userId="5102170ae7533958" providerId="LiveId" clId="{9546EC74-A814-454F-9464-CDAF6A2DE971}" dt="2024-06-10T14:42:34.353" v="9" actId="1036"/>
+          <ac:cxnSpMkLst>
+            <pc:docMk/>
+            <pc:sldMk cId="1373769093" sldId="270"/>
+            <ac:cxnSpMk id="27" creationId="{064AB111-5E64-B0CE-170E-10ADD415D98D}"/>
+          </ac:cxnSpMkLst>
+        </pc:cxnChg>
+        <pc:cxnChg chg="mod">
+          <ac:chgData name="Philippe Baucour" userId="5102170ae7533958" providerId="LiveId" clId="{9546EC74-A814-454F-9464-CDAF6A2DE971}" dt="2024-06-10T14:42:34.353" v="9" actId="1036"/>
+          <ac:cxnSpMkLst>
+            <pc:docMk/>
+            <pc:sldMk cId="1373769093" sldId="270"/>
+            <ac:cxnSpMk id="38" creationId="{F912D15A-4AC2-F142-7374-BF328BB1026B}"/>
+          </ac:cxnSpMkLst>
+        </pc:cxnChg>
+      </pc:sldChg>
     </pc:docChg>
   </pc:docChgLst>
   <pc:docChgLst>
@@ -2655,6 +2849,75 @@
             <a:pPr marL="158750" indent="0">
               <a:buNone/>
             </a:pPr>
+            <a:endParaRPr lang="fr-FR" dirty="0"/>
+          </a:p>
+        </p:txBody>
+      </p:sp>
+    </p:spTree>
+    <p:extLst>
+      <p:ext uri="{BB962C8B-B14F-4D97-AF65-F5344CB8AC3E}">
+        <p14:creationId xmlns:p14="http://schemas.microsoft.com/office/powerpoint/2010/main" val="721325654"/>
+      </p:ext>
+    </p:extLst>
+  </p:cSld>
+  <p:clrMapOvr>
+    <a:masterClrMapping/>
+  </p:clrMapOvr>
+</p:notes>
+</file>
+
+<file path=ppt/notesSlides/notesSlide3.xml><?xml version="1.0" encoding="utf-8"?>
+<p:notes xmlns:a="http://schemas.openxmlformats.org/drawingml/2006/main" xmlns:r="http://schemas.openxmlformats.org/officeDocument/2006/relationships" xmlns:p="http://schemas.openxmlformats.org/presentationml/2006/main">
+  <p:cSld>
+    <p:spTree>
+      <p:nvGrpSpPr>
+        <p:cNvPr id="1" name=""/>
+        <p:cNvGrpSpPr/>
+        <p:nvPr/>
+      </p:nvGrpSpPr>
+      <p:grpSpPr>
+        <a:xfrm>
+          <a:off x="0" y="0"/>
+          <a:ext cx="0" cy="0"/>
+          <a:chOff x="0" y="0"/>
+          <a:chExt cx="0" cy="0"/>
+        </a:xfrm>
+      </p:grpSpPr>
+      <p:sp>
+        <p:nvSpPr>
+          <p:cNvPr id="2" name="Espace réservé de l'image des diapositives 1"/>
+          <p:cNvSpPr>
+            <a:spLocks noGrp="1" noRot="1" noChangeAspect="1"/>
+          </p:cNvSpPr>
+          <p:nvPr>
+            <p:ph type="sldImg"/>
+          </p:nvPr>
+        </p:nvSpPr>
+        <p:spPr>
+          <a:xfrm>
+            <a:off x="381000" y="685800"/>
+            <a:ext cx="6096000" cy="3429000"/>
+          </a:xfrm>
+        </p:spPr>
+      </p:sp>
+      <p:sp>
+        <p:nvSpPr>
+          <p:cNvPr id="3" name="Espace réservé des notes 2"/>
+          <p:cNvSpPr>
+            <a:spLocks noGrp="1"/>
+          </p:cNvSpPr>
+          <p:nvPr>
+            <p:ph type="body" idx="1"/>
+          </p:nvPr>
+        </p:nvSpPr>
+        <p:spPr/>
+        <p:txBody>
+          <a:bodyPr/>
+          <a:lstStyle/>
+          <a:p>
+            <a:pPr marL="158750" indent="0">
+              <a:buNone/>
+            </a:pPr>
             <a:r>
               <a:rPr lang="fr-FR" dirty="0"/>
               <a:t>1 – </a:t>
@@ -2760,7 +3023,7 @@
 </p:notes>
 </file>
 
-<file path=ppt/notesSlides/notesSlide3.xml><?xml version="1.0" encoding="utf-8"?>
+<file path=ppt/notesSlides/notesSlide4.xml><?xml version="1.0" encoding="utf-8"?>
 <p:notes xmlns:a="http://schemas.openxmlformats.org/drawingml/2006/main" xmlns:r="http://schemas.openxmlformats.org/officeDocument/2006/relationships" xmlns:p="http://schemas.openxmlformats.org/presentationml/2006/main">
   <p:cSld>
     <p:spTree>
@@ -7233,6 +7496,3000 @@
       </p:grpSpPr>
       <p:sp>
         <p:nvSpPr>
+          <p:cNvPr id="37" name="Rectangle 36">
+            <a:extLst>
+              <a:ext uri="{FF2B5EF4-FFF2-40B4-BE49-F238E27FC236}">
+                <a16:creationId xmlns:a16="http://schemas.microsoft.com/office/drawing/2014/main" id="{18882719-D0A3-5B55-C871-F003AC1A6FBE}"/>
+              </a:ext>
+            </a:extLst>
+          </p:cNvPr>
+          <p:cNvSpPr/>
+          <p:nvPr/>
+        </p:nvSpPr>
+        <p:spPr>
+          <a:xfrm>
+            <a:off x="3350799" y="1569428"/>
+            <a:ext cx="1685411" cy="2714596"/>
+          </a:xfrm>
+          <a:prstGeom prst="rect">
+            <a:avLst/>
+          </a:prstGeom>
+          <a:solidFill>
+            <a:schemeClr val="bg1">
+              <a:lumMod val="85000"/>
+              <a:alpha val="60000"/>
+            </a:schemeClr>
+          </a:solidFill>
+          <a:ln w="12700"/>
+        </p:spPr>
+        <p:style>
+          <a:lnRef idx="2">
+            <a:schemeClr val="accent3">
+              <a:shade val="15000"/>
+            </a:schemeClr>
+          </a:lnRef>
+          <a:fillRef idx="1">
+            <a:schemeClr val="accent3"/>
+          </a:fillRef>
+          <a:effectRef idx="0">
+            <a:schemeClr val="accent3"/>
+          </a:effectRef>
+          <a:fontRef idx="minor">
+            <a:schemeClr val="lt1"/>
+          </a:fontRef>
+        </p:style>
+        <p:txBody>
+          <a:bodyPr rtlCol="0" anchor="ctr"/>
+          <a:lstStyle/>
+          <a:p>
+            <a:pPr algn="ctr"/>
+            <a:endParaRPr lang="fr-FR" sz="800" dirty="0"/>
+          </a:p>
+        </p:txBody>
+      </p:sp>
+      <p:sp>
+        <p:nvSpPr>
+          <p:cNvPr id="3" name="Titre 2">
+            <a:extLst>
+              <a:ext uri="{FF2B5EF4-FFF2-40B4-BE49-F238E27FC236}">
+                <a16:creationId xmlns:a16="http://schemas.microsoft.com/office/drawing/2014/main" id="{3D5747AA-8B62-5C79-BC10-9F4115BE33B3}"/>
+              </a:ext>
+            </a:extLst>
+          </p:cNvPr>
+          <p:cNvSpPr>
+            <a:spLocks noGrp="1"/>
+          </p:cNvSpPr>
+          <p:nvPr>
+            <p:ph type="title"/>
+          </p:nvPr>
+        </p:nvSpPr>
+        <p:spPr/>
+        <p:txBody>
+          <a:bodyPr/>
+          <a:lstStyle/>
+          <a:p>
+            <a:r>
+              <a:rPr lang="fr-FR" dirty="0" err="1"/>
+              <a:t>SkinCheck</a:t>
+            </a:r>
+            <a:r>
+              <a:rPr lang="fr-FR" dirty="0"/>
+              <a:t> - Objectives</a:t>
+            </a:r>
+          </a:p>
+        </p:txBody>
+      </p:sp>
+      <p:pic>
+        <p:nvPicPr>
+          <p:cNvPr id="5" name="Graphique 4" descr="Ordinateur avec un remplissage uni">
+            <a:extLst>
+              <a:ext uri="{FF2B5EF4-FFF2-40B4-BE49-F238E27FC236}">
+                <a16:creationId xmlns:a16="http://schemas.microsoft.com/office/drawing/2014/main" id="{171BDF44-7979-BAC1-BA99-65B541D80E7E}"/>
+              </a:ext>
+            </a:extLst>
+          </p:cNvPr>
+          <p:cNvPicPr>
+            <a:picLocks noChangeAspect="1"/>
+          </p:cNvPicPr>
+          <p:nvPr/>
+        </p:nvPicPr>
+        <p:blipFill>
+          <a:blip r:embed="rId3">
+            <a:extLst>
+              <a:ext uri="{28A0092B-C50C-407E-A947-70E740481C1C}">
+                <a14:useLocalDpi xmlns:a14="http://schemas.microsoft.com/office/drawing/2010/main" val="0"/>
+              </a:ext>
+              <a:ext uri="{96DAC541-7B7A-43D3-8B79-37D633B846F1}">
+                <asvg:svgBlip xmlns:asvg="http://schemas.microsoft.com/office/drawing/2016/SVG/main" r:embed="rId4"/>
+              </a:ext>
+            </a:extLst>
+          </a:blip>
+          <a:stretch>
+            <a:fillRect/>
+          </a:stretch>
+        </p:blipFill>
+        <p:spPr>
+          <a:xfrm>
+            <a:off x="3897019" y="3595380"/>
+            <a:ext cx="685800" cy="685800"/>
+          </a:xfrm>
+          <a:prstGeom prst="rect">
+            <a:avLst/>
+          </a:prstGeom>
+        </p:spPr>
+      </p:pic>
+      <p:pic>
+        <p:nvPicPr>
+          <p:cNvPr id="6" name="Picture 2" descr="Serveur de données - Icônes la mise en réseau gratuites">
+            <a:extLst>
+              <a:ext uri="{FF2B5EF4-FFF2-40B4-BE49-F238E27FC236}">
+                <a16:creationId xmlns:a16="http://schemas.microsoft.com/office/drawing/2014/main" id="{B7942790-0D7C-2AFF-BB97-F11C27076DF8}"/>
+              </a:ext>
+            </a:extLst>
+          </p:cNvPr>
+          <p:cNvPicPr>
+            <a:picLocks noChangeAspect="1" noChangeArrowheads="1"/>
+          </p:cNvPicPr>
+          <p:nvPr/>
+        </p:nvPicPr>
+        <p:blipFill>
+          <a:blip r:embed="rId5">
+            <a:extLst>
+              <a:ext uri="{28A0092B-C50C-407E-A947-70E740481C1C}">
+                <a14:useLocalDpi xmlns:a14="http://schemas.microsoft.com/office/drawing/2010/main" val="0"/>
+              </a:ext>
+            </a:extLst>
+          </a:blip>
+          <a:srcRect/>
+          <a:stretch>
+            <a:fillRect/>
+          </a:stretch>
+        </p:blipFill>
+        <p:spPr bwMode="auto">
+          <a:xfrm>
+            <a:off x="1601721" y="2519162"/>
+            <a:ext cx="867498" cy="867498"/>
+          </a:xfrm>
+          <a:prstGeom prst="rect">
+            <a:avLst/>
+          </a:prstGeom>
+          <a:noFill/>
+          <a:extLst>
+            <a:ext uri="{909E8E84-426E-40DD-AFC4-6F175D3DCCD1}">
+              <a14:hiddenFill xmlns:a14="http://schemas.microsoft.com/office/drawing/2010/main">
+                <a:solidFill>
+                  <a:srgbClr val="FFFFFF"/>
+                </a:solidFill>
+              </a14:hiddenFill>
+            </a:ext>
+          </a:extLst>
+        </p:spPr>
+      </p:pic>
+      <p:grpSp>
+        <p:nvGrpSpPr>
+          <p:cNvPr id="9" name="Groupe 8">
+            <a:extLst>
+              <a:ext uri="{FF2B5EF4-FFF2-40B4-BE49-F238E27FC236}">
+                <a16:creationId xmlns:a16="http://schemas.microsoft.com/office/drawing/2014/main" id="{1D7ABDEC-5A23-ECDF-0311-34001DB556DB}"/>
+              </a:ext>
+            </a:extLst>
+          </p:cNvPr>
+          <p:cNvGrpSpPr/>
+          <p:nvPr/>
+        </p:nvGrpSpPr>
+        <p:grpSpPr>
+          <a:xfrm>
+            <a:off x="5683522" y="2523515"/>
+            <a:ext cx="996504" cy="867498"/>
+            <a:chOff x="5683522" y="2523515"/>
+            <a:chExt cx="996504" cy="867498"/>
+          </a:xfrm>
+        </p:grpSpPr>
+        <p:pic>
+          <p:nvPicPr>
+            <p:cNvPr id="4" name="Picture 2" descr="Serveur de données - Icônes la mise en réseau gratuites">
+              <a:extLst>
+                <a:ext uri="{FF2B5EF4-FFF2-40B4-BE49-F238E27FC236}">
+                  <a16:creationId xmlns:a16="http://schemas.microsoft.com/office/drawing/2014/main" id="{717F07D8-AB39-1663-2BCF-301A9A73860B}"/>
+                </a:ext>
+              </a:extLst>
+            </p:cNvPr>
+            <p:cNvPicPr>
+              <a:picLocks noChangeAspect="1" noChangeArrowheads="1"/>
+            </p:cNvPicPr>
+            <p:nvPr/>
+          </p:nvPicPr>
+          <p:blipFill>
+            <a:blip r:embed="rId5">
+              <a:extLst>
+                <a:ext uri="{28A0092B-C50C-407E-A947-70E740481C1C}">
+                  <a14:useLocalDpi xmlns:a14="http://schemas.microsoft.com/office/drawing/2010/main" val="0"/>
+                </a:ext>
+              </a:extLst>
+            </a:blip>
+            <a:srcRect/>
+            <a:stretch>
+              <a:fillRect/>
+            </a:stretch>
+          </p:blipFill>
+          <p:spPr bwMode="auto">
+            <a:xfrm>
+              <a:off x="5812528" y="2523515"/>
+              <a:ext cx="867498" cy="867498"/>
+            </a:xfrm>
+            <a:prstGeom prst="rect">
+              <a:avLst/>
+            </a:prstGeom>
+            <a:noFill/>
+            <a:extLst>
+              <a:ext uri="{909E8E84-426E-40DD-AFC4-6F175D3DCCD1}">
+                <a14:hiddenFill xmlns:a14="http://schemas.microsoft.com/office/drawing/2010/main">
+                  <a:solidFill>
+                    <a:srgbClr val="FFFFFF"/>
+                  </a:solidFill>
+                </a14:hiddenFill>
+              </a:ext>
+            </a:extLst>
+          </p:spPr>
+        </p:pic>
+        <p:pic>
+          <p:nvPicPr>
+            <p:cNvPr id="7" name="Graphique 6" descr="Base de données avec un remplissage uni">
+              <a:extLst>
+                <a:ext uri="{FF2B5EF4-FFF2-40B4-BE49-F238E27FC236}">
+                  <a16:creationId xmlns:a16="http://schemas.microsoft.com/office/drawing/2014/main" id="{C912B127-9006-2475-358D-D9BA774A9413}"/>
+                </a:ext>
+              </a:extLst>
+            </p:cNvPr>
+            <p:cNvPicPr>
+              <a:picLocks noChangeAspect="1"/>
+            </p:cNvPicPr>
+            <p:nvPr/>
+          </p:nvPicPr>
+          <p:blipFill>
+            <a:blip r:embed="rId6">
+              <a:extLst>
+                <a:ext uri="{28A0092B-C50C-407E-A947-70E740481C1C}">
+                  <a14:useLocalDpi xmlns:a14="http://schemas.microsoft.com/office/drawing/2010/main" val="0"/>
+                </a:ext>
+                <a:ext uri="{96DAC541-7B7A-43D3-8B79-37D633B846F1}">
+                  <asvg:svgBlip xmlns:asvg="http://schemas.microsoft.com/office/drawing/2016/SVG/main" r:embed="rId7"/>
+                </a:ext>
+              </a:extLst>
+            </a:blip>
+            <a:stretch>
+              <a:fillRect/>
+            </a:stretch>
+          </p:blipFill>
+          <p:spPr>
+            <a:xfrm>
+              <a:off x="5683522" y="2982700"/>
+              <a:ext cx="382575" cy="382575"/>
+            </a:xfrm>
+            <a:prstGeom prst="rect">
+              <a:avLst/>
+            </a:prstGeom>
+          </p:spPr>
+        </p:pic>
+      </p:grpSp>
+      <p:sp>
+        <p:nvSpPr>
+          <p:cNvPr id="17" name="ZoneTexte 16">
+            <a:extLst>
+              <a:ext uri="{FF2B5EF4-FFF2-40B4-BE49-F238E27FC236}">
+                <a16:creationId xmlns:a16="http://schemas.microsoft.com/office/drawing/2014/main" id="{54722831-7D4F-84F9-2575-CBF76C7F93C3}"/>
+              </a:ext>
+            </a:extLst>
+          </p:cNvPr>
+          <p:cNvSpPr txBox="1"/>
+          <p:nvPr/>
+        </p:nvSpPr>
+        <p:spPr>
+          <a:xfrm>
+            <a:off x="159604" y="3149831"/>
+            <a:ext cx="598561" cy="215444"/>
+          </a:xfrm>
+          <a:prstGeom prst="rect">
+            <a:avLst/>
+          </a:prstGeom>
+          <a:solidFill>
+            <a:schemeClr val="accent2">
+              <a:lumMod val="20000"/>
+              <a:lumOff val="80000"/>
+            </a:schemeClr>
+          </a:solidFill>
+          <a:ln w="3175">
+            <a:solidFill>
+              <a:schemeClr val="tx1"/>
+            </a:solidFill>
+          </a:ln>
+        </p:spPr>
+        <p:txBody>
+          <a:bodyPr wrap="square" rtlCol="0" anchor="ctr">
+            <a:spAutoFit/>
+          </a:bodyPr>
+          <a:lstStyle>
+            <a:defPPr marR="0" lvl="0" algn="l" rtl="0">
+              <a:lnSpc>
+                <a:spcPct val="100000"/>
+              </a:lnSpc>
+              <a:spcBef>
+                <a:spcPts val="0"/>
+              </a:spcBef>
+              <a:spcAft>
+                <a:spcPts val="0"/>
+              </a:spcAft>
+              <a:defRPr/>
+            </a:defPPr>
+            <a:lvl1pPr algn="ctr">
+              <a:defRPr sz="675">
+                <a:latin typeface="Courier New" panose="02070309020205020404" pitchFamily="49" charset="0"/>
+                <a:cs typeface="Courier New" panose="02070309020205020404" pitchFamily="49" charset="0"/>
+              </a:defRPr>
+            </a:lvl1pPr>
+          </a:lstStyle>
+          <a:p>
+            <a:r>
+              <a:rPr lang="fr-FR" sz="800" dirty="0"/>
+              <a:t>Data</a:t>
+            </a:r>
+          </a:p>
+        </p:txBody>
+      </p:sp>
+      <p:cxnSp>
+        <p:nvCxnSpPr>
+          <p:cNvPr id="21" name="Connecteur droit avec flèche 20">
+            <a:extLst>
+              <a:ext uri="{FF2B5EF4-FFF2-40B4-BE49-F238E27FC236}">
+                <a16:creationId xmlns:a16="http://schemas.microsoft.com/office/drawing/2014/main" id="{3E5CC60F-E55F-BB01-045D-DB2636F3D02F}"/>
+              </a:ext>
+            </a:extLst>
+          </p:cNvPr>
+          <p:cNvCxnSpPr>
+            <a:cxnSpLocks/>
+            <a:stCxn id="6" idx="3"/>
+          </p:cNvCxnSpPr>
+          <p:nvPr/>
+        </p:nvCxnSpPr>
+        <p:spPr>
+          <a:xfrm flipV="1">
+            <a:off x="2469219" y="2948139"/>
+            <a:ext cx="846859" cy="4772"/>
+          </a:xfrm>
+          <a:prstGeom prst="straightConnector1">
+            <a:avLst/>
+          </a:prstGeom>
+          <a:ln w="57150">
+            <a:headEnd type="triangle"/>
+            <a:tailEnd type="triangle"/>
+          </a:ln>
+        </p:spPr>
+        <p:style>
+          <a:lnRef idx="1">
+            <a:schemeClr val="accent1"/>
+          </a:lnRef>
+          <a:fillRef idx="0">
+            <a:schemeClr val="accent1"/>
+          </a:fillRef>
+          <a:effectRef idx="0">
+            <a:schemeClr val="accent1"/>
+          </a:effectRef>
+          <a:fontRef idx="minor">
+            <a:schemeClr val="tx1"/>
+          </a:fontRef>
+        </p:style>
+      </p:cxnSp>
+      <p:cxnSp>
+        <p:nvCxnSpPr>
+          <p:cNvPr id="23" name="Connecteur droit avec flèche 22">
+            <a:extLst>
+              <a:ext uri="{FF2B5EF4-FFF2-40B4-BE49-F238E27FC236}">
+                <a16:creationId xmlns:a16="http://schemas.microsoft.com/office/drawing/2014/main" id="{DE938E05-1E91-AB1C-333D-CBB158AF050C}"/>
+              </a:ext>
+            </a:extLst>
+          </p:cNvPr>
+          <p:cNvCxnSpPr>
+            <a:cxnSpLocks/>
+            <a:endCxn id="4" idx="1"/>
+          </p:cNvCxnSpPr>
+          <p:nvPr/>
+        </p:nvCxnSpPr>
+        <p:spPr>
+          <a:xfrm flipV="1">
+            <a:off x="5036210" y="2957264"/>
+            <a:ext cx="776318" cy="5170"/>
+          </a:xfrm>
+          <a:prstGeom prst="straightConnector1">
+            <a:avLst/>
+          </a:prstGeom>
+          <a:ln w="57150">
+            <a:headEnd type="none"/>
+            <a:tailEnd type="triangle"/>
+          </a:ln>
+        </p:spPr>
+        <p:style>
+          <a:lnRef idx="1">
+            <a:schemeClr val="accent1"/>
+          </a:lnRef>
+          <a:fillRef idx="0">
+            <a:schemeClr val="accent1"/>
+          </a:fillRef>
+          <a:effectRef idx="0">
+            <a:schemeClr val="accent1"/>
+          </a:effectRef>
+          <a:fontRef idx="minor">
+            <a:schemeClr val="tx1"/>
+          </a:fontRef>
+        </p:style>
+      </p:cxnSp>
+      <p:cxnSp>
+        <p:nvCxnSpPr>
+          <p:cNvPr id="27" name="Connecteur droit avec flèche 26">
+            <a:extLst>
+              <a:ext uri="{FF2B5EF4-FFF2-40B4-BE49-F238E27FC236}">
+                <a16:creationId xmlns:a16="http://schemas.microsoft.com/office/drawing/2014/main" id="{064AB111-5E64-B0CE-170E-10ADD415D98D}"/>
+              </a:ext>
+            </a:extLst>
+          </p:cNvPr>
+          <p:cNvCxnSpPr>
+            <a:cxnSpLocks/>
+            <a:stCxn id="4" idx="2"/>
+          </p:cNvCxnSpPr>
+          <p:nvPr/>
+        </p:nvCxnSpPr>
+        <p:spPr>
+          <a:xfrm>
+            <a:off x="6246277" y="3391013"/>
+            <a:ext cx="6635" cy="650582"/>
+          </a:xfrm>
+          <a:prstGeom prst="straightConnector1">
+            <a:avLst/>
+          </a:prstGeom>
+          <a:ln w="57150">
+            <a:headEnd type="none"/>
+            <a:tailEnd type="triangle"/>
+          </a:ln>
+        </p:spPr>
+        <p:style>
+          <a:lnRef idx="1">
+            <a:schemeClr val="accent1"/>
+          </a:lnRef>
+          <a:fillRef idx="0">
+            <a:schemeClr val="accent1"/>
+          </a:fillRef>
+          <a:effectRef idx="0">
+            <a:schemeClr val="accent1"/>
+          </a:effectRef>
+          <a:fontRef idx="minor">
+            <a:schemeClr val="tx1"/>
+          </a:fontRef>
+        </p:style>
+      </p:cxnSp>
+      <p:pic>
+        <p:nvPicPr>
+          <p:cNvPr id="33" name="Graphique 32" descr="Ordinateur avec un remplissage uni">
+            <a:extLst>
+              <a:ext uri="{FF2B5EF4-FFF2-40B4-BE49-F238E27FC236}">
+                <a16:creationId xmlns:a16="http://schemas.microsoft.com/office/drawing/2014/main" id="{BCAC1AA9-5DC8-F914-5F46-7AB93D73E38B}"/>
+              </a:ext>
+            </a:extLst>
+          </p:cNvPr>
+          <p:cNvPicPr>
+            <a:picLocks noChangeAspect="1"/>
+          </p:cNvPicPr>
+          <p:nvPr/>
+        </p:nvPicPr>
+        <p:blipFill>
+          <a:blip r:embed="rId3">
+            <a:extLst>
+              <a:ext uri="{28A0092B-C50C-407E-A947-70E740481C1C}">
+                <a14:useLocalDpi xmlns:a14="http://schemas.microsoft.com/office/drawing/2010/main" val="0"/>
+              </a:ext>
+              <a:ext uri="{96DAC541-7B7A-43D3-8B79-37D633B846F1}">
+                <asvg:svgBlip xmlns:asvg="http://schemas.microsoft.com/office/drawing/2016/SVG/main" r:embed="rId4"/>
+              </a:ext>
+            </a:extLst>
+          </a:blip>
+          <a:stretch>
+            <a:fillRect/>
+          </a:stretch>
+        </p:blipFill>
+        <p:spPr>
+          <a:xfrm>
+            <a:off x="7684140" y="2612419"/>
+            <a:ext cx="685800" cy="685800"/>
+          </a:xfrm>
+          <a:prstGeom prst="rect">
+            <a:avLst/>
+          </a:prstGeom>
+        </p:spPr>
+      </p:pic>
+      <p:cxnSp>
+        <p:nvCxnSpPr>
+          <p:cNvPr id="38" name="Connecteur droit avec flèche 37">
+            <a:extLst>
+              <a:ext uri="{FF2B5EF4-FFF2-40B4-BE49-F238E27FC236}">
+                <a16:creationId xmlns:a16="http://schemas.microsoft.com/office/drawing/2014/main" id="{F912D15A-4AC2-F142-7374-BF328BB1026B}"/>
+              </a:ext>
+            </a:extLst>
+          </p:cNvPr>
+          <p:cNvCxnSpPr>
+            <a:cxnSpLocks/>
+            <a:stCxn id="4" idx="3"/>
+            <a:endCxn id="33" idx="1"/>
+          </p:cNvCxnSpPr>
+          <p:nvPr/>
+        </p:nvCxnSpPr>
+        <p:spPr>
+          <a:xfrm flipV="1">
+            <a:off x="6680026" y="2955319"/>
+            <a:ext cx="1004114" cy="1945"/>
+          </a:xfrm>
+          <a:prstGeom prst="straightConnector1">
+            <a:avLst/>
+          </a:prstGeom>
+          <a:ln w="57150">
+            <a:headEnd type="triangle"/>
+            <a:tailEnd type="triangle"/>
+          </a:ln>
+        </p:spPr>
+        <p:style>
+          <a:lnRef idx="1">
+            <a:schemeClr val="accent1"/>
+          </a:lnRef>
+          <a:fillRef idx="0">
+            <a:schemeClr val="accent1"/>
+          </a:fillRef>
+          <a:effectRef idx="0">
+            <a:schemeClr val="accent1"/>
+          </a:effectRef>
+          <a:fontRef idx="minor">
+            <a:schemeClr val="tx1"/>
+          </a:fontRef>
+        </p:style>
+      </p:cxnSp>
+      <p:grpSp>
+        <p:nvGrpSpPr>
+          <p:cNvPr id="1031" name="Groupe 1030">
+            <a:extLst>
+              <a:ext uri="{FF2B5EF4-FFF2-40B4-BE49-F238E27FC236}">
+                <a16:creationId xmlns:a16="http://schemas.microsoft.com/office/drawing/2014/main" id="{27408B37-7571-659D-5374-18E36A087DF5}"/>
+              </a:ext>
+            </a:extLst>
+          </p:cNvPr>
+          <p:cNvGrpSpPr/>
+          <p:nvPr/>
+        </p:nvGrpSpPr>
+        <p:grpSpPr>
+          <a:xfrm>
+            <a:off x="1523737" y="3421814"/>
+            <a:ext cx="951106" cy="435318"/>
+            <a:chOff x="1918907" y="2319014"/>
+            <a:chExt cx="951106" cy="435318"/>
+          </a:xfrm>
+        </p:grpSpPr>
+        <p:sp>
+          <p:nvSpPr>
+            <p:cNvPr id="10" name="Rectangle 9">
+              <a:extLst>
+                <a:ext uri="{FF2B5EF4-FFF2-40B4-BE49-F238E27FC236}">
+                  <a16:creationId xmlns:a16="http://schemas.microsoft.com/office/drawing/2014/main" id="{74915136-7F52-0861-8BFB-648DDFFB0CDE}"/>
+                </a:ext>
+              </a:extLst>
+            </p:cNvPr>
+            <p:cNvSpPr/>
+            <p:nvPr/>
+          </p:nvSpPr>
+          <p:spPr>
+            <a:xfrm>
+              <a:off x="1918907" y="2533806"/>
+              <a:ext cx="951105" cy="220526"/>
+            </a:xfrm>
+            <a:prstGeom prst="rect">
+              <a:avLst/>
+            </a:prstGeom>
+            <a:solidFill>
+              <a:schemeClr val="accent4">
+                <a:lumMod val="20000"/>
+                <a:lumOff val="80000"/>
+              </a:schemeClr>
+            </a:solidFill>
+            <a:ln w="3175"/>
+          </p:spPr>
+          <p:style>
+            <a:lnRef idx="2">
+              <a:schemeClr val="accent1">
+                <a:shade val="15000"/>
+              </a:schemeClr>
+            </a:lnRef>
+            <a:fillRef idx="1">
+              <a:schemeClr val="accent1"/>
+            </a:fillRef>
+            <a:effectRef idx="0">
+              <a:schemeClr val="accent1"/>
+            </a:effectRef>
+            <a:fontRef idx="minor">
+              <a:schemeClr val="lt1"/>
+            </a:fontRef>
+          </p:style>
+          <p:txBody>
+            <a:bodyPr rtlCol="0" anchor="ctr"/>
+            <a:lstStyle/>
+            <a:p>
+              <a:pPr algn="ctr"/>
+              <a:r>
+                <a:rPr lang="fr-FR" sz="800" dirty="0">
+                  <a:solidFill>
+                    <a:schemeClr val="tx1"/>
+                  </a:solidFill>
+                  <a:latin typeface="Courier New" panose="02070309020205020404" pitchFamily="49" charset="0"/>
+                  <a:cs typeface="Courier New" panose="02070309020205020404" pitchFamily="49" charset="0"/>
+                </a:rPr>
+                <a:t>S3</a:t>
+              </a:r>
+            </a:p>
+          </p:txBody>
+        </p:sp>
+        <p:sp>
+          <p:nvSpPr>
+            <p:cNvPr id="11" name="ZoneTexte 10">
+              <a:extLst>
+                <a:ext uri="{FF2B5EF4-FFF2-40B4-BE49-F238E27FC236}">
+                  <a16:creationId xmlns:a16="http://schemas.microsoft.com/office/drawing/2014/main" id="{79E35FDB-22AC-7F4D-2AE0-1F1272A4399D}"/>
+                </a:ext>
+              </a:extLst>
+            </p:cNvPr>
+            <p:cNvSpPr txBox="1"/>
+            <p:nvPr/>
+          </p:nvSpPr>
+          <p:spPr>
+            <a:xfrm>
+              <a:off x="1918908" y="2319014"/>
+              <a:ext cx="951105" cy="215444"/>
+            </a:xfrm>
+            <a:prstGeom prst="rect">
+              <a:avLst/>
+            </a:prstGeom>
+            <a:solidFill>
+              <a:schemeClr val="accent2">
+                <a:lumMod val="20000"/>
+                <a:lumOff val="80000"/>
+              </a:schemeClr>
+            </a:solidFill>
+            <a:ln w="3175">
+              <a:solidFill>
+                <a:schemeClr val="tx1"/>
+              </a:solidFill>
+            </a:ln>
+          </p:spPr>
+          <p:txBody>
+            <a:bodyPr wrap="square" rtlCol="0" anchor="ctr">
+              <a:spAutoFit/>
+            </a:bodyPr>
+            <a:lstStyle>
+              <a:defPPr marR="0" lvl="0" algn="l" rtl="0">
+                <a:lnSpc>
+                  <a:spcPct val="100000"/>
+                </a:lnSpc>
+                <a:spcBef>
+                  <a:spcPts val="0"/>
+                </a:spcBef>
+                <a:spcAft>
+                  <a:spcPts val="0"/>
+                </a:spcAft>
+                <a:defRPr/>
+              </a:defPPr>
+              <a:lvl1pPr algn="ctr">
+                <a:defRPr sz="675">
+                  <a:latin typeface="Courier New" panose="02070309020205020404" pitchFamily="49" charset="0"/>
+                  <a:cs typeface="Courier New" panose="02070309020205020404" pitchFamily="49" charset="0"/>
+                </a:defRPr>
+              </a:lvl1pPr>
+            </a:lstStyle>
+            <a:p>
+              <a:r>
+                <a:rPr lang="fr-FR" sz="800" dirty="0" err="1"/>
+                <a:t>Storing</a:t>
+              </a:r>
+              <a:endParaRPr lang="fr-FR" sz="800" dirty="0"/>
+            </a:p>
+          </p:txBody>
+        </p:sp>
+      </p:grpSp>
+      <p:grpSp>
+        <p:nvGrpSpPr>
+          <p:cNvPr id="12" name="Groupe 11">
+            <a:extLst>
+              <a:ext uri="{FF2B5EF4-FFF2-40B4-BE49-F238E27FC236}">
+                <a16:creationId xmlns:a16="http://schemas.microsoft.com/office/drawing/2014/main" id="{9ED725BF-90E5-1579-3A48-8DC4BFCF831D}"/>
+              </a:ext>
+            </a:extLst>
+          </p:cNvPr>
+          <p:cNvGrpSpPr/>
+          <p:nvPr/>
+        </p:nvGrpSpPr>
+        <p:grpSpPr>
+          <a:xfrm>
+            <a:off x="6025630" y="3826151"/>
+            <a:ext cx="1151805" cy="795059"/>
+            <a:chOff x="6025630" y="3826151"/>
+            <a:chExt cx="1151805" cy="795059"/>
+          </a:xfrm>
+        </p:grpSpPr>
+        <p:grpSp>
+          <p:nvGrpSpPr>
+            <p:cNvPr id="24" name="Groupe 23">
+              <a:extLst>
+                <a:ext uri="{FF2B5EF4-FFF2-40B4-BE49-F238E27FC236}">
+                  <a16:creationId xmlns:a16="http://schemas.microsoft.com/office/drawing/2014/main" id="{877BD90E-61C7-545A-7D6C-41BFE296E3FA}"/>
+                </a:ext>
+              </a:extLst>
+            </p:cNvPr>
+            <p:cNvGrpSpPr/>
+            <p:nvPr/>
+          </p:nvGrpSpPr>
+          <p:grpSpPr>
+            <a:xfrm>
+              <a:off x="6025630" y="3935410"/>
+              <a:ext cx="685800" cy="685800"/>
+              <a:chOff x="3518477" y="2676206"/>
+              <a:chExt cx="685800" cy="685800"/>
+            </a:xfrm>
+          </p:grpSpPr>
+          <p:pic>
+            <p:nvPicPr>
+              <p:cNvPr id="25" name="Graphique 24" descr="Ordinateur avec un remplissage uni">
+                <a:extLst>
+                  <a:ext uri="{FF2B5EF4-FFF2-40B4-BE49-F238E27FC236}">
+                    <a16:creationId xmlns:a16="http://schemas.microsoft.com/office/drawing/2014/main" id="{58B98C6B-4E84-6906-C69F-F03FE7557709}"/>
+                  </a:ext>
+                </a:extLst>
+              </p:cNvPr>
+              <p:cNvPicPr>
+                <a:picLocks noChangeAspect="1"/>
+              </p:cNvPicPr>
+              <p:nvPr/>
+            </p:nvPicPr>
+            <p:blipFill>
+              <a:blip r:embed="rId3">
+                <a:extLst>
+                  <a:ext uri="{28A0092B-C50C-407E-A947-70E740481C1C}">
+                    <a14:useLocalDpi xmlns:a14="http://schemas.microsoft.com/office/drawing/2010/main" val="0"/>
+                  </a:ext>
+                  <a:ext uri="{96DAC541-7B7A-43D3-8B79-37D633B846F1}">
+                    <asvg:svgBlip xmlns:asvg="http://schemas.microsoft.com/office/drawing/2016/SVG/main" r:embed="rId4"/>
+                  </a:ext>
+                </a:extLst>
+              </a:blip>
+              <a:stretch>
+                <a:fillRect/>
+              </a:stretch>
+            </p:blipFill>
+            <p:spPr>
+              <a:xfrm>
+                <a:off x="3518477" y="2676206"/>
+                <a:ext cx="685800" cy="685800"/>
+              </a:xfrm>
+              <a:prstGeom prst="rect">
+                <a:avLst/>
+              </a:prstGeom>
+            </p:spPr>
+          </p:pic>
+          <p:pic>
+            <p:nvPicPr>
+              <p:cNvPr id="26" name="Image 25">
+                <a:extLst>
+                  <a:ext uri="{FF2B5EF4-FFF2-40B4-BE49-F238E27FC236}">
+                    <a16:creationId xmlns:a16="http://schemas.microsoft.com/office/drawing/2014/main" id="{3C959D3F-A7DE-F337-430A-38BE1E9A400C}"/>
+                  </a:ext>
+                </a:extLst>
+              </p:cNvPr>
+              <p:cNvPicPr>
+                <a:picLocks noChangeAspect="1"/>
+              </p:cNvPicPr>
+              <p:nvPr/>
+            </p:nvPicPr>
+            <p:blipFill>
+              <a:blip r:embed="rId8"/>
+              <a:stretch>
+                <a:fillRect/>
+              </a:stretch>
+            </p:blipFill>
+            <p:spPr>
+              <a:xfrm>
+                <a:off x="3594735" y="2860818"/>
+                <a:ext cx="305329" cy="228556"/>
+              </a:xfrm>
+              <a:prstGeom prst="rect">
+                <a:avLst/>
+              </a:prstGeom>
+            </p:spPr>
+          </p:pic>
+        </p:grpSp>
+        <p:sp>
+          <p:nvSpPr>
+            <p:cNvPr id="31" name="ZoneTexte 30">
+              <a:extLst>
+                <a:ext uri="{FF2B5EF4-FFF2-40B4-BE49-F238E27FC236}">
+                  <a16:creationId xmlns:a16="http://schemas.microsoft.com/office/drawing/2014/main" id="{411D03E1-FE63-49A3-4D06-E97A1449DFC3}"/>
+                </a:ext>
+              </a:extLst>
+            </p:cNvPr>
+            <p:cNvSpPr txBox="1"/>
+            <p:nvPr/>
+          </p:nvSpPr>
+          <p:spPr>
+            <a:xfrm>
+              <a:off x="6375362" y="3826151"/>
+              <a:ext cx="802073" cy="215444"/>
+            </a:xfrm>
+            <a:prstGeom prst="rect">
+              <a:avLst/>
+            </a:prstGeom>
+            <a:solidFill>
+              <a:schemeClr val="accent2">
+                <a:lumMod val="20000"/>
+                <a:lumOff val="80000"/>
+              </a:schemeClr>
+            </a:solidFill>
+            <a:ln w="3175">
+              <a:solidFill>
+                <a:schemeClr val="tx1"/>
+              </a:solidFill>
+            </a:ln>
+          </p:spPr>
+          <p:txBody>
+            <a:bodyPr wrap="square" rtlCol="0" anchor="ctr">
+              <a:spAutoFit/>
+            </a:bodyPr>
+            <a:lstStyle>
+              <a:defPPr marR="0" lvl="0" algn="l" rtl="0">
+                <a:lnSpc>
+                  <a:spcPct val="100000"/>
+                </a:lnSpc>
+                <a:spcBef>
+                  <a:spcPts val="0"/>
+                </a:spcBef>
+                <a:spcAft>
+                  <a:spcPts val="0"/>
+                </a:spcAft>
+              </a:defPPr>
+              <a:lvl1pPr algn="ctr">
+                <a:defRPr sz="675">
+                  <a:latin typeface="Courier New" panose="02070309020205020404" pitchFamily="49" charset="0"/>
+                  <a:cs typeface="Courier New" panose="02070309020205020404" pitchFamily="49" charset="0"/>
+                </a:defRPr>
+              </a:lvl1pPr>
+            </a:lstStyle>
+            <a:p>
+              <a:r>
+                <a:rPr lang="fr-FR" sz="800" dirty="0"/>
+                <a:t>Monitoring</a:t>
+              </a:r>
+            </a:p>
+          </p:txBody>
+        </p:sp>
+      </p:grpSp>
+      <p:grpSp>
+        <p:nvGrpSpPr>
+          <p:cNvPr id="1027" name="Groupe 1026">
+            <a:extLst>
+              <a:ext uri="{FF2B5EF4-FFF2-40B4-BE49-F238E27FC236}">
+                <a16:creationId xmlns:a16="http://schemas.microsoft.com/office/drawing/2014/main" id="{9C71DFE7-C00D-9221-C068-D6B6C4D74F1C}"/>
+              </a:ext>
+            </a:extLst>
+          </p:cNvPr>
+          <p:cNvGrpSpPr/>
+          <p:nvPr/>
+        </p:nvGrpSpPr>
+        <p:grpSpPr>
+          <a:xfrm>
+            <a:off x="4253107" y="881702"/>
+            <a:ext cx="1115165" cy="650767"/>
+            <a:chOff x="4082059" y="570089"/>
+            <a:chExt cx="1115165" cy="650767"/>
+          </a:xfrm>
+        </p:grpSpPr>
+        <p:sp>
+          <p:nvSpPr>
+            <p:cNvPr id="45" name="Rectangle 44">
+              <a:extLst>
+                <a:ext uri="{FF2B5EF4-FFF2-40B4-BE49-F238E27FC236}">
+                  <a16:creationId xmlns:a16="http://schemas.microsoft.com/office/drawing/2014/main" id="{B7EC46BE-0F3E-CD8B-03B9-18067334CF89}"/>
+                </a:ext>
+              </a:extLst>
+            </p:cNvPr>
+            <p:cNvSpPr/>
+            <p:nvPr/>
+          </p:nvSpPr>
+          <p:spPr>
+            <a:xfrm>
+              <a:off x="4082060" y="785799"/>
+              <a:ext cx="1115164" cy="220526"/>
+            </a:xfrm>
+            <a:prstGeom prst="rect">
+              <a:avLst/>
+            </a:prstGeom>
+            <a:solidFill>
+              <a:schemeClr val="accent4">
+                <a:lumMod val="20000"/>
+                <a:lumOff val="80000"/>
+              </a:schemeClr>
+            </a:solidFill>
+            <a:ln w="3175"/>
+          </p:spPr>
+          <p:style>
+            <a:lnRef idx="2">
+              <a:schemeClr val="accent1">
+                <a:shade val="15000"/>
+              </a:schemeClr>
+            </a:lnRef>
+            <a:fillRef idx="1">
+              <a:schemeClr val="accent1"/>
+            </a:fillRef>
+            <a:effectRef idx="0">
+              <a:schemeClr val="accent1"/>
+            </a:effectRef>
+            <a:fontRef idx="minor">
+              <a:schemeClr val="lt1"/>
+            </a:fontRef>
+          </p:style>
+          <p:txBody>
+            <a:bodyPr rtlCol="0" anchor="ctr"/>
+            <a:lstStyle/>
+            <a:p>
+              <a:pPr algn="ctr"/>
+              <a:r>
+                <a:rPr lang="fr-FR" sz="800" dirty="0">
+                  <a:solidFill>
+                    <a:schemeClr val="tx1"/>
+                  </a:solidFill>
+                  <a:latin typeface="Courier New" panose="02070309020205020404" pitchFamily="49" charset="0"/>
+                  <a:cs typeface="Courier New" panose="02070309020205020404" pitchFamily="49" charset="0"/>
+                </a:rPr>
+                <a:t>EC2 </a:t>
+              </a:r>
+              <a:r>
+                <a:rPr lang="fr-FR" sz="800" dirty="0" err="1">
+                  <a:solidFill>
+                    <a:schemeClr val="tx1"/>
+                  </a:solidFill>
+                  <a:latin typeface="Courier New" panose="02070309020205020404" pitchFamily="49" charset="0"/>
+                  <a:cs typeface="Courier New" panose="02070309020205020404" pitchFamily="49" charset="0"/>
+                </a:rPr>
+                <a:t>others</a:t>
+              </a:r>
+              <a:endParaRPr lang="fr-FR" sz="800" dirty="0">
+                <a:solidFill>
+                  <a:schemeClr val="tx1"/>
+                </a:solidFill>
+                <a:latin typeface="Courier New" panose="02070309020205020404" pitchFamily="49" charset="0"/>
+                <a:cs typeface="Courier New" panose="02070309020205020404" pitchFamily="49" charset="0"/>
+              </a:endParaRPr>
+            </a:p>
+          </p:txBody>
+        </p:sp>
+        <p:sp>
+          <p:nvSpPr>
+            <p:cNvPr id="49" name="ZoneTexte 48">
+              <a:extLst>
+                <a:ext uri="{FF2B5EF4-FFF2-40B4-BE49-F238E27FC236}">
+                  <a16:creationId xmlns:a16="http://schemas.microsoft.com/office/drawing/2014/main" id="{E0D268CB-4B06-33FC-48AF-159E508BF0C9}"/>
+                </a:ext>
+              </a:extLst>
+            </p:cNvPr>
+            <p:cNvSpPr txBox="1"/>
+            <p:nvPr/>
+          </p:nvSpPr>
+          <p:spPr>
+            <a:xfrm>
+              <a:off x="4082059" y="1005412"/>
+              <a:ext cx="1115164" cy="215444"/>
+            </a:xfrm>
+            <a:prstGeom prst="rect">
+              <a:avLst/>
+            </a:prstGeom>
+            <a:solidFill>
+              <a:schemeClr val="accent5">
+                <a:lumMod val="20000"/>
+                <a:lumOff val="80000"/>
+              </a:schemeClr>
+            </a:solidFill>
+            <a:ln w="3175">
+              <a:solidFill>
+                <a:schemeClr val="tx1"/>
+              </a:solidFill>
+            </a:ln>
+          </p:spPr>
+          <p:txBody>
+            <a:bodyPr wrap="square" rtlCol="0">
+              <a:spAutoFit/>
+            </a:bodyPr>
+            <a:lstStyle>
+              <a:defPPr marR="0" lvl="0" algn="l" rtl="0">
+                <a:lnSpc>
+                  <a:spcPct val="100000"/>
+                </a:lnSpc>
+                <a:spcBef>
+                  <a:spcPts val="0"/>
+                </a:spcBef>
+                <a:spcAft>
+                  <a:spcPts val="0"/>
+                </a:spcAft>
+              </a:defPPr>
+              <a:lvl1pPr>
+                <a:defRPr sz="800">
+                  <a:latin typeface="Courier New" panose="02070309020205020404" pitchFamily="49" charset="0"/>
+                  <a:cs typeface="Courier New" panose="02070309020205020404" pitchFamily="49" charset="0"/>
+                </a:defRPr>
+              </a:lvl1pPr>
+            </a:lstStyle>
+            <a:p>
+              <a:r>
+                <a:rPr lang="fr-FR" dirty="0" err="1"/>
+                <a:t>MLFlow</a:t>
+              </a:r>
+              <a:r>
+                <a:rPr lang="fr-FR" dirty="0"/>
+                <a:t> </a:t>
+              </a:r>
+              <a:r>
+                <a:rPr lang="fr-FR" dirty="0" err="1"/>
+                <a:t>projects</a:t>
+              </a:r>
+              <a:endParaRPr lang="fr-FR" dirty="0"/>
+            </a:p>
+          </p:txBody>
+        </p:sp>
+        <p:sp>
+          <p:nvSpPr>
+            <p:cNvPr id="15" name="ZoneTexte 14">
+              <a:extLst>
+                <a:ext uri="{FF2B5EF4-FFF2-40B4-BE49-F238E27FC236}">
+                  <a16:creationId xmlns:a16="http://schemas.microsoft.com/office/drawing/2014/main" id="{85B6C5E1-6C57-B98B-0DA8-28B9893D188A}"/>
+                </a:ext>
+              </a:extLst>
+            </p:cNvPr>
+            <p:cNvSpPr txBox="1"/>
+            <p:nvPr/>
+          </p:nvSpPr>
+          <p:spPr>
+            <a:xfrm>
+              <a:off x="4082059" y="570089"/>
+              <a:ext cx="1115164" cy="215444"/>
+            </a:xfrm>
+            <a:prstGeom prst="rect">
+              <a:avLst/>
+            </a:prstGeom>
+            <a:solidFill>
+              <a:schemeClr val="accent2">
+                <a:lumMod val="20000"/>
+                <a:lumOff val="80000"/>
+              </a:schemeClr>
+            </a:solidFill>
+            <a:ln w="3175">
+              <a:solidFill>
+                <a:schemeClr val="tx1"/>
+              </a:solidFill>
+            </a:ln>
+          </p:spPr>
+          <p:txBody>
+            <a:bodyPr wrap="square" rtlCol="0" anchor="ctr">
+              <a:spAutoFit/>
+            </a:bodyPr>
+            <a:lstStyle>
+              <a:defPPr marR="0" lvl="0" algn="l" rtl="0">
+                <a:lnSpc>
+                  <a:spcPct val="100000"/>
+                </a:lnSpc>
+                <a:spcBef>
+                  <a:spcPts val="0"/>
+                </a:spcBef>
+                <a:spcAft>
+                  <a:spcPts val="0"/>
+                </a:spcAft>
+                <a:defRPr/>
+              </a:defPPr>
+              <a:lvl1pPr algn="ctr">
+                <a:defRPr sz="675">
+                  <a:latin typeface="Courier New" panose="02070309020205020404" pitchFamily="49" charset="0"/>
+                  <a:cs typeface="Courier New" panose="02070309020205020404" pitchFamily="49" charset="0"/>
+                </a:defRPr>
+              </a:lvl1pPr>
+            </a:lstStyle>
+            <a:p>
+              <a:r>
+                <a:rPr lang="fr-FR" sz="800" dirty="0"/>
+                <a:t>Training</a:t>
+              </a:r>
+            </a:p>
+          </p:txBody>
+        </p:sp>
+      </p:grpSp>
+      <p:pic>
+        <p:nvPicPr>
+          <p:cNvPr id="47" name="Graphique 46" descr="Nuage avec un remplissage uni">
+            <a:extLst>
+              <a:ext uri="{FF2B5EF4-FFF2-40B4-BE49-F238E27FC236}">
+                <a16:creationId xmlns:a16="http://schemas.microsoft.com/office/drawing/2014/main" id="{EAA36F96-0FAE-1D0A-E12A-AA22913FAB08}"/>
+              </a:ext>
+            </a:extLst>
+          </p:cNvPr>
+          <p:cNvPicPr>
+            <a:picLocks noChangeAspect="1"/>
+          </p:cNvPicPr>
+          <p:nvPr/>
+        </p:nvPicPr>
+        <p:blipFill>
+          <a:blip r:embed="rId9">
+            <a:extLst>
+              <a:ext uri="{96DAC541-7B7A-43D3-8B79-37D633B846F1}">
+                <asvg:svgBlip xmlns:asvg="http://schemas.microsoft.com/office/drawing/2016/SVG/main" r:embed="rId10"/>
+              </a:ext>
+            </a:extLst>
+          </a:blip>
+          <a:stretch>
+            <a:fillRect/>
+          </a:stretch>
+        </p:blipFill>
+        <p:spPr>
+          <a:xfrm>
+            <a:off x="149634" y="2615657"/>
+            <a:ext cx="664963" cy="664963"/>
+          </a:xfrm>
+          <a:prstGeom prst="rect">
+            <a:avLst/>
+          </a:prstGeom>
+        </p:spPr>
+      </p:pic>
+      <p:grpSp>
+        <p:nvGrpSpPr>
+          <p:cNvPr id="13" name="Groupe 12">
+            <a:extLst>
+              <a:ext uri="{FF2B5EF4-FFF2-40B4-BE49-F238E27FC236}">
+                <a16:creationId xmlns:a16="http://schemas.microsoft.com/office/drawing/2014/main" id="{DE30BA35-B98E-D8A5-C9E9-90092CB10684}"/>
+              </a:ext>
+            </a:extLst>
+          </p:cNvPr>
+          <p:cNvGrpSpPr/>
+          <p:nvPr/>
+        </p:nvGrpSpPr>
+        <p:grpSpPr>
+          <a:xfrm>
+            <a:off x="4744057" y="3663044"/>
+            <a:ext cx="1048354" cy="1016278"/>
+            <a:chOff x="4744057" y="3663044"/>
+            <a:chExt cx="1048354" cy="1016278"/>
+          </a:xfrm>
+        </p:grpSpPr>
+        <p:grpSp>
+          <p:nvGrpSpPr>
+            <p:cNvPr id="56" name="Groupe 55">
+              <a:extLst>
+                <a:ext uri="{FF2B5EF4-FFF2-40B4-BE49-F238E27FC236}">
+                  <a16:creationId xmlns:a16="http://schemas.microsoft.com/office/drawing/2014/main" id="{2C2DF18E-AC16-43EF-C64A-8E7B5B3DB147}"/>
+                </a:ext>
+              </a:extLst>
+            </p:cNvPr>
+            <p:cNvGrpSpPr/>
+            <p:nvPr/>
+          </p:nvGrpSpPr>
+          <p:grpSpPr>
+            <a:xfrm rot="20850387">
+              <a:off x="4744057" y="3663044"/>
+              <a:ext cx="1037697" cy="1016278"/>
+              <a:chOff x="700951" y="3221919"/>
+              <a:chExt cx="1037697" cy="1016278"/>
+            </a:xfrm>
+            <a:solidFill>
+              <a:srgbClr val="C00000"/>
+            </a:solidFill>
+          </p:grpSpPr>
+          <p:pic>
+            <p:nvPicPr>
+              <p:cNvPr id="54" name="Graphique 53" descr="Ligne fléchée : faire pivoter à droite avec un remplissage uni">
+                <a:extLst>
+                  <a:ext uri="{FF2B5EF4-FFF2-40B4-BE49-F238E27FC236}">
+                    <a16:creationId xmlns:a16="http://schemas.microsoft.com/office/drawing/2014/main" id="{9A92D136-E70E-C007-E650-A2D70CD4F353}"/>
+                  </a:ext>
+                </a:extLst>
+              </p:cNvPr>
+              <p:cNvPicPr>
+                <a:picLocks noChangeAspect="1"/>
+              </p:cNvPicPr>
+              <p:nvPr/>
+            </p:nvPicPr>
+            <p:blipFill>
+              <a:blip r:embed="rId11">
+                <a:extLst>
+                  <a:ext uri="{96DAC541-7B7A-43D3-8B79-37D633B846F1}">
+                    <asvg:svgBlip xmlns:asvg="http://schemas.microsoft.com/office/drawing/2016/SVG/main" r:embed="rId12"/>
+                  </a:ext>
+                </a:extLst>
+              </a:blip>
+              <a:stretch>
+                <a:fillRect/>
+              </a:stretch>
+            </p:blipFill>
+            <p:spPr>
+              <a:xfrm>
+                <a:off x="824248" y="3221919"/>
+                <a:ext cx="914400" cy="914400"/>
+              </a:xfrm>
+              <a:prstGeom prst="rect">
+                <a:avLst/>
+              </a:prstGeom>
+            </p:spPr>
+          </p:pic>
+          <p:pic>
+            <p:nvPicPr>
+              <p:cNvPr id="55" name="Graphique 54" descr="Ligne fléchée : faire pivoter à droite avec un remplissage uni">
+                <a:extLst>
+                  <a:ext uri="{FF2B5EF4-FFF2-40B4-BE49-F238E27FC236}">
+                    <a16:creationId xmlns:a16="http://schemas.microsoft.com/office/drawing/2014/main" id="{C063199A-312E-B148-3C65-8FAC334CC405}"/>
+                  </a:ext>
+                </a:extLst>
+              </p:cNvPr>
+              <p:cNvPicPr>
+                <a:picLocks noChangeAspect="1"/>
+              </p:cNvPicPr>
+              <p:nvPr/>
+            </p:nvPicPr>
+            <p:blipFill>
+              <a:blip r:embed="rId11">
+                <a:extLst>
+                  <a:ext uri="{96DAC541-7B7A-43D3-8B79-37D633B846F1}">
+                    <asvg:svgBlip xmlns:asvg="http://schemas.microsoft.com/office/drawing/2016/SVG/main" r:embed="rId12"/>
+                  </a:ext>
+                </a:extLst>
+              </a:blip>
+              <a:stretch>
+                <a:fillRect/>
+              </a:stretch>
+            </p:blipFill>
+            <p:spPr>
+              <a:xfrm rot="10331277">
+                <a:off x="700951" y="3323797"/>
+                <a:ext cx="914400" cy="914400"/>
+              </a:xfrm>
+              <a:prstGeom prst="rect">
+                <a:avLst/>
+              </a:prstGeom>
+            </p:spPr>
+          </p:pic>
+        </p:grpSp>
+        <p:sp>
+          <p:nvSpPr>
+            <p:cNvPr id="57" name="ZoneTexte 56">
+              <a:extLst>
+                <a:ext uri="{FF2B5EF4-FFF2-40B4-BE49-F238E27FC236}">
+                  <a16:creationId xmlns:a16="http://schemas.microsoft.com/office/drawing/2014/main" id="{42D4720D-D86B-CDF4-BA54-47094D836E44}"/>
+                </a:ext>
+              </a:extLst>
+            </p:cNvPr>
+            <p:cNvSpPr txBox="1"/>
+            <p:nvPr/>
+          </p:nvSpPr>
+          <p:spPr>
+            <a:xfrm>
+              <a:off x="5263911" y="4401866"/>
+              <a:ext cx="528500" cy="184666"/>
+            </a:xfrm>
+            <a:prstGeom prst="rect">
+              <a:avLst/>
+            </a:prstGeom>
+            <a:solidFill>
+              <a:schemeClr val="accent6"/>
+            </a:solidFill>
+            <a:ln w="3175">
+              <a:solidFill>
+                <a:schemeClr val="tx1"/>
+              </a:solidFill>
+            </a:ln>
+          </p:spPr>
+          <p:txBody>
+            <a:bodyPr wrap="square" rtlCol="0" anchor="ctr">
+              <a:spAutoFit/>
+            </a:bodyPr>
+            <a:lstStyle>
+              <a:defPPr marR="0" lvl="0" algn="l" rtl="0">
+                <a:lnSpc>
+                  <a:spcPct val="100000"/>
+                </a:lnSpc>
+                <a:spcBef>
+                  <a:spcPts val="0"/>
+                </a:spcBef>
+                <a:spcAft>
+                  <a:spcPts val="0"/>
+                </a:spcAft>
+                <a:defRPr/>
+              </a:defPPr>
+              <a:lvl1pPr algn="ctr">
+                <a:defRPr sz="600">
+                  <a:latin typeface="Courier New" panose="02070309020205020404" pitchFamily="49" charset="0"/>
+                  <a:cs typeface="Courier New" panose="02070309020205020404" pitchFamily="49" charset="0"/>
+                </a:defRPr>
+              </a:lvl1pPr>
+            </a:lstStyle>
+            <a:p>
+              <a:r>
+                <a:rPr lang="fr-FR" dirty="0" err="1"/>
+                <a:t>Iterate</a:t>
+              </a:r>
+              <a:endParaRPr lang="fr-FR" dirty="0"/>
+            </a:p>
+          </p:txBody>
+        </p:sp>
+      </p:grpSp>
+      <p:pic>
+        <p:nvPicPr>
+          <p:cNvPr id="60" name="Image 59">
+            <a:extLst>
+              <a:ext uri="{FF2B5EF4-FFF2-40B4-BE49-F238E27FC236}">
+                <a16:creationId xmlns:a16="http://schemas.microsoft.com/office/drawing/2014/main" id="{7CB98866-60DE-CAB4-E3DA-4474A06D0431}"/>
+              </a:ext>
+            </a:extLst>
+          </p:cNvPr>
+          <p:cNvPicPr>
+            <a:picLocks noChangeAspect="1"/>
+          </p:cNvPicPr>
+          <p:nvPr/>
+        </p:nvPicPr>
+        <p:blipFill rotWithShape="1">
+          <a:blip r:embed="rId13"/>
+          <a:srcRect l="8118" t="7108" r="12015" b="4195"/>
+          <a:stretch/>
+        </p:blipFill>
+        <p:spPr>
+          <a:xfrm>
+            <a:off x="8312689" y="3196437"/>
+            <a:ext cx="273554" cy="285386"/>
+          </a:xfrm>
+          <a:prstGeom prst="rect">
+            <a:avLst/>
+          </a:prstGeom>
+          <a:effectLst>
+            <a:outerShdw blurRad="50800" dist="38100" dir="2700000" algn="tl" rotWithShape="0">
+              <a:prstClr val="black">
+                <a:alpha val="40000"/>
+              </a:prstClr>
+            </a:outerShdw>
+          </a:effectLst>
+        </p:spPr>
+      </p:pic>
+      <p:pic>
+        <p:nvPicPr>
+          <p:cNvPr id="1026" name="Picture 2" descr="Gpu - Icônes ordinateur gratuites">
+            <a:extLst>
+              <a:ext uri="{FF2B5EF4-FFF2-40B4-BE49-F238E27FC236}">
+                <a16:creationId xmlns:a16="http://schemas.microsoft.com/office/drawing/2014/main" id="{0728D59F-5B9E-737F-DE8A-6695246453B8}"/>
+              </a:ext>
+            </a:extLst>
+          </p:cNvPr>
+          <p:cNvPicPr>
+            <a:picLocks noChangeAspect="1" noChangeArrowheads="1"/>
+          </p:cNvPicPr>
+          <p:nvPr/>
+        </p:nvPicPr>
+        <p:blipFill>
+          <a:blip r:embed="rId14">
+            <a:extLst>
+              <a:ext uri="{28A0092B-C50C-407E-A947-70E740481C1C}">
+                <a14:useLocalDpi xmlns:a14="http://schemas.microsoft.com/office/drawing/2010/main" val="0"/>
+              </a:ext>
+            </a:extLst>
+          </a:blip>
+          <a:srcRect/>
+          <a:stretch>
+            <a:fillRect/>
+          </a:stretch>
+        </p:blipFill>
+        <p:spPr bwMode="auto">
+          <a:xfrm>
+            <a:off x="3860031" y="2745511"/>
+            <a:ext cx="737811" cy="737811"/>
+          </a:xfrm>
+          <a:prstGeom prst="rect">
+            <a:avLst/>
+          </a:prstGeom>
+          <a:noFill/>
+          <a:extLst>
+            <a:ext uri="{909E8E84-426E-40DD-AFC4-6F175D3DCCD1}">
+              <a14:hiddenFill xmlns:a14="http://schemas.microsoft.com/office/drawing/2010/main">
+                <a:solidFill>
+                  <a:srgbClr val="FFFFFF"/>
+                </a:solidFill>
+              </a14:hiddenFill>
+            </a:ext>
+          </a:extLst>
+        </p:spPr>
+      </p:pic>
+      <p:grpSp>
+        <p:nvGrpSpPr>
+          <p:cNvPr id="1028" name="Groupe 1027">
+            <a:extLst>
+              <a:ext uri="{FF2B5EF4-FFF2-40B4-BE49-F238E27FC236}">
+                <a16:creationId xmlns:a16="http://schemas.microsoft.com/office/drawing/2014/main" id="{BAF9EED9-AED1-DC68-2DCE-26FB79C6239A}"/>
+              </a:ext>
+            </a:extLst>
+          </p:cNvPr>
+          <p:cNvGrpSpPr/>
+          <p:nvPr/>
+        </p:nvGrpSpPr>
+        <p:grpSpPr>
+          <a:xfrm>
+            <a:off x="7811770" y="2090576"/>
+            <a:ext cx="874209" cy="630045"/>
+            <a:chOff x="7847330" y="2494196"/>
+            <a:chExt cx="874209" cy="630045"/>
+          </a:xfrm>
+        </p:grpSpPr>
+        <p:sp>
+          <p:nvSpPr>
+            <p:cNvPr id="35" name="ZoneTexte 34">
+              <a:extLst>
+                <a:ext uri="{FF2B5EF4-FFF2-40B4-BE49-F238E27FC236}">
+                  <a16:creationId xmlns:a16="http://schemas.microsoft.com/office/drawing/2014/main" id="{D274B890-A8EE-A186-7126-825C2C23FECC}"/>
+                </a:ext>
+              </a:extLst>
+            </p:cNvPr>
+            <p:cNvSpPr txBox="1"/>
+            <p:nvPr/>
+          </p:nvSpPr>
+          <p:spPr>
+            <a:xfrm>
+              <a:off x="7847331" y="2494196"/>
+              <a:ext cx="874208" cy="215444"/>
+            </a:xfrm>
+            <a:prstGeom prst="rect">
+              <a:avLst/>
+            </a:prstGeom>
+            <a:solidFill>
+              <a:schemeClr val="accent2">
+                <a:lumMod val="20000"/>
+                <a:lumOff val="80000"/>
+              </a:schemeClr>
+            </a:solidFill>
+            <a:ln w="3175">
+              <a:solidFill>
+                <a:schemeClr val="tx1"/>
+              </a:solidFill>
+            </a:ln>
+          </p:spPr>
+          <p:txBody>
+            <a:bodyPr wrap="square" rtlCol="0" anchor="ctr">
+              <a:spAutoFit/>
+            </a:bodyPr>
+            <a:lstStyle>
+              <a:defPPr marR="0" lvl="0" algn="l" rtl="0">
+                <a:lnSpc>
+                  <a:spcPct val="100000"/>
+                </a:lnSpc>
+                <a:spcBef>
+                  <a:spcPts val="0"/>
+                </a:spcBef>
+                <a:spcAft>
+                  <a:spcPts val="0"/>
+                </a:spcAft>
+              </a:defPPr>
+              <a:lvl1pPr algn="ctr">
+                <a:defRPr sz="675">
+                  <a:latin typeface="Courier New" panose="02070309020205020404" pitchFamily="49" charset="0"/>
+                  <a:cs typeface="Courier New" panose="02070309020205020404" pitchFamily="49" charset="0"/>
+                </a:defRPr>
+              </a:lvl1pPr>
+            </a:lstStyle>
+            <a:p>
+              <a:r>
+                <a:rPr lang="fr-FR" sz="800" dirty="0" err="1"/>
+                <a:t>Consuming</a:t>
+              </a:r>
+              <a:endParaRPr lang="fr-FR" sz="800" dirty="0"/>
+            </a:p>
+          </p:txBody>
+        </p:sp>
+        <p:sp>
+          <p:nvSpPr>
+            <p:cNvPr id="62" name="Rectangle 61">
+              <a:extLst>
+                <a:ext uri="{FF2B5EF4-FFF2-40B4-BE49-F238E27FC236}">
+                  <a16:creationId xmlns:a16="http://schemas.microsoft.com/office/drawing/2014/main" id="{F10532C8-67F5-5F96-A53D-F1BD08EFDC8B}"/>
+                </a:ext>
+              </a:extLst>
+            </p:cNvPr>
+            <p:cNvSpPr/>
+            <p:nvPr/>
+          </p:nvSpPr>
+          <p:spPr>
+            <a:xfrm>
+              <a:off x="7847330" y="2698676"/>
+              <a:ext cx="874208" cy="220526"/>
+            </a:xfrm>
+            <a:prstGeom prst="rect">
+              <a:avLst/>
+            </a:prstGeom>
+            <a:solidFill>
+              <a:schemeClr val="accent4">
+                <a:lumMod val="20000"/>
+                <a:lumOff val="80000"/>
+              </a:schemeClr>
+            </a:solidFill>
+            <a:ln w="3175"/>
+          </p:spPr>
+          <p:style>
+            <a:lnRef idx="2">
+              <a:schemeClr val="accent1">
+                <a:shade val="15000"/>
+              </a:schemeClr>
+            </a:lnRef>
+            <a:fillRef idx="1">
+              <a:schemeClr val="accent1"/>
+            </a:fillRef>
+            <a:effectRef idx="0">
+              <a:schemeClr val="accent1"/>
+            </a:effectRef>
+            <a:fontRef idx="minor">
+              <a:schemeClr val="lt1"/>
+            </a:fontRef>
+          </p:style>
+          <p:txBody>
+            <a:bodyPr rtlCol="0" anchor="ctr"/>
+            <a:lstStyle/>
+            <a:p>
+              <a:pPr algn="ctr"/>
+              <a:r>
+                <a:rPr lang="fr-FR" sz="800" dirty="0" err="1">
+                  <a:solidFill>
+                    <a:schemeClr val="tx1"/>
+                  </a:solidFill>
+                  <a:latin typeface="Courier New" panose="02070309020205020404" pitchFamily="49" charset="0"/>
+                  <a:cs typeface="Courier New" panose="02070309020205020404" pitchFamily="49" charset="0"/>
+                </a:rPr>
+                <a:t>API+Web</a:t>
+              </a:r>
+              <a:r>
+                <a:rPr lang="fr-FR" sz="800" dirty="0">
+                  <a:solidFill>
+                    <a:schemeClr val="tx1"/>
+                  </a:solidFill>
+                  <a:latin typeface="Courier New" panose="02070309020205020404" pitchFamily="49" charset="0"/>
+                  <a:cs typeface="Courier New" panose="02070309020205020404" pitchFamily="49" charset="0"/>
+                </a:rPr>
+                <a:t> App</a:t>
+              </a:r>
+            </a:p>
+          </p:txBody>
+        </p:sp>
+        <p:sp>
+          <p:nvSpPr>
+            <p:cNvPr id="63" name="ZoneTexte 62">
+              <a:extLst>
+                <a:ext uri="{FF2B5EF4-FFF2-40B4-BE49-F238E27FC236}">
+                  <a16:creationId xmlns:a16="http://schemas.microsoft.com/office/drawing/2014/main" id="{39A85152-5F2B-F7A8-9D12-C4A32B754764}"/>
+                </a:ext>
+              </a:extLst>
+            </p:cNvPr>
+            <p:cNvSpPr txBox="1"/>
+            <p:nvPr/>
+          </p:nvSpPr>
+          <p:spPr>
+            <a:xfrm>
+              <a:off x="7847330" y="2908797"/>
+              <a:ext cx="874208" cy="215444"/>
+            </a:xfrm>
+            <a:prstGeom prst="rect">
+              <a:avLst/>
+            </a:prstGeom>
+            <a:solidFill>
+              <a:schemeClr val="accent5">
+                <a:lumMod val="20000"/>
+                <a:lumOff val="80000"/>
+              </a:schemeClr>
+            </a:solidFill>
+            <a:ln w="3175">
+              <a:solidFill>
+                <a:schemeClr val="tx1"/>
+              </a:solidFill>
+            </a:ln>
+          </p:spPr>
+          <p:txBody>
+            <a:bodyPr wrap="square" rtlCol="0" anchor="ctr">
+              <a:spAutoFit/>
+            </a:bodyPr>
+            <a:lstStyle/>
+            <a:p>
+              <a:pPr algn="ctr"/>
+              <a:r>
+                <a:rPr lang="fr-FR" sz="800" dirty="0">
+                  <a:latin typeface="Courier New" panose="02070309020205020404" pitchFamily="49" charset="0"/>
+                  <a:cs typeface="Courier New" panose="02070309020205020404" pitchFamily="49" charset="0"/>
+                </a:rPr>
+                <a:t>Flask</a:t>
+              </a:r>
+            </a:p>
+          </p:txBody>
+        </p:sp>
+      </p:grpSp>
+      <p:grpSp>
+        <p:nvGrpSpPr>
+          <p:cNvPr id="1030" name="Groupe 1029">
+            <a:extLst>
+              <a:ext uri="{FF2B5EF4-FFF2-40B4-BE49-F238E27FC236}">
+                <a16:creationId xmlns:a16="http://schemas.microsoft.com/office/drawing/2014/main" id="{0283DBA2-E154-B24E-00E4-B2111440E40D}"/>
+              </a:ext>
+            </a:extLst>
+          </p:cNvPr>
+          <p:cNvGrpSpPr/>
+          <p:nvPr/>
+        </p:nvGrpSpPr>
+        <p:grpSpPr>
+          <a:xfrm>
+            <a:off x="5674190" y="1904674"/>
+            <a:ext cx="1096351" cy="648536"/>
+            <a:chOff x="5550125" y="861609"/>
+            <a:chExt cx="1096351" cy="648536"/>
+          </a:xfrm>
+        </p:grpSpPr>
+        <p:sp>
+          <p:nvSpPr>
+            <p:cNvPr id="8" name="Rectangle 7">
+              <a:extLst>
+                <a:ext uri="{FF2B5EF4-FFF2-40B4-BE49-F238E27FC236}">
+                  <a16:creationId xmlns:a16="http://schemas.microsoft.com/office/drawing/2014/main" id="{7BD7D3CD-81D5-4848-C5A0-5012687582FD}"/>
+                </a:ext>
+              </a:extLst>
+            </p:cNvPr>
+            <p:cNvSpPr/>
+            <p:nvPr/>
+          </p:nvSpPr>
+          <p:spPr>
+            <a:xfrm>
+              <a:off x="5550125" y="1075311"/>
+              <a:ext cx="1096351" cy="220526"/>
+            </a:xfrm>
+            <a:prstGeom prst="rect">
+              <a:avLst/>
+            </a:prstGeom>
+            <a:solidFill>
+              <a:schemeClr val="accent4">
+                <a:lumMod val="20000"/>
+                <a:lumOff val="80000"/>
+              </a:schemeClr>
+            </a:solidFill>
+            <a:ln w="3175"/>
+          </p:spPr>
+          <p:style>
+            <a:lnRef idx="2">
+              <a:schemeClr val="accent1">
+                <a:shade val="15000"/>
+              </a:schemeClr>
+            </a:lnRef>
+            <a:fillRef idx="1">
+              <a:schemeClr val="accent1"/>
+            </a:fillRef>
+            <a:effectRef idx="0">
+              <a:schemeClr val="accent1"/>
+            </a:effectRef>
+            <a:fontRef idx="minor">
+              <a:schemeClr val="lt1"/>
+            </a:fontRef>
+          </p:style>
+          <p:txBody>
+            <a:bodyPr rtlCol="0" anchor="ctr"/>
+            <a:lstStyle/>
+            <a:p>
+              <a:pPr algn="ctr"/>
+              <a:r>
+                <a:rPr lang="fr-FR" sz="800" dirty="0" err="1">
+                  <a:solidFill>
+                    <a:schemeClr val="tx1"/>
+                  </a:solidFill>
+                  <a:latin typeface="Courier New" panose="02070309020205020404" pitchFamily="49" charset="0"/>
+                  <a:cs typeface="Courier New" panose="02070309020205020404" pitchFamily="49" charset="0"/>
+                </a:rPr>
+                <a:t>Heroku</a:t>
+              </a:r>
+              <a:endParaRPr lang="fr-FR" sz="800" dirty="0">
+                <a:solidFill>
+                  <a:schemeClr val="tx1"/>
+                </a:solidFill>
+                <a:latin typeface="Courier New" panose="02070309020205020404" pitchFamily="49" charset="0"/>
+                <a:cs typeface="Courier New" panose="02070309020205020404" pitchFamily="49" charset="0"/>
+              </a:endParaRPr>
+            </a:p>
+          </p:txBody>
+        </p:sp>
+        <p:sp>
+          <p:nvSpPr>
+            <p:cNvPr id="50" name="ZoneTexte 49">
+              <a:extLst>
+                <a:ext uri="{FF2B5EF4-FFF2-40B4-BE49-F238E27FC236}">
+                  <a16:creationId xmlns:a16="http://schemas.microsoft.com/office/drawing/2014/main" id="{A671C5B9-A334-3D52-FB83-E43BEEFB2500}"/>
+                </a:ext>
+              </a:extLst>
+            </p:cNvPr>
+            <p:cNvSpPr txBox="1"/>
+            <p:nvPr/>
+          </p:nvSpPr>
+          <p:spPr>
+            <a:xfrm>
+              <a:off x="5550125" y="1294701"/>
+              <a:ext cx="1096351" cy="215444"/>
+            </a:xfrm>
+            <a:prstGeom prst="rect">
+              <a:avLst/>
+            </a:prstGeom>
+            <a:solidFill>
+              <a:schemeClr val="accent5">
+                <a:lumMod val="20000"/>
+                <a:lumOff val="80000"/>
+              </a:schemeClr>
+            </a:solidFill>
+            <a:ln w="3175">
+              <a:solidFill>
+                <a:schemeClr val="tx1"/>
+              </a:solidFill>
+            </a:ln>
+          </p:spPr>
+          <p:txBody>
+            <a:bodyPr wrap="square" rtlCol="0">
+              <a:spAutoFit/>
+            </a:bodyPr>
+            <a:lstStyle/>
+            <a:p>
+              <a:r>
+                <a:rPr lang="fr-FR" sz="800" dirty="0" err="1">
+                  <a:latin typeface="Courier New" panose="02070309020205020404" pitchFamily="49" charset="0"/>
+                  <a:cs typeface="Courier New" panose="02070309020205020404" pitchFamily="49" charset="0"/>
+                </a:rPr>
+                <a:t>MLFlow</a:t>
+              </a:r>
+              <a:r>
+                <a:rPr lang="fr-FR" sz="800" dirty="0">
+                  <a:latin typeface="Courier New" panose="02070309020205020404" pitchFamily="49" charset="0"/>
+                  <a:cs typeface="Courier New" panose="02070309020205020404" pitchFamily="49" charset="0"/>
+                </a:rPr>
+                <a:t> </a:t>
+              </a:r>
+              <a:r>
+                <a:rPr lang="fr-FR" sz="800" dirty="0" err="1">
+                  <a:latin typeface="Courier New" panose="02070309020205020404" pitchFamily="49" charset="0"/>
+                  <a:cs typeface="Courier New" panose="02070309020205020404" pitchFamily="49" charset="0"/>
+                </a:rPr>
+                <a:t>tracking</a:t>
+              </a:r>
+              <a:endParaRPr lang="fr-FR" sz="800" dirty="0">
+                <a:latin typeface="Courier New" panose="02070309020205020404" pitchFamily="49" charset="0"/>
+                <a:cs typeface="Courier New" panose="02070309020205020404" pitchFamily="49" charset="0"/>
+              </a:endParaRPr>
+            </a:p>
+          </p:txBody>
+        </p:sp>
+        <p:sp>
+          <p:nvSpPr>
+            <p:cNvPr id="61" name="ZoneTexte 60">
+              <a:extLst>
+                <a:ext uri="{FF2B5EF4-FFF2-40B4-BE49-F238E27FC236}">
+                  <a16:creationId xmlns:a16="http://schemas.microsoft.com/office/drawing/2014/main" id="{0C67B44A-0F47-AFCD-9934-9CBFA7BCD508}"/>
+                </a:ext>
+              </a:extLst>
+            </p:cNvPr>
+            <p:cNvSpPr txBox="1"/>
+            <p:nvPr/>
+          </p:nvSpPr>
+          <p:spPr>
+            <a:xfrm>
+              <a:off x="5550125" y="861609"/>
+              <a:ext cx="1096351" cy="215444"/>
+            </a:xfrm>
+            <a:prstGeom prst="rect">
+              <a:avLst/>
+            </a:prstGeom>
+            <a:solidFill>
+              <a:schemeClr val="accent2">
+                <a:lumMod val="20000"/>
+                <a:lumOff val="80000"/>
+              </a:schemeClr>
+            </a:solidFill>
+            <a:ln w="3175">
+              <a:solidFill>
+                <a:schemeClr val="tx1"/>
+              </a:solidFill>
+            </a:ln>
+          </p:spPr>
+          <p:txBody>
+            <a:bodyPr wrap="square" rtlCol="0" anchor="ctr">
+              <a:spAutoFit/>
+            </a:bodyPr>
+            <a:lstStyle>
+              <a:defPPr marR="0" lvl="0" algn="l" rtl="0">
+                <a:lnSpc>
+                  <a:spcPct val="100000"/>
+                </a:lnSpc>
+                <a:spcBef>
+                  <a:spcPts val="0"/>
+                </a:spcBef>
+                <a:spcAft>
+                  <a:spcPts val="0"/>
+                </a:spcAft>
+                <a:defRPr/>
+              </a:defPPr>
+              <a:lvl1pPr algn="ctr">
+                <a:defRPr sz="675">
+                  <a:latin typeface="Courier New" panose="02070309020205020404" pitchFamily="49" charset="0"/>
+                  <a:cs typeface="Courier New" panose="02070309020205020404" pitchFamily="49" charset="0"/>
+                </a:defRPr>
+              </a:lvl1pPr>
+            </a:lstStyle>
+            <a:p>
+              <a:r>
+                <a:rPr lang="fr-FR" sz="800" dirty="0" err="1"/>
+                <a:t>Tracking</a:t>
+              </a:r>
+              <a:endParaRPr lang="fr-FR" sz="800" dirty="0"/>
+            </a:p>
+          </p:txBody>
+        </p:sp>
+      </p:grpSp>
+      <p:cxnSp>
+        <p:nvCxnSpPr>
+          <p:cNvPr id="1032" name="Connecteur droit avec flèche 1031">
+            <a:extLst>
+              <a:ext uri="{FF2B5EF4-FFF2-40B4-BE49-F238E27FC236}">
+                <a16:creationId xmlns:a16="http://schemas.microsoft.com/office/drawing/2014/main" id="{6DEDE52E-6D8A-A403-BA05-57BC07F03271}"/>
+              </a:ext>
+            </a:extLst>
+          </p:cNvPr>
+          <p:cNvCxnSpPr>
+            <a:cxnSpLocks/>
+            <a:stCxn id="47" idx="3"/>
+          </p:cNvCxnSpPr>
+          <p:nvPr/>
+        </p:nvCxnSpPr>
+        <p:spPr>
+          <a:xfrm>
+            <a:off x="814597" y="2948139"/>
+            <a:ext cx="846859" cy="4772"/>
+          </a:xfrm>
+          <a:prstGeom prst="straightConnector1">
+            <a:avLst/>
+          </a:prstGeom>
+          <a:ln w="57150">
+            <a:headEnd type="none"/>
+            <a:tailEnd type="triangle"/>
+          </a:ln>
+        </p:spPr>
+        <p:style>
+          <a:lnRef idx="1">
+            <a:schemeClr val="accent1"/>
+          </a:lnRef>
+          <a:fillRef idx="0">
+            <a:schemeClr val="accent1"/>
+          </a:fillRef>
+          <a:effectRef idx="0">
+            <a:schemeClr val="accent1"/>
+          </a:effectRef>
+          <a:fontRef idx="minor">
+            <a:schemeClr val="tx1"/>
+          </a:fontRef>
+        </p:style>
+      </p:cxnSp>
+      <p:pic>
+        <p:nvPicPr>
+          <p:cNvPr id="1056" name="Image 1055">
+            <a:extLst>
+              <a:ext uri="{FF2B5EF4-FFF2-40B4-BE49-F238E27FC236}">
+                <a16:creationId xmlns:a16="http://schemas.microsoft.com/office/drawing/2014/main" id="{FD93E48A-D1E5-FD02-1902-875615C41779}"/>
+              </a:ext>
+            </a:extLst>
+          </p:cNvPr>
+          <p:cNvPicPr>
+            <a:picLocks noChangeAspect="1"/>
+          </p:cNvPicPr>
+          <p:nvPr/>
+        </p:nvPicPr>
+        <p:blipFill>
+          <a:blip r:embed="rId15"/>
+          <a:stretch>
+            <a:fillRect/>
+          </a:stretch>
+        </p:blipFill>
+        <p:spPr>
+          <a:xfrm>
+            <a:off x="3861014" y="1913668"/>
+            <a:ext cx="771946" cy="771946"/>
+          </a:xfrm>
+          <a:prstGeom prst="rect">
+            <a:avLst/>
+          </a:prstGeom>
+        </p:spPr>
+      </p:pic>
+      <p:sp>
+        <p:nvSpPr>
+          <p:cNvPr id="14" name="ZoneTexte 13">
+            <a:extLst>
+              <a:ext uri="{FF2B5EF4-FFF2-40B4-BE49-F238E27FC236}">
+                <a16:creationId xmlns:a16="http://schemas.microsoft.com/office/drawing/2014/main" id="{EC3BE5EB-C72D-BB87-03A1-27B48EEC3965}"/>
+              </a:ext>
+            </a:extLst>
+          </p:cNvPr>
+          <p:cNvSpPr txBox="1"/>
+          <p:nvPr/>
+        </p:nvSpPr>
+        <p:spPr>
+          <a:xfrm>
+            <a:off x="7811770" y="2090576"/>
+            <a:ext cx="874208" cy="215444"/>
+          </a:xfrm>
+          <a:prstGeom prst="rect">
+            <a:avLst/>
+          </a:prstGeom>
+          <a:solidFill>
+            <a:schemeClr val="accent2">
+              <a:lumMod val="20000"/>
+              <a:lumOff val="80000"/>
+            </a:schemeClr>
+          </a:solidFill>
+          <a:ln w="3175">
+            <a:solidFill>
+              <a:schemeClr val="tx1"/>
+            </a:solidFill>
+          </a:ln>
+        </p:spPr>
+        <p:txBody>
+          <a:bodyPr wrap="square" rtlCol="0" anchor="ctr">
+            <a:spAutoFit/>
+          </a:bodyPr>
+          <a:lstStyle>
+            <a:defPPr marR="0" lvl="0" algn="l" rtl="0">
+              <a:lnSpc>
+                <a:spcPct val="100000"/>
+              </a:lnSpc>
+              <a:spcBef>
+                <a:spcPts val="0"/>
+              </a:spcBef>
+              <a:spcAft>
+                <a:spcPts val="0"/>
+              </a:spcAft>
+            </a:defPPr>
+            <a:lvl1pPr algn="ctr">
+              <a:defRPr sz="675">
+                <a:latin typeface="Courier New" panose="02070309020205020404" pitchFamily="49" charset="0"/>
+                <a:cs typeface="Courier New" panose="02070309020205020404" pitchFamily="49" charset="0"/>
+              </a:defRPr>
+            </a:lvl1pPr>
+          </a:lstStyle>
+          <a:p>
+            <a:r>
+              <a:rPr lang="fr-FR" sz="800" dirty="0" err="1"/>
+              <a:t>Consuming</a:t>
+            </a:r>
+            <a:endParaRPr lang="fr-FR" sz="800" dirty="0"/>
+          </a:p>
+        </p:txBody>
+      </p:sp>
+      <p:pic>
+        <p:nvPicPr>
+          <p:cNvPr id="16" name="Graphique 15" descr="Nuage avec un remplissage uni">
+            <a:extLst>
+              <a:ext uri="{FF2B5EF4-FFF2-40B4-BE49-F238E27FC236}">
+                <a16:creationId xmlns:a16="http://schemas.microsoft.com/office/drawing/2014/main" id="{62ED3F04-1018-2948-F086-DDBA0B2AB2A7}"/>
+              </a:ext>
+            </a:extLst>
+          </p:cNvPr>
+          <p:cNvPicPr>
+            <a:picLocks noChangeAspect="1"/>
+          </p:cNvPicPr>
+          <p:nvPr/>
+        </p:nvPicPr>
+        <p:blipFill>
+          <a:blip r:embed="rId9">
+            <a:extLst>
+              <a:ext uri="{96DAC541-7B7A-43D3-8B79-37D633B846F1}">
+                <asvg:svgBlip xmlns:asvg="http://schemas.microsoft.com/office/drawing/2016/SVG/main" r:embed="rId10"/>
+              </a:ext>
+            </a:extLst>
+          </a:blip>
+          <a:stretch>
+            <a:fillRect/>
+          </a:stretch>
+        </p:blipFill>
+        <p:spPr>
+          <a:xfrm>
+            <a:off x="5903708" y="2572166"/>
+            <a:ext cx="664963" cy="664963"/>
+          </a:xfrm>
+          <a:prstGeom prst="rect">
+            <a:avLst/>
+          </a:prstGeom>
+        </p:spPr>
+      </p:pic>
+    </p:spTree>
+    <p:extLst>
+      <p:ext uri="{BB962C8B-B14F-4D97-AF65-F5344CB8AC3E}">
+        <p14:creationId xmlns:p14="http://schemas.microsoft.com/office/powerpoint/2010/main" val="1373769093"/>
+      </p:ext>
+    </p:extLst>
+  </p:cSld>
+  <p:clrMapOvr>
+    <a:masterClrMapping/>
+  </p:clrMapOvr>
+  <p:timing>
+    <p:tnLst>
+      <p:par>
+        <p:cTn id="1" dur="indefinite" restart="never" nodeType="tmRoot">
+          <p:childTnLst>
+            <p:seq concurrent="1" nextAc="seek">
+              <p:cTn id="2" dur="indefinite" nodeType="mainSeq">
+                <p:childTnLst>
+                  <p:par>
+                    <p:cTn id="3" fill="hold">
+                      <p:stCondLst>
+                        <p:cond delay="indefinite"/>
+                      </p:stCondLst>
+                      <p:childTnLst>
+                        <p:par>
+                          <p:cTn id="4" fill="hold">
+                            <p:stCondLst>
+                              <p:cond delay="0"/>
+                            </p:stCondLst>
+                            <p:childTnLst>
+                              <p:par>
+                                <p:cTn id="5" presetID="1" presetClass="entr" presetSubtype="0" fill="hold" nodeType="clickEffect">
+                                  <p:stCondLst>
+                                    <p:cond delay="0"/>
+                                  </p:stCondLst>
+                                  <p:childTnLst>
+                                    <p:set>
+                                      <p:cBhvr>
+                                        <p:cTn id="6" dur="1" fill="hold">
+                                          <p:stCondLst>
+                                            <p:cond delay="0"/>
+                                          </p:stCondLst>
+                                        </p:cTn>
+                                        <p:tgtEl>
+                                          <p:spTgt spid="60"/>
+                                        </p:tgtEl>
+                                        <p:attrNameLst>
+                                          <p:attrName>style.visibility</p:attrName>
+                                        </p:attrNameLst>
+                                      </p:cBhvr>
+                                      <p:to>
+                                        <p:strVal val="visible"/>
+                                      </p:to>
+                                    </p:set>
+                                  </p:childTnLst>
+                                </p:cTn>
+                              </p:par>
+                            </p:childTnLst>
+                          </p:cTn>
+                        </p:par>
+                        <p:par>
+                          <p:cTn id="7" fill="hold">
+                            <p:stCondLst>
+                              <p:cond delay="0"/>
+                            </p:stCondLst>
+                            <p:childTnLst>
+                              <p:par>
+                                <p:cTn id="8" presetID="1" presetClass="entr" presetSubtype="0" fill="hold" nodeType="afterEffect">
+                                  <p:stCondLst>
+                                    <p:cond delay="1000"/>
+                                  </p:stCondLst>
+                                  <p:childTnLst>
+                                    <p:set>
+                                      <p:cBhvr>
+                                        <p:cTn id="9" dur="1" fill="hold">
+                                          <p:stCondLst>
+                                            <p:cond delay="0"/>
+                                          </p:stCondLst>
+                                        </p:cTn>
+                                        <p:tgtEl>
+                                          <p:spTgt spid="33"/>
+                                        </p:tgtEl>
+                                        <p:attrNameLst>
+                                          <p:attrName>style.visibility</p:attrName>
+                                        </p:attrNameLst>
+                                      </p:cBhvr>
+                                      <p:to>
+                                        <p:strVal val="visible"/>
+                                      </p:to>
+                                    </p:set>
+                                  </p:childTnLst>
+                                </p:cTn>
+                              </p:par>
+                            </p:childTnLst>
+                          </p:cTn>
+                        </p:par>
+                        <p:par>
+                          <p:cTn id="10" fill="hold">
+                            <p:stCondLst>
+                              <p:cond delay="1000"/>
+                            </p:stCondLst>
+                            <p:childTnLst>
+                              <p:par>
+                                <p:cTn id="11" presetID="1" presetClass="entr" presetSubtype="0" fill="hold" grpId="0" nodeType="afterEffect">
+                                  <p:stCondLst>
+                                    <p:cond delay="1000"/>
+                                  </p:stCondLst>
+                                  <p:childTnLst>
+                                    <p:set>
+                                      <p:cBhvr>
+                                        <p:cTn id="12" dur="1" fill="hold">
+                                          <p:stCondLst>
+                                            <p:cond delay="0"/>
+                                          </p:stCondLst>
+                                        </p:cTn>
+                                        <p:tgtEl>
+                                          <p:spTgt spid="14"/>
+                                        </p:tgtEl>
+                                        <p:attrNameLst>
+                                          <p:attrName>style.visibility</p:attrName>
+                                        </p:attrNameLst>
+                                      </p:cBhvr>
+                                      <p:to>
+                                        <p:strVal val="visible"/>
+                                      </p:to>
+                                    </p:set>
+                                  </p:childTnLst>
+                                </p:cTn>
+                              </p:par>
+                            </p:childTnLst>
+                          </p:cTn>
+                        </p:par>
+                        <p:par>
+                          <p:cTn id="13" fill="hold">
+                            <p:stCondLst>
+                              <p:cond delay="2000"/>
+                            </p:stCondLst>
+                            <p:childTnLst>
+                              <p:par>
+                                <p:cTn id="14" presetID="22" presetClass="entr" presetSubtype="2" fill="hold" nodeType="afterEffect">
+                                  <p:stCondLst>
+                                    <p:cond delay="1000"/>
+                                  </p:stCondLst>
+                                  <p:childTnLst>
+                                    <p:set>
+                                      <p:cBhvr>
+                                        <p:cTn id="15" dur="1" fill="hold">
+                                          <p:stCondLst>
+                                            <p:cond delay="0"/>
+                                          </p:stCondLst>
+                                        </p:cTn>
+                                        <p:tgtEl>
+                                          <p:spTgt spid="38"/>
+                                        </p:tgtEl>
+                                        <p:attrNameLst>
+                                          <p:attrName>style.visibility</p:attrName>
+                                        </p:attrNameLst>
+                                      </p:cBhvr>
+                                      <p:to>
+                                        <p:strVal val="visible"/>
+                                      </p:to>
+                                    </p:set>
+                                    <p:animEffect transition="in" filter="wipe(right)">
+                                      <p:cBhvr>
+                                        <p:cTn id="16" dur="500"/>
+                                        <p:tgtEl>
+                                          <p:spTgt spid="38"/>
+                                        </p:tgtEl>
+                                      </p:cBhvr>
+                                    </p:animEffect>
+                                  </p:childTnLst>
+                                </p:cTn>
+                              </p:par>
+                            </p:childTnLst>
+                          </p:cTn>
+                        </p:par>
+                        <p:par>
+                          <p:cTn id="17" fill="hold">
+                            <p:stCondLst>
+                              <p:cond delay="3500"/>
+                            </p:stCondLst>
+                            <p:childTnLst>
+                              <p:par>
+                                <p:cTn id="18" presetID="1" presetClass="entr" presetSubtype="0" fill="hold" nodeType="afterEffect">
+                                  <p:stCondLst>
+                                    <p:cond delay="1000"/>
+                                  </p:stCondLst>
+                                  <p:childTnLst>
+                                    <p:set>
+                                      <p:cBhvr>
+                                        <p:cTn id="19" dur="1" fill="hold">
+                                          <p:stCondLst>
+                                            <p:cond delay="0"/>
+                                          </p:stCondLst>
+                                        </p:cTn>
+                                        <p:tgtEl>
+                                          <p:spTgt spid="16"/>
+                                        </p:tgtEl>
+                                        <p:attrNameLst>
+                                          <p:attrName>style.visibility</p:attrName>
+                                        </p:attrNameLst>
+                                      </p:cBhvr>
+                                      <p:to>
+                                        <p:strVal val="visible"/>
+                                      </p:to>
+                                    </p:set>
+                                  </p:childTnLst>
+                                </p:cTn>
+                              </p:par>
+                            </p:childTnLst>
+                          </p:cTn>
+                        </p:par>
+                      </p:childTnLst>
+                    </p:cTn>
+                  </p:par>
+                  <p:par>
+                    <p:cTn id="20" fill="hold">
+                      <p:stCondLst>
+                        <p:cond delay="indefinite"/>
+                      </p:stCondLst>
+                      <p:childTnLst>
+                        <p:par>
+                          <p:cTn id="21" fill="hold">
+                            <p:stCondLst>
+                              <p:cond delay="0"/>
+                            </p:stCondLst>
+                            <p:childTnLst>
+                              <p:par>
+                                <p:cTn id="22" presetID="10" presetClass="exit" presetSubtype="0" fill="hold" nodeType="clickEffect">
+                                  <p:stCondLst>
+                                    <p:cond delay="0"/>
+                                  </p:stCondLst>
+                                  <p:childTnLst>
+                                    <p:animEffect transition="out" filter="fade">
+                                      <p:cBhvr>
+                                        <p:cTn id="23" dur="500"/>
+                                        <p:tgtEl>
+                                          <p:spTgt spid="16"/>
+                                        </p:tgtEl>
+                                      </p:cBhvr>
+                                    </p:animEffect>
+                                    <p:set>
+                                      <p:cBhvr>
+                                        <p:cTn id="24" dur="1" fill="hold">
+                                          <p:stCondLst>
+                                            <p:cond delay="499"/>
+                                          </p:stCondLst>
+                                        </p:cTn>
+                                        <p:tgtEl>
+                                          <p:spTgt spid="16"/>
+                                        </p:tgtEl>
+                                        <p:attrNameLst>
+                                          <p:attrName>style.visibility</p:attrName>
+                                        </p:attrNameLst>
+                                      </p:cBhvr>
+                                      <p:to>
+                                        <p:strVal val="hidden"/>
+                                      </p:to>
+                                    </p:set>
+                                  </p:childTnLst>
+                                </p:cTn>
+                              </p:par>
+                              <p:par>
+                                <p:cTn id="25" presetID="10" presetClass="entr" presetSubtype="0" fill="hold" nodeType="withEffect">
+                                  <p:stCondLst>
+                                    <p:cond delay="0"/>
+                                  </p:stCondLst>
+                                  <p:childTnLst>
+                                    <p:set>
+                                      <p:cBhvr>
+                                        <p:cTn id="26" dur="1" fill="hold">
+                                          <p:stCondLst>
+                                            <p:cond delay="0"/>
+                                          </p:stCondLst>
+                                        </p:cTn>
+                                        <p:tgtEl>
+                                          <p:spTgt spid="9"/>
+                                        </p:tgtEl>
+                                        <p:attrNameLst>
+                                          <p:attrName>style.visibility</p:attrName>
+                                        </p:attrNameLst>
+                                      </p:cBhvr>
+                                      <p:to>
+                                        <p:strVal val="visible"/>
+                                      </p:to>
+                                    </p:set>
+                                    <p:animEffect transition="in" filter="fade">
+                                      <p:cBhvr>
+                                        <p:cTn id="27" dur="500"/>
+                                        <p:tgtEl>
+                                          <p:spTgt spid="9"/>
+                                        </p:tgtEl>
+                                      </p:cBhvr>
+                                    </p:animEffect>
+                                  </p:childTnLst>
+                                </p:cTn>
+                              </p:par>
+                            </p:childTnLst>
+                          </p:cTn>
+                        </p:par>
+                      </p:childTnLst>
+                    </p:cTn>
+                  </p:par>
+                  <p:par>
+                    <p:cTn id="28" fill="hold">
+                      <p:stCondLst>
+                        <p:cond delay="indefinite"/>
+                      </p:stCondLst>
+                      <p:childTnLst>
+                        <p:par>
+                          <p:cTn id="29" fill="hold">
+                            <p:stCondLst>
+                              <p:cond delay="0"/>
+                            </p:stCondLst>
+                            <p:childTnLst>
+                              <p:par>
+                                <p:cTn id="30" presetID="1" presetClass="entr" presetSubtype="0" fill="hold" nodeType="clickEffect">
+                                  <p:stCondLst>
+                                    <p:cond delay="0"/>
+                                  </p:stCondLst>
+                                  <p:childTnLst>
+                                    <p:set>
+                                      <p:cBhvr>
+                                        <p:cTn id="31" dur="1" fill="hold">
+                                          <p:stCondLst>
+                                            <p:cond delay="0"/>
+                                          </p:stCondLst>
+                                        </p:cTn>
+                                        <p:tgtEl>
+                                          <p:spTgt spid="47"/>
+                                        </p:tgtEl>
+                                        <p:attrNameLst>
+                                          <p:attrName>style.visibility</p:attrName>
+                                        </p:attrNameLst>
+                                      </p:cBhvr>
+                                      <p:to>
+                                        <p:strVal val="visible"/>
+                                      </p:to>
+                                    </p:set>
+                                  </p:childTnLst>
+                                </p:cTn>
+                              </p:par>
+                              <p:par>
+                                <p:cTn id="32" presetID="1" presetClass="entr" presetSubtype="0" fill="hold" grpId="0" nodeType="withEffect">
+                                  <p:stCondLst>
+                                    <p:cond delay="0"/>
+                                  </p:stCondLst>
+                                  <p:childTnLst>
+                                    <p:set>
+                                      <p:cBhvr>
+                                        <p:cTn id="33" dur="1" fill="hold">
+                                          <p:stCondLst>
+                                            <p:cond delay="0"/>
+                                          </p:stCondLst>
+                                        </p:cTn>
+                                        <p:tgtEl>
+                                          <p:spTgt spid="17"/>
+                                        </p:tgtEl>
+                                        <p:attrNameLst>
+                                          <p:attrName>style.visibility</p:attrName>
+                                        </p:attrNameLst>
+                                      </p:cBhvr>
+                                      <p:to>
+                                        <p:strVal val="visible"/>
+                                      </p:to>
+                                    </p:set>
+                                  </p:childTnLst>
+                                </p:cTn>
+                              </p:par>
+                              <p:par>
+                                <p:cTn id="34" presetID="22" presetClass="entr" presetSubtype="8" fill="hold" nodeType="withEffect">
+                                  <p:stCondLst>
+                                    <p:cond delay="1000"/>
+                                  </p:stCondLst>
+                                  <p:childTnLst>
+                                    <p:set>
+                                      <p:cBhvr>
+                                        <p:cTn id="35" dur="1" fill="hold">
+                                          <p:stCondLst>
+                                            <p:cond delay="0"/>
+                                          </p:stCondLst>
+                                        </p:cTn>
+                                        <p:tgtEl>
+                                          <p:spTgt spid="1032"/>
+                                        </p:tgtEl>
+                                        <p:attrNameLst>
+                                          <p:attrName>style.visibility</p:attrName>
+                                        </p:attrNameLst>
+                                      </p:cBhvr>
+                                      <p:to>
+                                        <p:strVal val="visible"/>
+                                      </p:to>
+                                    </p:set>
+                                    <p:animEffect transition="in" filter="wipe(left)">
+                                      <p:cBhvr>
+                                        <p:cTn id="36" dur="500"/>
+                                        <p:tgtEl>
+                                          <p:spTgt spid="1032"/>
+                                        </p:tgtEl>
+                                      </p:cBhvr>
+                                    </p:animEffect>
+                                  </p:childTnLst>
+                                </p:cTn>
+                              </p:par>
+                            </p:childTnLst>
+                          </p:cTn>
+                        </p:par>
+                        <p:par>
+                          <p:cTn id="37" fill="hold">
+                            <p:stCondLst>
+                              <p:cond delay="1500"/>
+                            </p:stCondLst>
+                            <p:childTnLst>
+                              <p:par>
+                                <p:cTn id="38" presetID="1" presetClass="entr" presetSubtype="0" fill="hold" nodeType="afterEffect">
+                                  <p:stCondLst>
+                                    <p:cond delay="1000"/>
+                                  </p:stCondLst>
+                                  <p:childTnLst>
+                                    <p:set>
+                                      <p:cBhvr>
+                                        <p:cTn id="39" dur="1" fill="hold">
+                                          <p:stCondLst>
+                                            <p:cond delay="0"/>
+                                          </p:stCondLst>
+                                        </p:cTn>
+                                        <p:tgtEl>
+                                          <p:spTgt spid="6"/>
+                                        </p:tgtEl>
+                                        <p:attrNameLst>
+                                          <p:attrName>style.visibility</p:attrName>
+                                        </p:attrNameLst>
+                                      </p:cBhvr>
+                                      <p:to>
+                                        <p:strVal val="visible"/>
+                                      </p:to>
+                                    </p:set>
+                                  </p:childTnLst>
+                                </p:cTn>
+                              </p:par>
+                            </p:childTnLst>
+                          </p:cTn>
+                        </p:par>
+                        <p:par>
+                          <p:cTn id="40" fill="hold">
+                            <p:stCondLst>
+                              <p:cond delay="2500"/>
+                            </p:stCondLst>
+                            <p:childTnLst>
+                              <p:par>
+                                <p:cTn id="41" presetID="22" presetClass="entr" presetSubtype="8" fill="hold" nodeType="afterEffect">
+                                  <p:stCondLst>
+                                    <p:cond delay="1000"/>
+                                  </p:stCondLst>
+                                  <p:childTnLst>
+                                    <p:set>
+                                      <p:cBhvr>
+                                        <p:cTn id="42" dur="1" fill="hold">
+                                          <p:stCondLst>
+                                            <p:cond delay="0"/>
+                                          </p:stCondLst>
+                                        </p:cTn>
+                                        <p:tgtEl>
+                                          <p:spTgt spid="21"/>
+                                        </p:tgtEl>
+                                        <p:attrNameLst>
+                                          <p:attrName>style.visibility</p:attrName>
+                                        </p:attrNameLst>
+                                      </p:cBhvr>
+                                      <p:to>
+                                        <p:strVal val="visible"/>
+                                      </p:to>
+                                    </p:set>
+                                    <p:animEffect transition="in" filter="wipe(left)">
+                                      <p:cBhvr>
+                                        <p:cTn id="43" dur="500"/>
+                                        <p:tgtEl>
+                                          <p:spTgt spid="21"/>
+                                        </p:tgtEl>
+                                      </p:cBhvr>
+                                    </p:animEffect>
+                                  </p:childTnLst>
+                                </p:cTn>
+                              </p:par>
+                            </p:childTnLst>
+                          </p:cTn>
+                        </p:par>
+                        <p:par>
+                          <p:cTn id="44" fill="hold">
+                            <p:stCondLst>
+                              <p:cond delay="4000"/>
+                            </p:stCondLst>
+                            <p:childTnLst>
+                              <p:par>
+                                <p:cTn id="45" presetID="1" presetClass="entr" presetSubtype="0" fill="hold" grpId="0" nodeType="afterEffect">
+                                  <p:stCondLst>
+                                    <p:cond delay="1000"/>
+                                  </p:stCondLst>
+                                  <p:childTnLst>
+                                    <p:set>
+                                      <p:cBhvr>
+                                        <p:cTn id="46" dur="1" fill="hold">
+                                          <p:stCondLst>
+                                            <p:cond delay="0"/>
+                                          </p:stCondLst>
+                                        </p:cTn>
+                                        <p:tgtEl>
+                                          <p:spTgt spid="37"/>
+                                        </p:tgtEl>
+                                        <p:attrNameLst>
+                                          <p:attrName>style.visibility</p:attrName>
+                                        </p:attrNameLst>
+                                      </p:cBhvr>
+                                      <p:to>
+                                        <p:strVal val="visible"/>
+                                      </p:to>
+                                    </p:set>
+                                  </p:childTnLst>
+                                </p:cTn>
+                              </p:par>
+                              <p:par>
+                                <p:cTn id="47" presetID="1" presetClass="entr" presetSubtype="0" fill="hold" nodeType="withEffect">
+                                  <p:stCondLst>
+                                    <p:cond delay="1000"/>
+                                  </p:stCondLst>
+                                  <p:childTnLst>
+                                    <p:set>
+                                      <p:cBhvr>
+                                        <p:cTn id="48" dur="1" fill="hold">
+                                          <p:stCondLst>
+                                            <p:cond delay="0"/>
+                                          </p:stCondLst>
+                                        </p:cTn>
+                                        <p:tgtEl>
+                                          <p:spTgt spid="5"/>
+                                        </p:tgtEl>
+                                        <p:attrNameLst>
+                                          <p:attrName>style.visibility</p:attrName>
+                                        </p:attrNameLst>
+                                      </p:cBhvr>
+                                      <p:to>
+                                        <p:strVal val="visible"/>
+                                      </p:to>
+                                    </p:set>
+                                  </p:childTnLst>
+                                </p:cTn>
+                              </p:par>
+                              <p:par>
+                                <p:cTn id="49" presetID="1" presetClass="entr" presetSubtype="0" fill="hold" nodeType="withEffect">
+                                  <p:stCondLst>
+                                    <p:cond delay="1000"/>
+                                  </p:stCondLst>
+                                  <p:childTnLst>
+                                    <p:set>
+                                      <p:cBhvr>
+                                        <p:cTn id="50" dur="1" fill="hold">
+                                          <p:stCondLst>
+                                            <p:cond delay="0"/>
+                                          </p:stCondLst>
+                                        </p:cTn>
+                                        <p:tgtEl>
+                                          <p:spTgt spid="1026"/>
+                                        </p:tgtEl>
+                                        <p:attrNameLst>
+                                          <p:attrName>style.visibility</p:attrName>
+                                        </p:attrNameLst>
+                                      </p:cBhvr>
+                                      <p:to>
+                                        <p:strVal val="visible"/>
+                                      </p:to>
+                                    </p:set>
+                                  </p:childTnLst>
+                                </p:cTn>
+                              </p:par>
+                              <p:par>
+                                <p:cTn id="51" presetID="1" presetClass="entr" presetSubtype="0" fill="hold" nodeType="withEffect">
+                                  <p:stCondLst>
+                                    <p:cond delay="1000"/>
+                                  </p:stCondLst>
+                                  <p:childTnLst>
+                                    <p:set>
+                                      <p:cBhvr>
+                                        <p:cTn id="52" dur="1" fill="hold">
+                                          <p:stCondLst>
+                                            <p:cond delay="0"/>
+                                          </p:stCondLst>
+                                        </p:cTn>
+                                        <p:tgtEl>
+                                          <p:spTgt spid="1056"/>
+                                        </p:tgtEl>
+                                        <p:attrNameLst>
+                                          <p:attrName>style.visibility</p:attrName>
+                                        </p:attrNameLst>
+                                      </p:cBhvr>
+                                      <p:to>
+                                        <p:strVal val="visible"/>
+                                      </p:to>
+                                    </p:set>
+                                  </p:childTnLst>
+                                </p:cTn>
+                              </p:par>
+                            </p:childTnLst>
+                          </p:cTn>
+                        </p:par>
+                        <p:par>
+                          <p:cTn id="53" fill="hold">
+                            <p:stCondLst>
+                              <p:cond delay="5000"/>
+                            </p:stCondLst>
+                            <p:childTnLst>
+                              <p:par>
+                                <p:cTn id="54" presetID="22" presetClass="entr" presetSubtype="8" fill="hold" nodeType="afterEffect">
+                                  <p:stCondLst>
+                                    <p:cond delay="1000"/>
+                                  </p:stCondLst>
+                                  <p:childTnLst>
+                                    <p:set>
+                                      <p:cBhvr>
+                                        <p:cTn id="55" dur="1" fill="hold">
+                                          <p:stCondLst>
+                                            <p:cond delay="0"/>
+                                          </p:stCondLst>
+                                        </p:cTn>
+                                        <p:tgtEl>
+                                          <p:spTgt spid="23"/>
+                                        </p:tgtEl>
+                                        <p:attrNameLst>
+                                          <p:attrName>style.visibility</p:attrName>
+                                        </p:attrNameLst>
+                                      </p:cBhvr>
+                                      <p:to>
+                                        <p:strVal val="visible"/>
+                                      </p:to>
+                                    </p:set>
+                                    <p:animEffect transition="in" filter="wipe(left)">
+                                      <p:cBhvr>
+                                        <p:cTn id="56" dur="500"/>
+                                        <p:tgtEl>
+                                          <p:spTgt spid="23"/>
+                                        </p:tgtEl>
+                                      </p:cBhvr>
+                                    </p:animEffect>
+                                  </p:childTnLst>
+                                </p:cTn>
+                              </p:par>
+                            </p:childTnLst>
+                          </p:cTn>
+                        </p:par>
+                      </p:childTnLst>
+                    </p:cTn>
+                  </p:par>
+                  <p:par>
+                    <p:cTn id="57" fill="hold">
+                      <p:stCondLst>
+                        <p:cond delay="indefinite"/>
+                      </p:stCondLst>
+                      <p:childTnLst>
+                        <p:par>
+                          <p:cTn id="58" fill="hold">
+                            <p:stCondLst>
+                              <p:cond delay="0"/>
+                            </p:stCondLst>
+                            <p:childTnLst>
+                              <p:par>
+                                <p:cTn id="59" presetID="22" presetClass="entr" presetSubtype="1" fill="hold" nodeType="clickEffect">
+                                  <p:stCondLst>
+                                    <p:cond delay="0"/>
+                                  </p:stCondLst>
+                                  <p:childTnLst>
+                                    <p:set>
+                                      <p:cBhvr>
+                                        <p:cTn id="60" dur="1" fill="hold">
+                                          <p:stCondLst>
+                                            <p:cond delay="0"/>
+                                          </p:stCondLst>
+                                        </p:cTn>
+                                        <p:tgtEl>
+                                          <p:spTgt spid="27"/>
+                                        </p:tgtEl>
+                                        <p:attrNameLst>
+                                          <p:attrName>style.visibility</p:attrName>
+                                        </p:attrNameLst>
+                                      </p:cBhvr>
+                                      <p:to>
+                                        <p:strVal val="visible"/>
+                                      </p:to>
+                                    </p:set>
+                                    <p:animEffect transition="in" filter="wipe(up)">
+                                      <p:cBhvr>
+                                        <p:cTn id="61" dur="500"/>
+                                        <p:tgtEl>
+                                          <p:spTgt spid="27"/>
+                                        </p:tgtEl>
+                                      </p:cBhvr>
+                                    </p:animEffect>
+                                  </p:childTnLst>
+                                </p:cTn>
+                              </p:par>
+                            </p:childTnLst>
+                          </p:cTn>
+                        </p:par>
+                        <p:par>
+                          <p:cTn id="62" fill="hold">
+                            <p:stCondLst>
+                              <p:cond delay="500"/>
+                            </p:stCondLst>
+                            <p:childTnLst>
+                              <p:par>
+                                <p:cTn id="63" presetID="1" presetClass="entr" presetSubtype="0" fill="hold" nodeType="afterEffect">
+                                  <p:stCondLst>
+                                    <p:cond delay="1000"/>
+                                  </p:stCondLst>
+                                  <p:childTnLst>
+                                    <p:set>
+                                      <p:cBhvr>
+                                        <p:cTn id="64" dur="1" fill="hold">
+                                          <p:stCondLst>
+                                            <p:cond delay="0"/>
+                                          </p:stCondLst>
+                                        </p:cTn>
+                                        <p:tgtEl>
+                                          <p:spTgt spid="12"/>
+                                        </p:tgtEl>
+                                        <p:attrNameLst>
+                                          <p:attrName>style.visibility</p:attrName>
+                                        </p:attrNameLst>
+                                      </p:cBhvr>
+                                      <p:to>
+                                        <p:strVal val="visible"/>
+                                      </p:to>
+                                    </p:set>
+                                  </p:childTnLst>
+                                </p:cTn>
+                              </p:par>
+                            </p:childTnLst>
+                          </p:cTn>
+                        </p:par>
+                        <p:par>
+                          <p:cTn id="65" fill="hold">
+                            <p:stCondLst>
+                              <p:cond delay="1500"/>
+                            </p:stCondLst>
+                            <p:childTnLst>
+                              <p:par>
+                                <p:cTn id="66" presetID="1" presetClass="entr" presetSubtype="0" fill="hold" nodeType="afterEffect">
+                                  <p:stCondLst>
+                                    <p:cond delay="1000"/>
+                                  </p:stCondLst>
+                                  <p:childTnLst>
+                                    <p:set>
+                                      <p:cBhvr>
+                                        <p:cTn id="67" dur="1" fill="hold">
+                                          <p:stCondLst>
+                                            <p:cond delay="0"/>
+                                          </p:stCondLst>
+                                        </p:cTn>
+                                        <p:tgtEl>
+                                          <p:spTgt spid="13"/>
+                                        </p:tgtEl>
+                                        <p:attrNameLst>
+                                          <p:attrName>style.visibility</p:attrName>
+                                        </p:attrNameLst>
+                                      </p:cBhvr>
+                                      <p:to>
+                                        <p:strVal val="visible"/>
+                                      </p:to>
+                                    </p:set>
+                                  </p:childTnLst>
+                                </p:cTn>
+                              </p:par>
+                            </p:childTnLst>
+                          </p:cTn>
+                        </p:par>
+                      </p:childTnLst>
+                    </p:cTn>
+                  </p:par>
+                  <p:par>
+                    <p:cTn id="68" fill="hold">
+                      <p:stCondLst>
+                        <p:cond delay="indefinite"/>
+                      </p:stCondLst>
+                      <p:childTnLst>
+                        <p:par>
+                          <p:cTn id="69" fill="hold">
+                            <p:stCondLst>
+                              <p:cond delay="0"/>
+                            </p:stCondLst>
+                            <p:childTnLst>
+                              <p:par>
+                                <p:cTn id="70" presetID="22" presetClass="entr" presetSubtype="1" fill="hold" nodeType="clickEffect">
+                                  <p:stCondLst>
+                                    <p:cond delay="0"/>
+                                  </p:stCondLst>
+                                  <p:childTnLst>
+                                    <p:set>
+                                      <p:cBhvr>
+                                        <p:cTn id="71" dur="1" fill="hold">
+                                          <p:stCondLst>
+                                            <p:cond delay="0"/>
+                                          </p:stCondLst>
+                                        </p:cTn>
+                                        <p:tgtEl>
+                                          <p:spTgt spid="1028"/>
+                                        </p:tgtEl>
+                                        <p:attrNameLst>
+                                          <p:attrName>style.visibility</p:attrName>
+                                        </p:attrNameLst>
+                                      </p:cBhvr>
+                                      <p:to>
+                                        <p:strVal val="visible"/>
+                                      </p:to>
+                                    </p:set>
+                                    <p:animEffect transition="in" filter="wipe(up)">
+                                      <p:cBhvr>
+                                        <p:cTn id="72" dur="500"/>
+                                        <p:tgtEl>
+                                          <p:spTgt spid="1028"/>
+                                        </p:tgtEl>
+                                      </p:cBhvr>
+                                    </p:animEffect>
+                                  </p:childTnLst>
+                                </p:cTn>
+                              </p:par>
+                            </p:childTnLst>
+                          </p:cTn>
+                        </p:par>
+                        <p:par>
+                          <p:cTn id="73" fill="hold">
+                            <p:stCondLst>
+                              <p:cond delay="500"/>
+                            </p:stCondLst>
+                            <p:childTnLst>
+                              <p:par>
+                                <p:cTn id="74" presetID="1" presetClass="entr" presetSubtype="0" fill="hold" nodeType="afterEffect">
+                                  <p:stCondLst>
+                                    <p:cond delay="1000"/>
+                                  </p:stCondLst>
+                                  <p:childTnLst>
+                                    <p:set>
+                                      <p:cBhvr>
+                                        <p:cTn id="75" dur="1" fill="hold">
+                                          <p:stCondLst>
+                                            <p:cond delay="0"/>
+                                          </p:stCondLst>
+                                        </p:cTn>
+                                        <p:tgtEl>
+                                          <p:spTgt spid="1030"/>
+                                        </p:tgtEl>
+                                        <p:attrNameLst>
+                                          <p:attrName>style.visibility</p:attrName>
+                                        </p:attrNameLst>
+                                      </p:cBhvr>
+                                      <p:to>
+                                        <p:strVal val="visible"/>
+                                      </p:to>
+                                    </p:set>
+                                  </p:childTnLst>
+                                </p:cTn>
+                              </p:par>
+                            </p:childTnLst>
+                          </p:cTn>
+                        </p:par>
+                        <p:par>
+                          <p:cTn id="76" fill="hold">
+                            <p:stCondLst>
+                              <p:cond delay="1500"/>
+                            </p:stCondLst>
+                            <p:childTnLst>
+                              <p:par>
+                                <p:cTn id="77" presetID="1" presetClass="entr" presetSubtype="0" fill="hold" nodeType="afterEffect">
+                                  <p:stCondLst>
+                                    <p:cond delay="1000"/>
+                                  </p:stCondLst>
+                                  <p:childTnLst>
+                                    <p:set>
+                                      <p:cBhvr>
+                                        <p:cTn id="78" dur="1" fill="hold">
+                                          <p:stCondLst>
+                                            <p:cond delay="0"/>
+                                          </p:stCondLst>
+                                        </p:cTn>
+                                        <p:tgtEl>
+                                          <p:spTgt spid="1027"/>
+                                        </p:tgtEl>
+                                        <p:attrNameLst>
+                                          <p:attrName>style.visibility</p:attrName>
+                                        </p:attrNameLst>
+                                      </p:cBhvr>
+                                      <p:to>
+                                        <p:strVal val="visible"/>
+                                      </p:to>
+                                    </p:set>
+                                  </p:childTnLst>
+                                </p:cTn>
+                              </p:par>
+                            </p:childTnLst>
+                          </p:cTn>
+                        </p:par>
+                        <p:par>
+                          <p:cTn id="79" fill="hold">
+                            <p:stCondLst>
+                              <p:cond delay="2500"/>
+                            </p:stCondLst>
+                            <p:childTnLst>
+                              <p:par>
+                                <p:cTn id="80" presetID="1" presetClass="entr" presetSubtype="0" fill="hold" nodeType="afterEffect">
+                                  <p:stCondLst>
+                                    <p:cond delay="1000"/>
+                                  </p:stCondLst>
+                                  <p:childTnLst>
+                                    <p:set>
+                                      <p:cBhvr>
+                                        <p:cTn id="81" dur="1" fill="hold">
+                                          <p:stCondLst>
+                                            <p:cond delay="0"/>
+                                          </p:stCondLst>
+                                        </p:cTn>
+                                        <p:tgtEl>
+                                          <p:spTgt spid="1031"/>
+                                        </p:tgtEl>
+                                        <p:attrNameLst>
+                                          <p:attrName>style.visibility</p:attrName>
+                                        </p:attrNameLst>
+                                      </p:cBhvr>
+                                      <p:to>
+                                        <p:strVal val="visible"/>
+                                      </p:to>
+                                    </p:set>
+                                  </p:childTnLst>
+                                </p:cTn>
+                              </p:par>
+                            </p:childTnLst>
+                          </p:cTn>
+                        </p:par>
+                      </p:childTnLst>
+                    </p:cTn>
+                  </p:par>
+                </p:childTnLst>
+              </p:cTn>
+              <p:prevCondLst>
+                <p:cond evt="onPrev" delay="0">
+                  <p:tgtEl>
+                    <p:sldTgt/>
+                  </p:tgtEl>
+                </p:cond>
+              </p:prevCondLst>
+              <p:nextCondLst>
+                <p:cond evt="onNext" delay="0">
+                  <p:tgtEl>
+                    <p:sldTgt/>
+                  </p:tgtEl>
+                </p:cond>
+              </p:nextCondLst>
+            </p:seq>
+          </p:childTnLst>
+        </p:cTn>
+      </p:par>
+    </p:tnLst>
+    <p:bldLst>
+      <p:bldP spid="37" grpId="0" animBg="1"/>
+      <p:bldP spid="17" grpId="0" animBg="1"/>
+      <p:bldP spid="14" grpId="0" animBg="1"/>
+    </p:bldLst>
+  </p:timing>
+</p:sld>
+</file>
+
+<file path=ppt/slides/slide3.xml><?xml version="1.0" encoding="utf-8"?>
+<p:sld xmlns:a="http://schemas.openxmlformats.org/drawingml/2006/main" xmlns:r="http://schemas.openxmlformats.org/officeDocument/2006/relationships" xmlns:p="http://schemas.openxmlformats.org/presentationml/2006/main">
+  <p:cSld>
+    <p:spTree>
+      <p:nvGrpSpPr>
+        <p:cNvPr id="1" name=""/>
+        <p:cNvGrpSpPr/>
+        <p:nvPr/>
+      </p:nvGrpSpPr>
+      <p:grpSpPr>
+        <a:xfrm>
+          <a:off x="0" y="0"/>
+          <a:ext cx="0" cy="0"/>
+          <a:chOff x="0" y="0"/>
+          <a:chExt cx="0" cy="0"/>
+        </a:xfrm>
+      </p:grpSpPr>
+      <p:sp>
+        <p:nvSpPr>
           <p:cNvPr id="3" name="Titre 2">
             <a:extLst>
               <a:ext uri="{FF2B5EF4-FFF2-40B4-BE49-F238E27FC236}">
@@ -8374,7 +11631,7 @@
 </p:sld>
 </file>
 
-<file path=ppt/slides/slide3.xml><?xml version="1.0" encoding="utf-8"?>
+<file path=ppt/slides/slide4.xml><?xml version="1.0" encoding="utf-8"?>
 <p:sld xmlns:a="http://schemas.openxmlformats.org/drawingml/2006/main" xmlns:r="http://schemas.openxmlformats.org/officeDocument/2006/relationships" xmlns:p="http://schemas.openxmlformats.org/presentationml/2006/main">
   <p:cSld>
     <p:spTree>
@@ -10222,7 +13479,7 @@
 </p:sld>
 </file>
 
-<file path=ppt/slides/slide4.xml><?xml version="1.0" encoding="utf-8"?>
+<file path=ppt/slides/slide5.xml><?xml version="1.0" encoding="utf-8"?>
 <p:sld xmlns:a="http://schemas.openxmlformats.org/drawingml/2006/main" xmlns:r="http://schemas.openxmlformats.org/officeDocument/2006/relationships" xmlns:p="http://schemas.openxmlformats.org/presentationml/2006/main">
   <p:cSld>
     <p:spTree>

</xml_diff>

<commit_message>
Ai avancé sur le test predict()
</commit_message>
<xml_diff>
--- a/admin/skin_project_archi_0706.pptx
+++ b/admin/skin_project_archi_0706.pptx
@@ -5,7 +5,7 @@
     <p:sldMasterId id="2147483659" r:id="rId1"/>
   </p:sldMasterIdLst>
   <p:notesMasterIdLst>
-    <p:notesMasterId r:id="rId7"/>
+    <p:notesMasterId r:id="rId10"/>
   </p:notesMasterIdLst>
   <p:sldIdLst>
     <p:sldId id="268" r:id="rId2"/>
@@ -13,6 +13,9 @@
     <p:sldId id="265" r:id="rId4"/>
     <p:sldId id="267" r:id="rId5"/>
     <p:sldId id="269" r:id="rId6"/>
+    <p:sldId id="273" r:id="rId7"/>
+    <p:sldId id="271" r:id="rId8"/>
+    <p:sldId id="272" r:id="rId9"/>
   </p:sldIdLst>
   <p:sldSz cx="9144000" cy="5143500" type="screen16x9"/>
   <p:notesSz cx="6858000" cy="9144000"/>
@@ -257,7 +260,6 @@
 <p1510:revInfo xmlns:a="http://schemas.openxmlformats.org/drawingml/2006/main" xmlns:r="http://schemas.openxmlformats.org/officeDocument/2006/relationships" xmlns:p1510="http://schemas.microsoft.com/office/powerpoint/2015/10/main">
   <p1510:revLst>
     <p1510:client id="{9546EC74-A814-454F-9464-CDAF6A2DE971}" v="169" dt="2024-06-10T15:08:38.136"/>
-    <p1510:client id="{A89391CB-9751-4520-9ECA-7ECDFA5EA23C}" v="612" dt="2024-06-09T16:18:49.970"/>
   </p1510:revLst>
 </p1510:revInfo>
 </file>
@@ -1362,7 +1364,7 @@
   <pc:docChgLst>
     <pc:chgData name="Philippe Baucour" userId="5102170ae7533958" providerId="LiveId" clId="{9546EC74-A814-454F-9464-CDAF6A2DE971}"/>
     <pc:docChg chg="custSel addSld modSld">
-      <pc:chgData name="Philippe Baucour" userId="5102170ae7533958" providerId="LiveId" clId="{9546EC74-A814-454F-9464-CDAF6A2DE971}" dt="2024-06-10T15:09:45.365" v="179" actId="6549"/>
+      <pc:chgData name="Philippe Baucour" userId="5102170ae7533958" providerId="LiveId" clId="{9546EC74-A814-454F-9464-CDAF6A2DE971}" dt="2024-06-10T20:40:02.856" v="272" actId="20577"/>
       <pc:docMkLst>
         <pc:docMk/>
       </pc:docMkLst>
@@ -1548,6 +1550,99 @@
             <ac:cxnSpMk id="38" creationId="{F912D15A-4AC2-F142-7374-BF328BB1026B}"/>
           </ac:cxnSpMkLst>
         </pc:cxnChg>
+      </pc:sldChg>
+      <pc:sldChg chg="addSp delSp modSp new mod modClrScheme chgLayout">
+        <pc:chgData name="Philippe Baucour" userId="5102170ae7533958" providerId="LiveId" clId="{9546EC74-A814-454F-9464-CDAF6A2DE971}" dt="2024-06-10T16:10:01.436" v="223" actId="1076"/>
+        <pc:sldMkLst>
+          <pc:docMk/>
+          <pc:sldMk cId="1533125142" sldId="271"/>
+        </pc:sldMkLst>
+        <pc:spChg chg="del mod ord">
+          <ac:chgData name="Philippe Baucour" userId="5102170ae7533958" providerId="LiveId" clId="{9546EC74-A814-454F-9464-CDAF6A2DE971}" dt="2024-06-10T16:09:36.542" v="181" actId="700"/>
+          <ac:spMkLst>
+            <pc:docMk/>
+            <pc:sldMk cId="1533125142" sldId="271"/>
+            <ac:spMk id="2" creationId="{868954A1-D09D-44D6-F520-DA4D273F7644}"/>
+          </ac:spMkLst>
+        </pc:spChg>
+        <pc:spChg chg="add mod ord">
+          <ac:chgData name="Philippe Baucour" userId="5102170ae7533958" providerId="LiveId" clId="{9546EC74-A814-454F-9464-CDAF6A2DE971}" dt="2024-06-10T16:09:53.908" v="221" actId="20577"/>
+          <ac:spMkLst>
+            <pc:docMk/>
+            <pc:sldMk cId="1533125142" sldId="271"/>
+            <ac:spMk id="3" creationId="{89259ABD-3A9B-2F7C-2C12-19A206884325}"/>
+          </ac:spMkLst>
+        </pc:spChg>
+        <pc:picChg chg="add mod">
+          <ac:chgData name="Philippe Baucour" userId="5102170ae7533958" providerId="LiveId" clId="{9546EC74-A814-454F-9464-CDAF6A2DE971}" dt="2024-06-10T16:10:01.436" v="223" actId="1076"/>
+          <ac:picMkLst>
+            <pc:docMk/>
+            <pc:sldMk cId="1533125142" sldId="271"/>
+            <ac:picMk id="5" creationId="{9B06FDBE-E202-5A65-A428-2A4EB54712CC}"/>
+          </ac:picMkLst>
+        </pc:picChg>
+      </pc:sldChg>
+      <pc:sldChg chg="addSp delSp modSp new mod modClrScheme chgLayout">
+        <pc:chgData name="Philippe Baucour" userId="5102170ae7533958" providerId="LiveId" clId="{9546EC74-A814-454F-9464-CDAF6A2DE971}" dt="2024-06-10T20:40:02.856" v="272" actId="20577"/>
+        <pc:sldMkLst>
+          <pc:docMk/>
+          <pc:sldMk cId="471808504" sldId="272"/>
+        </pc:sldMkLst>
+        <pc:spChg chg="del mod ord">
+          <ac:chgData name="Philippe Baucour" userId="5102170ae7533958" providerId="LiveId" clId="{9546EC74-A814-454F-9464-CDAF6A2DE971}" dt="2024-06-10T20:39:49.711" v="238" actId="700"/>
+          <ac:spMkLst>
+            <pc:docMk/>
+            <pc:sldMk cId="471808504" sldId="272"/>
+            <ac:spMk id="2" creationId="{68D07CBB-9C13-40A0-9FC1-4B9851C46347}"/>
+          </ac:spMkLst>
+        </pc:spChg>
+        <pc:spChg chg="add mod ord">
+          <ac:chgData name="Philippe Baucour" userId="5102170ae7533958" providerId="LiveId" clId="{9546EC74-A814-454F-9464-CDAF6A2DE971}" dt="2024-06-10T20:40:02.856" v="272" actId="20577"/>
+          <ac:spMkLst>
+            <pc:docMk/>
+            <pc:sldMk cId="471808504" sldId="272"/>
+            <ac:spMk id="5" creationId="{F4C2C1E4-E899-5095-73A1-4DD72D4D1DAB}"/>
+          </ac:spMkLst>
+        </pc:spChg>
+        <pc:picChg chg="add mod">
+          <ac:chgData name="Philippe Baucour" userId="5102170ae7533958" providerId="LiveId" clId="{9546EC74-A814-454F-9464-CDAF6A2DE971}" dt="2024-06-10T20:37:28.133" v="227" actId="1076"/>
+          <ac:picMkLst>
+            <pc:docMk/>
+            <pc:sldMk cId="471808504" sldId="272"/>
+            <ac:picMk id="4" creationId="{AD0310D8-7742-556A-E626-894D520ED57D}"/>
+          </ac:picMkLst>
+        </pc:picChg>
+      </pc:sldChg>
+      <pc:sldChg chg="addSp delSp modSp new mod modClrScheme chgLayout">
+        <pc:chgData name="Philippe Baucour" userId="5102170ae7533958" providerId="LiveId" clId="{9546EC74-A814-454F-9464-CDAF6A2DE971}" dt="2024-06-10T20:39:20.790" v="237" actId="1076"/>
+        <pc:sldMkLst>
+          <pc:docMk/>
+          <pc:sldMk cId="2955890335" sldId="273"/>
+        </pc:sldMkLst>
+        <pc:spChg chg="del mod ord">
+          <ac:chgData name="Philippe Baucour" userId="5102170ae7533958" providerId="LiveId" clId="{9546EC74-A814-454F-9464-CDAF6A2DE971}" dt="2024-06-10T20:39:05.138" v="229" actId="700"/>
+          <ac:spMkLst>
+            <pc:docMk/>
+            <pc:sldMk cId="2955890335" sldId="273"/>
+            <ac:spMk id="2" creationId="{F58DE1B5-409F-FE06-7788-57BD098876B8}"/>
+          </ac:spMkLst>
+        </pc:spChg>
+        <pc:spChg chg="add mod ord">
+          <ac:chgData name="Philippe Baucour" userId="5102170ae7533958" providerId="LiveId" clId="{9546EC74-A814-454F-9464-CDAF6A2DE971}" dt="2024-06-10T20:39:11.988" v="234" actId="20577"/>
+          <ac:spMkLst>
+            <pc:docMk/>
+            <pc:sldMk cId="2955890335" sldId="273"/>
+            <ac:spMk id="3" creationId="{7B977106-8E92-0C60-1C04-1A8F28B9E0A3}"/>
+          </ac:spMkLst>
+        </pc:spChg>
+        <pc:picChg chg="add mod">
+          <ac:chgData name="Philippe Baucour" userId="5102170ae7533958" providerId="LiveId" clId="{9546EC74-A814-454F-9464-CDAF6A2DE971}" dt="2024-06-10T20:39:20.790" v="237" actId="1076"/>
+          <ac:picMkLst>
+            <pc:docMk/>
+            <pc:sldMk cId="2955890335" sldId="273"/>
+            <ac:picMk id="5" creationId="{B88CF3AA-31D8-1525-EC4B-AEF5405C2575}"/>
+          </ac:picMkLst>
+        </pc:picChg>
       </pc:sldChg>
     </pc:docChg>
   </pc:docChgLst>
@@ -13956,6 +14051,274 @@
 </p:sld>
 </file>
 
+<file path=ppt/slides/slide6.xml><?xml version="1.0" encoding="utf-8"?>
+<p:sld xmlns:a="http://schemas.openxmlformats.org/drawingml/2006/main" xmlns:r="http://schemas.openxmlformats.org/officeDocument/2006/relationships" xmlns:p="http://schemas.openxmlformats.org/presentationml/2006/main">
+  <p:cSld>
+    <p:spTree>
+      <p:nvGrpSpPr>
+        <p:cNvPr id="1" name=""/>
+        <p:cNvGrpSpPr/>
+        <p:nvPr/>
+      </p:nvGrpSpPr>
+      <p:grpSpPr>
+        <a:xfrm>
+          <a:off x="0" y="0"/>
+          <a:ext cx="0" cy="0"/>
+          <a:chOff x="0" y="0"/>
+          <a:chExt cx="0" cy="0"/>
+        </a:xfrm>
+      </p:grpSpPr>
+      <p:sp>
+        <p:nvSpPr>
+          <p:cNvPr id="3" name="Titre 2">
+            <a:extLst>
+              <a:ext uri="{FF2B5EF4-FFF2-40B4-BE49-F238E27FC236}">
+                <a16:creationId xmlns:a16="http://schemas.microsoft.com/office/drawing/2014/main" id="{7B977106-8E92-0C60-1C04-1A8F28B9E0A3}"/>
+              </a:ext>
+            </a:extLst>
+          </p:cNvPr>
+          <p:cNvSpPr>
+            <a:spLocks noGrp="1"/>
+          </p:cNvSpPr>
+          <p:nvPr>
+            <p:ph type="title"/>
+          </p:nvPr>
+        </p:nvSpPr>
+        <p:spPr/>
+        <p:txBody>
+          <a:bodyPr/>
+          <a:lstStyle/>
+          <a:p>
+            <a:r>
+              <a:rPr lang="fr-FR" dirty="0"/>
+              <a:t>10/06</a:t>
+            </a:r>
+          </a:p>
+        </p:txBody>
+      </p:sp>
+      <p:pic>
+        <p:nvPicPr>
+          <p:cNvPr id="5" name="Image 4">
+            <a:extLst>
+              <a:ext uri="{FF2B5EF4-FFF2-40B4-BE49-F238E27FC236}">
+                <a16:creationId xmlns:a16="http://schemas.microsoft.com/office/drawing/2014/main" id="{B88CF3AA-31D8-1525-EC4B-AEF5405C2575}"/>
+              </a:ext>
+            </a:extLst>
+          </p:cNvPr>
+          <p:cNvPicPr>
+            <a:picLocks noChangeAspect="1"/>
+          </p:cNvPicPr>
+          <p:nvPr/>
+        </p:nvPicPr>
+        <p:blipFill>
+          <a:blip r:embed="rId2"/>
+          <a:stretch>
+            <a:fillRect/>
+          </a:stretch>
+        </p:blipFill>
+        <p:spPr>
+          <a:xfrm>
+            <a:off x="473283" y="1247524"/>
+            <a:ext cx="8293930" cy="2568951"/>
+          </a:xfrm>
+          <a:prstGeom prst="rect">
+            <a:avLst/>
+          </a:prstGeom>
+        </p:spPr>
+      </p:pic>
+    </p:spTree>
+    <p:extLst>
+      <p:ext uri="{BB962C8B-B14F-4D97-AF65-F5344CB8AC3E}">
+        <p14:creationId xmlns:p14="http://schemas.microsoft.com/office/powerpoint/2010/main" val="2955890335"/>
+      </p:ext>
+    </p:extLst>
+  </p:cSld>
+  <p:clrMapOvr>
+    <a:masterClrMapping/>
+  </p:clrMapOvr>
+</p:sld>
+</file>
+
+<file path=ppt/slides/slide7.xml><?xml version="1.0" encoding="utf-8"?>
+<p:sld xmlns:a="http://schemas.openxmlformats.org/drawingml/2006/main" xmlns:r="http://schemas.openxmlformats.org/officeDocument/2006/relationships" xmlns:p="http://schemas.openxmlformats.org/presentationml/2006/main">
+  <p:cSld>
+    <p:spTree>
+      <p:nvGrpSpPr>
+        <p:cNvPr id="1" name=""/>
+        <p:cNvGrpSpPr/>
+        <p:nvPr/>
+      </p:nvGrpSpPr>
+      <p:grpSpPr>
+        <a:xfrm>
+          <a:off x="0" y="0"/>
+          <a:ext cx="0" cy="0"/>
+          <a:chOff x="0" y="0"/>
+          <a:chExt cx="0" cy="0"/>
+        </a:xfrm>
+      </p:grpSpPr>
+      <p:sp>
+        <p:nvSpPr>
+          <p:cNvPr id="3" name="Titre 2">
+            <a:extLst>
+              <a:ext uri="{FF2B5EF4-FFF2-40B4-BE49-F238E27FC236}">
+                <a16:creationId xmlns:a16="http://schemas.microsoft.com/office/drawing/2014/main" id="{89259ABD-3A9B-2F7C-2C12-19A206884325}"/>
+              </a:ext>
+            </a:extLst>
+          </p:cNvPr>
+          <p:cNvSpPr>
+            <a:spLocks noGrp="1"/>
+          </p:cNvSpPr>
+          <p:nvPr>
+            <p:ph type="title"/>
+          </p:nvPr>
+        </p:nvSpPr>
+        <p:spPr/>
+        <p:txBody>
+          <a:bodyPr/>
+          <a:lstStyle/>
+          <a:p>
+            <a:r>
+              <a:rPr lang="fr-FR" dirty="0"/>
+              <a:t>Test d'accès en navigation privée</a:t>
+            </a:r>
+          </a:p>
+        </p:txBody>
+      </p:sp>
+      <p:pic>
+        <p:nvPicPr>
+          <p:cNvPr id="5" name="Image 4">
+            <a:extLst>
+              <a:ext uri="{FF2B5EF4-FFF2-40B4-BE49-F238E27FC236}">
+                <a16:creationId xmlns:a16="http://schemas.microsoft.com/office/drawing/2014/main" id="{9B06FDBE-E202-5A65-A428-2A4EB54712CC}"/>
+              </a:ext>
+            </a:extLst>
+          </p:cNvPr>
+          <p:cNvPicPr>
+            <a:picLocks noChangeAspect="1"/>
+          </p:cNvPicPr>
+          <p:nvPr/>
+        </p:nvPicPr>
+        <p:blipFill>
+          <a:blip r:embed="rId2"/>
+          <a:stretch>
+            <a:fillRect/>
+          </a:stretch>
+        </p:blipFill>
+        <p:spPr>
+          <a:xfrm>
+            <a:off x="698435" y="1364080"/>
+            <a:ext cx="7884977" cy="2524327"/>
+          </a:xfrm>
+          <a:prstGeom prst="rect">
+            <a:avLst/>
+          </a:prstGeom>
+        </p:spPr>
+      </p:pic>
+    </p:spTree>
+    <p:extLst>
+      <p:ext uri="{BB962C8B-B14F-4D97-AF65-F5344CB8AC3E}">
+        <p14:creationId xmlns:p14="http://schemas.microsoft.com/office/powerpoint/2010/main" val="1533125142"/>
+      </p:ext>
+    </p:extLst>
+  </p:cSld>
+  <p:clrMapOvr>
+    <a:masterClrMapping/>
+  </p:clrMapOvr>
+</p:sld>
+</file>
+
+<file path=ppt/slides/slide8.xml><?xml version="1.0" encoding="utf-8"?>
+<p:sld xmlns:a="http://schemas.openxmlformats.org/drawingml/2006/main" xmlns:r="http://schemas.openxmlformats.org/officeDocument/2006/relationships" xmlns:p="http://schemas.openxmlformats.org/presentationml/2006/main">
+  <p:cSld>
+    <p:spTree>
+      <p:nvGrpSpPr>
+        <p:cNvPr id="1" name=""/>
+        <p:cNvGrpSpPr/>
+        <p:nvPr/>
+      </p:nvGrpSpPr>
+      <p:grpSpPr>
+        <a:xfrm>
+          <a:off x="0" y="0"/>
+          <a:ext cx="0" cy="0"/>
+          <a:chOff x="0" y="0"/>
+          <a:chExt cx="0" cy="0"/>
+        </a:xfrm>
+      </p:grpSpPr>
+      <p:sp>
+        <p:nvSpPr>
+          <p:cNvPr id="5" name="Titre 4">
+            <a:extLst>
+              <a:ext uri="{FF2B5EF4-FFF2-40B4-BE49-F238E27FC236}">
+                <a16:creationId xmlns:a16="http://schemas.microsoft.com/office/drawing/2014/main" id="{F4C2C1E4-E899-5095-73A1-4DD72D4D1DAB}"/>
+              </a:ext>
+            </a:extLst>
+          </p:cNvPr>
+          <p:cNvSpPr>
+            <a:spLocks noGrp="1"/>
+          </p:cNvSpPr>
+          <p:nvPr>
+            <p:ph type="title"/>
+          </p:nvPr>
+        </p:nvSpPr>
+        <p:spPr/>
+        <p:txBody>
+          <a:bodyPr/>
+          <a:lstStyle/>
+          <a:p>
+            <a:r>
+              <a:rPr lang="fr-FR" dirty="0"/>
+              <a:t>Prédictions à partir </a:t>
+            </a:r>
+            <a:r>
+              <a:rPr lang="fr-FR"/>
+              <a:t>d'un script</a:t>
+            </a:r>
+          </a:p>
+        </p:txBody>
+      </p:sp>
+      <p:pic>
+        <p:nvPicPr>
+          <p:cNvPr id="4" name="Image 3">
+            <a:extLst>
+              <a:ext uri="{FF2B5EF4-FFF2-40B4-BE49-F238E27FC236}">
+                <a16:creationId xmlns:a16="http://schemas.microsoft.com/office/drawing/2014/main" id="{AD0310D8-7742-556A-E626-894D520ED57D}"/>
+              </a:ext>
+            </a:extLst>
+          </p:cNvPr>
+          <p:cNvPicPr>
+            <a:picLocks noChangeAspect="1"/>
+          </p:cNvPicPr>
+          <p:nvPr/>
+        </p:nvPicPr>
+        <p:blipFill>
+          <a:blip r:embed="rId2"/>
+          <a:stretch>
+            <a:fillRect/>
+          </a:stretch>
+        </p:blipFill>
+        <p:spPr>
+          <a:xfrm>
+            <a:off x="482472" y="1893735"/>
+            <a:ext cx="8179055" cy="1356029"/>
+          </a:xfrm>
+          <a:prstGeom prst="rect">
+            <a:avLst/>
+          </a:prstGeom>
+        </p:spPr>
+      </p:pic>
+    </p:spTree>
+    <p:extLst>
+      <p:ext uri="{BB962C8B-B14F-4D97-AF65-F5344CB8AC3E}">
+        <p14:creationId xmlns:p14="http://schemas.microsoft.com/office/powerpoint/2010/main" val="471808504"/>
+      </p:ext>
+    </p:extLst>
+  </p:cSld>
+  <p:clrMapOvr>
+    <a:masterClrMapping/>
+  </p:clrMapOvr>
+</p:sld>
+</file>
+
 <file path=ppt/theme/theme1.xml><?xml version="1.0" encoding="utf-8"?>
 <a:theme xmlns:a="http://schemas.openxmlformats.org/drawingml/2006/main" name="Simple Light">
   <a:themeElements>

</xml_diff>

<commit_message>
Update du modeles et test.
</commit_message>
<xml_diff>
--- a/admin/skin_project_archi_0706.pptx
+++ b/admin/skin_project_archi_0706.pptx
@@ -5,7 +5,7 @@
     <p:sldMasterId id="2147483659" r:id="rId1"/>
   </p:sldMasterIdLst>
   <p:notesMasterIdLst>
-    <p:notesMasterId r:id="rId10"/>
+    <p:notesMasterId r:id="rId17"/>
   </p:notesMasterIdLst>
   <p:sldIdLst>
     <p:sldId id="268" r:id="rId2"/>
@@ -16,6 +16,13 @@
     <p:sldId id="273" r:id="rId7"/>
     <p:sldId id="271" r:id="rId8"/>
     <p:sldId id="272" r:id="rId9"/>
+    <p:sldId id="274" r:id="rId10"/>
+    <p:sldId id="275" r:id="rId11"/>
+    <p:sldId id="276" r:id="rId12"/>
+    <p:sldId id="277" r:id="rId13"/>
+    <p:sldId id="278" r:id="rId14"/>
+    <p:sldId id="279" r:id="rId15"/>
+    <p:sldId id="280" r:id="rId16"/>
   </p:sldIdLst>
   <p:sldSz cx="9144000" cy="5143500" type="screen16x9"/>
   <p:notesSz cx="6858000" cy="9144000"/>
@@ -259,7 +266,7 @@
 <file path=ppt/revisionInfo.xml><?xml version="1.0" encoding="utf-8"?>
 <p1510:revInfo xmlns:a="http://schemas.openxmlformats.org/drawingml/2006/main" xmlns:r="http://schemas.openxmlformats.org/officeDocument/2006/relationships" xmlns:p1510="http://schemas.microsoft.com/office/powerpoint/2015/10/main">
   <p1510:revLst>
-    <p1510:client id="{9546EC74-A814-454F-9464-CDAF6A2DE971}" v="169" dt="2024-06-10T15:08:38.136"/>
+    <p1510:client id="{9546EC74-A814-454F-9464-CDAF6A2DE971}" v="171" dt="2024-06-12T08:57:57.693"/>
   </p1510:revLst>
 </p1510:revInfo>
 </file>
@@ -1364,7 +1371,7 @@
   <pc:docChgLst>
     <pc:chgData name="Philippe Baucour" userId="5102170ae7533958" providerId="LiveId" clId="{9546EC74-A814-454F-9464-CDAF6A2DE971}"/>
     <pc:docChg chg="custSel addSld modSld">
-      <pc:chgData name="Philippe Baucour" userId="5102170ae7533958" providerId="LiveId" clId="{9546EC74-A814-454F-9464-CDAF6A2DE971}" dt="2024-06-10T20:40:02.856" v="272" actId="20577"/>
+      <pc:chgData name="Philippe Baucour" userId="5102170ae7533958" providerId="LiveId" clId="{9546EC74-A814-454F-9464-CDAF6A2DE971}" dt="2024-06-13T08:42:03.803" v="456" actId="14100"/>
       <pc:docMkLst>
         <pc:docMk/>
       </pc:docMkLst>
@@ -1641,6 +1648,231 @@
             <pc:docMk/>
             <pc:sldMk cId="2955890335" sldId="273"/>
             <ac:picMk id="5" creationId="{B88CF3AA-31D8-1525-EC4B-AEF5405C2575}"/>
+          </ac:picMkLst>
+        </pc:picChg>
+      </pc:sldChg>
+      <pc:sldChg chg="addSp delSp modSp new mod modClrScheme chgLayout">
+        <pc:chgData name="Philippe Baucour" userId="5102170ae7533958" providerId="LiveId" clId="{9546EC74-A814-454F-9464-CDAF6A2DE971}" dt="2024-06-12T08:52:39.989" v="320" actId="20577"/>
+        <pc:sldMkLst>
+          <pc:docMk/>
+          <pc:sldMk cId="3466325700" sldId="274"/>
+        </pc:sldMkLst>
+        <pc:spChg chg="del mod ord">
+          <ac:chgData name="Philippe Baucour" userId="5102170ae7533958" providerId="LiveId" clId="{9546EC74-A814-454F-9464-CDAF6A2DE971}" dt="2024-06-12T08:52:07.942" v="275" actId="700"/>
+          <ac:spMkLst>
+            <pc:docMk/>
+            <pc:sldMk cId="3466325700" sldId="274"/>
+            <ac:spMk id="2" creationId="{DA5B005B-A3C3-2518-E73E-250F882FA220}"/>
+          </ac:spMkLst>
+        </pc:spChg>
+        <pc:spChg chg="add mod ord">
+          <ac:chgData name="Philippe Baucour" userId="5102170ae7533958" providerId="LiveId" clId="{9546EC74-A814-454F-9464-CDAF6A2DE971}" dt="2024-06-12T08:52:39.989" v="320" actId="20577"/>
+          <ac:spMkLst>
+            <pc:docMk/>
+            <pc:sldMk cId="3466325700" sldId="274"/>
+            <ac:spMk id="3" creationId="{938FAA9B-AA7D-A893-2F47-6422FD81BBD8}"/>
+          </ac:spMkLst>
+        </pc:spChg>
+        <pc:picChg chg="add mod">
+          <ac:chgData name="Philippe Baucour" userId="5102170ae7533958" providerId="LiveId" clId="{9546EC74-A814-454F-9464-CDAF6A2DE971}" dt="2024-06-12T08:52:20.220" v="278" actId="14100"/>
+          <ac:picMkLst>
+            <pc:docMk/>
+            <pc:sldMk cId="3466325700" sldId="274"/>
+            <ac:picMk id="5" creationId="{1F9DE783-D8AB-D8E7-F46A-17CE4435EA30}"/>
+          </ac:picMkLst>
+        </pc:picChg>
+      </pc:sldChg>
+      <pc:sldChg chg="addSp delSp modSp new mod modClrScheme chgLayout">
+        <pc:chgData name="Philippe Baucour" userId="5102170ae7533958" providerId="LiveId" clId="{9546EC74-A814-454F-9464-CDAF6A2DE971}" dt="2024-06-12T08:58:31.149" v="375" actId="1076"/>
+        <pc:sldMkLst>
+          <pc:docMk/>
+          <pc:sldMk cId="292342887" sldId="275"/>
+        </pc:sldMkLst>
+        <pc:spChg chg="del mod ord">
+          <ac:chgData name="Philippe Baucour" userId="5102170ae7533958" providerId="LiveId" clId="{9546EC74-A814-454F-9464-CDAF6A2DE971}" dt="2024-06-12T08:57:15.274" v="322" actId="700"/>
+          <ac:spMkLst>
+            <pc:docMk/>
+            <pc:sldMk cId="292342887" sldId="275"/>
+            <ac:spMk id="2" creationId="{530D5680-A37F-A37E-CEB1-0E96BCB410A4}"/>
+          </ac:spMkLst>
+        </pc:spChg>
+        <pc:spChg chg="add mod ord">
+          <ac:chgData name="Philippe Baucour" userId="5102170ae7533958" providerId="LiveId" clId="{9546EC74-A814-454F-9464-CDAF6A2DE971}" dt="2024-06-12T08:57:15.274" v="322" actId="700"/>
+          <ac:spMkLst>
+            <pc:docMk/>
+            <pc:sldMk cId="292342887" sldId="275"/>
+            <ac:spMk id="3" creationId="{15DBC86D-16C2-74F5-CB1A-24EB15EF833E}"/>
+          </ac:spMkLst>
+        </pc:spChg>
+        <pc:spChg chg="add mod">
+          <ac:chgData name="Philippe Baucour" userId="5102170ae7533958" providerId="LiveId" clId="{9546EC74-A814-454F-9464-CDAF6A2DE971}" dt="2024-06-12T08:58:31.149" v="375" actId="1076"/>
+          <ac:spMkLst>
+            <pc:docMk/>
+            <pc:sldMk cId="292342887" sldId="275"/>
+            <ac:spMk id="6" creationId="{955ABAAB-F597-8CBB-F27D-0EAE21F14919}"/>
+          </ac:spMkLst>
+        </pc:spChg>
+        <pc:picChg chg="add mod">
+          <ac:chgData name="Philippe Baucour" userId="5102170ae7533958" providerId="LiveId" clId="{9546EC74-A814-454F-9464-CDAF6A2DE971}" dt="2024-06-12T08:57:25.695" v="326" actId="14100"/>
+          <ac:picMkLst>
+            <pc:docMk/>
+            <pc:sldMk cId="292342887" sldId="275"/>
+            <ac:picMk id="5" creationId="{08959755-C53E-C10C-F733-C02BDE4532F2}"/>
+          </ac:picMkLst>
+        </pc:picChg>
+      </pc:sldChg>
+      <pc:sldChg chg="addSp delSp modSp new mod modClrScheme chgLayout">
+        <pc:chgData name="Philippe Baucour" userId="5102170ae7533958" providerId="LiveId" clId="{9546EC74-A814-454F-9464-CDAF6A2DE971}" dt="2024-06-12T11:54:26.831" v="429" actId="1035"/>
+        <pc:sldMkLst>
+          <pc:docMk/>
+          <pc:sldMk cId="3604987106" sldId="276"/>
+        </pc:sldMkLst>
+        <pc:spChg chg="del mod ord">
+          <ac:chgData name="Philippe Baucour" userId="5102170ae7533958" providerId="LiveId" clId="{9546EC74-A814-454F-9464-CDAF6A2DE971}" dt="2024-06-12T09:44:34.194" v="380" actId="700"/>
+          <ac:spMkLst>
+            <pc:docMk/>
+            <pc:sldMk cId="3604987106" sldId="276"/>
+            <ac:spMk id="2" creationId="{42EAD8A1-0CEF-87BD-1520-0826E4EA96BA}"/>
+          </ac:spMkLst>
+        </pc:spChg>
+        <pc:spChg chg="add mod ord">
+          <ac:chgData name="Philippe Baucour" userId="5102170ae7533958" providerId="LiveId" clId="{9546EC74-A814-454F-9464-CDAF6A2DE971}" dt="2024-06-12T09:44:58.482" v="426" actId="20577"/>
+          <ac:spMkLst>
+            <pc:docMk/>
+            <pc:sldMk cId="3604987106" sldId="276"/>
+            <ac:spMk id="5" creationId="{ED15ACDC-45A2-1D17-8E2F-DFDD19F1E93C}"/>
+          </ac:spMkLst>
+        </pc:spChg>
+        <pc:picChg chg="add mod">
+          <ac:chgData name="Philippe Baucour" userId="5102170ae7533958" providerId="LiveId" clId="{9546EC74-A814-454F-9464-CDAF6A2DE971}" dt="2024-06-12T11:54:26.831" v="429" actId="1035"/>
+          <ac:picMkLst>
+            <pc:docMk/>
+            <pc:sldMk cId="3604987106" sldId="276"/>
+            <ac:picMk id="4" creationId="{A9B5F365-6DD3-15AA-809E-999F4076E57B}"/>
+          </ac:picMkLst>
+        </pc:picChg>
+      </pc:sldChg>
+      <pc:sldChg chg="addSp delSp modSp new mod modClrScheme chgLayout">
+        <pc:chgData name="Philippe Baucour" userId="5102170ae7533958" providerId="LiveId" clId="{9546EC74-A814-454F-9464-CDAF6A2DE971}" dt="2024-06-13T08:39:53.433" v="438" actId="14100"/>
+        <pc:sldMkLst>
+          <pc:docMk/>
+          <pc:sldMk cId="1878953371" sldId="277"/>
+        </pc:sldMkLst>
+        <pc:spChg chg="del mod ord">
+          <ac:chgData name="Philippe Baucour" userId="5102170ae7533958" providerId="LiveId" clId="{9546EC74-A814-454F-9464-CDAF6A2DE971}" dt="2024-06-13T08:39:35.521" v="431" actId="700"/>
+          <ac:spMkLst>
+            <pc:docMk/>
+            <pc:sldMk cId="1878953371" sldId="277"/>
+            <ac:spMk id="2" creationId="{0CBB0C36-E69E-6453-50D3-75FC1739FCE6}"/>
+          </ac:spMkLst>
+        </pc:spChg>
+        <pc:spChg chg="add mod ord">
+          <ac:chgData name="Philippe Baucour" userId="5102170ae7533958" providerId="LiveId" clId="{9546EC74-A814-454F-9464-CDAF6A2DE971}" dt="2024-06-13T08:39:35.521" v="431" actId="700"/>
+          <ac:spMkLst>
+            <pc:docMk/>
+            <pc:sldMk cId="1878953371" sldId="277"/>
+            <ac:spMk id="3" creationId="{42F9C309-7D5D-C662-F168-F47EFE581249}"/>
+          </ac:spMkLst>
+        </pc:spChg>
+        <pc:picChg chg="add mod">
+          <ac:chgData name="Philippe Baucour" userId="5102170ae7533958" providerId="LiveId" clId="{9546EC74-A814-454F-9464-CDAF6A2DE971}" dt="2024-06-13T08:39:53.433" v="438" actId="14100"/>
+          <ac:picMkLst>
+            <pc:docMk/>
+            <pc:sldMk cId="1878953371" sldId="277"/>
+            <ac:picMk id="5" creationId="{A1707192-8EA9-B8C4-2796-A9326B207671}"/>
+          </ac:picMkLst>
+        </pc:picChg>
+      </pc:sldChg>
+      <pc:sldChg chg="addSp delSp modSp new mod modClrScheme chgLayout">
+        <pc:chgData name="Philippe Baucour" userId="5102170ae7533958" providerId="LiveId" clId="{9546EC74-A814-454F-9464-CDAF6A2DE971}" dt="2024-06-13T08:40:39.692" v="444" actId="14100"/>
+        <pc:sldMkLst>
+          <pc:docMk/>
+          <pc:sldMk cId="191255963" sldId="278"/>
+        </pc:sldMkLst>
+        <pc:spChg chg="del mod ord">
+          <ac:chgData name="Philippe Baucour" userId="5102170ae7533958" providerId="LiveId" clId="{9546EC74-A814-454F-9464-CDAF6A2DE971}" dt="2024-06-13T08:40:29.348" v="440" actId="700"/>
+          <ac:spMkLst>
+            <pc:docMk/>
+            <pc:sldMk cId="191255963" sldId="278"/>
+            <ac:spMk id="2" creationId="{83A745F2-B9D1-3ED9-A4E3-07F41C048443}"/>
+          </ac:spMkLst>
+        </pc:spChg>
+        <pc:spChg chg="add mod ord">
+          <ac:chgData name="Philippe Baucour" userId="5102170ae7533958" providerId="LiveId" clId="{9546EC74-A814-454F-9464-CDAF6A2DE971}" dt="2024-06-13T08:40:29.348" v="440" actId="700"/>
+          <ac:spMkLst>
+            <pc:docMk/>
+            <pc:sldMk cId="191255963" sldId="278"/>
+            <ac:spMk id="3" creationId="{C9188E85-1A0F-1F68-2DE0-C502FDCE3AF4}"/>
+          </ac:spMkLst>
+        </pc:spChg>
+        <pc:picChg chg="add mod">
+          <ac:chgData name="Philippe Baucour" userId="5102170ae7533958" providerId="LiveId" clId="{9546EC74-A814-454F-9464-CDAF6A2DE971}" dt="2024-06-13T08:40:39.692" v="444" actId="14100"/>
+          <ac:picMkLst>
+            <pc:docMk/>
+            <pc:sldMk cId="191255963" sldId="278"/>
+            <ac:picMk id="5" creationId="{1F132C22-5728-A023-A34E-0450A604DE6F}"/>
+          </ac:picMkLst>
+        </pc:picChg>
+      </pc:sldChg>
+      <pc:sldChg chg="addSp delSp modSp new mod modClrScheme chgLayout">
+        <pc:chgData name="Philippe Baucour" userId="5102170ae7533958" providerId="LiveId" clId="{9546EC74-A814-454F-9464-CDAF6A2DE971}" dt="2024-06-13T08:41:23.846" v="450" actId="14100"/>
+        <pc:sldMkLst>
+          <pc:docMk/>
+          <pc:sldMk cId="2750708421" sldId="279"/>
+        </pc:sldMkLst>
+        <pc:spChg chg="del mod ord">
+          <ac:chgData name="Philippe Baucour" userId="5102170ae7533958" providerId="LiveId" clId="{9546EC74-A814-454F-9464-CDAF6A2DE971}" dt="2024-06-13T08:41:11.202" v="446" actId="700"/>
+          <ac:spMkLst>
+            <pc:docMk/>
+            <pc:sldMk cId="2750708421" sldId="279"/>
+            <ac:spMk id="2" creationId="{93F8A45B-DAB2-7961-D90E-4742550EAE58}"/>
+          </ac:spMkLst>
+        </pc:spChg>
+        <pc:spChg chg="add mod ord">
+          <ac:chgData name="Philippe Baucour" userId="5102170ae7533958" providerId="LiveId" clId="{9546EC74-A814-454F-9464-CDAF6A2DE971}" dt="2024-06-13T08:41:11.202" v="446" actId="700"/>
+          <ac:spMkLst>
+            <pc:docMk/>
+            <pc:sldMk cId="2750708421" sldId="279"/>
+            <ac:spMk id="3" creationId="{A30DE29E-1103-B919-B8D5-96B7BA311BE8}"/>
+          </ac:spMkLst>
+        </pc:spChg>
+        <pc:picChg chg="add mod">
+          <ac:chgData name="Philippe Baucour" userId="5102170ae7533958" providerId="LiveId" clId="{9546EC74-A814-454F-9464-CDAF6A2DE971}" dt="2024-06-13T08:41:23.846" v="450" actId="14100"/>
+          <ac:picMkLst>
+            <pc:docMk/>
+            <pc:sldMk cId="2750708421" sldId="279"/>
+            <ac:picMk id="5" creationId="{C888E24C-4200-9A54-4926-E69301909023}"/>
+          </ac:picMkLst>
+        </pc:picChg>
+      </pc:sldChg>
+      <pc:sldChg chg="addSp delSp modSp new mod modClrScheme chgLayout">
+        <pc:chgData name="Philippe Baucour" userId="5102170ae7533958" providerId="LiveId" clId="{9546EC74-A814-454F-9464-CDAF6A2DE971}" dt="2024-06-13T08:42:03.803" v="456" actId="14100"/>
+        <pc:sldMkLst>
+          <pc:docMk/>
+          <pc:sldMk cId="1620320245" sldId="280"/>
+        </pc:sldMkLst>
+        <pc:spChg chg="del mod ord">
+          <ac:chgData name="Philippe Baucour" userId="5102170ae7533958" providerId="LiveId" clId="{9546EC74-A814-454F-9464-CDAF6A2DE971}" dt="2024-06-13T08:41:53.886" v="452" actId="700"/>
+          <ac:spMkLst>
+            <pc:docMk/>
+            <pc:sldMk cId="1620320245" sldId="280"/>
+            <ac:spMk id="2" creationId="{F635E7AD-EB0A-0F8D-F4CA-89D7BE363145}"/>
+          </ac:spMkLst>
+        </pc:spChg>
+        <pc:spChg chg="add mod ord">
+          <ac:chgData name="Philippe Baucour" userId="5102170ae7533958" providerId="LiveId" clId="{9546EC74-A814-454F-9464-CDAF6A2DE971}" dt="2024-06-13T08:41:53.886" v="452" actId="700"/>
+          <ac:spMkLst>
+            <pc:docMk/>
+            <pc:sldMk cId="1620320245" sldId="280"/>
+            <ac:spMk id="3" creationId="{CD476A8F-862C-DD63-9580-A07CAD6C353A}"/>
+          </ac:spMkLst>
+        </pc:spChg>
+        <pc:picChg chg="add mod">
+          <ac:chgData name="Philippe Baucour" userId="5102170ae7533958" providerId="LiveId" clId="{9546EC74-A814-454F-9464-CDAF6A2DE971}" dt="2024-06-13T08:42:03.803" v="456" actId="14100"/>
+          <ac:picMkLst>
+            <pc:docMk/>
+            <pc:sldMk cId="1620320245" sldId="280"/>
+            <ac:picMk id="5" creationId="{4CE4E53F-42B7-DBAE-D683-F48E37635B64}"/>
           </ac:picMkLst>
         </pc:picChg>
       </pc:sldChg>
@@ -7572,6 +7804,569 @@
 </p:sld>
 </file>
 
+<file path=ppt/slides/slide10.xml><?xml version="1.0" encoding="utf-8"?>
+<p:sld xmlns:a="http://schemas.openxmlformats.org/drawingml/2006/main" xmlns:r="http://schemas.openxmlformats.org/officeDocument/2006/relationships" xmlns:p="http://schemas.openxmlformats.org/presentationml/2006/main">
+  <p:cSld>
+    <p:spTree>
+      <p:nvGrpSpPr>
+        <p:cNvPr id="1" name=""/>
+        <p:cNvGrpSpPr/>
+        <p:nvPr/>
+      </p:nvGrpSpPr>
+      <p:grpSpPr>
+        <a:xfrm>
+          <a:off x="0" y="0"/>
+          <a:ext cx="0" cy="0"/>
+          <a:chOff x="0" y="0"/>
+          <a:chExt cx="0" cy="0"/>
+        </a:xfrm>
+      </p:grpSpPr>
+      <p:sp>
+        <p:nvSpPr>
+          <p:cNvPr id="3" name="Titre 2">
+            <a:extLst>
+              <a:ext uri="{FF2B5EF4-FFF2-40B4-BE49-F238E27FC236}">
+                <a16:creationId xmlns:a16="http://schemas.microsoft.com/office/drawing/2014/main" id="{15DBC86D-16C2-74F5-CB1A-24EB15EF833E}"/>
+              </a:ext>
+            </a:extLst>
+          </p:cNvPr>
+          <p:cNvSpPr>
+            <a:spLocks noGrp="1"/>
+          </p:cNvSpPr>
+          <p:nvPr>
+            <p:ph type="title"/>
+          </p:nvPr>
+        </p:nvSpPr>
+        <p:spPr/>
+        <p:txBody>
+          <a:bodyPr/>
+          <a:lstStyle/>
+          <a:p>
+            <a:endParaRPr lang="fr-FR"/>
+          </a:p>
+        </p:txBody>
+      </p:sp>
+      <p:pic>
+        <p:nvPicPr>
+          <p:cNvPr id="5" name="Image 4">
+            <a:extLst>
+              <a:ext uri="{FF2B5EF4-FFF2-40B4-BE49-F238E27FC236}">
+                <a16:creationId xmlns:a16="http://schemas.microsoft.com/office/drawing/2014/main" id="{08959755-C53E-C10C-F733-C02BDE4532F2}"/>
+              </a:ext>
+            </a:extLst>
+          </p:cNvPr>
+          <p:cNvPicPr>
+            <a:picLocks noChangeAspect="1"/>
+          </p:cNvPicPr>
+          <p:nvPr/>
+        </p:nvPicPr>
+        <p:blipFill>
+          <a:blip r:embed="rId2"/>
+          <a:stretch>
+            <a:fillRect/>
+          </a:stretch>
+        </p:blipFill>
+        <p:spPr>
+          <a:xfrm>
+            <a:off x="1374587" y="1006298"/>
+            <a:ext cx="3606365" cy="4000683"/>
+          </a:xfrm>
+          <a:prstGeom prst="rect">
+            <a:avLst/>
+          </a:prstGeom>
+        </p:spPr>
+      </p:pic>
+      <p:sp>
+        <p:nvSpPr>
+          <p:cNvPr id="6" name="ZoneTexte 5">
+            <a:extLst>
+              <a:ext uri="{FF2B5EF4-FFF2-40B4-BE49-F238E27FC236}">
+                <a16:creationId xmlns:a16="http://schemas.microsoft.com/office/drawing/2014/main" id="{955ABAAB-F597-8CBB-F27D-0EAE21F14919}"/>
+              </a:ext>
+            </a:extLst>
+          </p:cNvPr>
+          <p:cNvSpPr txBox="1"/>
+          <p:nvPr/>
+        </p:nvSpPr>
+        <p:spPr>
+          <a:xfrm>
+            <a:off x="5757503" y="2376970"/>
+            <a:ext cx="2175596" cy="523220"/>
+          </a:xfrm>
+          <a:prstGeom prst="rect">
+            <a:avLst/>
+          </a:prstGeom>
+          <a:noFill/>
+        </p:spPr>
+        <p:txBody>
+          <a:bodyPr wrap="none" rtlCol="0">
+            <a:spAutoFit/>
+          </a:bodyPr>
+          <a:lstStyle/>
+          <a:p>
+            <a:r>
+              <a:rPr lang="fr-FR" dirty="0"/>
+              <a:t>Recall = </a:t>
+            </a:r>
+            <a:r>
+              <a:rPr lang="fr-FR" dirty="0" err="1"/>
+              <a:t>Sensitivity</a:t>
+            </a:r>
+            <a:br>
+              <a:rPr lang="fr-FR" dirty="0"/>
+            </a:br>
+            <a:r>
+              <a:rPr lang="fr-FR" dirty="0" err="1"/>
+              <a:t>Specificity</a:t>
+            </a:r>
+            <a:r>
+              <a:rPr lang="fr-FR" dirty="0"/>
+              <a:t> = TN/(TN+FP)</a:t>
+            </a:r>
+          </a:p>
+        </p:txBody>
+      </p:sp>
+    </p:spTree>
+    <p:extLst>
+      <p:ext uri="{BB962C8B-B14F-4D97-AF65-F5344CB8AC3E}">
+        <p14:creationId xmlns:p14="http://schemas.microsoft.com/office/powerpoint/2010/main" val="292342887"/>
+      </p:ext>
+    </p:extLst>
+  </p:cSld>
+  <p:clrMapOvr>
+    <a:masterClrMapping/>
+  </p:clrMapOvr>
+</p:sld>
+</file>
+
+<file path=ppt/slides/slide11.xml><?xml version="1.0" encoding="utf-8"?>
+<p:sld xmlns:a="http://schemas.openxmlformats.org/drawingml/2006/main" xmlns:r="http://schemas.openxmlformats.org/officeDocument/2006/relationships" xmlns:p="http://schemas.openxmlformats.org/presentationml/2006/main">
+  <p:cSld>
+    <p:spTree>
+      <p:nvGrpSpPr>
+        <p:cNvPr id="1" name=""/>
+        <p:cNvGrpSpPr/>
+        <p:nvPr/>
+      </p:nvGrpSpPr>
+      <p:grpSpPr>
+        <a:xfrm>
+          <a:off x="0" y="0"/>
+          <a:ext cx="0" cy="0"/>
+          <a:chOff x="0" y="0"/>
+          <a:chExt cx="0" cy="0"/>
+        </a:xfrm>
+      </p:grpSpPr>
+      <p:sp>
+        <p:nvSpPr>
+          <p:cNvPr id="5" name="Titre 4">
+            <a:extLst>
+              <a:ext uri="{FF2B5EF4-FFF2-40B4-BE49-F238E27FC236}">
+                <a16:creationId xmlns:a16="http://schemas.microsoft.com/office/drawing/2014/main" id="{ED15ACDC-45A2-1D17-8E2F-DFDD19F1E93C}"/>
+              </a:ext>
+            </a:extLst>
+          </p:cNvPr>
+          <p:cNvSpPr>
+            <a:spLocks noGrp="1"/>
+          </p:cNvSpPr>
+          <p:nvPr>
+            <p:ph type="title"/>
+          </p:nvPr>
+        </p:nvSpPr>
+        <p:spPr/>
+        <p:txBody>
+          <a:bodyPr/>
+          <a:lstStyle/>
+          <a:p>
+            <a:r>
+              <a:rPr lang="fr-FR" dirty="0"/>
+              <a:t>Les 4 classes utilisées par Dominique (12/6)</a:t>
+            </a:r>
+          </a:p>
+        </p:txBody>
+      </p:sp>
+      <p:pic>
+        <p:nvPicPr>
+          <p:cNvPr id="4" name="Image 3">
+            <a:extLst>
+              <a:ext uri="{FF2B5EF4-FFF2-40B4-BE49-F238E27FC236}">
+                <a16:creationId xmlns:a16="http://schemas.microsoft.com/office/drawing/2014/main" id="{A9B5F365-6DD3-15AA-809E-999F4076E57B}"/>
+              </a:ext>
+            </a:extLst>
+          </p:cNvPr>
+          <p:cNvPicPr>
+            <a:picLocks noChangeAspect="1"/>
+          </p:cNvPicPr>
+          <p:nvPr/>
+        </p:nvPicPr>
+        <p:blipFill>
+          <a:blip r:embed="rId2"/>
+          <a:stretch>
+            <a:fillRect/>
+          </a:stretch>
+        </p:blipFill>
+        <p:spPr>
+          <a:xfrm>
+            <a:off x="461099" y="1202098"/>
+            <a:ext cx="3168931" cy="1807707"/>
+          </a:xfrm>
+          <a:prstGeom prst="rect">
+            <a:avLst/>
+          </a:prstGeom>
+        </p:spPr>
+      </p:pic>
+    </p:spTree>
+    <p:extLst>
+      <p:ext uri="{BB962C8B-B14F-4D97-AF65-F5344CB8AC3E}">
+        <p14:creationId xmlns:p14="http://schemas.microsoft.com/office/powerpoint/2010/main" val="3604987106"/>
+      </p:ext>
+    </p:extLst>
+  </p:cSld>
+  <p:clrMapOvr>
+    <a:masterClrMapping/>
+  </p:clrMapOvr>
+</p:sld>
+</file>
+
+<file path=ppt/slides/slide12.xml><?xml version="1.0" encoding="utf-8"?>
+<p:sld xmlns:a="http://schemas.openxmlformats.org/drawingml/2006/main" xmlns:r="http://schemas.openxmlformats.org/officeDocument/2006/relationships" xmlns:p="http://schemas.openxmlformats.org/presentationml/2006/main">
+  <p:cSld>
+    <p:spTree>
+      <p:nvGrpSpPr>
+        <p:cNvPr id="1" name=""/>
+        <p:cNvGrpSpPr/>
+        <p:nvPr/>
+      </p:nvGrpSpPr>
+      <p:grpSpPr>
+        <a:xfrm>
+          <a:off x="0" y="0"/>
+          <a:ext cx="0" cy="0"/>
+          <a:chOff x="0" y="0"/>
+          <a:chExt cx="0" cy="0"/>
+        </a:xfrm>
+      </p:grpSpPr>
+      <p:sp>
+        <p:nvSpPr>
+          <p:cNvPr id="3" name="Titre 2">
+            <a:extLst>
+              <a:ext uri="{FF2B5EF4-FFF2-40B4-BE49-F238E27FC236}">
+                <a16:creationId xmlns:a16="http://schemas.microsoft.com/office/drawing/2014/main" id="{42F9C309-7D5D-C662-F168-F47EFE581249}"/>
+              </a:ext>
+            </a:extLst>
+          </p:cNvPr>
+          <p:cNvSpPr>
+            <a:spLocks noGrp="1"/>
+          </p:cNvSpPr>
+          <p:nvPr>
+            <p:ph type="title"/>
+          </p:nvPr>
+        </p:nvSpPr>
+        <p:spPr/>
+        <p:txBody>
+          <a:bodyPr/>
+          <a:lstStyle/>
+          <a:p>
+            <a:endParaRPr lang="fr-FR"/>
+          </a:p>
+        </p:txBody>
+      </p:sp>
+      <p:pic>
+        <p:nvPicPr>
+          <p:cNvPr id="5" name="Image 4">
+            <a:extLst>
+              <a:ext uri="{FF2B5EF4-FFF2-40B4-BE49-F238E27FC236}">
+                <a16:creationId xmlns:a16="http://schemas.microsoft.com/office/drawing/2014/main" id="{A1707192-8EA9-B8C4-2796-A9326B207671}"/>
+              </a:ext>
+            </a:extLst>
+          </p:cNvPr>
+          <p:cNvPicPr>
+            <a:picLocks noChangeAspect="1"/>
+          </p:cNvPicPr>
+          <p:nvPr/>
+        </p:nvPicPr>
+        <p:blipFill>
+          <a:blip r:embed="rId2"/>
+          <a:stretch>
+            <a:fillRect/>
+          </a:stretch>
+        </p:blipFill>
+        <p:spPr>
+          <a:xfrm>
+            <a:off x="189690" y="846928"/>
+            <a:ext cx="8191544" cy="4157829"/>
+          </a:xfrm>
+          <a:prstGeom prst="rect">
+            <a:avLst/>
+          </a:prstGeom>
+        </p:spPr>
+      </p:pic>
+    </p:spTree>
+    <p:extLst>
+      <p:ext uri="{BB962C8B-B14F-4D97-AF65-F5344CB8AC3E}">
+        <p14:creationId xmlns:p14="http://schemas.microsoft.com/office/powerpoint/2010/main" val="1878953371"/>
+      </p:ext>
+    </p:extLst>
+  </p:cSld>
+  <p:clrMapOvr>
+    <a:masterClrMapping/>
+  </p:clrMapOvr>
+</p:sld>
+</file>
+
+<file path=ppt/slides/slide13.xml><?xml version="1.0" encoding="utf-8"?>
+<p:sld xmlns:a="http://schemas.openxmlformats.org/drawingml/2006/main" xmlns:r="http://schemas.openxmlformats.org/officeDocument/2006/relationships" xmlns:p="http://schemas.openxmlformats.org/presentationml/2006/main">
+  <p:cSld>
+    <p:spTree>
+      <p:nvGrpSpPr>
+        <p:cNvPr id="1" name=""/>
+        <p:cNvGrpSpPr/>
+        <p:nvPr/>
+      </p:nvGrpSpPr>
+      <p:grpSpPr>
+        <a:xfrm>
+          <a:off x="0" y="0"/>
+          <a:ext cx="0" cy="0"/>
+          <a:chOff x="0" y="0"/>
+          <a:chExt cx="0" cy="0"/>
+        </a:xfrm>
+      </p:grpSpPr>
+      <p:sp>
+        <p:nvSpPr>
+          <p:cNvPr id="3" name="Titre 2">
+            <a:extLst>
+              <a:ext uri="{FF2B5EF4-FFF2-40B4-BE49-F238E27FC236}">
+                <a16:creationId xmlns:a16="http://schemas.microsoft.com/office/drawing/2014/main" id="{C9188E85-1A0F-1F68-2DE0-C502FDCE3AF4}"/>
+              </a:ext>
+            </a:extLst>
+          </p:cNvPr>
+          <p:cNvSpPr>
+            <a:spLocks noGrp="1"/>
+          </p:cNvSpPr>
+          <p:nvPr>
+            <p:ph type="title"/>
+          </p:nvPr>
+        </p:nvSpPr>
+        <p:spPr/>
+        <p:txBody>
+          <a:bodyPr/>
+          <a:lstStyle/>
+          <a:p>
+            <a:endParaRPr lang="fr-FR"/>
+          </a:p>
+        </p:txBody>
+      </p:sp>
+      <p:pic>
+        <p:nvPicPr>
+          <p:cNvPr id="5" name="Image 4">
+            <a:extLst>
+              <a:ext uri="{FF2B5EF4-FFF2-40B4-BE49-F238E27FC236}">
+                <a16:creationId xmlns:a16="http://schemas.microsoft.com/office/drawing/2014/main" id="{1F132C22-5728-A023-A34E-0450A604DE6F}"/>
+              </a:ext>
+            </a:extLst>
+          </p:cNvPr>
+          <p:cNvPicPr>
+            <a:picLocks noChangeAspect="1"/>
+          </p:cNvPicPr>
+          <p:nvPr/>
+        </p:nvPicPr>
+        <p:blipFill>
+          <a:blip r:embed="rId2"/>
+          <a:stretch>
+            <a:fillRect/>
+          </a:stretch>
+        </p:blipFill>
+        <p:spPr>
+          <a:xfrm>
+            <a:off x="533015" y="774219"/>
+            <a:ext cx="5913735" cy="4307298"/>
+          </a:xfrm>
+          <a:prstGeom prst="rect">
+            <a:avLst/>
+          </a:prstGeom>
+        </p:spPr>
+      </p:pic>
+    </p:spTree>
+    <p:extLst>
+      <p:ext uri="{BB962C8B-B14F-4D97-AF65-F5344CB8AC3E}">
+        <p14:creationId xmlns:p14="http://schemas.microsoft.com/office/powerpoint/2010/main" val="191255963"/>
+      </p:ext>
+    </p:extLst>
+  </p:cSld>
+  <p:clrMapOvr>
+    <a:masterClrMapping/>
+  </p:clrMapOvr>
+</p:sld>
+</file>
+
+<file path=ppt/slides/slide14.xml><?xml version="1.0" encoding="utf-8"?>
+<p:sld xmlns:a="http://schemas.openxmlformats.org/drawingml/2006/main" xmlns:r="http://schemas.openxmlformats.org/officeDocument/2006/relationships" xmlns:p="http://schemas.openxmlformats.org/presentationml/2006/main">
+  <p:cSld>
+    <p:spTree>
+      <p:nvGrpSpPr>
+        <p:cNvPr id="1" name=""/>
+        <p:cNvGrpSpPr/>
+        <p:nvPr/>
+      </p:nvGrpSpPr>
+      <p:grpSpPr>
+        <a:xfrm>
+          <a:off x="0" y="0"/>
+          <a:ext cx="0" cy="0"/>
+          <a:chOff x="0" y="0"/>
+          <a:chExt cx="0" cy="0"/>
+        </a:xfrm>
+      </p:grpSpPr>
+      <p:sp>
+        <p:nvSpPr>
+          <p:cNvPr id="3" name="Titre 2">
+            <a:extLst>
+              <a:ext uri="{FF2B5EF4-FFF2-40B4-BE49-F238E27FC236}">
+                <a16:creationId xmlns:a16="http://schemas.microsoft.com/office/drawing/2014/main" id="{A30DE29E-1103-B919-B8D5-96B7BA311BE8}"/>
+              </a:ext>
+            </a:extLst>
+          </p:cNvPr>
+          <p:cNvSpPr>
+            <a:spLocks noGrp="1"/>
+          </p:cNvSpPr>
+          <p:nvPr>
+            <p:ph type="title"/>
+          </p:nvPr>
+        </p:nvSpPr>
+        <p:spPr/>
+        <p:txBody>
+          <a:bodyPr/>
+          <a:lstStyle/>
+          <a:p>
+            <a:endParaRPr lang="fr-FR"/>
+          </a:p>
+        </p:txBody>
+      </p:sp>
+      <p:pic>
+        <p:nvPicPr>
+          <p:cNvPr id="5" name="Image 4">
+            <a:extLst>
+              <a:ext uri="{FF2B5EF4-FFF2-40B4-BE49-F238E27FC236}">
+                <a16:creationId xmlns:a16="http://schemas.microsoft.com/office/drawing/2014/main" id="{C888E24C-4200-9A54-4926-E69301909023}"/>
+              </a:ext>
+            </a:extLst>
+          </p:cNvPr>
+          <p:cNvPicPr>
+            <a:picLocks noChangeAspect="1"/>
+          </p:cNvPicPr>
+          <p:nvPr/>
+        </p:nvPicPr>
+        <p:blipFill>
+          <a:blip r:embed="rId2"/>
+          <a:stretch>
+            <a:fillRect/>
+          </a:stretch>
+        </p:blipFill>
+        <p:spPr>
+          <a:xfrm>
+            <a:off x="206774" y="864191"/>
+            <a:ext cx="8324880" cy="4102977"/>
+          </a:xfrm>
+          <a:prstGeom prst="rect">
+            <a:avLst/>
+          </a:prstGeom>
+        </p:spPr>
+      </p:pic>
+    </p:spTree>
+    <p:extLst>
+      <p:ext uri="{BB962C8B-B14F-4D97-AF65-F5344CB8AC3E}">
+        <p14:creationId xmlns:p14="http://schemas.microsoft.com/office/powerpoint/2010/main" val="2750708421"/>
+      </p:ext>
+    </p:extLst>
+  </p:cSld>
+  <p:clrMapOvr>
+    <a:masterClrMapping/>
+  </p:clrMapOvr>
+</p:sld>
+</file>
+
+<file path=ppt/slides/slide15.xml><?xml version="1.0" encoding="utf-8"?>
+<p:sld xmlns:a="http://schemas.openxmlformats.org/drawingml/2006/main" xmlns:r="http://schemas.openxmlformats.org/officeDocument/2006/relationships" xmlns:p="http://schemas.openxmlformats.org/presentationml/2006/main">
+  <p:cSld>
+    <p:spTree>
+      <p:nvGrpSpPr>
+        <p:cNvPr id="1" name=""/>
+        <p:cNvGrpSpPr/>
+        <p:nvPr/>
+      </p:nvGrpSpPr>
+      <p:grpSpPr>
+        <a:xfrm>
+          <a:off x="0" y="0"/>
+          <a:ext cx="0" cy="0"/>
+          <a:chOff x="0" y="0"/>
+          <a:chExt cx="0" cy="0"/>
+        </a:xfrm>
+      </p:grpSpPr>
+      <p:sp>
+        <p:nvSpPr>
+          <p:cNvPr id="3" name="Titre 2">
+            <a:extLst>
+              <a:ext uri="{FF2B5EF4-FFF2-40B4-BE49-F238E27FC236}">
+                <a16:creationId xmlns:a16="http://schemas.microsoft.com/office/drawing/2014/main" id="{CD476A8F-862C-DD63-9580-A07CAD6C353A}"/>
+              </a:ext>
+            </a:extLst>
+          </p:cNvPr>
+          <p:cNvSpPr>
+            <a:spLocks noGrp="1"/>
+          </p:cNvSpPr>
+          <p:nvPr>
+            <p:ph type="title"/>
+          </p:nvPr>
+        </p:nvSpPr>
+        <p:spPr/>
+        <p:txBody>
+          <a:bodyPr/>
+          <a:lstStyle/>
+          <a:p>
+            <a:endParaRPr lang="fr-FR"/>
+          </a:p>
+        </p:txBody>
+      </p:sp>
+      <p:pic>
+        <p:nvPicPr>
+          <p:cNvPr id="5" name="Image 4">
+            <a:extLst>
+              <a:ext uri="{FF2B5EF4-FFF2-40B4-BE49-F238E27FC236}">
+                <a16:creationId xmlns:a16="http://schemas.microsoft.com/office/drawing/2014/main" id="{4CE4E53F-42B7-DBAE-D683-F48E37635B64}"/>
+              </a:ext>
+            </a:extLst>
+          </p:cNvPr>
+          <p:cNvPicPr>
+            <a:picLocks noChangeAspect="1"/>
+          </p:cNvPicPr>
+          <p:nvPr/>
+        </p:nvPicPr>
+        <p:blipFill>
+          <a:blip r:embed="rId2"/>
+          <a:stretch>
+            <a:fillRect/>
+          </a:stretch>
+        </p:blipFill>
+        <p:spPr>
+          <a:xfrm>
+            <a:off x="321647" y="784735"/>
+            <a:ext cx="7889573" cy="4173072"/>
+          </a:xfrm>
+          <a:prstGeom prst="rect">
+            <a:avLst/>
+          </a:prstGeom>
+        </p:spPr>
+      </p:pic>
+    </p:spTree>
+    <p:extLst>
+      <p:ext uri="{BB962C8B-B14F-4D97-AF65-F5344CB8AC3E}">
+        <p14:creationId xmlns:p14="http://schemas.microsoft.com/office/powerpoint/2010/main" val="1620320245"/>
+      </p:ext>
+    </p:extLst>
+  </p:cSld>
+  <p:clrMapOvr>
+    <a:masterClrMapping/>
+  </p:clrMapOvr>
+</p:sld>
+</file>
+
 <file path=ppt/slides/slide2.xml><?xml version="1.0" encoding="utf-8"?>
 <p:sld xmlns:a="http://schemas.openxmlformats.org/drawingml/2006/main" xmlns:r="http://schemas.openxmlformats.org/officeDocument/2006/relationships" xmlns:p="http://schemas.openxmlformats.org/presentationml/2006/main">
   <p:cSld>
@@ -14319,6 +15114,102 @@
 </p:sld>
 </file>
 
+<file path=ppt/slides/slide9.xml><?xml version="1.0" encoding="utf-8"?>
+<p:sld xmlns:a="http://schemas.openxmlformats.org/drawingml/2006/main" xmlns:r="http://schemas.openxmlformats.org/officeDocument/2006/relationships" xmlns:p="http://schemas.openxmlformats.org/presentationml/2006/main">
+  <p:cSld>
+    <p:spTree>
+      <p:nvGrpSpPr>
+        <p:cNvPr id="1" name=""/>
+        <p:cNvGrpSpPr/>
+        <p:nvPr/>
+      </p:nvGrpSpPr>
+      <p:grpSpPr>
+        <a:xfrm>
+          <a:off x="0" y="0"/>
+          <a:ext cx="0" cy="0"/>
+          <a:chOff x="0" y="0"/>
+          <a:chExt cx="0" cy="0"/>
+        </a:xfrm>
+      </p:grpSpPr>
+      <p:sp>
+        <p:nvSpPr>
+          <p:cNvPr id="3" name="Titre 2">
+            <a:extLst>
+              <a:ext uri="{FF2B5EF4-FFF2-40B4-BE49-F238E27FC236}">
+                <a16:creationId xmlns:a16="http://schemas.microsoft.com/office/drawing/2014/main" id="{938FAA9B-AA7D-A893-2F47-6422FD81BBD8}"/>
+              </a:ext>
+            </a:extLst>
+          </p:cNvPr>
+          <p:cNvSpPr>
+            <a:spLocks noGrp="1"/>
+          </p:cNvSpPr>
+          <p:nvPr>
+            <p:ph type="title"/>
+          </p:nvPr>
+        </p:nvSpPr>
+        <p:spPr/>
+        <p:txBody>
+          <a:bodyPr/>
+          <a:lstStyle/>
+          <a:p>
+            <a:r>
+              <a:rPr lang="fr-FR" dirty="0"/>
+              <a:t>Tout premier run </a:t>
+            </a:r>
+            <a:r>
+              <a:rPr lang="fr-FR" dirty="0" err="1"/>
+              <a:t>transfer</a:t>
+            </a:r>
+            <a:r>
+              <a:rPr lang="fr-FR"/>
+              <a:t> learning</a:t>
+            </a:r>
+          </a:p>
+        </p:txBody>
+      </p:sp>
+      <p:pic>
+        <p:nvPicPr>
+          <p:cNvPr id="5" name="Image 4">
+            <a:extLst>
+              <a:ext uri="{FF2B5EF4-FFF2-40B4-BE49-F238E27FC236}">
+                <a16:creationId xmlns:a16="http://schemas.microsoft.com/office/drawing/2014/main" id="{1F9DE783-D8AB-D8E7-F46A-17CE4435EA30}"/>
+              </a:ext>
+            </a:extLst>
+          </p:cNvPr>
+          <p:cNvPicPr>
+            <a:picLocks noChangeAspect="1"/>
+          </p:cNvPicPr>
+          <p:nvPr/>
+        </p:nvPicPr>
+        <p:blipFill>
+          <a:blip r:embed="rId2"/>
+          <a:stretch>
+            <a:fillRect/>
+          </a:stretch>
+        </p:blipFill>
+        <p:spPr>
+          <a:xfrm>
+            <a:off x="187569" y="1885200"/>
+            <a:ext cx="8728770" cy="1799970"/>
+          </a:xfrm>
+          <a:prstGeom prst="rect">
+            <a:avLst/>
+          </a:prstGeom>
+        </p:spPr>
+      </p:pic>
+    </p:spTree>
+    <p:extLst>
+      <p:ext uri="{BB962C8B-B14F-4D97-AF65-F5344CB8AC3E}">
+        <p14:creationId xmlns:p14="http://schemas.microsoft.com/office/powerpoint/2010/main" val="3466325700"/>
+      </p:ext>
+    </p:extLst>
+  </p:cSld>
+  <p:clrMapOvr>
+    <a:masterClrMapping/>
+  </p:clrMapOvr>
+</p:sld>
+</file>
+
 <file path=ppt/theme/theme1.xml><?xml version="1.0" encoding="utf-8"?>
 <a:theme xmlns:a="http://schemas.openxmlformats.org/drawingml/2006/main" name="Simple Light">
   <a:themeElements>

</xml_diff>